<commit_message>
Created plots for optuna's evaluation metrics and history
</commit_message>
<xml_diff>
--- a/chapter_06/figures/cv_optuna.pptx
+++ b/chapter_06/figures/cv_optuna.pptx
@@ -2,14 +2,14 @@
 <file path=ppt/presentation.xml><?xml version="1.0" encoding="utf-8"?>
 <p:presentation xmlns:a="http://schemas.openxmlformats.org/drawingml/2006/main" xmlns:r="http://schemas.openxmlformats.org/officeDocument/2006/relationships" xmlns:p="http://schemas.openxmlformats.org/presentationml/2006/main" saveSubsetFonts="1">
   <p:sldMasterIdLst>
-    <p:sldMasterId id="2147483684" r:id="rId1"/>
+    <p:sldMasterId id="2147483696" r:id="rId1"/>
   </p:sldMasterIdLst>
   <p:sldIdLst>
     <p:sldId id="258" r:id="rId2"/>
     <p:sldId id="257" r:id="rId3"/>
     <p:sldId id="259" r:id="rId4"/>
   </p:sldIdLst>
-  <p:sldSz cx="4140200" cy="7991475"/>
+  <p:sldSz cx="4140200" cy="7596188"/>
   <p:notesSz cx="6858000" cy="9144000"/>
   <p:defaultTextStyle>
     <a:defPPr>
@@ -117,7 +117,7 @@
 <file path=ppt/revisionInfo.xml><?xml version="1.0" encoding="utf-8"?>
 <p1510:revInfo xmlns:a="http://schemas.openxmlformats.org/drawingml/2006/main" xmlns:r="http://schemas.openxmlformats.org/officeDocument/2006/relationships" xmlns:p1510="http://schemas.microsoft.com/office/powerpoint/2015/10/main">
   <p1510:revLst>
-    <p1510:client id="{8F39CC3E-6016-4CF8-AB9C-88FF887B156E}" v="83" dt="2025-06-12T10:54:26.561"/>
+    <p1510:client id="{0478CFAF-F744-4001-ABF3-5E8A4958592B}" v="5" dt="2025-07-03T10:13:38.626"/>
   </p1510:revLst>
 </p1510:revInfo>
 </file>
@@ -5948,6 +5948,798 @@
           <pc:docMk/>
           <pc:sldMk cId="2168025636" sldId="259"/>
         </pc:sldMkLst>
+      </pc:sldChg>
+    </pc:docChg>
+  </pc:docChgLst>
+  <pc:docChgLst>
+    <pc:chgData name="Fatima Pillosu" userId="a6295d4dc9e22643" providerId="LiveId" clId="{0478CFAF-F744-4001-ABF3-5E8A4958592B}"/>
+    <pc:docChg chg="undo custSel modSld">
+      <pc:chgData name="Fatima Pillosu" userId="a6295d4dc9e22643" providerId="LiveId" clId="{0478CFAF-F744-4001-ABF3-5E8A4958592B}" dt="2025-07-03T10:13:38.626" v="499"/>
+      <pc:docMkLst>
+        <pc:docMk/>
+      </pc:docMkLst>
+      <pc:sldChg chg="addSp delSp modSp mod">
+        <pc:chgData name="Fatima Pillosu" userId="a6295d4dc9e22643" providerId="LiveId" clId="{0478CFAF-F744-4001-ABF3-5E8A4958592B}" dt="2025-07-03T10:13:38.626" v="499"/>
+        <pc:sldMkLst>
+          <pc:docMk/>
+          <pc:sldMk cId="2370713982" sldId="258"/>
+        </pc:sldMkLst>
+        <pc:spChg chg="add del mod">
+          <ac:chgData name="Fatima Pillosu" userId="a6295d4dc9e22643" providerId="LiveId" clId="{0478CFAF-F744-4001-ABF3-5E8A4958592B}" dt="2025-07-03T10:13:29.318" v="498" actId="21"/>
+          <ac:spMkLst>
+            <pc:docMk/>
+            <pc:sldMk cId="2370713982" sldId="258"/>
+            <ac:spMk id="4" creationId="{27B7D5CF-81CA-4EAF-61FB-FBDB71CAE40F}"/>
+          </ac:spMkLst>
+        </pc:spChg>
+        <pc:spChg chg="add del mod">
+          <ac:chgData name="Fatima Pillosu" userId="a6295d4dc9e22643" providerId="LiveId" clId="{0478CFAF-F744-4001-ABF3-5E8A4958592B}" dt="2025-07-03T10:13:25.499" v="497" actId="478"/>
+          <ac:spMkLst>
+            <pc:docMk/>
+            <pc:sldMk cId="2370713982" sldId="258"/>
+            <ac:spMk id="6" creationId="{5B5D5622-A42F-1A13-C7AE-10F806E4B9BF}"/>
+          </ac:spMkLst>
+        </pc:spChg>
+        <pc:spChg chg="add mod">
+          <ac:chgData name="Fatima Pillosu" userId="a6295d4dc9e22643" providerId="LiveId" clId="{0478CFAF-F744-4001-ABF3-5E8A4958592B}" dt="2025-07-03T10:13:38.626" v="499"/>
+          <ac:spMkLst>
+            <pc:docMk/>
+            <pc:sldMk cId="2370713982" sldId="258"/>
+            <ac:spMk id="9" creationId="{37757665-AC28-C2D7-9288-A4F262BEDCA5}"/>
+          </ac:spMkLst>
+        </pc:spChg>
+        <pc:spChg chg="add mod">
+          <ac:chgData name="Fatima Pillosu" userId="a6295d4dc9e22643" providerId="LiveId" clId="{0478CFAF-F744-4001-ABF3-5E8A4958592B}" dt="2025-07-03T10:13:38.626" v="499"/>
+          <ac:spMkLst>
+            <pc:docMk/>
+            <pc:sldMk cId="2370713982" sldId="258"/>
+            <ac:spMk id="11" creationId="{6E3975A0-04BD-A32C-5C8E-87D363BCBF43}"/>
+          </ac:spMkLst>
+        </pc:spChg>
+        <pc:spChg chg="add mod">
+          <ac:chgData name="Fatima Pillosu" userId="a6295d4dc9e22643" providerId="LiveId" clId="{0478CFAF-F744-4001-ABF3-5E8A4958592B}" dt="2025-07-03T10:13:38.626" v="499"/>
+          <ac:spMkLst>
+            <pc:docMk/>
+            <pc:sldMk cId="2370713982" sldId="258"/>
+            <ac:spMk id="12" creationId="{EC3C4672-BBD3-831C-7CA8-0C6A492C9F9C}"/>
+          </ac:spMkLst>
+        </pc:spChg>
+        <pc:spChg chg="add mod">
+          <ac:chgData name="Fatima Pillosu" userId="a6295d4dc9e22643" providerId="LiveId" clId="{0478CFAF-F744-4001-ABF3-5E8A4958592B}" dt="2025-07-03T10:13:38.626" v="499"/>
+          <ac:spMkLst>
+            <pc:docMk/>
+            <pc:sldMk cId="2370713982" sldId="258"/>
+            <ac:spMk id="14" creationId="{A98AD652-CC49-61CB-93BF-590382B2DB5F}"/>
+          </ac:spMkLst>
+        </pc:spChg>
+        <pc:spChg chg="add mod">
+          <ac:chgData name="Fatima Pillosu" userId="a6295d4dc9e22643" providerId="LiveId" clId="{0478CFAF-F744-4001-ABF3-5E8A4958592B}" dt="2025-07-03T10:13:38.626" v="499"/>
+          <ac:spMkLst>
+            <pc:docMk/>
+            <pc:sldMk cId="2370713982" sldId="258"/>
+            <ac:spMk id="16" creationId="{66347620-DBE3-A5F5-F8A3-7C2F7C6EBDE6}"/>
+          </ac:spMkLst>
+        </pc:spChg>
+        <pc:spChg chg="add mod">
+          <ac:chgData name="Fatima Pillosu" userId="a6295d4dc9e22643" providerId="LiveId" clId="{0478CFAF-F744-4001-ABF3-5E8A4958592B}" dt="2025-07-03T10:13:38.626" v="499"/>
+          <ac:spMkLst>
+            <pc:docMk/>
+            <pc:sldMk cId="2370713982" sldId="258"/>
+            <ac:spMk id="17" creationId="{4DC959A9-7C89-6A9D-8C2C-4CCD3B47ECC5}"/>
+          </ac:spMkLst>
+        </pc:spChg>
+        <pc:spChg chg="add mod">
+          <ac:chgData name="Fatima Pillosu" userId="a6295d4dc9e22643" providerId="LiveId" clId="{0478CFAF-F744-4001-ABF3-5E8A4958592B}" dt="2025-07-03T10:13:38.626" v="499"/>
+          <ac:spMkLst>
+            <pc:docMk/>
+            <pc:sldMk cId="2370713982" sldId="258"/>
+            <ac:spMk id="21" creationId="{AE7F31D2-F023-F7AB-A647-E119A53ECEA7}"/>
+          </ac:spMkLst>
+        </pc:spChg>
+        <pc:spChg chg="add mod">
+          <ac:chgData name="Fatima Pillosu" userId="a6295d4dc9e22643" providerId="LiveId" clId="{0478CFAF-F744-4001-ABF3-5E8A4958592B}" dt="2025-07-03T10:13:38.626" v="499"/>
+          <ac:spMkLst>
+            <pc:docMk/>
+            <pc:sldMk cId="2370713982" sldId="258"/>
+            <ac:spMk id="22" creationId="{1A0731B8-37BC-29FF-5EFB-3505DFCBB060}"/>
+          </ac:spMkLst>
+        </pc:spChg>
+        <pc:spChg chg="add mod">
+          <ac:chgData name="Fatima Pillosu" userId="a6295d4dc9e22643" providerId="LiveId" clId="{0478CFAF-F744-4001-ABF3-5E8A4958592B}" dt="2025-07-03T10:13:38.626" v="499"/>
+          <ac:spMkLst>
+            <pc:docMk/>
+            <pc:sldMk cId="2370713982" sldId="258"/>
+            <ac:spMk id="24" creationId="{5382C8C2-6F3C-50EB-0A51-B5F6DC1665D1}"/>
+          </ac:spMkLst>
+        </pc:spChg>
+        <pc:spChg chg="add mod">
+          <ac:chgData name="Fatima Pillosu" userId="a6295d4dc9e22643" providerId="LiveId" clId="{0478CFAF-F744-4001-ABF3-5E8A4958592B}" dt="2025-07-03T10:13:38.626" v="499"/>
+          <ac:spMkLst>
+            <pc:docMk/>
+            <pc:sldMk cId="2370713982" sldId="258"/>
+            <ac:spMk id="25" creationId="{AFE3A951-104C-CEDE-A21D-544D4B214711}"/>
+          </ac:spMkLst>
+        </pc:spChg>
+        <pc:spChg chg="add mod">
+          <ac:chgData name="Fatima Pillosu" userId="a6295d4dc9e22643" providerId="LiveId" clId="{0478CFAF-F744-4001-ABF3-5E8A4958592B}" dt="2025-07-03T10:13:38.626" v="499"/>
+          <ac:spMkLst>
+            <pc:docMk/>
+            <pc:sldMk cId="2370713982" sldId="258"/>
+            <ac:spMk id="26" creationId="{F81123FD-1880-7B13-64BB-A61B32D6C3FC}"/>
+          </ac:spMkLst>
+        </pc:spChg>
+        <pc:spChg chg="add mod">
+          <ac:chgData name="Fatima Pillosu" userId="a6295d4dc9e22643" providerId="LiveId" clId="{0478CFAF-F744-4001-ABF3-5E8A4958592B}" dt="2025-07-03T10:13:38.626" v="499"/>
+          <ac:spMkLst>
+            <pc:docMk/>
+            <pc:sldMk cId="2370713982" sldId="258"/>
+            <ac:spMk id="27" creationId="{68F25C0E-89BD-9175-A93B-76E013FBF0DD}"/>
+          </ac:spMkLst>
+        </pc:spChg>
+        <pc:spChg chg="add mod">
+          <ac:chgData name="Fatima Pillosu" userId="a6295d4dc9e22643" providerId="LiveId" clId="{0478CFAF-F744-4001-ABF3-5E8A4958592B}" dt="2025-07-03T10:13:38.626" v="499"/>
+          <ac:spMkLst>
+            <pc:docMk/>
+            <pc:sldMk cId="2370713982" sldId="258"/>
+            <ac:spMk id="28" creationId="{96248778-630E-7601-4FAE-FF9CFCDF1B42}"/>
+          </ac:spMkLst>
+        </pc:spChg>
+        <pc:spChg chg="add mod">
+          <ac:chgData name="Fatima Pillosu" userId="a6295d4dc9e22643" providerId="LiveId" clId="{0478CFAF-F744-4001-ABF3-5E8A4958592B}" dt="2025-07-03T10:13:38.626" v="499"/>
+          <ac:spMkLst>
+            <pc:docMk/>
+            <pc:sldMk cId="2370713982" sldId="258"/>
+            <ac:spMk id="29" creationId="{9CADC630-E44A-1A89-9FDE-8EDA7123B19C}"/>
+          </ac:spMkLst>
+        </pc:spChg>
+        <pc:spChg chg="add mod">
+          <ac:chgData name="Fatima Pillosu" userId="a6295d4dc9e22643" providerId="LiveId" clId="{0478CFAF-F744-4001-ABF3-5E8A4958592B}" dt="2025-07-03T10:13:38.626" v="499"/>
+          <ac:spMkLst>
+            <pc:docMk/>
+            <pc:sldMk cId="2370713982" sldId="258"/>
+            <ac:spMk id="30" creationId="{EAF3C8BC-9003-987C-E4A9-44A032A5528E}"/>
+          </ac:spMkLst>
+        </pc:spChg>
+        <pc:spChg chg="add mod">
+          <ac:chgData name="Fatima Pillosu" userId="a6295d4dc9e22643" providerId="LiveId" clId="{0478CFAF-F744-4001-ABF3-5E8A4958592B}" dt="2025-07-03T10:13:38.626" v="499"/>
+          <ac:spMkLst>
+            <pc:docMk/>
+            <pc:sldMk cId="2370713982" sldId="258"/>
+            <ac:spMk id="31" creationId="{28B436EB-88AE-9EF3-EB76-64B6D1FB6EEB}"/>
+          </ac:spMkLst>
+        </pc:spChg>
+        <pc:spChg chg="add mod">
+          <ac:chgData name="Fatima Pillosu" userId="a6295d4dc9e22643" providerId="LiveId" clId="{0478CFAF-F744-4001-ABF3-5E8A4958592B}" dt="2025-07-03T10:13:38.626" v="499"/>
+          <ac:spMkLst>
+            <pc:docMk/>
+            <pc:sldMk cId="2370713982" sldId="258"/>
+            <ac:spMk id="32" creationId="{F27C24D0-AB2A-41DB-6171-C0B6ED9E9A68}"/>
+          </ac:spMkLst>
+        </pc:spChg>
+        <pc:spChg chg="add mod">
+          <ac:chgData name="Fatima Pillosu" userId="a6295d4dc9e22643" providerId="LiveId" clId="{0478CFAF-F744-4001-ABF3-5E8A4958592B}" dt="2025-07-03T10:13:38.626" v="499"/>
+          <ac:spMkLst>
+            <pc:docMk/>
+            <pc:sldMk cId="2370713982" sldId="258"/>
+            <ac:spMk id="33" creationId="{41C377DF-3C36-42E1-684D-12BC83DB59C3}"/>
+          </ac:spMkLst>
+        </pc:spChg>
+        <pc:spChg chg="add mod">
+          <ac:chgData name="Fatima Pillosu" userId="a6295d4dc9e22643" providerId="LiveId" clId="{0478CFAF-F744-4001-ABF3-5E8A4958592B}" dt="2025-07-03T10:13:38.626" v="499"/>
+          <ac:spMkLst>
+            <pc:docMk/>
+            <pc:sldMk cId="2370713982" sldId="258"/>
+            <ac:spMk id="35" creationId="{2CFA74E3-D91E-2C27-4A99-D3D1A111919C}"/>
+          </ac:spMkLst>
+        </pc:spChg>
+        <pc:spChg chg="add mod">
+          <ac:chgData name="Fatima Pillosu" userId="a6295d4dc9e22643" providerId="LiveId" clId="{0478CFAF-F744-4001-ABF3-5E8A4958592B}" dt="2025-07-03T10:13:38.626" v="499"/>
+          <ac:spMkLst>
+            <pc:docMk/>
+            <pc:sldMk cId="2370713982" sldId="258"/>
+            <ac:spMk id="36" creationId="{CC497459-D1DC-EE9A-EE1D-815F28D2818C}"/>
+          </ac:spMkLst>
+        </pc:spChg>
+        <pc:spChg chg="add mod">
+          <ac:chgData name="Fatima Pillosu" userId="a6295d4dc9e22643" providerId="LiveId" clId="{0478CFAF-F744-4001-ABF3-5E8A4958592B}" dt="2025-07-03T10:13:38.626" v="499"/>
+          <ac:spMkLst>
+            <pc:docMk/>
+            <pc:sldMk cId="2370713982" sldId="258"/>
+            <ac:spMk id="37" creationId="{8A74094E-C336-74AA-E520-6856C354301A}"/>
+          </ac:spMkLst>
+        </pc:spChg>
+        <pc:spChg chg="add mod">
+          <ac:chgData name="Fatima Pillosu" userId="a6295d4dc9e22643" providerId="LiveId" clId="{0478CFAF-F744-4001-ABF3-5E8A4958592B}" dt="2025-07-03T10:13:38.626" v="499"/>
+          <ac:spMkLst>
+            <pc:docMk/>
+            <pc:sldMk cId="2370713982" sldId="258"/>
+            <ac:spMk id="38" creationId="{10B23706-9C8A-69A2-B423-B2EEB1C4D06D}"/>
+          </ac:spMkLst>
+        </pc:spChg>
+        <pc:spChg chg="add mod">
+          <ac:chgData name="Fatima Pillosu" userId="a6295d4dc9e22643" providerId="LiveId" clId="{0478CFAF-F744-4001-ABF3-5E8A4958592B}" dt="2025-07-03T10:13:38.626" v="499"/>
+          <ac:spMkLst>
+            <pc:docMk/>
+            <pc:sldMk cId="2370713982" sldId="258"/>
+            <ac:spMk id="39" creationId="{14A7D952-0782-7271-7F2A-BC6BC775B542}"/>
+          </ac:spMkLst>
+        </pc:spChg>
+        <pc:spChg chg="add mod">
+          <ac:chgData name="Fatima Pillosu" userId="a6295d4dc9e22643" providerId="LiveId" clId="{0478CFAF-F744-4001-ABF3-5E8A4958592B}" dt="2025-07-03T10:13:38.626" v="499"/>
+          <ac:spMkLst>
+            <pc:docMk/>
+            <pc:sldMk cId="2370713982" sldId="258"/>
+            <ac:spMk id="40" creationId="{06432789-ABB4-135D-C8F1-01F8D760F247}"/>
+          </ac:spMkLst>
+        </pc:spChg>
+        <pc:spChg chg="add mod">
+          <ac:chgData name="Fatima Pillosu" userId="a6295d4dc9e22643" providerId="LiveId" clId="{0478CFAF-F744-4001-ABF3-5E8A4958592B}" dt="2025-07-03T10:13:38.626" v="499"/>
+          <ac:spMkLst>
+            <pc:docMk/>
+            <pc:sldMk cId="2370713982" sldId="258"/>
+            <ac:spMk id="41" creationId="{C5603496-23AC-2551-E5E0-BDF8C60E9816}"/>
+          </ac:spMkLst>
+        </pc:spChg>
+        <pc:spChg chg="add mod">
+          <ac:chgData name="Fatima Pillosu" userId="a6295d4dc9e22643" providerId="LiveId" clId="{0478CFAF-F744-4001-ABF3-5E8A4958592B}" dt="2025-07-03T10:13:38.626" v="499"/>
+          <ac:spMkLst>
+            <pc:docMk/>
+            <pc:sldMk cId="2370713982" sldId="258"/>
+            <ac:spMk id="42" creationId="{BD4FCEEF-D9EE-3F9D-274E-A275AE7207AC}"/>
+          </ac:spMkLst>
+        </pc:spChg>
+        <pc:spChg chg="add mod">
+          <ac:chgData name="Fatima Pillosu" userId="a6295d4dc9e22643" providerId="LiveId" clId="{0478CFAF-F744-4001-ABF3-5E8A4958592B}" dt="2025-07-03T10:13:38.626" v="499"/>
+          <ac:spMkLst>
+            <pc:docMk/>
+            <pc:sldMk cId="2370713982" sldId="258"/>
+            <ac:spMk id="44" creationId="{54B4C05C-53AB-88AD-E871-B8862B4F61D3}"/>
+          </ac:spMkLst>
+        </pc:spChg>
+        <pc:spChg chg="add mod">
+          <ac:chgData name="Fatima Pillosu" userId="a6295d4dc9e22643" providerId="LiveId" clId="{0478CFAF-F744-4001-ABF3-5E8A4958592B}" dt="2025-07-03T10:13:38.626" v="499"/>
+          <ac:spMkLst>
+            <pc:docMk/>
+            <pc:sldMk cId="2370713982" sldId="258"/>
+            <ac:spMk id="45" creationId="{6EE46427-6BDE-882E-3A72-3DF2ED872F0A}"/>
+          </ac:spMkLst>
+        </pc:spChg>
+        <pc:spChg chg="add mod">
+          <ac:chgData name="Fatima Pillosu" userId="a6295d4dc9e22643" providerId="LiveId" clId="{0478CFAF-F744-4001-ABF3-5E8A4958592B}" dt="2025-07-03T10:13:38.626" v="499"/>
+          <ac:spMkLst>
+            <pc:docMk/>
+            <pc:sldMk cId="2370713982" sldId="258"/>
+            <ac:spMk id="46" creationId="{0BBE180E-9D2D-A30D-B94E-AB6240A4F89E}"/>
+          </ac:spMkLst>
+        </pc:spChg>
+        <pc:spChg chg="add mod">
+          <ac:chgData name="Fatima Pillosu" userId="a6295d4dc9e22643" providerId="LiveId" clId="{0478CFAF-F744-4001-ABF3-5E8A4958592B}" dt="2025-07-03T10:13:38.626" v="499"/>
+          <ac:spMkLst>
+            <pc:docMk/>
+            <pc:sldMk cId="2370713982" sldId="258"/>
+            <ac:spMk id="53" creationId="{27B7D5CF-81CA-4EAF-61FB-FBDB71CAE40F}"/>
+          </ac:spMkLst>
+        </pc:spChg>
+        <pc:spChg chg="del mod">
+          <ac:chgData name="Fatima Pillosu" userId="a6295d4dc9e22643" providerId="LiveId" clId="{0478CFAF-F744-4001-ABF3-5E8A4958592B}" dt="2025-07-03T10:13:29.318" v="498" actId="21"/>
+          <ac:spMkLst>
+            <pc:docMk/>
+            <pc:sldMk cId="2370713982" sldId="258"/>
+            <ac:spMk id="175" creationId="{37757665-AC28-C2D7-9288-A4F262BEDCA5}"/>
+          </ac:spMkLst>
+        </pc:spChg>
+        <pc:spChg chg="del">
+          <ac:chgData name="Fatima Pillosu" userId="a6295d4dc9e22643" providerId="LiveId" clId="{0478CFAF-F744-4001-ABF3-5E8A4958592B}" dt="2025-07-03T10:13:29.318" v="498" actId="21"/>
+          <ac:spMkLst>
+            <pc:docMk/>
+            <pc:sldMk cId="2370713982" sldId="258"/>
+            <ac:spMk id="177" creationId="{6E3975A0-04BD-A32C-5C8E-87D363BCBF43}"/>
+          </ac:spMkLst>
+        </pc:spChg>
+        <pc:spChg chg="del mod">
+          <ac:chgData name="Fatima Pillosu" userId="a6295d4dc9e22643" providerId="LiveId" clId="{0478CFAF-F744-4001-ABF3-5E8A4958592B}" dt="2025-07-03T10:13:29.318" v="498" actId="21"/>
+          <ac:spMkLst>
+            <pc:docMk/>
+            <pc:sldMk cId="2370713982" sldId="258"/>
+            <ac:spMk id="178" creationId="{EC3C4672-BBD3-831C-7CA8-0C6A492C9F9C}"/>
+          </ac:spMkLst>
+        </pc:spChg>
+        <pc:spChg chg="del">
+          <ac:chgData name="Fatima Pillosu" userId="a6295d4dc9e22643" providerId="LiveId" clId="{0478CFAF-F744-4001-ABF3-5E8A4958592B}" dt="2025-07-03T10:13:29.318" v="498" actId="21"/>
+          <ac:spMkLst>
+            <pc:docMk/>
+            <pc:sldMk cId="2370713982" sldId="258"/>
+            <ac:spMk id="180" creationId="{A98AD652-CC49-61CB-93BF-590382B2DB5F}"/>
+          </ac:spMkLst>
+        </pc:spChg>
+        <pc:spChg chg="del mod">
+          <ac:chgData name="Fatima Pillosu" userId="a6295d4dc9e22643" providerId="LiveId" clId="{0478CFAF-F744-4001-ABF3-5E8A4958592B}" dt="2025-07-03T10:13:29.318" v="498" actId="21"/>
+          <ac:spMkLst>
+            <pc:docMk/>
+            <pc:sldMk cId="2370713982" sldId="258"/>
+            <ac:spMk id="182" creationId="{66347620-DBE3-A5F5-F8A3-7C2F7C6EBDE6}"/>
+          </ac:spMkLst>
+        </pc:spChg>
+        <pc:spChg chg="del">
+          <ac:chgData name="Fatima Pillosu" userId="a6295d4dc9e22643" providerId="LiveId" clId="{0478CFAF-F744-4001-ABF3-5E8A4958592B}" dt="2025-07-03T10:13:29.318" v="498" actId="21"/>
+          <ac:spMkLst>
+            <pc:docMk/>
+            <pc:sldMk cId="2370713982" sldId="258"/>
+            <ac:spMk id="183" creationId="{4DC959A9-7C89-6A9D-8C2C-4CCD3B47ECC5}"/>
+          </ac:spMkLst>
+        </pc:spChg>
+        <pc:spChg chg="del mod">
+          <ac:chgData name="Fatima Pillosu" userId="a6295d4dc9e22643" providerId="LiveId" clId="{0478CFAF-F744-4001-ABF3-5E8A4958592B}" dt="2025-07-03T10:13:29.318" v="498" actId="21"/>
+          <ac:spMkLst>
+            <pc:docMk/>
+            <pc:sldMk cId="2370713982" sldId="258"/>
+            <ac:spMk id="187" creationId="{AE7F31D2-F023-F7AB-A647-E119A53ECEA7}"/>
+          </ac:spMkLst>
+        </pc:spChg>
+        <pc:spChg chg="del mod">
+          <ac:chgData name="Fatima Pillosu" userId="a6295d4dc9e22643" providerId="LiveId" clId="{0478CFAF-F744-4001-ABF3-5E8A4958592B}" dt="2025-07-03T10:13:29.318" v="498" actId="21"/>
+          <ac:spMkLst>
+            <pc:docMk/>
+            <pc:sldMk cId="2370713982" sldId="258"/>
+            <ac:spMk id="189" creationId="{1A0731B8-37BC-29FF-5EFB-3505DFCBB060}"/>
+          </ac:spMkLst>
+        </pc:spChg>
+        <pc:spChg chg="del">
+          <ac:chgData name="Fatima Pillosu" userId="a6295d4dc9e22643" providerId="LiveId" clId="{0478CFAF-F744-4001-ABF3-5E8A4958592B}" dt="2025-07-03T10:13:29.318" v="498" actId="21"/>
+          <ac:spMkLst>
+            <pc:docMk/>
+            <pc:sldMk cId="2370713982" sldId="258"/>
+            <ac:spMk id="191" creationId="{5382C8C2-6F3C-50EB-0A51-B5F6DC1665D1}"/>
+          </ac:spMkLst>
+        </pc:spChg>
+        <pc:spChg chg="del">
+          <ac:chgData name="Fatima Pillosu" userId="a6295d4dc9e22643" providerId="LiveId" clId="{0478CFAF-F744-4001-ABF3-5E8A4958592B}" dt="2025-07-03T10:13:29.318" v="498" actId="21"/>
+          <ac:spMkLst>
+            <pc:docMk/>
+            <pc:sldMk cId="2370713982" sldId="258"/>
+            <ac:spMk id="192" creationId="{AFE3A951-104C-CEDE-A21D-544D4B214711}"/>
+          </ac:spMkLst>
+        </pc:spChg>
+        <pc:spChg chg="del">
+          <ac:chgData name="Fatima Pillosu" userId="a6295d4dc9e22643" providerId="LiveId" clId="{0478CFAF-F744-4001-ABF3-5E8A4958592B}" dt="2025-07-03T10:13:29.318" v="498" actId="21"/>
+          <ac:spMkLst>
+            <pc:docMk/>
+            <pc:sldMk cId="2370713982" sldId="258"/>
+            <ac:spMk id="193" creationId="{F81123FD-1880-7B13-64BB-A61B32D6C3FC}"/>
+          </ac:spMkLst>
+        </pc:spChg>
+        <pc:spChg chg="del">
+          <ac:chgData name="Fatima Pillosu" userId="a6295d4dc9e22643" providerId="LiveId" clId="{0478CFAF-F744-4001-ABF3-5E8A4958592B}" dt="2025-07-03T10:13:29.318" v="498" actId="21"/>
+          <ac:spMkLst>
+            <pc:docMk/>
+            <pc:sldMk cId="2370713982" sldId="258"/>
+            <ac:spMk id="194" creationId="{68F25C0E-89BD-9175-A93B-76E013FBF0DD}"/>
+          </ac:spMkLst>
+        </pc:spChg>
+        <pc:spChg chg="del">
+          <ac:chgData name="Fatima Pillosu" userId="a6295d4dc9e22643" providerId="LiveId" clId="{0478CFAF-F744-4001-ABF3-5E8A4958592B}" dt="2025-07-03T10:13:29.318" v="498" actId="21"/>
+          <ac:spMkLst>
+            <pc:docMk/>
+            <pc:sldMk cId="2370713982" sldId="258"/>
+            <ac:spMk id="195" creationId="{96248778-630E-7601-4FAE-FF9CFCDF1B42}"/>
+          </ac:spMkLst>
+        </pc:spChg>
+        <pc:spChg chg="del">
+          <ac:chgData name="Fatima Pillosu" userId="a6295d4dc9e22643" providerId="LiveId" clId="{0478CFAF-F744-4001-ABF3-5E8A4958592B}" dt="2025-07-03T10:13:29.318" v="498" actId="21"/>
+          <ac:spMkLst>
+            <pc:docMk/>
+            <pc:sldMk cId="2370713982" sldId="258"/>
+            <ac:spMk id="196" creationId="{9CADC630-E44A-1A89-9FDE-8EDA7123B19C}"/>
+          </ac:spMkLst>
+        </pc:spChg>
+        <pc:spChg chg="del">
+          <ac:chgData name="Fatima Pillosu" userId="a6295d4dc9e22643" providerId="LiveId" clId="{0478CFAF-F744-4001-ABF3-5E8A4958592B}" dt="2025-07-03T10:13:29.318" v="498" actId="21"/>
+          <ac:spMkLst>
+            <pc:docMk/>
+            <pc:sldMk cId="2370713982" sldId="258"/>
+            <ac:spMk id="197" creationId="{EAF3C8BC-9003-987C-E4A9-44A032A5528E}"/>
+          </ac:spMkLst>
+        </pc:spChg>
+        <pc:spChg chg="del">
+          <ac:chgData name="Fatima Pillosu" userId="a6295d4dc9e22643" providerId="LiveId" clId="{0478CFAF-F744-4001-ABF3-5E8A4958592B}" dt="2025-07-03T10:13:29.318" v="498" actId="21"/>
+          <ac:spMkLst>
+            <pc:docMk/>
+            <pc:sldMk cId="2370713982" sldId="258"/>
+            <ac:spMk id="198" creationId="{28B436EB-88AE-9EF3-EB76-64B6D1FB6EEB}"/>
+          </ac:spMkLst>
+        </pc:spChg>
+        <pc:spChg chg="del">
+          <ac:chgData name="Fatima Pillosu" userId="a6295d4dc9e22643" providerId="LiveId" clId="{0478CFAF-F744-4001-ABF3-5E8A4958592B}" dt="2025-07-03T10:13:29.318" v="498" actId="21"/>
+          <ac:spMkLst>
+            <pc:docMk/>
+            <pc:sldMk cId="2370713982" sldId="258"/>
+            <ac:spMk id="199" creationId="{F27C24D0-AB2A-41DB-6171-C0B6ED9E9A68}"/>
+          </ac:spMkLst>
+        </pc:spChg>
+        <pc:spChg chg="del mod">
+          <ac:chgData name="Fatima Pillosu" userId="a6295d4dc9e22643" providerId="LiveId" clId="{0478CFAF-F744-4001-ABF3-5E8A4958592B}" dt="2025-07-03T10:13:29.318" v="498" actId="21"/>
+          <ac:spMkLst>
+            <pc:docMk/>
+            <pc:sldMk cId="2370713982" sldId="258"/>
+            <ac:spMk id="200" creationId="{41C377DF-3C36-42E1-684D-12BC83DB59C3}"/>
+          </ac:spMkLst>
+        </pc:spChg>
+        <pc:spChg chg="del">
+          <ac:chgData name="Fatima Pillosu" userId="a6295d4dc9e22643" providerId="LiveId" clId="{0478CFAF-F744-4001-ABF3-5E8A4958592B}" dt="2025-07-03T10:13:29.318" v="498" actId="21"/>
+          <ac:spMkLst>
+            <pc:docMk/>
+            <pc:sldMk cId="2370713982" sldId="258"/>
+            <ac:spMk id="202" creationId="{2CFA74E3-D91E-2C27-4A99-D3D1A111919C}"/>
+          </ac:spMkLst>
+        </pc:spChg>
+        <pc:spChg chg="del">
+          <ac:chgData name="Fatima Pillosu" userId="a6295d4dc9e22643" providerId="LiveId" clId="{0478CFAF-F744-4001-ABF3-5E8A4958592B}" dt="2025-07-03T10:13:29.318" v="498" actId="21"/>
+          <ac:spMkLst>
+            <pc:docMk/>
+            <pc:sldMk cId="2370713982" sldId="258"/>
+            <ac:spMk id="203" creationId="{CC497459-D1DC-EE9A-EE1D-815F28D2818C}"/>
+          </ac:spMkLst>
+        </pc:spChg>
+        <pc:spChg chg="del">
+          <ac:chgData name="Fatima Pillosu" userId="a6295d4dc9e22643" providerId="LiveId" clId="{0478CFAF-F744-4001-ABF3-5E8A4958592B}" dt="2025-07-03T10:13:29.318" v="498" actId="21"/>
+          <ac:spMkLst>
+            <pc:docMk/>
+            <pc:sldMk cId="2370713982" sldId="258"/>
+            <ac:spMk id="204" creationId="{8A74094E-C336-74AA-E520-6856C354301A}"/>
+          </ac:spMkLst>
+        </pc:spChg>
+        <pc:spChg chg="del">
+          <ac:chgData name="Fatima Pillosu" userId="a6295d4dc9e22643" providerId="LiveId" clId="{0478CFAF-F744-4001-ABF3-5E8A4958592B}" dt="2025-07-03T10:13:29.318" v="498" actId="21"/>
+          <ac:spMkLst>
+            <pc:docMk/>
+            <pc:sldMk cId="2370713982" sldId="258"/>
+            <ac:spMk id="205" creationId="{10B23706-9C8A-69A2-B423-B2EEB1C4D06D}"/>
+          </ac:spMkLst>
+        </pc:spChg>
+        <pc:spChg chg="del">
+          <ac:chgData name="Fatima Pillosu" userId="a6295d4dc9e22643" providerId="LiveId" clId="{0478CFAF-F744-4001-ABF3-5E8A4958592B}" dt="2025-07-03T10:13:29.318" v="498" actId="21"/>
+          <ac:spMkLst>
+            <pc:docMk/>
+            <pc:sldMk cId="2370713982" sldId="258"/>
+            <ac:spMk id="206" creationId="{14A7D952-0782-7271-7F2A-BC6BC775B542}"/>
+          </ac:spMkLst>
+        </pc:spChg>
+        <pc:spChg chg="del">
+          <ac:chgData name="Fatima Pillosu" userId="a6295d4dc9e22643" providerId="LiveId" clId="{0478CFAF-F744-4001-ABF3-5E8A4958592B}" dt="2025-07-03T10:13:29.318" v="498" actId="21"/>
+          <ac:spMkLst>
+            <pc:docMk/>
+            <pc:sldMk cId="2370713982" sldId="258"/>
+            <ac:spMk id="207" creationId="{06432789-ABB4-135D-C8F1-01F8D760F247}"/>
+          </ac:spMkLst>
+        </pc:spChg>
+        <pc:spChg chg="del">
+          <ac:chgData name="Fatima Pillosu" userId="a6295d4dc9e22643" providerId="LiveId" clId="{0478CFAF-F744-4001-ABF3-5E8A4958592B}" dt="2025-07-03T10:13:29.318" v="498" actId="21"/>
+          <ac:spMkLst>
+            <pc:docMk/>
+            <pc:sldMk cId="2370713982" sldId="258"/>
+            <ac:spMk id="208" creationId="{C5603496-23AC-2551-E5E0-BDF8C60E9816}"/>
+          </ac:spMkLst>
+        </pc:spChg>
+        <pc:spChg chg="del">
+          <ac:chgData name="Fatima Pillosu" userId="a6295d4dc9e22643" providerId="LiveId" clId="{0478CFAF-F744-4001-ABF3-5E8A4958592B}" dt="2025-07-03T10:13:29.318" v="498" actId="21"/>
+          <ac:spMkLst>
+            <pc:docMk/>
+            <pc:sldMk cId="2370713982" sldId="258"/>
+            <ac:spMk id="209" creationId="{BD4FCEEF-D9EE-3F9D-274E-A275AE7207AC}"/>
+          </ac:spMkLst>
+        </pc:spChg>
+        <pc:spChg chg="del mod">
+          <ac:chgData name="Fatima Pillosu" userId="a6295d4dc9e22643" providerId="LiveId" clId="{0478CFAF-F744-4001-ABF3-5E8A4958592B}" dt="2025-07-03T10:13:29.318" v="498" actId="21"/>
+          <ac:spMkLst>
+            <pc:docMk/>
+            <pc:sldMk cId="2370713982" sldId="258"/>
+            <ac:spMk id="211" creationId="{54B4C05C-53AB-88AD-E871-B8862B4F61D3}"/>
+          </ac:spMkLst>
+        </pc:spChg>
+        <pc:spChg chg="del">
+          <ac:chgData name="Fatima Pillosu" userId="a6295d4dc9e22643" providerId="LiveId" clId="{0478CFAF-F744-4001-ABF3-5E8A4958592B}" dt="2025-07-03T10:13:29.318" v="498" actId="21"/>
+          <ac:spMkLst>
+            <pc:docMk/>
+            <pc:sldMk cId="2370713982" sldId="258"/>
+            <ac:spMk id="212" creationId="{6EE46427-6BDE-882E-3A72-3DF2ED872F0A}"/>
+          </ac:spMkLst>
+        </pc:spChg>
+        <pc:spChg chg="del">
+          <ac:chgData name="Fatima Pillosu" userId="a6295d4dc9e22643" providerId="LiveId" clId="{0478CFAF-F744-4001-ABF3-5E8A4958592B}" dt="2025-07-03T10:13:29.318" v="498" actId="21"/>
+          <ac:spMkLst>
+            <pc:docMk/>
+            <pc:sldMk cId="2370713982" sldId="258"/>
+            <ac:spMk id="213" creationId="{0BBE180E-9D2D-A30D-B94E-AB6240A4F89E}"/>
+          </ac:spMkLst>
+        </pc:spChg>
+        <pc:spChg chg="del mod">
+          <ac:chgData name="Fatima Pillosu" userId="a6295d4dc9e22643" providerId="LiveId" clId="{0478CFAF-F744-4001-ABF3-5E8A4958592B}" dt="2025-07-03T10:09:18.869" v="463" actId="478"/>
+          <ac:spMkLst>
+            <pc:docMk/>
+            <pc:sldMk cId="2370713982" sldId="258"/>
+            <ac:spMk id="218" creationId="{F39AC6C1-D9A5-4BB9-D077-438BD55748C0}"/>
+          </ac:spMkLst>
+        </pc:spChg>
+        <pc:picChg chg="add mod">
+          <ac:chgData name="Fatima Pillosu" userId="a6295d4dc9e22643" providerId="LiveId" clId="{0478CFAF-F744-4001-ABF3-5E8A4958592B}" dt="2025-07-03T10:13:38.626" v="499"/>
+          <ac:picMkLst>
+            <pc:docMk/>
+            <pc:sldMk cId="2370713982" sldId="258"/>
+            <ac:picMk id="15" creationId="{E97DB556-868B-EC99-E5AE-818CEEC67257}"/>
+          </ac:picMkLst>
+        </pc:picChg>
+        <pc:picChg chg="add mod">
+          <ac:chgData name="Fatima Pillosu" userId="a6295d4dc9e22643" providerId="LiveId" clId="{0478CFAF-F744-4001-ABF3-5E8A4958592B}" dt="2025-07-03T10:13:38.626" v="499"/>
+          <ac:picMkLst>
+            <pc:docMk/>
+            <pc:sldMk cId="2370713982" sldId="258"/>
+            <ac:picMk id="23" creationId="{6A5460AA-4519-4CF9-A5F0-33FE5FD31A96}"/>
+          </ac:picMkLst>
+        </pc:picChg>
+        <pc:picChg chg="add mod">
+          <ac:chgData name="Fatima Pillosu" userId="a6295d4dc9e22643" providerId="LiveId" clId="{0478CFAF-F744-4001-ABF3-5E8A4958592B}" dt="2025-07-03T10:13:38.626" v="499"/>
+          <ac:picMkLst>
+            <pc:docMk/>
+            <pc:sldMk cId="2370713982" sldId="258"/>
+            <ac:picMk id="47" creationId="{682317A1-2BB1-8278-722B-8CE350ED4201}"/>
+          </ac:picMkLst>
+        </pc:picChg>
+        <pc:picChg chg="del">
+          <ac:chgData name="Fatima Pillosu" userId="a6295d4dc9e22643" providerId="LiveId" clId="{0478CFAF-F744-4001-ABF3-5E8A4958592B}" dt="2025-07-03T10:13:29.318" v="498" actId="21"/>
+          <ac:picMkLst>
+            <pc:docMk/>
+            <pc:sldMk cId="2370713982" sldId="258"/>
+            <ac:picMk id="181" creationId="{E97DB556-868B-EC99-E5AE-818CEEC67257}"/>
+          </ac:picMkLst>
+        </pc:picChg>
+        <pc:picChg chg="del">
+          <ac:chgData name="Fatima Pillosu" userId="a6295d4dc9e22643" providerId="LiveId" clId="{0478CFAF-F744-4001-ABF3-5E8A4958592B}" dt="2025-07-03T10:13:29.318" v="498" actId="21"/>
+          <ac:picMkLst>
+            <pc:docMk/>
+            <pc:sldMk cId="2370713982" sldId="258"/>
+            <ac:picMk id="190" creationId="{6A5460AA-4519-4CF9-A5F0-33FE5FD31A96}"/>
+          </ac:picMkLst>
+        </pc:picChg>
+        <pc:picChg chg="del">
+          <ac:chgData name="Fatima Pillosu" userId="a6295d4dc9e22643" providerId="LiveId" clId="{0478CFAF-F744-4001-ABF3-5E8A4958592B}" dt="2025-07-03T10:13:29.318" v="498" actId="21"/>
+          <ac:picMkLst>
+            <pc:docMk/>
+            <pc:sldMk cId="2370713982" sldId="258"/>
+            <ac:picMk id="214" creationId="{682317A1-2BB1-8278-722B-8CE350ED4201}"/>
+          </ac:picMkLst>
+        </pc:picChg>
+        <pc:cxnChg chg="add del mod">
+          <ac:chgData name="Fatima Pillosu" userId="a6295d4dc9e22643" providerId="LiveId" clId="{0478CFAF-F744-4001-ABF3-5E8A4958592B}" dt="2025-07-03T10:13:29.318" v="498" actId="21"/>
+          <ac:cxnSpMkLst>
+            <pc:docMk/>
+            <pc:sldMk cId="2370713982" sldId="258"/>
+            <ac:cxnSpMk id="2" creationId="{78FE547C-E0DD-A313-0B6C-3682E841EA64}"/>
+          </ac:cxnSpMkLst>
+        </pc:cxnChg>
+        <pc:cxnChg chg="add mod">
+          <ac:chgData name="Fatima Pillosu" userId="a6295d4dc9e22643" providerId="LiveId" clId="{0478CFAF-F744-4001-ABF3-5E8A4958592B}" dt="2025-07-03T10:13:38.626" v="499"/>
+          <ac:cxnSpMkLst>
+            <pc:docMk/>
+            <pc:sldMk cId="2370713982" sldId="258"/>
+            <ac:cxnSpMk id="7" creationId="{6B2B5BF2-676C-E1AE-BA62-2F7C9F6C9C70}"/>
+          </ac:cxnSpMkLst>
+        </pc:cxnChg>
+        <pc:cxnChg chg="add mod">
+          <ac:chgData name="Fatima Pillosu" userId="a6295d4dc9e22643" providerId="LiveId" clId="{0478CFAF-F744-4001-ABF3-5E8A4958592B}" dt="2025-07-03T10:13:38.626" v="499"/>
+          <ac:cxnSpMkLst>
+            <pc:docMk/>
+            <pc:sldMk cId="2370713982" sldId="258"/>
+            <ac:cxnSpMk id="8" creationId="{C03C5827-406F-B7CA-16D5-2D1C3286C854}"/>
+          </ac:cxnSpMkLst>
+        </pc:cxnChg>
+        <pc:cxnChg chg="add mod">
+          <ac:chgData name="Fatima Pillosu" userId="a6295d4dc9e22643" providerId="LiveId" clId="{0478CFAF-F744-4001-ABF3-5E8A4958592B}" dt="2025-07-03T10:13:38.626" v="499"/>
+          <ac:cxnSpMkLst>
+            <pc:docMk/>
+            <pc:sldMk cId="2370713982" sldId="258"/>
+            <ac:cxnSpMk id="10" creationId="{92F3CE2A-5F1A-1C78-2C29-5D73E908A641}"/>
+          </ac:cxnSpMkLst>
+        </pc:cxnChg>
+        <pc:cxnChg chg="add mod">
+          <ac:chgData name="Fatima Pillosu" userId="a6295d4dc9e22643" providerId="LiveId" clId="{0478CFAF-F744-4001-ABF3-5E8A4958592B}" dt="2025-07-03T10:13:38.626" v="499"/>
+          <ac:cxnSpMkLst>
+            <pc:docMk/>
+            <pc:sldMk cId="2370713982" sldId="258"/>
+            <ac:cxnSpMk id="13" creationId="{7DC2AC43-F265-6066-8ACE-435A1F981070}"/>
+          </ac:cxnSpMkLst>
+        </pc:cxnChg>
+        <pc:cxnChg chg="add mod">
+          <ac:chgData name="Fatima Pillosu" userId="a6295d4dc9e22643" providerId="LiveId" clId="{0478CFAF-F744-4001-ABF3-5E8A4958592B}" dt="2025-07-03T10:13:38.626" v="499"/>
+          <ac:cxnSpMkLst>
+            <pc:docMk/>
+            <pc:sldMk cId="2370713982" sldId="258"/>
+            <ac:cxnSpMk id="18" creationId="{B54C17C6-3C4D-8A4F-59E1-33BB2363B4F2}"/>
+          </ac:cxnSpMkLst>
+        </pc:cxnChg>
+        <pc:cxnChg chg="add mod">
+          <ac:chgData name="Fatima Pillosu" userId="a6295d4dc9e22643" providerId="LiveId" clId="{0478CFAF-F744-4001-ABF3-5E8A4958592B}" dt="2025-07-03T10:13:38.626" v="499"/>
+          <ac:cxnSpMkLst>
+            <pc:docMk/>
+            <pc:sldMk cId="2370713982" sldId="258"/>
+            <ac:cxnSpMk id="19" creationId="{256D26E3-8C15-B026-B526-6022B54CCA43}"/>
+          </ac:cxnSpMkLst>
+        </pc:cxnChg>
+        <pc:cxnChg chg="add mod">
+          <ac:chgData name="Fatima Pillosu" userId="a6295d4dc9e22643" providerId="LiveId" clId="{0478CFAF-F744-4001-ABF3-5E8A4958592B}" dt="2025-07-03T10:13:38.626" v="499"/>
+          <ac:cxnSpMkLst>
+            <pc:docMk/>
+            <pc:sldMk cId="2370713982" sldId="258"/>
+            <ac:cxnSpMk id="20" creationId="{8B8A5069-7969-C164-8418-15F4BE24B20F}"/>
+          </ac:cxnSpMkLst>
+        </pc:cxnChg>
+        <pc:cxnChg chg="add mod">
+          <ac:chgData name="Fatima Pillosu" userId="a6295d4dc9e22643" providerId="LiveId" clId="{0478CFAF-F744-4001-ABF3-5E8A4958592B}" dt="2025-07-03T10:13:38.626" v="499"/>
+          <ac:cxnSpMkLst>
+            <pc:docMk/>
+            <pc:sldMk cId="2370713982" sldId="258"/>
+            <ac:cxnSpMk id="34" creationId="{D6C433DB-BAA1-CC71-D29E-1CD90D5B8AA6}"/>
+          </ac:cxnSpMkLst>
+        </pc:cxnChg>
+        <pc:cxnChg chg="add mod">
+          <ac:chgData name="Fatima Pillosu" userId="a6295d4dc9e22643" providerId="LiveId" clId="{0478CFAF-F744-4001-ABF3-5E8A4958592B}" dt="2025-07-03T10:13:38.626" v="499"/>
+          <ac:cxnSpMkLst>
+            <pc:docMk/>
+            <pc:sldMk cId="2370713982" sldId="258"/>
+            <ac:cxnSpMk id="43" creationId="{C7C3581F-BB46-6BFD-88EC-1685548CDC83}"/>
+          </ac:cxnSpMkLst>
+        </pc:cxnChg>
+        <pc:cxnChg chg="add mod">
+          <ac:chgData name="Fatima Pillosu" userId="a6295d4dc9e22643" providerId="LiveId" clId="{0478CFAF-F744-4001-ABF3-5E8A4958592B}" dt="2025-07-03T10:13:38.626" v="499"/>
+          <ac:cxnSpMkLst>
+            <pc:docMk/>
+            <pc:sldMk cId="2370713982" sldId="258"/>
+            <ac:cxnSpMk id="48" creationId="{C90FD5CB-CFB6-24E9-74FD-5E099AAAFF1E}"/>
+          </ac:cxnSpMkLst>
+        </pc:cxnChg>
+        <pc:cxnChg chg="add mod">
+          <ac:chgData name="Fatima Pillosu" userId="a6295d4dc9e22643" providerId="LiveId" clId="{0478CFAF-F744-4001-ABF3-5E8A4958592B}" dt="2025-07-03T10:13:38.626" v="499"/>
+          <ac:cxnSpMkLst>
+            <pc:docMk/>
+            <pc:sldMk cId="2370713982" sldId="258"/>
+            <ac:cxnSpMk id="49" creationId="{05C4EC2C-B3F3-2097-D9EC-F18C3D347A17}"/>
+          </ac:cxnSpMkLst>
+        </pc:cxnChg>
+        <pc:cxnChg chg="add mod">
+          <ac:chgData name="Fatima Pillosu" userId="a6295d4dc9e22643" providerId="LiveId" clId="{0478CFAF-F744-4001-ABF3-5E8A4958592B}" dt="2025-07-03T10:13:38.626" v="499"/>
+          <ac:cxnSpMkLst>
+            <pc:docMk/>
+            <pc:sldMk cId="2370713982" sldId="258"/>
+            <ac:cxnSpMk id="50" creationId="{0EA9D7BD-3F7C-AE8D-C1CE-E9C384898216}"/>
+          </ac:cxnSpMkLst>
+        </pc:cxnChg>
+        <pc:cxnChg chg="add mod">
+          <ac:chgData name="Fatima Pillosu" userId="a6295d4dc9e22643" providerId="LiveId" clId="{0478CFAF-F744-4001-ABF3-5E8A4958592B}" dt="2025-07-03T10:13:38.626" v="499"/>
+          <ac:cxnSpMkLst>
+            <pc:docMk/>
+            <pc:sldMk cId="2370713982" sldId="258"/>
+            <ac:cxnSpMk id="51" creationId="{8AED844A-3F43-A4D7-963B-F1037DBA7454}"/>
+          </ac:cxnSpMkLst>
+        </pc:cxnChg>
+        <pc:cxnChg chg="add mod">
+          <ac:chgData name="Fatima Pillosu" userId="a6295d4dc9e22643" providerId="LiveId" clId="{0478CFAF-F744-4001-ABF3-5E8A4958592B}" dt="2025-07-03T10:13:38.626" v="499"/>
+          <ac:cxnSpMkLst>
+            <pc:docMk/>
+            <pc:sldMk cId="2370713982" sldId="258"/>
+            <ac:cxnSpMk id="52" creationId="{78FE547C-E0DD-A313-0B6C-3682E841EA64}"/>
+          </ac:cxnSpMkLst>
+        </pc:cxnChg>
+        <pc:cxnChg chg="del mod">
+          <ac:chgData name="Fatima Pillosu" userId="a6295d4dc9e22643" providerId="LiveId" clId="{0478CFAF-F744-4001-ABF3-5E8A4958592B}" dt="2025-07-03T10:13:29.318" v="498" actId="21"/>
+          <ac:cxnSpMkLst>
+            <pc:docMk/>
+            <pc:sldMk cId="2370713982" sldId="258"/>
+            <ac:cxnSpMk id="173" creationId="{6B2B5BF2-676C-E1AE-BA62-2F7C9F6C9C70}"/>
+          </ac:cxnSpMkLst>
+        </pc:cxnChg>
+        <pc:cxnChg chg="del">
+          <ac:chgData name="Fatima Pillosu" userId="a6295d4dc9e22643" providerId="LiveId" clId="{0478CFAF-F744-4001-ABF3-5E8A4958592B}" dt="2025-07-03T10:13:29.318" v="498" actId="21"/>
+          <ac:cxnSpMkLst>
+            <pc:docMk/>
+            <pc:sldMk cId="2370713982" sldId="258"/>
+            <ac:cxnSpMk id="174" creationId="{C03C5827-406F-B7CA-16D5-2D1C3286C854}"/>
+          </ac:cxnSpMkLst>
+        </pc:cxnChg>
+        <pc:cxnChg chg="del">
+          <ac:chgData name="Fatima Pillosu" userId="a6295d4dc9e22643" providerId="LiveId" clId="{0478CFAF-F744-4001-ABF3-5E8A4958592B}" dt="2025-07-03T10:13:29.318" v="498" actId="21"/>
+          <ac:cxnSpMkLst>
+            <pc:docMk/>
+            <pc:sldMk cId="2370713982" sldId="258"/>
+            <ac:cxnSpMk id="176" creationId="{92F3CE2A-5F1A-1C78-2C29-5D73E908A641}"/>
+          </ac:cxnSpMkLst>
+        </pc:cxnChg>
+        <pc:cxnChg chg="del mod">
+          <ac:chgData name="Fatima Pillosu" userId="a6295d4dc9e22643" providerId="LiveId" clId="{0478CFAF-F744-4001-ABF3-5E8A4958592B}" dt="2025-07-03T10:13:29.318" v="498" actId="21"/>
+          <ac:cxnSpMkLst>
+            <pc:docMk/>
+            <pc:sldMk cId="2370713982" sldId="258"/>
+            <ac:cxnSpMk id="179" creationId="{7DC2AC43-F265-6066-8ACE-435A1F981070}"/>
+          </ac:cxnSpMkLst>
+        </pc:cxnChg>
+        <pc:cxnChg chg="del">
+          <ac:chgData name="Fatima Pillosu" userId="a6295d4dc9e22643" providerId="LiveId" clId="{0478CFAF-F744-4001-ABF3-5E8A4958592B}" dt="2025-07-03T10:13:29.318" v="498" actId="21"/>
+          <ac:cxnSpMkLst>
+            <pc:docMk/>
+            <pc:sldMk cId="2370713982" sldId="258"/>
+            <ac:cxnSpMk id="184" creationId="{B54C17C6-3C4D-8A4F-59E1-33BB2363B4F2}"/>
+          </ac:cxnSpMkLst>
+        </pc:cxnChg>
+        <pc:cxnChg chg="del">
+          <ac:chgData name="Fatima Pillosu" userId="a6295d4dc9e22643" providerId="LiveId" clId="{0478CFAF-F744-4001-ABF3-5E8A4958592B}" dt="2025-07-03T10:13:29.318" v="498" actId="21"/>
+          <ac:cxnSpMkLst>
+            <pc:docMk/>
+            <pc:sldMk cId="2370713982" sldId="258"/>
+            <ac:cxnSpMk id="185" creationId="{256D26E3-8C15-B026-B526-6022B54CCA43}"/>
+          </ac:cxnSpMkLst>
+        </pc:cxnChg>
+        <pc:cxnChg chg="del mod">
+          <ac:chgData name="Fatima Pillosu" userId="a6295d4dc9e22643" providerId="LiveId" clId="{0478CFAF-F744-4001-ABF3-5E8A4958592B}" dt="2025-07-03T10:13:29.318" v="498" actId="21"/>
+          <ac:cxnSpMkLst>
+            <pc:docMk/>
+            <pc:sldMk cId="2370713982" sldId="258"/>
+            <ac:cxnSpMk id="186" creationId="{8B8A5069-7969-C164-8418-15F4BE24B20F}"/>
+          </ac:cxnSpMkLst>
+        </pc:cxnChg>
+        <pc:cxnChg chg="del mod">
+          <ac:chgData name="Fatima Pillosu" userId="a6295d4dc9e22643" providerId="LiveId" clId="{0478CFAF-F744-4001-ABF3-5E8A4958592B}" dt="2025-07-03T10:09:19.671" v="464" actId="478"/>
+          <ac:cxnSpMkLst>
+            <pc:docMk/>
+            <pc:sldMk cId="2370713982" sldId="258"/>
+            <ac:cxnSpMk id="188" creationId="{D5FAA1EB-8CDC-4657-65F7-67F78E902DA0}"/>
+          </ac:cxnSpMkLst>
+        </pc:cxnChg>
+        <pc:cxnChg chg="del mod">
+          <ac:chgData name="Fatima Pillosu" userId="a6295d4dc9e22643" providerId="LiveId" clId="{0478CFAF-F744-4001-ABF3-5E8A4958592B}" dt="2025-07-03T10:13:29.318" v="498" actId="21"/>
+          <ac:cxnSpMkLst>
+            <pc:docMk/>
+            <pc:sldMk cId="2370713982" sldId="258"/>
+            <ac:cxnSpMk id="201" creationId="{D6C433DB-BAA1-CC71-D29E-1CD90D5B8AA6}"/>
+          </ac:cxnSpMkLst>
+        </pc:cxnChg>
+        <pc:cxnChg chg="del mod">
+          <ac:chgData name="Fatima Pillosu" userId="a6295d4dc9e22643" providerId="LiveId" clId="{0478CFAF-F744-4001-ABF3-5E8A4958592B}" dt="2025-07-03T10:13:29.318" v="498" actId="21"/>
+          <ac:cxnSpMkLst>
+            <pc:docMk/>
+            <pc:sldMk cId="2370713982" sldId="258"/>
+            <ac:cxnSpMk id="210" creationId="{C7C3581F-BB46-6BFD-88EC-1685548CDC83}"/>
+          </ac:cxnSpMkLst>
+        </pc:cxnChg>
+        <pc:cxnChg chg="del">
+          <ac:chgData name="Fatima Pillosu" userId="a6295d4dc9e22643" providerId="LiveId" clId="{0478CFAF-F744-4001-ABF3-5E8A4958592B}" dt="2025-07-03T10:13:29.318" v="498" actId="21"/>
+          <ac:cxnSpMkLst>
+            <pc:docMk/>
+            <pc:sldMk cId="2370713982" sldId="258"/>
+            <ac:cxnSpMk id="215" creationId="{C90FD5CB-CFB6-24E9-74FD-5E099AAAFF1E}"/>
+          </ac:cxnSpMkLst>
+        </pc:cxnChg>
+        <pc:cxnChg chg="del">
+          <ac:chgData name="Fatima Pillosu" userId="a6295d4dc9e22643" providerId="LiveId" clId="{0478CFAF-F744-4001-ABF3-5E8A4958592B}" dt="2025-07-03T10:13:29.318" v="498" actId="21"/>
+          <ac:cxnSpMkLst>
+            <pc:docMk/>
+            <pc:sldMk cId="2370713982" sldId="258"/>
+            <ac:cxnSpMk id="216" creationId="{05C4EC2C-B3F3-2097-D9EC-F18C3D347A17}"/>
+          </ac:cxnSpMkLst>
+        </pc:cxnChg>
+        <pc:cxnChg chg="del">
+          <ac:chgData name="Fatima Pillosu" userId="a6295d4dc9e22643" providerId="LiveId" clId="{0478CFAF-F744-4001-ABF3-5E8A4958592B}" dt="2025-07-03T10:13:29.318" v="498" actId="21"/>
+          <ac:cxnSpMkLst>
+            <pc:docMk/>
+            <pc:sldMk cId="2370713982" sldId="258"/>
+            <ac:cxnSpMk id="217" creationId="{0EA9D7BD-3F7C-AE8D-C1CE-E9C384898216}"/>
+          </ac:cxnSpMkLst>
+        </pc:cxnChg>
+        <pc:cxnChg chg="del mod">
+          <ac:chgData name="Fatima Pillosu" userId="a6295d4dc9e22643" providerId="LiveId" clId="{0478CFAF-F744-4001-ABF3-5E8A4958592B}" dt="2025-07-03T10:13:29.318" v="498" actId="21"/>
+          <ac:cxnSpMkLst>
+            <pc:docMk/>
+            <pc:sldMk cId="2370713982" sldId="258"/>
+            <ac:cxnSpMk id="219" creationId="{8AED844A-3F43-A4D7-963B-F1037DBA7454}"/>
+          </ac:cxnSpMkLst>
+        </pc:cxnChg>
       </pc:sldChg>
     </pc:docChg>
   </pc:docChgLst>
@@ -5983,8 +6775,8 @@
         </p:nvSpPr>
         <p:spPr>
           <a:xfrm>
-            <a:off x="310515" y="1307865"/>
-            <a:ext cx="3519170" cy="2782217"/>
+            <a:off x="310515" y="1243173"/>
+            <a:ext cx="3519170" cy="2644599"/>
           </a:xfrm>
         </p:spPr>
         <p:txBody>
@@ -6015,8 +6807,8 @@
         </p:nvSpPr>
         <p:spPr>
           <a:xfrm>
-            <a:off x="517525" y="4197375"/>
-            <a:ext cx="3105150" cy="1929423"/>
+            <a:off x="517525" y="3989757"/>
+            <a:ext cx="3105150" cy="1833987"/>
           </a:xfrm>
         </p:spPr>
         <p:txBody>
@@ -6085,7 +6877,7 @@
           <a:p>
             <a:fld id="{26226F86-B123-4002-8175-586B5E8ACF57}" type="datetimeFigureOut">
               <a:rPr lang="en-GB" smtClean="0"/>
-              <a:t>12/06/2025</a:t>
+              <a:t>02/07/2025</a:t>
             </a:fld>
             <a:endParaRPr lang="en-GB"/>
           </a:p>
@@ -6136,7 +6928,7 @@
     </p:spTree>
     <p:extLst>
       <p:ext uri="{BB962C8B-B14F-4D97-AF65-F5344CB8AC3E}">
-        <p14:creationId xmlns:p14="http://schemas.microsoft.com/office/powerpoint/2010/main" val="3900935617"/>
+        <p14:creationId xmlns:p14="http://schemas.microsoft.com/office/powerpoint/2010/main" val="3968974430"/>
       </p:ext>
     </p:extLst>
   </p:cSld>
@@ -6255,7 +7047,7 @@
           <a:p>
             <a:fld id="{26226F86-B123-4002-8175-586B5E8ACF57}" type="datetimeFigureOut">
               <a:rPr lang="en-GB" smtClean="0"/>
-              <a:t>12/06/2025</a:t>
+              <a:t>02/07/2025</a:t>
             </a:fld>
             <a:endParaRPr lang="en-GB"/>
           </a:p>
@@ -6306,7 +7098,7 @@
     </p:spTree>
     <p:extLst>
       <p:ext uri="{BB962C8B-B14F-4D97-AF65-F5344CB8AC3E}">
-        <p14:creationId xmlns:p14="http://schemas.microsoft.com/office/powerpoint/2010/main" val="1508069228"/>
+        <p14:creationId xmlns:p14="http://schemas.microsoft.com/office/powerpoint/2010/main" val="2895606354"/>
       </p:ext>
     </p:extLst>
   </p:cSld>
@@ -6345,8 +7137,8 @@
         </p:nvSpPr>
         <p:spPr>
           <a:xfrm>
-            <a:off x="2962831" y="425472"/>
-            <a:ext cx="892731" cy="6772406"/>
+            <a:off x="2962831" y="404427"/>
+            <a:ext cx="892731" cy="6437418"/>
           </a:xfrm>
         </p:spPr>
         <p:txBody>
@@ -6373,8 +7165,8 @@
         </p:nvSpPr>
         <p:spPr>
           <a:xfrm>
-            <a:off x="284639" y="425472"/>
-            <a:ext cx="2626439" cy="6772406"/>
+            <a:off x="284639" y="404427"/>
+            <a:ext cx="2626439" cy="6437418"/>
           </a:xfrm>
         </p:spPr>
         <p:txBody>
@@ -6435,7 +7227,7 @@
           <a:p>
             <a:fld id="{26226F86-B123-4002-8175-586B5E8ACF57}" type="datetimeFigureOut">
               <a:rPr lang="en-GB" smtClean="0"/>
-              <a:t>12/06/2025</a:t>
+              <a:t>02/07/2025</a:t>
             </a:fld>
             <a:endParaRPr lang="en-GB"/>
           </a:p>
@@ -6486,7 +7278,7 @@
     </p:spTree>
     <p:extLst>
       <p:ext uri="{BB962C8B-B14F-4D97-AF65-F5344CB8AC3E}">
-        <p14:creationId xmlns:p14="http://schemas.microsoft.com/office/powerpoint/2010/main" val="383022387"/>
+        <p14:creationId xmlns:p14="http://schemas.microsoft.com/office/powerpoint/2010/main" val="2379376403"/>
       </p:ext>
     </p:extLst>
   </p:cSld>
@@ -6605,7 +7397,7 @@
           <a:p>
             <a:fld id="{26226F86-B123-4002-8175-586B5E8ACF57}" type="datetimeFigureOut">
               <a:rPr lang="en-GB" smtClean="0"/>
-              <a:t>12/06/2025</a:t>
+              <a:t>02/07/2025</a:t>
             </a:fld>
             <a:endParaRPr lang="en-GB"/>
           </a:p>
@@ -6656,7 +7448,7 @@
     </p:spTree>
     <p:extLst>
       <p:ext uri="{BB962C8B-B14F-4D97-AF65-F5344CB8AC3E}">
-        <p14:creationId xmlns:p14="http://schemas.microsoft.com/office/powerpoint/2010/main" val="472665170"/>
+        <p14:creationId xmlns:p14="http://schemas.microsoft.com/office/powerpoint/2010/main" val="4128719797"/>
       </p:ext>
     </p:extLst>
   </p:cSld>
@@ -6695,8 +7487,8 @@
         </p:nvSpPr>
         <p:spPr>
           <a:xfrm>
-            <a:off x="282482" y="1992321"/>
-            <a:ext cx="3570923" cy="3324231"/>
+            <a:off x="282482" y="1893774"/>
+            <a:ext cx="3570923" cy="3159803"/>
           </a:xfrm>
         </p:spPr>
         <p:txBody>
@@ -6727,8 +7519,8 @@
         </p:nvSpPr>
         <p:spPr>
           <a:xfrm>
-            <a:off x="282482" y="5348001"/>
-            <a:ext cx="3570923" cy="1748135"/>
+            <a:off x="282482" y="5083469"/>
+            <a:ext cx="3570923" cy="1661666"/>
           </a:xfrm>
         </p:spPr>
         <p:txBody>
@@ -6851,7 +7643,7 @@
           <a:p>
             <a:fld id="{26226F86-B123-4002-8175-586B5E8ACF57}" type="datetimeFigureOut">
               <a:rPr lang="en-GB" smtClean="0"/>
-              <a:t>12/06/2025</a:t>
+              <a:t>02/07/2025</a:t>
             </a:fld>
             <a:endParaRPr lang="en-GB"/>
           </a:p>
@@ -6902,7 +7694,7 @@
     </p:spTree>
     <p:extLst>
       <p:ext uri="{BB962C8B-B14F-4D97-AF65-F5344CB8AC3E}">
-        <p14:creationId xmlns:p14="http://schemas.microsoft.com/office/powerpoint/2010/main" val="1617335411"/>
+        <p14:creationId xmlns:p14="http://schemas.microsoft.com/office/powerpoint/2010/main" val="1634248628"/>
       </p:ext>
     </p:extLst>
   </p:cSld>
@@ -6964,8 +7756,8 @@
         </p:nvSpPr>
         <p:spPr>
           <a:xfrm>
-            <a:off x="284639" y="2127360"/>
-            <a:ext cx="1759585" cy="5070517"/>
+            <a:off x="284639" y="2022133"/>
+            <a:ext cx="1759585" cy="4819712"/>
           </a:xfrm>
         </p:spPr>
         <p:txBody>
@@ -7021,8 +7813,8 @@
         </p:nvSpPr>
         <p:spPr>
           <a:xfrm>
-            <a:off x="2095976" y="2127360"/>
-            <a:ext cx="1759585" cy="5070517"/>
+            <a:off x="2095976" y="2022133"/>
+            <a:ext cx="1759585" cy="4819712"/>
           </a:xfrm>
         </p:spPr>
         <p:txBody>
@@ -7083,7 +7875,7 @@
           <a:p>
             <a:fld id="{26226F86-B123-4002-8175-586B5E8ACF57}" type="datetimeFigureOut">
               <a:rPr lang="en-GB" smtClean="0"/>
-              <a:t>12/06/2025</a:t>
+              <a:t>02/07/2025</a:t>
             </a:fld>
             <a:endParaRPr lang="en-GB"/>
           </a:p>
@@ -7134,7 +7926,7 @@
     </p:spTree>
     <p:extLst>
       <p:ext uri="{BB962C8B-B14F-4D97-AF65-F5344CB8AC3E}">
-        <p14:creationId xmlns:p14="http://schemas.microsoft.com/office/powerpoint/2010/main" val="2022225238"/>
+        <p14:creationId xmlns:p14="http://schemas.microsoft.com/office/powerpoint/2010/main" val="3687292436"/>
       </p:ext>
     </p:extLst>
   </p:cSld>
@@ -7173,8 +7965,8 @@
         </p:nvSpPr>
         <p:spPr>
           <a:xfrm>
-            <a:off x="285178" y="425474"/>
-            <a:ext cx="3570923" cy="1544649"/>
+            <a:off x="285178" y="404428"/>
+            <a:ext cx="3570923" cy="1468245"/>
           </a:xfrm>
         </p:spPr>
         <p:txBody>
@@ -7201,8 +7993,8 @@
         </p:nvSpPr>
         <p:spPr>
           <a:xfrm>
-            <a:off x="285179" y="1959022"/>
-            <a:ext cx="1751498" cy="960086"/>
+            <a:off x="285179" y="1862122"/>
+            <a:ext cx="1751498" cy="912597"/>
           </a:xfrm>
         </p:spPr>
         <p:txBody>
@@ -7266,8 +8058,8 @@
         </p:nvSpPr>
         <p:spPr>
           <a:xfrm>
-            <a:off x="285179" y="2919108"/>
-            <a:ext cx="1751498" cy="4293569"/>
+            <a:off x="285179" y="2774719"/>
+            <a:ext cx="1751498" cy="4081193"/>
           </a:xfrm>
         </p:spPr>
         <p:txBody>
@@ -7323,8 +8115,8 @@
         </p:nvSpPr>
         <p:spPr>
           <a:xfrm>
-            <a:off x="2095977" y="1959022"/>
-            <a:ext cx="1760124" cy="960086"/>
+            <a:off x="2095977" y="1862122"/>
+            <a:ext cx="1760124" cy="912597"/>
           </a:xfrm>
         </p:spPr>
         <p:txBody>
@@ -7388,8 +8180,8 @@
         </p:nvSpPr>
         <p:spPr>
           <a:xfrm>
-            <a:off x="2095977" y="2919108"/>
-            <a:ext cx="1760124" cy="4293569"/>
+            <a:off x="2095977" y="2774719"/>
+            <a:ext cx="1760124" cy="4081193"/>
           </a:xfrm>
         </p:spPr>
         <p:txBody>
@@ -7450,7 +8242,7 @@
           <a:p>
             <a:fld id="{26226F86-B123-4002-8175-586B5E8ACF57}" type="datetimeFigureOut">
               <a:rPr lang="en-GB" smtClean="0"/>
-              <a:t>12/06/2025</a:t>
+              <a:t>02/07/2025</a:t>
             </a:fld>
             <a:endParaRPr lang="en-GB"/>
           </a:p>
@@ -7501,7 +8293,7 @@
     </p:spTree>
     <p:extLst>
       <p:ext uri="{BB962C8B-B14F-4D97-AF65-F5344CB8AC3E}">
-        <p14:creationId xmlns:p14="http://schemas.microsoft.com/office/powerpoint/2010/main" val="1680433592"/>
+        <p14:creationId xmlns:p14="http://schemas.microsoft.com/office/powerpoint/2010/main" val="4234823074"/>
       </p:ext>
     </p:extLst>
   </p:cSld>
@@ -7568,7 +8360,7 @@
           <a:p>
             <a:fld id="{26226F86-B123-4002-8175-586B5E8ACF57}" type="datetimeFigureOut">
               <a:rPr lang="en-GB" smtClean="0"/>
-              <a:t>12/06/2025</a:t>
+              <a:t>02/07/2025</a:t>
             </a:fld>
             <a:endParaRPr lang="en-GB"/>
           </a:p>
@@ -7619,7 +8411,7 @@
     </p:spTree>
     <p:extLst>
       <p:ext uri="{BB962C8B-B14F-4D97-AF65-F5344CB8AC3E}">
-        <p14:creationId xmlns:p14="http://schemas.microsoft.com/office/powerpoint/2010/main" val="445693269"/>
+        <p14:creationId xmlns:p14="http://schemas.microsoft.com/office/powerpoint/2010/main" val="1180495647"/>
       </p:ext>
     </p:extLst>
   </p:cSld>
@@ -7663,7 +8455,7 @@
           <a:p>
             <a:fld id="{26226F86-B123-4002-8175-586B5E8ACF57}" type="datetimeFigureOut">
               <a:rPr lang="en-GB" smtClean="0"/>
-              <a:t>12/06/2025</a:t>
+              <a:t>02/07/2025</a:t>
             </a:fld>
             <a:endParaRPr lang="en-GB"/>
           </a:p>
@@ -7714,7 +8506,7 @@
     </p:spTree>
     <p:extLst>
       <p:ext uri="{BB962C8B-B14F-4D97-AF65-F5344CB8AC3E}">
-        <p14:creationId xmlns:p14="http://schemas.microsoft.com/office/powerpoint/2010/main" val="3373522934"/>
+        <p14:creationId xmlns:p14="http://schemas.microsoft.com/office/powerpoint/2010/main" val="1768909274"/>
       </p:ext>
     </p:extLst>
   </p:cSld>
@@ -7753,8 +8545,8 @@
         </p:nvSpPr>
         <p:spPr>
           <a:xfrm>
-            <a:off x="285178" y="532765"/>
-            <a:ext cx="1335322" cy="1864678"/>
+            <a:off x="285178" y="506412"/>
+            <a:ext cx="1335322" cy="1772444"/>
           </a:xfrm>
         </p:spPr>
         <p:txBody>
@@ -7785,8 +8577,8 @@
         </p:nvSpPr>
         <p:spPr>
           <a:xfrm>
-            <a:off x="1760124" y="1150626"/>
-            <a:ext cx="2095976" cy="5679127"/>
+            <a:off x="1760124" y="1093712"/>
+            <a:ext cx="2095976" cy="5398217"/>
           </a:xfrm>
         </p:spPr>
         <p:txBody>
@@ -7870,8 +8662,8 @@
         </p:nvSpPr>
         <p:spPr>
           <a:xfrm>
-            <a:off x="285178" y="2397442"/>
-            <a:ext cx="1335322" cy="4441559"/>
+            <a:off x="285178" y="2278857"/>
+            <a:ext cx="1335322" cy="4221863"/>
           </a:xfrm>
         </p:spPr>
         <p:txBody>
@@ -7940,7 +8732,7 @@
           <a:p>
             <a:fld id="{26226F86-B123-4002-8175-586B5E8ACF57}" type="datetimeFigureOut">
               <a:rPr lang="en-GB" smtClean="0"/>
-              <a:t>12/06/2025</a:t>
+              <a:t>02/07/2025</a:t>
             </a:fld>
             <a:endParaRPr lang="en-GB"/>
           </a:p>
@@ -7991,7 +8783,7 @@
     </p:spTree>
     <p:extLst>
       <p:ext uri="{BB962C8B-B14F-4D97-AF65-F5344CB8AC3E}">
-        <p14:creationId xmlns:p14="http://schemas.microsoft.com/office/powerpoint/2010/main" val="1111042838"/>
+        <p14:creationId xmlns:p14="http://schemas.microsoft.com/office/powerpoint/2010/main" val="3032773821"/>
       </p:ext>
     </p:extLst>
   </p:cSld>
@@ -8030,8 +8822,8 @@
         </p:nvSpPr>
         <p:spPr>
           <a:xfrm>
-            <a:off x="285178" y="532765"/>
-            <a:ext cx="1335322" cy="1864678"/>
+            <a:off x="285178" y="506412"/>
+            <a:ext cx="1335322" cy="1772444"/>
           </a:xfrm>
         </p:spPr>
         <p:txBody>
@@ -8062,8 +8854,8 @@
         </p:nvSpPr>
         <p:spPr>
           <a:xfrm>
-            <a:off x="1760124" y="1150626"/>
-            <a:ext cx="2095976" cy="5679127"/>
+            <a:off x="1760124" y="1093712"/>
+            <a:ext cx="2095976" cy="5398217"/>
           </a:xfrm>
         </p:spPr>
         <p:txBody>
@@ -8127,8 +8919,8 @@
         </p:nvSpPr>
         <p:spPr>
           <a:xfrm>
-            <a:off x="285178" y="2397442"/>
-            <a:ext cx="1335322" cy="4441559"/>
+            <a:off x="285178" y="2278857"/>
+            <a:ext cx="1335322" cy="4221863"/>
           </a:xfrm>
         </p:spPr>
         <p:txBody>
@@ -8197,7 +8989,7 @@
           <a:p>
             <a:fld id="{26226F86-B123-4002-8175-586B5E8ACF57}" type="datetimeFigureOut">
               <a:rPr lang="en-GB" smtClean="0"/>
-              <a:t>12/06/2025</a:t>
+              <a:t>02/07/2025</a:t>
             </a:fld>
             <a:endParaRPr lang="en-GB"/>
           </a:p>
@@ -8248,7 +9040,7 @@
     </p:spTree>
     <p:extLst>
       <p:ext uri="{BB962C8B-B14F-4D97-AF65-F5344CB8AC3E}">
-        <p14:creationId xmlns:p14="http://schemas.microsoft.com/office/powerpoint/2010/main" val="98811895"/>
+        <p14:creationId xmlns:p14="http://schemas.microsoft.com/office/powerpoint/2010/main" val="437825404"/>
       </p:ext>
     </p:extLst>
   </p:cSld>
@@ -8292,8 +9084,8 @@
         </p:nvSpPr>
         <p:spPr>
           <a:xfrm>
-            <a:off x="284639" y="425474"/>
-            <a:ext cx="3570923" cy="1544649"/>
+            <a:off x="284639" y="404428"/>
+            <a:ext cx="3570923" cy="1468245"/>
           </a:xfrm>
           <a:prstGeom prst="rect">
             <a:avLst/>
@@ -8325,8 +9117,8 @@
         </p:nvSpPr>
         <p:spPr>
           <a:xfrm>
-            <a:off x="284639" y="2127360"/>
-            <a:ext cx="3570923" cy="5070517"/>
+            <a:off x="284639" y="2022133"/>
+            <a:ext cx="3570923" cy="4819712"/>
           </a:xfrm>
           <a:prstGeom prst="rect">
             <a:avLst/>
@@ -8387,8 +9179,8 @@
         </p:nvSpPr>
         <p:spPr>
           <a:xfrm>
-            <a:off x="284639" y="7406915"/>
-            <a:ext cx="931545" cy="425472"/>
+            <a:off x="284639" y="7040542"/>
+            <a:ext cx="931545" cy="404427"/>
           </a:xfrm>
           <a:prstGeom prst="rect">
             <a:avLst/>
@@ -8410,7 +9202,7 @@
           <a:p>
             <a:fld id="{26226F86-B123-4002-8175-586B5E8ACF57}" type="datetimeFigureOut">
               <a:rPr lang="en-GB" smtClean="0"/>
-              <a:t>12/06/2025</a:t>
+              <a:t>02/07/2025</a:t>
             </a:fld>
             <a:endParaRPr lang="en-GB"/>
           </a:p>
@@ -8428,8 +9220,8 @@
         </p:nvSpPr>
         <p:spPr>
           <a:xfrm>
-            <a:off x="1371441" y="7406915"/>
-            <a:ext cx="1397318" cy="425472"/>
+            <a:off x="1371441" y="7040542"/>
+            <a:ext cx="1397318" cy="404427"/>
           </a:xfrm>
           <a:prstGeom prst="rect">
             <a:avLst/>
@@ -8465,8 +9257,8 @@
         </p:nvSpPr>
         <p:spPr>
           <a:xfrm>
-            <a:off x="2924016" y="7406915"/>
-            <a:ext cx="931545" cy="425472"/>
+            <a:off x="2924016" y="7040542"/>
+            <a:ext cx="931545" cy="404427"/>
           </a:xfrm>
           <a:prstGeom prst="rect">
             <a:avLst/>
@@ -8497,23 +9289,23 @@
     </p:spTree>
     <p:extLst>
       <p:ext uri="{BB962C8B-B14F-4D97-AF65-F5344CB8AC3E}">
-        <p14:creationId xmlns:p14="http://schemas.microsoft.com/office/powerpoint/2010/main" val="1944114402"/>
+        <p14:creationId xmlns:p14="http://schemas.microsoft.com/office/powerpoint/2010/main" val="3103596789"/>
       </p:ext>
     </p:extLst>
   </p:cSld>
   <p:clrMap bg1="lt1" tx1="dk1" bg2="lt2" tx2="dk2" accent1="accent1" accent2="accent2" accent3="accent3" accent4="accent4" accent5="accent5" accent6="accent6" hlink="hlink" folHlink="folHlink"/>
   <p:sldLayoutIdLst>
-    <p:sldLayoutId id="2147483685" r:id="rId1"/>
-    <p:sldLayoutId id="2147483686" r:id="rId2"/>
-    <p:sldLayoutId id="2147483687" r:id="rId3"/>
-    <p:sldLayoutId id="2147483688" r:id="rId4"/>
-    <p:sldLayoutId id="2147483689" r:id="rId5"/>
-    <p:sldLayoutId id="2147483690" r:id="rId6"/>
-    <p:sldLayoutId id="2147483691" r:id="rId7"/>
-    <p:sldLayoutId id="2147483692" r:id="rId8"/>
-    <p:sldLayoutId id="2147483693" r:id="rId9"/>
-    <p:sldLayoutId id="2147483694" r:id="rId10"/>
-    <p:sldLayoutId id="2147483695" r:id="rId11"/>
+    <p:sldLayoutId id="2147483697" r:id="rId1"/>
+    <p:sldLayoutId id="2147483698" r:id="rId2"/>
+    <p:sldLayoutId id="2147483699" r:id="rId3"/>
+    <p:sldLayoutId id="2147483700" r:id="rId4"/>
+    <p:sldLayoutId id="2147483701" r:id="rId5"/>
+    <p:sldLayoutId id="2147483702" r:id="rId6"/>
+    <p:sldLayoutId id="2147483703" r:id="rId7"/>
+    <p:sldLayoutId id="2147483704" r:id="rId8"/>
+    <p:sldLayoutId id="2147483705" r:id="rId9"/>
+    <p:sldLayoutId id="2147483706" r:id="rId10"/>
+    <p:sldLayoutId id="2147483707" r:id="rId11"/>
   </p:sldLayoutIdLst>
   <p:txStyles>
     <p:titleStyle>
@@ -8823,7 +9615,7 @@
       </p:grpSpPr>
       <p:cxnSp>
         <p:nvCxnSpPr>
-          <p:cNvPr id="173" name="Straight Arrow Connector 172">
+          <p:cNvPr id="7" name="Straight Arrow Connector 6">
             <a:extLst>
               <a:ext uri="{FF2B5EF4-FFF2-40B4-BE49-F238E27FC236}">
                 <a16:creationId xmlns:a16="http://schemas.microsoft.com/office/drawing/2014/main" id="{6B2B5BF2-676C-E1AE-BA62-2F7C9F6C9C70}"/>
@@ -8837,7 +9629,7 @@
         </p:nvCxnSpPr>
         <p:spPr>
           <a:xfrm>
-            <a:off x="1814251" y="5841781"/>
+            <a:off x="1807853" y="5841781"/>
             <a:ext cx="0" cy="184430"/>
           </a:xfrm>
           <a:prstGeom prst="straightConnector1">
@@ -8870,7 +9662,7 @@
       </p:cxnSp>
       <p:cxnSp>
         <p:nvCxnSpPr>
-          <p:cNvPr id="174" name="Straight Arrow Connector 173">
+          <p:cNvPr id="8" name="Straight Arrow Connector 7">
             <a:extLst>
               <a:ext uri="{FF2B5EF4-FFF2-40B4-BE49-F238E27FC236}">
                 <a16:creationId xmlns:a16="http://schemas.microsoft.com/office/drawing/2014/main" id="{C03C5827-406F-B7CA-16D5-2D1C3286C854}"/>
@@ -8879,7 +9671,7 @@
           </p:cNvPr>
           <p:cNvCxnSpPr>
             <a:cxnSpLocks/>
-            <a:stCxn id="182" idx="2"/>
+            <a:stCxn id="16" idx="2"/>
           </p:cNvCxnSpPr>
           <p:nvPr/>
         </p:nvCxnSpPr>
@@ -8918,7 +9710,7 @@
       </p:cxnSp>
       <p:sp>
         <p:nvSpPr>
-          <p:cNvPr id="175" name="Rectangle 174">
+          <p:cNvPr id="9" name="Rectangle 8">
             <a:extLst>
               <a:ext uri="{FF2B5EF4-FFF2-40B4-BE49-F238E27FC236}">
                 <a16:creationId xmlns:a16="http://schemas.microsoft.com/office/drawing/2014/main" id="{37757665-AC28-C2D7-9288-A4F262BEDCA5}"/>
@@ -8977,10 +9769,10 @@
                 <a:solidFill>
                   <a:srgbClr val="009900"/>
                 </a:solidFill>
-                <a:latin typeface="Calibri Light" panose="020F0302020204030204" pitchFamily="34" charset="0"/>
-                <a:cs typeface="Calibri Light" panose="020F0302020204030204" pitchFamily="34" charset="0"/>
+                <a:latin typeface="Calibri" panose="020F0502020204030204" pitchFamily="34" charset="0"/>
+                <a:cs typeface="Calibri" panose="020F0502020204030204" pitchFamily="34" charset="0"/>
               </a:rPr>
-              <a:t>precision-recall curves</a:t>
+              <a:t>Precision-Recall curves</a:t>
             </a:r>
             <a:r>
               <a:rPr lang="en-GB" sz="800" dirty="0">
@@ -8997,10 +9789,10 @@
                 <a:solidFill>
                   <a:srgbClr val="009900"/>
                 </a:solidFill>
-                <a:latin typeface="Calibri Light" panose="020F0302020204030204" pitchFamily="34" charset="0"/>
-                <a:cs typeface="Calibri Light" panose="020F0302020204030204" pitchFamily="34" charset="0"/>
+                <a:latin typeface="Calibri" panose="020F0502020204030204" pitchFamily="34" charset="0"/>
+                <a:cs typeface="Calibri" panose="020F0502020204030204" pitchFamily="34" charset="0"/>
               </a:rPr>
-              <a:t>auprc</a:t>
+              <a:t>AUC-PR</a:t>
             </a:r>
             <a:r>
               <a:rPr lang="en-GB" sz="800" dirty="0">
@@ -9017,10 +9809,10 @@
                 <a:solidFill>
                   <a:srgbClr val="009900"/>
                 </a:solidFill>
-                <a:latin typeface="Calibri Light" panose="020F0302020204030204" pitchFamily="34" charset="0"/>
-                <a:cs typeface="Calibri Light" panose="020F0302020204030204" pitchFamily="34" charset="0"/>
+                <a:latin typeface="Calibri" panose="020F0502020204030204" pitchFamily="34" charset="0"/>
+                <a:cs typeface="Calibri" panose="020F0502020204030204" pitchFamily="34" charset="0"/>
               </a:rPr>
-              <a:t>roc curves</a:t>
+              <a:t>ROC curves</a:t>
             </a:r>
             <a:r>
               <a:rPr lang="en-GB" sz="800" dirty="0">
@@ -9037,10 +9829,10 @@
                 <a:solidFill>
                   <a:srgbClr val="009900"/>
                 </a:solidFill>
-                <a:latin typeface="Calibri Light" panose="020F0302020204030204" pitchFamily="34" charset="0"/>
-                <a:cs typeface="Calibri Light" panose="020F0302020204030204" pitchFamily="34" charset="0"/>
+                <a:latin typeface="Calibri" panose="020F0502020204030204" pitchFamily="34" charset="0"/>
+                <a:cs typeface="Calibri" panose="020F0502020204030204" pitchFamily="34" charset="0"/>
               </a:rPr>
-              <a:t>aroc</a:t>
+              <a:t>AUC-ROC</a:t>
             </a:r>
             <a:r>
               <a:rPr lang="en-GB" sz="800" dirty="0">
@@ -9057,8 +9849,8 @@
                 <a:solidFill>
                   <a:srgbClr val="009900"/>
                 </a:solidFill>
-                <a:latin typeface="Calibri Light" panose="020F0302020204030204" pitchFamily="34" charset="0"/>
-                <a:cs typeface="Calibri Light" panose="020F0302020204030204" pitchFamily="34" charset="0"/>
+                <a:latin typeface="Calibri" panose="020F0502020204030204" pitchFamily="34" charset="0"/>
+                <a:cs typeface="Calibri" panose="020F0502020204030204" pitchFamily="34" charset="0"/>
               </a:rPr>
               <a:t>reliability diagrams</a:t>
             </a:r>
@@ -9077,10 +9869,20 @@
                 <a:solidFill>
                   <a:srgbClr val="009900"/>
                 </a:solidFill>
+                <a:latin typeface="Calibri" panose="020F0502020204030204" pitchFamily="34" charset="0"/>
+                <a:cs typeface="Calibri" panose="020F0502020204030204" pitchFamily="34" charset="0"/>
+              </a:rPr>
+              <a:t>frequency bias</a:t>
+            </a:r>
+            <a:r>
+              <a:rPr lang="en-GB" sz="800" b="1" dirty="0">
+                <a:solidFill>
+                  <a:srgbClr val="009900"/>
+                </a:solidFill>
                 <a:latin typeface="Calibri Light" panose="020F0302020204030204" pitchFamily="34" charset="0"/>
                 <a:cs typeface="Calibri Light" panose="020F0302020204030204" pitchFamily="34" charset="0"/>
               </a:rPr>
-              <a:t>frequency bias.</a:t>
+              <a:t>.</a:t>
             </a:r>
             <a:endParaRPr lang="en-GB" sz="800" dirty="0">
               <a:solidFill>
@@ -9094,7 +9896,7 @@
       </p:sp>
       <p:cxnSp>
         <p:nvCxnSpPr>
-          <p:cNvPr id="176" name="Straight Arrow Connector 175">
+          <p:cNvPr id="10" name="Straight Arrow Connector 9">
             <a:extLst>
               <a:ext uri="{FF2B5EF4-FFF2-40B4-BE49-F238E27FC236}">
                 <a16:creationId xmlns:a16="http://schemas.microsoft.com/office/drawing/2014/main" id="{92F3CE2A-5F1A-1C78-2C29-5D73E908A641}"/>
@@ -9103,7 +9905,7 @@
           </p:cNvPr>
           <p:cNvCxnSpPr>
             <a:cxnSpLocks/>
-            <a:endCxn id="175" idx="3"/>
+            <a:endCxn id="9" idx="3"/>
           </p:cNvCxnSpPr>
           <p:nvPr/>
         </p:nvCxnSpPr>
@@ -9142,7 +9944,7 @@
       </p:cxnSp>
       <p:sp>
         <p:nvSpPr>
-          <p:cNvPr id="177" name="Rectangle 176">
+          <p:cNvPr id="11" name="Rectangle 10">
             <a:extLst>
               <a:ext uri="{FF2B5EF4-FFF2-40B4-BE49-F238E27FC236}">
                 <a16:creationId xmlns:a16="http://schemas.microsoft.com/office/drawing/2014/main" id="{6E3975A0-04BD-A32C-5C8E-87D363BCBF43}"/>
@@ -9186,19 +9988,6 @@
           <a:lstStyle/>
           <a:p>
             <a:r>
-              <a:rPr lang="en-GB" sz="1200" b="1">
-                <a:solidFill>
-                  <a:schemeClr val="tx1">
-                    <a:lumMod val="75000"/>
-                    <a:lumOff val="25000"/>
-                  </a:schemeClr>
-                </a:solidFill>
-                <a:latin typeface="Calibri" panose="020F0502020204030204" pitchFamily="34" charset="0"/>
-                <a:cs typeface="Calibri" panose="020F0502020204030204" pitchFamily="34" charset="0"/>
-              </a:rPr>
-              <a:t>Workflow for </a:t>
-            </a:r>
-            <a:r>
               <a:rPr lang="en-GB" sz="1200" b="1" dirty="0">
                 <a:solidFill>
                   <a:schemeClr val="tx1">
@@ -9209,7 +9998,7 @@
                 <a:latin typeface="Calibri" panose="020F0502020204030204" pitchFamily="34" charset="0"/>
                 <a:cs typeface="Calibri" panose="020F0502020204030204" pitchFamily="34" charset="0"/>
               </a:rPr>
-              <a:t>training data-driven predictive models</a:t>
+              <a:t>Workflow for training data-driven predictive models</a:t>
             </a:r>
           </a:p>
           <a:p>
@@ -9231,7 +10020,7 @@
       </p:sp>
       <p:sp>
         <p:nvSpPr>
-          <p:cNvPr id="178" name="Rectangle 177">
+          <p:cNvPr id="12" name="Rectangle 11">
             <a:extLst>
               <a:ext uri="{FF2B5EF4-FFF2-40B4-BE49-F238E27FC236}">
                 <a16:creationId xmlns:a16="http://schemas.microsoft.com/office/drawing/2014/main" id="{EC3C4672-BBD3-831C-7CA8-0C6A492C9F9C}"/>
@@ -9243,13 +10032,15 @@
         </p:nvSpPr>
         <p:spPr>
           <a:xfrm>
-            <a:off x="565693" y="572085"/>
-            <a:ext cx="3008814" cy="264384"/>
+            <a:off x="490149" y="572085"/>
+            <a:ext cx="3159903" cy="264384"/>
           </a:xfrm>
           <a:prstGeom prst="rect">
             <a:avLst/>
           </a:prstGeom>
-          <a:noFill/>
+          <a:solidFill>
+            <a:srgbClr val="800080"/>
+          </a:solidFill>
           <a:ln w="3175">
             <a:solidFill>
               <a:schemeClr val="tx1">
@@ -9281,76 +10072,124 @@
           <a:p>
             <a:pPr algn="ctr"/>
             <a:r>
-              <a:rPr lang="en-GB" sz="800" dirty="0">
+              <a:rPr lang="en-GB" sz="800" u="sng" dirty="0">
                 <a:solidFill>
-                  <a:schemeClr val="tx1">
-                    <a:lumMod val="75000"/>
-                    <a:lumOff val="25000"/>
-                  </a:schemeClr>
+                  <a:schemeClr val="bg1"/>
                 </a:solidFill>
                 <a:latin typeface="Calibri Light" panose="020F0302020204030204" pitchFamily="34" charset="0"/>
                 <a:cs typeface="Calibri Light" panose="020F0302020204030204" pitchFamily="34" charset="0"/>
               </a:rPr>
-              <a:t>Imbalanced training dataset (from 2001 to 2020)</a:t>
-            </a:r>
-          </a:p>
-          <a:p>
-            <a:pPr algn="ctr"/>
-            <a:r>
-              <a:rPr lang="en-GB" sz="800" b="1" dirty="0">
+              <a:t>Imbalanced</a:t>
+            </a:r>
+            <a:r>
+              <a:rPr lang="en-GB" sz="800" dirty="0">
                 <a:solidFill>
-                  <a:schemeClr val="tx1">
-                    <a:lumMod val="75000"/>
-                    <a:lumOff val="25000"/>
-                  </a:schemeClr>
+                  <a:schemeClr val="bg1"/>
                 </a:solidFill>
                 <a:latin typeface="Calibri Light" panose="020F0302020204030204" pitchFamily="34" charset="0"/>
                 <a:cs typeface="Calibri Light" panose="020F0302020204030204" pitchFamily="34" charset="0"/>
               </a:rPr>
-              <a:t>m = 19M </a:t>
-            </a:r>
-            <a:r>
-              <a:rPr lang="en-GB" sz="800" dirty="0">
+              <a:t> training dataset (from 2001 to 2020)</a:t>
+            </a:r>
+          </a:p>
+          <a:p>
+            <a:pPr algn="ctr"/>
+            <a:r>
+              <a:rPr lang="en-GB" sz="800" b="1" dirty="0">
                 <a:solidFill>
-                  <a:schemeClr val="tx1">
-                    <a:lumMod val="75000"/>
-                    <a:lumOff val="25000"/>
-                  </a:schemeClr>
+                  <a:schemeClr val="bg1"/>
+                </a:solidFill>
+                <a:latin typeface="Calibri" panose="020F0502020204030204" pitchFamily="34" charset="0"/>
+                <a:cs typeface="Calibri" panose="020F0502020204030204" pitchFamily="34" charset="0"/>
+              </a:rPr>
+              <a:t>m = 19.75M</a:t>
+            </a:r>
+            <a:r>
+              <a:rPr lang="en-GB" sz="800" b="1" dirty="0">
+                <a:solidFill>
+                  <a:schemeClr val="bg1"/>
                 </a:solidFill>
                 <a:latin typeface="Calibri Light" panose="020F0302020204030204" pitchFamily="34" charset="0"/>
                 <a:cs typeface="Calibri Light" panose="020F0302020204030204" pitchFamily="34" charset="0"/>
               </a:rPr>
-              <a:t>data points, of which only </a:t>
+              <a:t> </a:t>
+            </a:r>
+            <a:r>
+              <a:rPr lang="en-GB" sz="800" dirty="0">
+                <a:solidFill>
+                  <a:schemeClr val="bg1"/>
+                </a:solidFill>
+                <a:latin typeface="Calibri Light" panose="020F0302020204030204" pitchFamily="34" charset="0"/>
+                <a:cs typeface="Calibri Light" panose="020F0302020204030204" pitchFamily="34" charset="0"/>
+              </a:rPr>
+              <a:t>data points, of which </a:t>
             </a:r>
             <a:r>
               <a:rPr lang="en-GB" sz="800" b="1" dirty="0">
                 <a:solidFill>
-                  <a:schemeClr val="tx1">
-                    <a:lumMod val="75000"/>
-                    <a:lumOff val="25000"/>
-                  </a:schemeClr>
+                  <a:schemeClr val="bg1"/>
                 </a:solidFill>
                 <a:latin typeface="Calibri" panose="020F0502020204030204" pitchFamily="34" charset="0"/>
                 <a:cs typeface="Calibri" panose="020F0502020204030204" pitchFamily="34" charset="0"/>
               </a:rPr>
-              <a:t>53245 (0.27%) are yes-events</a:t>
-            </a:r>
-            <a:endParaRPr lang="en-GB" sz="800" dirty="0">
-              <a:solidFill>
-                <a:schemeClr val="tx1">
-                  <a:lumMod val="75000"/>
-                  <a:lumOff val="25000"/>
-                </a:schemeClr>
-              </a:solidFill>
-              <a:latin typeface="Calibri Light" panose="020F0302020204030204" pitchFamily="34" charset="0"/>
-              <a:cs typeface="Calibri Light" panose="020F0302020204030204" pitchFamily="34" charset="0"/>
-            </a:endParaRPr>
+              <a:t>53245 </a:t>
+            </a:r>
+            <a:r>
+              <a:rPr lang="en-GB" sz="800" dirty="0">
+                <a:solidFill>
+                  <a:schemeClr val="bg1"/>
+                </a:solidFill>
+                <a:latin typeface="Calibri Light" panose="020F0302020204030204" pitchFamily="34" charset="0"/>
+                <a:cs typeface="Calibri Light" panose="020F0302020204030204" pitchFamily="34" charset="0"/>
+              </a:rPr>
+              <a:t>(</a:t>
+            </a:r>
+            <a:r>
+              <a:rPr lang="en-GB" sz="800" b="1" dirty="0">
+                <a:solidFill>
+                  <a:schemeClr val="bg1"/>
+                </a:solidFill>
+                <a:latin typeface="Calibri" panose="020F0502020204030204" pitchFamily="34" charset="0"/>
+                <a:cs typeface="Calibri" panose="020F0502020204030204" pitchFamily="34" charset="0"/>
+              </a:rPr>
+              <a:t>0.27%</a:t>
+            </a:r>
+            <a:r>
+              <a:rPr lang="en-GB" sz="800" dirty="0">
+                <a:solidFill>
+                  <a:schemeClr val="bg1"/>
+                </a:solidFill>
+                <a:latin typeface="Calibri Light" panose="020F0302020204030204" pitchFamily="34" charset="0"/>
+                <a:cs typeface="Calibri Light" panose="020F0302020204030204" pitchFamily="34" charset="0"/>
+              </a:rPr>
+              <a:t>)</a:t>
+            </a:r>
+            <a:r>
+              <a:rPr lang="en-GB" sz="800" b="1" dirty="0">
+                <a:solidFill>
+                  <a:schemeClr val="bg1"/>
+                </a:solidFill>
+                <a:latin typeface="Calibri" panose="020F0502020204030204" pitchFamily="34" charset="0"/>
+                <a:cs typeface="Calibri" panose="020F0502020204030204" pitchFamily="34" charset="0"/>
+              </a:rPr>
+              <a:t> </a:t>
+            </a:r>
+            <a:r>
+              <a:rPr lang="en-GB" sz="800" dirty="0">
+                <a:solidFill>
+                  <a:schemeClr val="bg1"/>
+                </a:solidFill>
+                <a:latin typeface="Calibri Light" panose="020F0302020204030204" pitchFamily="34" charset="0"/>
+                <a:cs typeface="Calibri Light" panose="020F0302020204030204" pitchFamily="34" charset="0"/>
+              </a:rPr>
+              <a:t>are gridded yes-events</a:t>
+            </a:r>
           </a:p>
         </p:txBody>
       </p:sp>
       <p:cxnSp>
         <p:nvCxnSpPr>
-          <p:cNvPr id="179" name="Straight Arrow Connector 178">
+          <p:cNvPr id="13" name="Straight Arrow Connector 12">
             <a:extLst>
               <a:ext uri="{FF2B5EF4-FFF2-40B4-BE49-F238E27FC236}">
                 <a16:creationId xmlns:a16="http://schemas.microsoft.com/office/drawing/2014/main" id="{7DC2AC43-F265-6066-8ACE-435A1F981070}"/>
@@ -9359,14 +10198,14 @@
           </p:cNvPr>
           <p:cNvCxnSpPr>
             <a:cxnSpLocks/>
-            <a:stCxn id="178" idx="2"/>
+            <a:stCxn id="12" idx="2"/>
           </p:cNvCxnSpPr>
           <p:nvPr/>
         </p:nvCxnSpPr>
         <p:spPr>
           <a:xfrm>
-            <a:off x="2070100" y="836469"/>
-            <a:ext cx="1" cy="614581"/>
+            <a:off x="2070101" y="836469"/>
+            <a:ext cx="0" cy="614581"/>
           </a:xfrm>
           <a:prstGeom prst="straightConnector1">
             <a:avLst/>
@@ -9398,7 +10237,7 @@
       </p:cxnSp>
       <p:sp>
         <p:nvSpPr>
-          <p:cNvPr id="180" name="Rectangle 179">
+          <p:cNvPr id="14" name="Rectangle 13">
             <a:extLst>
               <a:ext uri="{FF2B5EF4-FFF2-40B4-BE49-F238E27FC236}">
                 <a16:creationId xmlns:a16="http://schemas.microsoft.com/office/drawing/2014/main" id="{A98AD652-CC49-61CB-93BF-590382B2DB5F}"/>
@@ -9474,7 +10313,7 @@
       </p:sp>
       <p:pic>
         <p:nvPicPr>
-          <p:cNvPr id="181" name="Picture 2" descr="Integrate scikit-learn (sklearn) with ZenML - Modeling Integrations">
+          <p:cNvPr id="15" name="Picture 2" descr="Integrate scikit-learn (sklearn) with ZenML - Modeling Integrations">
             <a:extLst>
               <a:ext uri="{FF2B5EF4-FFF2-40B4-BE49-F238E27FC236}">
                 <a16:creationId xmlns:a16="http://schemas.microsoft.com/office/drawing/2014/main" id="{E97DB556-868B-EC99-E5AE-818CEEC67257}"/>
@@ -9519,7 +10358,7 @@
       </p:pic>
       <p:sp>
         <p:nvSpPr>
-          <p:cNvPr id="182" name="Rectangle 181">
+          <p:cNvPr id="16" name="Rectangle 15">
             <a:extLst>
               <a:ext uri="{FF2B5EF4-FFF2-40B4-BE49-F238E27FC236}">
                 <a16:creationId xmlns:a16="http://schemas.microsoft.com/office/drawing/2014/main" id="{66347620-DBE3-A5F5-F8A3-7C2F7C6EBDE6}"/>
@@ -9582,7 +10421,7 @@
       </p:sp>
       <p:sp>
         <p:nvSpPr>
-          <p:cNvPr id="183" name="TextBox 182">
+          <p:cNvPr id="17" name="TextBox 16">
             <a:extLst>
               <a:ext uri="{FF2B5EF4-FFF2-40B4-BE49-F238E27FC236}">
                 <a16:creationId xmlns:a16="http://schemas.microsoft.com/office/drawing/2014/main" id="{4DC959A9-7C89-6A9D-8C2C-4CCD3B47ECC5}"/>
@@ -9624,7 +10463,7 @@
       </p:sp>
       <p:cxnSp>
         <p:nvCxnSpPr>
-          <p:cNvPr id="184" name="Straight Arrow Connector 183">
+          <p:cNvPr id="18" name="Straight Arrow Connector 17">
             <a:extLst>
               <a:ext uri="{FF2B5EF4-FFF2-40B4-BE49-F238E27FC236}">
                 <a16:creationId xmlns:a16="http://schemas.microsoft.com/office/drawing/2014/main" id="{B54C17C6-3C4D-8A4F-59E1-33BB2363B4F2}"/>
@@ -9668,7 +10507,7 @@
       </p:cxnSp>
       <p:cxnSp>
         <p:nvCxnSpPr>
-          <p:cNvPr id="185" name="Straight Arrow Connector 184">
+          <p:cNvPr id="19" name="Straight Arrow Connector 18">
             <a:extLst>
               <a:ext uri="{FF2B5EF4-FFF2-40B4-BE49-F238E27FC236}">
                 <a16:creationId xmlns:a16="http://schemas.microsoft.com/office/drawing/2014/main" id="{256D26E3-8C15-B026-B526-6022B54CCA43}"/>
@@ -9712,7 +10551,7 @@
       </p:cxnSp>
       <p:cxnSp>
         <p:nvCxnSpPr>
-          <p:cNvPr id="186" name="Straight Arrow Connector 185">
+          <p:cNvPr id="20" name="Straight Arrow Connector 19">
             <a:extLst>
               <a:ext uri="{FF2B5EF4-FFF2-40B4-BE49-F238E27FC236}">
                 <a16:creationId xmlns:a16="http://schemas.microsoft.com/office/drawing/2014/main" id="{8B8A5069-7969-C164-8418-15F4BE24B20F}"/>
@@ -9759,7 +10598,7 @@
       </p:cxnSp>
       <p:sp>
         <p:nvSpPr>
-          <p:cNvPr id="187" name="Rectangle 186">
+          <p:cNvPr id="21" name="Rectangle 20">
             <a:extLst>
               <a:ext uri="{FF2B5EF4-FFF2-40B4-BE49-F238E27FC236}">
                 <a16:creationId xmlns:a16="http://schemas.microsoft.com/office/drawing/2014/main" id="{AE7F31D2-F023-F7AB-A647-E119A53ECEA7}"/>
@@ -9771,8 +10610,8 @@
         </p:nvSpPr>
         <p:spPr>
           <a:xfrm>
-            <a:off x="514494" y="6638401"/>
-            <a:ext cx="3111212" cy="411559"/>
+            <a:off x="0" y="6675785"/>
+            <a:ext cx="4140200" cy="323055"/>
           </a:xfrm>
           <a:prstGeom prst="rect">
             <a:avLst/>
@@ -9819,15 +10658,12 @@
             <a:r>
               <a:rPr lang="en-GB" sz="800" b="1" dirty="0">
                 <a:solidFill>
-                  <a:schemeClr val="tx1">
-                    <a:lumMod val="75000"/>
-                    <a:lumOff val="25000"/>
-                  </a:schemeClr>
+                  <a:srgbClr val="009900"/>
                 </a:solidFill>
                 <a:latin typeface="Calibri" panose="020F0502020204030204" pitchFamily="34" charset="0"/>
                 <a:cs typeface="Calibri" panose="020F0502020204030204" pitchFamily="34" charset="0"/>
               </a:rPr>
-              <a:t>overall best set of hyperparameters </a:t>
+              <a:t>model corresponding to the fold with the best set of hyperparameters over the outer test datasets</a:t>
             </a:r>
             <a:r>
               <a:rPr lang="en-GB" sz="800" dirty="0">
@@ -9840,145 +10676,54 @@
                 <a:latin typeface="Calibri Light" panose="020F0302020204030204" pitchFamily="34" charset="0"/>
                 <a:cs typeface="Calibri Light" panose="020F0302020204030204" pitchFamily="34" charset="0"/>
               </a:rPr>
-              <a:t>out of all k_outer folds:</a:t>
-            </a:r>
-          </a:p>
-          <a:p>
-            <a:pPr algn="ctr"/>
+              <a:t>, and </a:t>
+            </a:r>
+            <a:r>
+              <a:rPr lang="en-GB" sz="800" b="1" dirty="0">
+                <a:solidFill>
+                  <a:srgbClr val="800080"/>
+                </a:solidFill>
+                <a:latin typeface="Calibri" panose="020F0502020204030204" pitchFamily="34" charset="0"/>
+                <a:cs typeface="Calibri" panose="020F0502020204030204" pitchFamily="34" charset="0"/>
+              </a:rPr>
+              <a:t>train it over the original training dataset </a:t>
+            </a:r>
             <a:r>
               <a:rPr lang="en-GB" sz="800" dirty="0">
                 <a:solidFill>
-                  <a:schemeClr val="tx1">
-                    <a:lumMod val="75000"/>
-                    <a:lumOff val="25000"/>
-                  </a:schemeClr>
+                  <a:srgbClr val="800080"/>
                 </a:solidFill>
                 <a:latin typeface="Calibri Light" panose="020F0302020204030204" pitchFamily="34" charset="0"/>
                 <a:cs typeface="Calibri Light" panose="020F0302020204030204" pitchFamily="34" charset="0"/>
               </a:rPr>
-              <a:t>-&gt; Compute the</a:t>
+              <a:t>(</a:t>
             </a:r>
             <a:r>
               <a:rPr lang="en-GB" sz="800" b="1" dirty="0">
                 <a:solidFill>
-                  <a:schemeClr val="tx1">
-                    <a:lumMod val="75000"/>
-                    <a:lumOff val="25000"/>
-                  </a:schemeClr>
+                  <a:srgbClr val="800080"/>
                 </a:solidFill>
                 <a:latin typeface="Calibri" panose="020F0502020204030204" pitchFamily="34" charset="0"/>
                 <a:cs typeface="Calibri" panose="020F0502020204030204" pitchFamily="34" charset="0"/>
               </a:rPr>
-              <a:t> mode</a:t>
+              <a:t>m</a:t>
             </a:r>
             <a:r>
               <a:rPr lang="en-GB" sz="800" dirty="0">
                 <a:solidFill>
-                  <a:schemeClr val="tx1">
-                    <a:lumMod val="75000"/>
-                    <a:lumOff val="25000"/>
-                  </a:schemeClr>
+                  <a:srgbClr val="800080"/>
                 </a:solidFill>
                 <a:latin typeface="Calibri Light" panose="020F0302020204030204" pitchFamily="34" charset="0"/>
                 <a:cs typeface="Calibri Light" panose="020F0302020204030204" pitchFamily="34" charset="0"/>
               </a:rPr>
-              <a:t> for categorical hyperparameters</a:t>
-            </a:r>
-          </a:p>
-          <a:p>
-            <a:pPr algn="ctr"/>
-            <a:r>
-              <a:rPr lang="en-GB" sz="800" dirty="0">
-                <a:solidFill>
-                  <a:schemeClr val="tx1">
-                    <a:lumMod val="75000"/>
-                    <a:lumOff val="25000"/>
-                  </a:schemeClr>
-                </a:solidFill>
-                <a:latin typeface="Calibri Light" panose="020F0302020204030204" pitchFamily="34" charset="0"/>
-                <a:cs typeface="Calibri Light" panose="020F0302020204030204" pitchFamily="34" charset="0"/>
-              </a:rPr>
-              <a:t>-&gt; Compute the</a:t>
-            </a:r>
-            <a:r>
-              <a:rPr lang="en-GB" sz="800" b="1" dirty="0">
-                <a:solidFill>
-                  <a:schemeClr val="tx1">
-                    <a:lumMod val="75000"/>
-                    <a:lumOff val="25000"/>
-                  </a:schemeClr>
-                </a:solidFill>
-                <a:latin typeface="Calibri" panose="020F0502020204030204" pitchFamily="34" charset="0"/>
-                <a:cs typeface="Calibri" panose="020F0502020204030204" pitchFamily="34" charset="0"/>
-              </a:rPr>
-              <a:t> median</a:t>
-            </a:r>
-            <a:r>
-              <a:rPr lang="en-GB" sz="800" dirty="0">
-                <a:solidFill>
-                  <a:schemeClr val="tx1">
-                    <a:lumMod val="75000"/>
-                    <a:lumOff val="25000"/>
-                  </a:schemeClr>
-                </a:solidFill>
-                <a:latin typeface="Calibri Light" panose="020F0302020204030204" pitchFamily="34" charset="0"/>
-                <a:cs typeface="Calibri Light" panose="020F0302020204030204" pitchFamily="34" charset="0"/>
-              </a:rPr>
-              <a:t> for numerical hyperparameters</a:t>
+              <a:t> datapoints)</a:t>
             </a:r>
           </a:p>
         </p:txBody>
       </p:sp>
-      <p:cxnSp>
-        <p:nvCxnSpPr>
-          <p:cNvPr id="188" name="Straight Arrow Connector 187">
-            <a:extLst>
-              <a:ext uri="{FF2B5EF4-FFF2-40B4-BE49-F238E27FC236}">
-                <a16:creationId xmlns:a16="http://schemas.microsoft.com/office/drawing/2014/main" id="{D5FAA1EB-8CDC-4657-65F7-67F78E902DA0}"/>
-              </a:ext>
-            </a:extLst>
-          </p:cNvPr>
-          <p:cNvCxnSpPr>
-            <a:cxnSpLocks/>
-          </p:cNvCxnSpPr>
-          <p:nvPr/>
-        </p:nvCxnSpPr>
-        <p:spPr>
-          <a:xfrm>
-            <a:off x="2070100" y="7057389"/>
-            <a:ext cx="0" cy="184430"/>
-          </a:xfrm>
-          <a:prstGeom prst="straightConnector1">
-            <a:avLst/>
-          </a:prstGeom>
-          <a:ln w="3175">
-            <a:solidFill>
-              <a:schemeClr val="tx1">
-                <a:lumMod val="75000"/>
-                <a:lumOff val="25000"/>
-              </a:schemeClr>
-            </a:solidFill>
-            <a:tailEnd type="triangle"/>
-          </a:ln>
-        </p:spPr>
-        <p:style>
-          <a:lnRef idx="2">
-            <a:schemeClr val="accent1"/>
-          </a:lnRef>
-          <a:fillRef idx="0">
-            <a:schemeClr val="accent1"/>
-          </a:fillRef>
-          <a:effectRef idx="1">
-            <a:schemeClr val="accent1"/>
-          </a:effectRef>
-          <a:fontRef idx="minor">
-            <a:schemeClr val="tx1"/>
-          </a:fontRef>
-        </p:style>
-      </p:cxnSp>
       <p:sp>
         <p:nvSpPr>
-          <p:cNvPr id="189" name="Parallelogram 188">
+          <p:cNvPr id="22" name="Parallelogram 21">
             <a:extLst>
               <a:ext uri="{FF2B5EF4-FFF2-40B4-BE49-F238E27FC236}">
                 <a16:creationId xmlns:a16="http://schemas.microsoft.com/office/drawing/2014/main" id="{1A0731B8-37BC-29FF-5EFB-3505DFCBB060}"/>
@@ -9990,7 +10735,7 @@
         </p:nvSpPr>
         <p:spPr>
           <a:xfrm>
-            <a:off x="1073151" y="7586584"/>
+            <a:off x="92655" y="7174515"/>
             <a:ext cx="2000607" cy="361106"/>
           </a:xfrm>
           <a:prstGeom prst="parallelogram">
@@ -10050,7 +10795,7 @@
       </p:sp>
       <p:pic>
         <p:nvPicPr>
-          <p:cNvPr id="190" name="Picture 189">
+          <p:cNvPr id="23" name="Picture 22">
             <a:extLst>
               <a:ext uri="{FF2B5EF4-FFF2-40B4-BE49-F238E27FC236}">
                 <a16:creationId xmlns:a16="http://schemas.microsoft.com/office/drawing/2014/main" id="{6A5460AA-4519-4CF9-A5F0-33FE5FD31A96}"/>
@@ -10080,7 +10825,7 @@
       </p:pic>
       <p:sp>
         <p:nvSpPr>
-          <p:cNvPr id="191" name="Rectangle 190">
+          <p:cNvPr id="24" name="Rectangle 23">
             <a:extLst>
               <a:ext uri="{FF2B5EF4-FFF2-40B4-BE49-F238E27FC236}">
                 <a16:creationId xmlns:a16="http://schemas.microsoft.com/office/drawing/2014/main" id="{5382C8C2-6F3C-50EB-0A51-B5F6DC1665D1}"/>
@@ -10143,7 +10888,7 @@
       </p:sp>
       <p:sp>
         <p:nvSpPr>
-          <p:cNvPr id="192" name="Rectangle 191">
+          <p:cNvPr id="25" name="Rectangle 24">
             <a:extLst>
               <a:ext uri="{FF2B5EF4-FFF2-40B4-BE49-F238E27FC236}">
                 <a16:creationId xmlns:a16="http://schemas.microsoft.com/office/drawing/2014/main" id="{AFE3A951-104C-CEDE-A21D-544D4B214711}"/>
@@ -10206,7 +10951,7 @@
       </p:sp>
       <p:sp>
         <p:nvSpPr>
-          <p:cNvPr id="193" name="Rectangle 192">
+          <p:cNvPr id="26" name="Rectangle 25">
             <a:extLst>
               <a:ext uri="{FF2B5EF4-FFF2-40B4-BE49-F238E27FC236}">
                 <a16:creationId xmlns:a16="http://schemas.microsoft.com/office/drawing/2014/main" id="{F81123FD-1880-7B13-64BB-A61B32D6C3FC}"/>
@@ -10269,7 +11014,7 @@
       </p:sp>
       <p:sp>
         <p:nvSpPr>
-          <p:cNvPr id="194" name="Rectangle 193">
+          <p:cNvPr id="27" name="Rectangle 26">
             <a:extLst>
               <a:ext uri="{FF2B5EF4-FFF2-40B4-BE49-F238E27FC236}">
                 <a16:creationId xmlns:a16="http://schemas.microsoft.com/office/drawing/2014/main" id="{68F25C0E-89BD-9175-A93B-76E013FBF0DD}"/>
@@ -10332,7 +11077,7 @@
       </p:sp>
       <p:sp>
         <p:nvSpPr>
-          <p:cNvPr id="195" name="Rectangle 194">
+          <p:cNvPr id="28" name="Rectangle 27">
             <a:extLst>
               <a:ext uri="{FF2B5EF4-FFF2-40B4-BE49-F238E27FC236}">
                 <a16:creationId xmlns:a16="http://schemas.microsoft.com/office/drawing/2014/main" id="{96248778-630E-7601-4FAE-FF9CFCDF1B42}"/>
@@ -10395,7 +11140,7 @@
       </p:sp>
       <p:sp>
         <p:nvSpPr>
-          <p:cNvPr id="196" name="Rectangle 195">
+          <p:cNvPr id="29" name="Rectangle 28">
             <a:extLst>
               <a:ext uri="{FF2B5EF4-FFF2-40B4-BE49-F238E27FC236}">
                 <a16:creationId xmlns:a16="http://schemas.microsoft.com/office/drawing/2014/main" id="{9CADC630-E44A-1A89-9FDE-8EDA7123B19C}"/>
@@ -10458,7 +11203,7 @@
       </p:sp>
       <p:sp>
         <p:nvSpPr>
-          <p:cNvPr id="197" name="Rectangle 196">
+          <p:cNvPr id="30" name="Rectangle 29">
             <a:extLst>
               <a:ext uri="{FF2B5EF4-FFF2-40B4-BE49-F238E27FC236}">
                 <a16:creationId xmlns:a16="http://schemas.microsoft.com/office/drawing/2014/main" id="{EAF3C8BC-9003-987C-E4A9-44A032A5528E}"/>
@@ -10521,7 +11266,7 @@
       </p:sp>
       <p:sp>
         <p:nvSpPr>
-          <p:cNvPr id="198" name="Rectangle 197">
+          <p:cNvPr id="31" name="Rectangle 30">
             <a:extLst>
               <a:ext uri="{FF2B5EF4-FFF2-40B4-BE49-F238E27FC236}">
                 <a16:creationId xmlns:a16="http://schemas.microsoft.com/office/drawing/2014/main" id="{28B436EB-88AE-9EF3-EB76-64B6D1FB6EEB}"/>
@@ -10584,7 +11329,7 @@
       </p:sp>
       <p:sp>
         <p:nvSpPr>
-          <p:cNvPr id="199" name="Rectangle 198">
+          <p:cNvPr id="32" name="Rectangle 31">
             <a:extLst>
               <a:ext uri="{FF2B5EF4-FFF2-40B4-BE49-F238E27FC236}">
                 <a16:creationId xmlns:a16="http://schemas.microsoft.com/office/drawing/2014/main" id="{F27C24D0-AB2A-41DB-6171-C0B6ED9E9A68}"/>
@@ -10647,7 +11392,7 @@
       </p:sp>
       <p:sp>
         <p:nvSpPr>
-          <p:cNvPr id="200" name="Rectangle 199">
+          <p:cNvPr id="33" name="Rectangle 32">
             <a:extLst>
               <a:ext uri="{FF2B5EF4-FFF2-40B4-BE49-F238E27FC236}">
                 <a16:creationId xmlns:a16="http://schemas.microsoft.com/office/drawing/2014/main" id="{41C377DF-3C36-42E1-684D-12BC83DB59C3}"/>
@@ -10659,8 +11404,8 @@
         </p:nvSpPr>
         <p:spPr>
           <a:xfrm>
-            <a:off x="326662" y="4638605"/>
-            <a:ext cx="2978473" cy="546157"/>
+            <a:off x="288074" y="4638605"/>
+            <a:ext cx="3028422" cy="546157"/>
           </a:xfrm>
           <a:prstGeom prst="rect">
             <a:avLst/>
@@ -10745,7 +11490,7 @@
                 <a:latin typeface="Calibri" panose="020F0502020204030204" pitchFamily="34" charset="0"/>
                 <a:cs typeface="Calibri" panose="020F0502020204030204" pitchFamily="34" charset="0"/>
               </a:rPr>
-              <a:t>auprc</a:t>
+              <a:t>AUC-PR</a:t>
             </a:r>
             <a:r>
               <a:rPr lang="en-GB" sz="800" dirty="0">
@@ -10765,7 +11510,7 @@
                 <a:latin typeface="Calibri" panose="020F0502020204030204" pitchFamily="34" charset="0"/>
                 <a:cs typeface="Calibri" panose="020F0502020204030204" pitchFamily="34" charset="0"/>
               </a:rPr>
-              <a:t>aroc</a:t>
+              <a:t>AUC-ROC</a:t>
             </a:r>
             <a:r>
               <a:rPr lang="en-GB" sz="800" dirty="0">
@@ -10808,7 +11553,7 @@
       </p:sp>
       <p:cxnSp>
         <p:nvCxnSpPr>
-          <p:cNvPr id="201" name="Straight Arrow Connector 200">
+          <p:cNvPr id="34" name="Straight Arrow Connector 33">
             <a:extLst>
               <a:ext uri="{FF2B5EF4-FFF2-40B4-BE49-F238E27FC236}">
                 <a16:creationId xmlns:a16="http://schemas.microsoft.com/office/drawing/2014/main" id="{D6C433DB-BAA1-CC71-D29E-1CD90D5B8AA6}"/>
@@ -10822,7 +11567,7 @@
         </p:nvCxnSpPr>
         <p:spPr>
           <a:xfrm>
-            <a:off x="1801455" y="4448774"/>
+            <a:off x="1807853" y="4448774"/>
             <a:ext cx="0" cy="183694"/>
           </a:xfrm>
           <a:prstGeom prst="straightConnector1">
@@ -10855,7 +11600,7 @@
       </p:cxnSp>
       <p:sp>
         <p:nvSpPr>
-          <p:cNvPr id="202" name="Rectangle 201">
+          <p:cNvPr id="35" name="Rectangle 34">
             <a:extLst>
               <a:ext uri="{FF2B5EF4-FFF2-40B4-BE49-F238E27FC236}">
                 <a16:creationId xmlns:a16="http://schemas.microsoft.com/office/drawing/2014/main" id="{2CFA74E3-D91E-2C27-4A99-D3D1A111919C}"/>
@@ -10956,7 +11701,7 @@
       </p:sp>
       <p:sp>
         <p:nvSpPr>
-          <p:cNvPr id="203" name="Rectangle 202">
+          <p:cNvPr id="36" name="Rectangle 35">
             <a:extLst>
               <a:ext uri="{FF2B5EF4-FFF2-40B4-BE49-F238E27FC236}">
                 <a16:creationId xmlns:a16="http://schemas.microsoft.com/office/drawing/2014/main" id="{CC497459-D1DC-EE9A-EE1D-815F28D2818C}"/>
@@ -11031,7 +11776,7 @@
       </p:sp>
       <p:sp>
         <p:nvSpPr>
-          <p:cNvPr id="204" name="Rectangle 203">
+          <p:cNvPr id="37" name="Rectangle 36">
             <a:extLst>
               <a:ext uri="{FF2B5EF4-FFF2-40B4-BE49-F238E27FC236}">
                 <a16:creationId xmlns:a16="http://schemas.microsoft.com/office/drawing/2014/main" id="{8A74094E-C336-74AA-E520-6856C354301A}"/>
@@ -11106,7 +11851,7 @@
       </p:sp>
       <p:sp>
         <p:nvSpPr>
-          <p:cNvPr id="205" name="Rectangle 204">
+          <p:cNvPr id="38" name="Rectangle 37">
             <a:extLst>
               <a:ext uri="{FF2B5EF4-FFF2-40B4-BE49-F238E27FC236}">
                 <a16:creationId xmlns:a16="http://schemas.microsoft.com/office/drawing/2014/main" id="{10B23706-9C8A-69A2-B423-B2EEB1C4D06D}"/>
@@ -11181,7 +11926,7 @@
       </p:sp>
       <p:sp>
         <p:nvSpPr>
-          <p:cNvPr id="206" name="Rectangle 205">
+          <p:cNvPr id="39" name="Rectangle 38">
             <a:extLst>
               <a:ext uri="{FF2B5EF4-FFF2-40B4-BE49-F238E27FC236}">
                 <a16:creationId xmlns:a16="http://schemas.microsoft.com/office/drawing/2014/main" id="{14A7D952-0782-7271-7F2A-BC6BC775B542}"/>
@@ -11243,7 +11988,7 @@
       </p:sp>
       <p:sp>
         <p:nvSpPr>
-          <p:cNvPr id="207" name="Rectangle 206">
+          <p:cNvPr id="40" name="Rectangle 39">
             <a:extLst>
               <a:ext uri="{FF2B5EF4-FFF2-40B4-BE49-F238E27FC236}">
                 <a16:creationId xmlns:a16="http://schemas.microsoft.com/office/drawing/2014/main" id="{06432789-ABB4-135D-C8F1-01F8D760F247}"/>
@@ -11305,7 +12050,7 @@
       </p:sp>
       <p:sp>
         <p:nvSpPr>
-          <p:cNvPr id="208" name="Rectangle 207">
+          <p:cNvPr id="41" name="Rectangle 40">
             <a:extLst>
               <a:ext uri="{FF2B5EF4-FFF2-40B4-BE49-F238E27FC236}">
                 <a16:creationId xmlns:a16="http://schemas.microsoft.com/office/drawing/2014/main" id="{C5603496-23AC-2551-E5E0-BDF8C60E9816}"/>
@@ -11367,7 +12112,7 @@
       </p:sp>
       <p:sp>
         <p:nvSpPr>
-          <p:cNvPr id="209" name="Rectangle 208">
+          <p:cNvPr id="42" name="Rectangle 41">
             <a:extLst>
               <a:ext uri="{FF2B5EF4-FFF2-40B4-BE49-F238E27FC236}">
                 <a16:creationId xmlns:a16="http://schemas.microsoft.com/office/drawing/2014/main" id="{BD4FCEEF-D9EE-3F9D-274E-A275AE7207AC}"/>
@@ -11428,7 +12173,7 @@
       </p:sp>
       <p:cxnSp>
         <p:nvCxnSpPr>
-          <p:cNvPr id="210" name="Straight Arrow Connector 209">
+          <p:cNvPr id="43" name="Straight Arrow Connector 42">
             <a:extLst>
               <a:ext uri="{FF2B5EF4-FFF2-40B4-BE49-F238E27FC236}">
                 <a16:creationId xmlns:a16="http://schemas.microsoft.com/office/drawing/2014/main" id="{C7C3581F-BB46-6BFD-88EC-1685548CDC83}"/>
@@ -11442,7 +12187,7 @@
         </p:nvCxnSpPr>
         <p:spPr>
           <a:xfrm>
-            <a:off x="1814251" y="5189502"/>
+            <a:off x="1807853" y="5189502"/>
             <a:ext cx="0" cy="184430"/>
           </a:xfrm>
           <a:prstGeom prst="straightConnector1">
@@ -11475,7 +12220,7 @@
       </p:cxnSp>
       <p:sp>
         <p:nvSpPr>
-          <p:cNvPr id="211" name="Rectangle 210">
+          <p:cNvPr id="44" name="Rectangle 43">
             <a:extLst>
               <a:ext uri="{FF2B5EF4-FFF2-40B4-BE49-F238E27FC236}">
                 <a16:creationId xmlns:a16="http://schemas.microsoft.com/office/drawing/2014/main" id="{54B4C05C-53AB-88AD-E871-B8862B4F61D3}"/>
@@ -11567,14 +12312,14 @@
                 <a:latin typeface="Calibri Light" panose="020F0302020204030204" pitchFamily="34" charset="0"/>
                 <a:cs typeface="Calibri Light" panose="020F0302020204030204" pitchFamily="34" charset="0"/>
               </a:rPr>
-              <a:t>and trains the model with it over the whole outer training dataset.</a:t>
+              <a:t>and trains the model with it over the entire outer training dataset.</a:t>
             </a:r>
           </a:p>
         </p:txBody>
       </p:sp>
       <p:sp>
         <p:nvSpPr>
-          <p:cNvPr id="212" name="Rectangle 211">
+          <p:cNvPr id="45" name="Rectangle 44">
             <a:extLst>
               <a:ext uri="{FF2B5EF4-FFF2-40B4-BE49-F238E27FC236}">
                 <a16:creationId xmlns:a16="http://schemas.microsoft.com/office/drawing/2014/main" id="{6EE46427-6BDE-882E-3A72-3DF2ED872F0A}"/>
@@ -11646,7 +12391,7 @@
       </p:sp>
       <p:sp>
         <p:nvSpPr>
-          <p:cNvPr id="213" name="TextBox 212">
+          <p:cNvPr id="46" name="TextBox 45">
             <a:extLst>
               <a:ext uri="{FF2B5EF4-FFF2-40B4-BE49-F238E27FC236}">
                 <a16:creationId xmlns:a16="http://schemas.microsoft.com/office/drawing/2014/main" id="{0BBE180E-9D2D-A30D-B94E-AB6240A4F89E}"/>
@@ -11688,7 +12433,7 @@
       </p:sp>
       <p:pic>
         <p:nvPicPr>
-          <p:cNvPr id="214" name="Graphic 213" descr="Refresh with solid fill">
+          <p:cNvPr id="47" name="Graphic 46" descr="Refresh with solid fill">
             <a:extLst>
               <a:ext uri="{FF2B5EF4-FFF2-40B4-BE49-F238E27FC236}">
                 <a16:creationId xmlns:a16="http://schemas.microsoft.com/office/drawing/2014/main" id="{682317A1-2BB1-8278-722B-8CE350ED4201}"/>
@@ -11724,7 +12469,7 @@
       </p:pic>
       <p:cxnSp>
         <p:nvCxnSpPr>
-          <p:cNvPr id="215" name="Straight Connector 214">
+          <p:cNvPr id="48" name="Straight Connector 47">
             <a:extLst>
               <a:ext uri="{FF2B5EF4-FFF2-40B4-BE49-F238E27FC236}">
                 <a16:creationId xmlns:a16="http://schemas.microsoft.com/office/drawing/2014/main" id="{C90FD5CB-CFB6-24E9-74FD-5E099AAAFF1E}"/>
@@ -11771,7 +12516,7 @@
       </p:cxnSp>
       <p:cxnSp>
         <p:nvCxnSpPr>
-          <p:cNvPr id="216" name="Straight Connector 215">
+          <p:cNvPr id="49" name="Straight Connector 48">
             <a:extLst>
               <a:ext uri="{FF2B5EF4-FFF2-40B4-BE49-F238E27FC236}">
                 <a16:creationId xmlns:a16="http://schemas.microsoft.com/office/drawing/2014/main" id="{05C4EC2C-B3F3-2097-D9EC-F18C3D347A17}"/>
@@ -11818,7 +12563,7 @@
       </p:cxnSp>
       <p:cxnSp>
         <p:nvCxnSpPr>
-          <p:cNvPr id="217" name="Straight Connector 216">
+          <p:cNvPr id="50" name="Straight Connector 49">
             <a:extLst>
               <a:ext uri="{FF2B5EF4-FFF2-40B4-BE49-F238E27FC236}">
                 <a16:creationId xmlns:a16="http://schemas.microsoft.com/office/drawing/2014/main" id="{0EA9D7BD-3F7C-AE8D-C1CE-E9C384898216}"/>
@@ -11863,97 +12608,9 @@
           </a:fontRef>
         </p:style>
       </p:cxnSp>
-      <p:sp>
-        <p:nvSpPr>
-          <p:cNvPr id="218" name="Rectangle 217">
-            <a:extLst>
-              <a:ext uri="{FF2B5EF4-FFF2-40B4-BE49-F238E27FC236}">
-                <a16:creationId xmlns:a16="http://schemas.microsoft.com/office/drawing/2014/main" id="{F39AC6C1-D9A5-4BB9-D077-438BD55748C0}"/>
-              </a:ext>
-            </a:extLst>
-          </p:cNvPr>
-          <p:cNvSpPr/>
-          <p:nvPr/>
-        </p:nvSpPr>
-        <p:spPr>
-          <a:xfrm>
-            <a:off x="514494" y="7212125"/>
-            <a:ext cx="3111212" cy="206737"/>
-          </a:xfrm>
-          <a:prstGeom prst="rect">
-            <a:avLst/>
-          </a:prstGeom>
-          <a:noFill/>
-          <a:ln w="3175">
-            <a:noFill/>
-          </a:ln>
-        </p:spPr>
-        <p:style>
-          <a:lnRef idx="2">
-            <a:schemeClr val="accent1">
-              <a:shade val="15000"/>
-            </a:schemeClr>
-          </a:lnRef>
-          <a:fillRef idx="1">
-            <a:schemeClr val="accent1"/>
-          </a:fillRef>
-          <a:effectRef idx="0">
-            <a:schemeClr val="accent1"/>
-          </a:effectRef>
-          <a:fontRef idx="minor">
-            <a:schemeClr val="lt1"/>
-          </a:fontRef>
-        </p:style>
-        <p:txBody>
-          <a:bodyPr rtlCol="0" anchor="ctr"/>
-          <a:lstStyle/>
-          <a:p>
-            <a:pPr algn="ctr"/>
-            <a:r>
-              <a:rPr lang="en-GB" sz="800" dirty="0">
-                <a:solidFill>
-                  <a:schemeClr val="tx1">
-                    <a:lumMod val="75000"/>
-                    <a:lumOff val="25000"/>
-                  </a:schemeClr>
-                </a:solidFill>
-                <a:latin typeface="Calibri Light" panose="020F0302020204030204" pitchFamily="34" charset="0"/>
-                <a:cs typeface="Calibri Light" panose="020F0302020204030204" pitchFamily="34" charset="0"/>
-              </a:rPr>
-              <a:t>Train the best model over the original training dataset (</a:t>
-            </a:r>
-            <a:r>
-              <a:rPr lang="en-GB" sz="800" b="1" dirty="0">
-                <a:solidFill>
-                  <a:schemeClr val="tx1">
-                    <a:lumMod val="75000"/>
-                    <a:lumOff val="25000"/>
-                  </a:schemeClr>
-                </a:solidFill>
-                <a:latin typeface="Calibri" panose="020F0502020204030204" pitchFamily="34" charset="0"/>
-                <a:cs typeface="Calibri" panose="020F0502020204030204" pitchFamily="34" charset="0"/>
-              </a:rPr>
-              <a:t>m</a:t>
-            </a:r>
-            <a:r>
-              <a:rPr lang="en-GB" sz="800" dirty="0">
-                <a:solidFill>
-                  <a:schemeClr val="tx1">
-                    <a:lumMod val="75000"/>
-                    <a:lumOff val="25000"/>
-                  </a:schemeClr>
-                </a:solidFill>
-                <a:latin typeface="Calibri Light" panose="020F0302020204030204" pitchFamily="34" charset="0"/>
-                <a:cs typeface="Calibri Light" panose="020F0302020204030204" pitchFamily="34" charset="0"/>
-              </a:rPr>
-              <a:t> datapoints)</a:t>
-            </a:r>
-          </a:p>
-        </p:txBody>
-      </p:sp>
       <p:cxnSp>
         <p:nvCxnSpPr>
-          <p:cNvPr id="219" name="Straight Arrow Connector 218">
+          <p:cNvPr id="51" name="Straight Arrow Connector 50">
             <a:extLst>
               <a:ext uri="{FF2B5EF4-FFF2-40B4-BE49-F238E27FC236}">
                 <a16:creationId xmlns:a16="http://schemas.microsoft.com/office/drawing/2014/main" id="{8AED844A-3F43-A4D7-963B-F1037DBA7454}"/>
@@ -11967,7 +12624,7 @@
         </p:nvCxnSpPr>
         <p:spPr>
           <a:xfrm>
-            <a:off x="2070100" y="7399812"/>
+            <a:off x="1089604" y="6987743"/>
             <a:ext cx="0" cy="184430"/>
           </a:xfrm>
           <a:prstGeom prst="straightConnector1">
@@ -11998,6 +12655,182 @@
           </a:fontRef>
         </p:style>
       </p:cxnSp>
+      <p:cxnSp>
+        <p:nvCxnSpPr>
+          <p:cNvPr id="52" name="Straight Arrow Connector 51">
+            <a:extLst>
+              <a:ext uri="{FF2B5EF4-FFF2-40B4-BE49-F238E27FC236}">
+                <a16:creationId xmlns:a16="http://schemas.microsoft.com/office/drawing/2014/main" id="{78FE547C-E0DD-A313-0B6C-3682E841EA64}"/>
+              </a:ext>
+            </a:extLst>
+          </p:cNvPr>
+          <p:cNvCxnSpPr>
+            <a:cxnSpLocks/>
+          </p:cNvCxnSpPr>
+          <p:nvPr/>
+        </p:nvCxnSpPr>
+        <p:spPr>
+          <a:xfrm>
+            <a:off x="1848368" y="7380025"/>
+            <a:ext cx="345978" cy="0"/>
+          </a:xfrm>
+          <a:prstGeom prst="straightConnector1">
+            <a:avLst/>
+          </a:prstGeom>
+          <a:ln w="3175">
+            <a:solidFill>
+              <a:schemeClr val="tx1">
+                <a:lumMod val="75000"/>
+                <a:lumOff val="25000"/>
+              </a:schemeClr>
+            </a:solidFill>
+            <a:tailEnd type="triangle"/>
+          </a:ln>
+        </p:spPr>
+        <p:style>
+          <a:lnRef idx="2">
+            <a:schemeClr val="accent1"/>
+          </a:lnRef>
+          <a:fillRef idx="0">
+            <a:schemeClr val="accent1"/>
+          </a:fillRef>
+          <a:effectRef idx="1">
+            <a:schemeClr val="accent1"/>
+          </a:effectRef>
+          <a:fontRef idx="minor">
+            <a:schemeClr val="tx1"/>
+          </a:fontRef>
+        </p:style>
+      </p:cxnSp>
+      <p:sp>
+        <p:nvSpPr>
+          <p:cNvPr id="53" name="Rectangle 52">
+            <a:extLst>
+              <a:ext uri="{FF2B5EF4-FFF2-40B4-BE49-F238E27FC236}">
+                <a16:creationId xmlns:a16="http://schemas.microsoft.com/office/drawing/2014/main" id="{27B7D5CF-81CA-4EAF-61FB-FBDB71CAE40F}"/>
+              </a:ext>
+            </a:extLst>
+          </p:cNvPr>
+          <p:cNvSpPr/>
+          <p:nvPr/>
+        </p:nvSpPr>
+        <p:spPr>
+          <a:xfrm>
+            <a:off x="2194346" y="7057502"/>
+            <a:ext cx="1856205" cy="485691"/>
+          </a:xfrm>
+          <a:prstGeom prst="rect">
+            <a:avLst/>
+          </a:prstGeom>
+          <a:solidFill>
+            <a:srgbClr val="00B0F0"/>
+          </a:solidFill>
+          <a:ln w="3175">
+            <a:solidFill>
+              <a:schemeClr val="tx1">
+                <a:lumMod val="75000"/>
+                <a:lumOff val="25000"/>
+              </a:schemeClr>
+            </a:solidFill>
+          </a:ln>
+        </p:spPr>
+        <p:style>
+          <a:lnRef idx="2">
+            <a:schemeClr val="accent1">
+              <a:shade val="15000"/>
+            </a:schemeClr>
+          </a:lnRef>
+          <a:fillRef idx="1">
+            <a:schemeClr val="accent1"/>
+          </a:fillRef>
+          <a:effectRef idx="0">
+            <a:schemeClr val="accent1"/>
+          </a:effectRef>
+          <a:fontRef idx="minor">
+            <a:schemeClr val="lt1"/>
+          </a:fontRef>
+        </p:style>
+        <p:txBody>
+          <a:bodyPr rtlCol="0" anchor="ctr"/>
+          <a:lstStyle/>
+          <a:p>
+            <a:pPr algn="ctr"/>
+            <a:r>
+              <a:rPr lang="en-GB" sz="800" dirty="0">
+                <a:solidFill>
+                  <a:schemeClr val="bg1"/>
+                </a:solidFill>
+                <a:latin typeface="Calibri Light" panose="020F0302020204030204" pitchFamily="34" charset="0"/>
+                <a:cs typeface="Calibri Light" panose="020F0302020204030204" pitchFamily="34" charset="0"/>
+              </a:rPr>
+              <a:t>Verification dataset (from 2021 to 2024)</a:t>
+            </a:r>
+          </a:p>
+          <a:p>
+            <a:pPr algn="ctr"/>
+            <a:r>
+              <a:rPr lang="en-GB" sz="800" b="1" dirty="0">
+                <a:solidFill>
+                  <a:schemeClr val="bg1"/>
+                </a:solidFill>
+                <a:latin typeface="Calibri" panose="020F0502020204030204" pitchFamily="34" charset="0"/>
+                <a:cs typeface="Calibri" panose="020F0502020204030204" pitchFamily="34" charset="0"/>
+              </a:rPr>
+              <a:t>n = 4.36M</a:t>
+            </a:r>
+            <a:r>
+              <a:rPr lang="en-GB" sz="800" dirty="0">
+                <a:solidFill>
+                  <a:schemeClr val="bg1"/>
+                </a:solidFill>
+                <a:latin typeface="Calibri Light" panose="020F0302020204030204" pitchFamily="34" charset="0"/>
+                <a:cs typeface="Calibri Light" panose="020F0302020204030204" pitchFamily="34" charset="0"/>
+              </a:rPr>
+              <a:t>, of which </a:t>
+            </a:r>
+            <a:r>
+              <a:rPr lang="en-GB" sz="800" b="1" dirty="0">
+                <a:solidFill>
+                  <a:schemeClr val="bg1"/>
+                </a:solidFill>
+                <a:latin typeface="Calibri" panose="020F0502020204030204" pitchFamily="34" charset="0"/>
+                <a:cs typeface="Calibri" panose="020F0502020204030204" pitchFamily="34" charset="0"/>
+              </a:rPr>
+              <a:t>10742</a:t>
+            </a:r>
+            <a:r>
+              <a:rPr lang="en-GB" sz="800" dirty="0">
+                <a:solidFill>
+                  <a:schemeClr val="bg1"/>
+                </a:solidFill>
+                <a:latin typeface="Calibri Light" panose="020F0302020204030204" pitchFamily="34" charset="0"/>
+                <a:cs typeface="Calibri Light" panose="020F0302020204030204" pitchFamily="34" charset="0"/>
+              </a:rPr>
+              <a:t> (</a:t>
+            </a:r>
+            <a:r>
+              <a:rPr lang="en-GB" sz="800" b="1" dirty="0">
+                <a:solidFill>
+                  <a:schemeClr val="bg1"/>
+                </a:solidFill>
+                <a:latin typeface="Calibri" panose="020F0502020204030204" pitchFamily="34" charset="0"/>
+                <a:cs typeface="Calibri" panose="020F0502020204030204" pitchFamily="34" charset="0"/>
+              </a:rPr>
+              <a:t>0.25%</a:t>
+            </a:r>
+            <a:r>
+              <a:rPr lang="en-GB" sz="800" dirty="0">
+                <a:solidFill>
+                  <a:schemeClr val="bg1"/>
+                </a:solidFill>
+                <a:latin typeface="Calibri Light" panose="020F0302020204030204" pitchFamily="34" charset="0"/>
+                <a:cs typeface="Calibri Light" panose="020F0302020204030204" pitchFamily="34" charset="0"/>
+              </a:rPr>
+              <a:t>) are gridded yes-events</a:t>
+            </a:r>
+          </a:p>
+        </p:txBody>
+      </p:sp>
     </p:spTree>
     <p:extLst>
       <p:ext uri="{BB962C8B-B14F-4D97-AF65-F5344CB8AC3E}">
@@ -12042,7 +12875,7 @@
         </p:nvSpPr>
         <p:spPr>
           <a:xfrm>
-            <a:off x="-1341803" y="2022737"/>
+            <a:off x="-1341803" y="1825095"/>
             <a:ext cx="5937987" cy="1752925"/>
           </a:xfrm>
           <a:prstGeom prst="rect">
@@ -12101,7 +12934,7 @@
         </p:nvSpPr>
         <p:spPr>
           <a:xfrm>
-            <a:off x="-1259906" y="2529325"/>
+            <a:off x="-1259906" y="2331683"/>
             <a:ext cx="1965301" cy="1182447"/>
           </a:xfrm>
           <a:prstGeom prst="rect">
@@ -12157,7 +12990,7 @@
         </p:nvSpPr>
         <p:spPr>
           <a:xfrm>
-            <a:off x="-268472" y="2575995"/>
+            <a:off x="-268472" y="2378352"/>
             <a:ext cx="719591" cy="232126"/>
           </a:xfrm>
           <a:prstGeom prst="rect">
@@ -12226,7 +13059,7 @@
         </p:nvSpPr>
         <p:spPr>
           <a:xfrm>
-            <a:off x="-268471" y="2931078"/>
+            <a:off x="-268471" y="2733435"/>
             <a:ext cx="222841" cy="232126"/>
           </a:xfrm>
           <a:prstGeom prst="rect">
@@ -12287,7 +13120,7 @@
         </p:nvSpPr>
         <p:spPr>
           <a:xfrm>
-            <a:off x="-268471" y="3176533"/>
+            <a:off x="-268471" y="2978890"/>
             <a:ext cx="222841" cy="232126"/>
           </a:xfrm>
           <a:prstGeom prst="rect">
@@ -12348,7 +13181,7 @@
         </p:nvSpPr>
         <p:spPr>
           <a:xfrm>
-            <a:off x="-268471" y="3433219"/>
+            <a:off x="-268471" y="3235576"/>
             <a:ext cx="222841" cy="232126"/>
           </a:xfrm>
           <a:prstGeom prst="rect">
@@ -12409,7 +13242,7 @@
         </p:nvSpPr>
         <p:spPr>
           <a:xfrm>
-            <a:off x="480386" y="2575995"/>
+            <a:off x="480387" y="2378352"/>
             <a:ext cx="185701" cy="232126"/>
           </a:xfrm>
           <a:prstGeom prst="rect">
@@ -12470,7 +13303,7 @@
         </p:nvSpPr>
         <p:spPr>
           <a:xfrm>
-            <a:off x="-20097" y="2931078"/>
+            <a:off x="-20097" y="2733435"/>
             <a:ext cx="222841" cy="232126"/>
           </a:xfrm>
           <a:prstGeom prst="rect">
@@ -12531,7 +13364,7 @@
         </p:nvSpPr>
         <p:spPr>
           <a:xfrm>
-            <a:off x="-20097" y="3176533"/>
+            <a:off x="-20097" y="2978890"/>
             <a:ext cx="222841" cy="232126"/>
           </a:xfrm>
           <a:prstGeom prst="rect">
@@ -12592,7 +13425,7 @@
         </p:nvSpPr>
         <p:spPr>
           <a:xfrm>
-            <a:off x="-20097" y="3433219"/>
+            <a:off x="-20097" y="3235576"/>
             <a:ext cx="222841" cy="232126"/>
           </a:xfrm>
           <a:prstGeom prst="rect">
@@ -12653,7 +13486,7 @@
         </p:nvSpPr>
         <p:spPr>
           <a:xfrm>
-            <a:off x="228278" y="2931078"/>
+            <a:off x="228279" y="2733435"/>
             <a:ext cx="222841" cy="232126"/>
           </a:xfrm>
           <a:prstGeom prst="rect">
@@ -12714,7 +13547,7 @@
         </p:nvSpPr>
         <p:spPr>
           <a:xfrm>
-            <a:off x="228278" y="3176533"/>
+            <a:off x="228279" y="2978890"/>
             <a:ext cx="222841" cy="232126"/>
           </a:xfrm>
           <a:prstGeom prst="rect">
@@ -12775,7 +13608,7 @@
         </p:nvSpPr>
         <p:spPr>
           <a:xfrm>
-            <a:off x="228278" y="3433219"/>
+            <a:off x="228279" y="3235576"/>
             <a:ext cx="222841" cy="232126"/>
           </a:xfrm>
           <a:prstGeom prst="rect">
@@ -12836,7 +13669,7 @@
         </p:nvSpPr>
         <p:spPr>
           <a:xfrm>
-            <a:off x="-262416" y="2249487"/>
+            <a:off x="-262416" y="2051844"/>
             <a:ext cx="928504" cy="232126"/>
           </a:xfrm>
           <a:prstGeom prst="rect">
@@ -12919,7 +13752,7 @@
         </p:nvSpPr>
         <p:spPr>
           <a:xfrm>
-            <a:off x="735159" y="2931078"/>
+            <a:off x="735160" y="2733435"/>
             <a:ext cx="222841" cy="232126"/>
           </a:xfrm>
           <a:prstGeom prst="rect">
@@ -12980,7 +13813,7 @@
         </p:nvSpPr>
         <p:spPr>
           <a:xfrm>
-            <a:off x="735159" y="3176533"/>
+            <a:off x="735160" y="2978890"/>
             <a:ext cx="222841" cy="232126"/>
           </a:xfrm>
           <a:prstGeom prst="rect">
@@ -13041,7 +13874,7 @@
         </p:nvSpPr>
         <p:spPr>
           <a:xfrm>
-            <a:off x="735159" y="3433219"/>
+            <a:off x="735160" y="3235576"/>
             <a:ext cx="222841" cy="232126"/>
           </a:xfrm>
           <a:prstGeom prst="rect">
@@ -13102,7 +13935,7 @@
         </p:nvSpPr>
         <p:spPr>
           <a:xfrm>
-            <a:off x="1484015" y="2575995"/>
+            <a:off x="1484016" y="2378352"/>
             <a:ext cx="185701" cy="232126"/>
           </a:xfrm>
           <a:prstGeom prst="rect">
@@ -13163,7 +13996,7 @@
         </p:nvSpPr>
         <p:spPr>
           <a:xfrm>
-            <a:off x="983533" y="2931078"/>
+            <a:off x="983534" y="2733435"/>
             <a:ext cx="222841" cy="232126"/>
           </a:xfrm>
           <a:prstGeom prst="rect">
@@ -13224,7 +14057,7 @@
         </p:nvSpPr>
         <p:spPr>
           <a:xfrm>
-            <a:off x="983533" y="3176533"/>
+            <a:off x="983534" y="2978890"/>
             <a:ext cx="222841" cy="232126"/>
           </a:xfrm>
           <a:prstGeom prst="rect">
@@ -13285,7 +14118,7 @@
         </p:nvSpPr>
         <p:spPr>
           <a:xfrm>
-            <a:off x="983533" y="3433219"/>
+            <a:off x="983534" y="3235576"/>
             <a:ext cx="222841" cy="232126"/>
           </a:xfrm>
           <a:prstGeom prst="rect">
@@ -13346,7 +14179,7 @@
         </p:nvSpPr>
         <p:spPr>
           <a:xfrm>
-            <a:off x="1231908" y="2931078"/>
+            <a:off x="1231909" y="2733435"/>
             <a:ext cx="222841" cy="232126"/>
           </a:xfrm>
           <a:prstGeom prst="rect">
@@ -13407,7 +14240,7 @@
         </p:nvSpPr>
         <p:spPr>
           <a:xfrm>
-            <a:off x="1231908" y="3176533"/>
+            <a:off x="1231909" y="2978890"/>
             <a:ext cx="222841" cy="232126"/>
           </a:xfrm>
           <a:prstGeom prst="rect">
@@ -13468,7 +14301,7 @@
         </p:nvSpPr>
         <p:spPr>
           <a:xfrm>
-            <a:off x="1231908" y="3433219"/>
+            <a:off x="1231909" y="3235576"/>
             <a:ext cx="222841" cy="232126"/>
           </a:xfrm>
           <a:prstGeom prst="rect">
@@ -13529,7 +14362,7 @@
         </p:nvSpPr>
         <p:spPr>
           <a:xfrm>
-            <a:off x="741212" y="2249487"/>
+            <a:off x="741212" y="2051844"/>
             <a:ext cx="928504" cy="232126"/>
           </a:xfrm>
           <a:prstGeom prst="rect">
@@ -13612,7 +14445,7 @@
         </p:nvSpPr>
         <p:spPr>
           <a:xfrm>
-            <a:off x="1696805" y="2931078"/>
+            <a:off x="1696806" y="2733435"/>
             <a:ext cx="222841" cy="232126"/>
           </a:xfrm>
           <a:prstGeom prst="rect">
@@ -13673,7 +14506,7 @@
         </p:nvSpPr>
         <p:spPr>
           <a:xfrm>
-            <a:off x="1696805" y="3176533"/>
+            <a:off x="1696806" y="2978890"/>
             <a:ext cx="222841" cy="232126"/>
           </a:xfrm>
           <a:prstGeom prst="rect">
@@ -13734,7 +14567,7 @@
         </p:nvSpPr>
         <p:spPr>
           <a:xfrm>
-            <a:off x="1696805" y="3433219"/>
+            <a:off x="1696806" y="3235576"/>
             <a:ext cx="222841" cy="232126"/>
           </a:xfrm>
           <a:prstGeom prst="rect">
@@ -13795,7 +14628,7 @@
         </p:nvSpPr>
         <p:spPr>
           <a:xfrm>
-            <a:off x="2445663" y="2575995"/>
+            <a:off x="2445664" y="2378352"/>
             <a:ext cx="185701" cy="232126"/>
           </a:xfrm>
           <a:prstGeom prst="rect">
@@ -13856,7 +14689,7 @@
         </p:nvSpPr>
         <p:spPr>
           <a:xfrm>
-            <a:off x="1945181" y="2931078"/>
+            <a:off x="1945182" y="2733435"/>
             <a:ext cx="222841" cy="232126"/>
           </a:xfrm>
           <a:prstGeom prst="rect">
@@ -13917,7 +14750,7 @@
         </p:nvSpPr>
         <p:spPr>
           <a:xfrm>
-            <a:off x="1945181" y="3176533"/>
+            <a:off x="1945182" y="2978890"/>
             <a:ext cx="222841" cy="232126"/>
           </a:xfrm>
           <a:prstGeom prst="rect">
@@ -13978,7 +14811,7 @@
         </p:nvSpPr>
         <p:spPr>
           <a:xfrm>
-            <a:off x="1945181" y="3433219"/>
+            <a:off x="1945182" y="3235576"/>
             <a:ext cx="222841" cy="232126"/>
           </a:xfrm>
           <a:prstGeom prst="rect">
@@ -14039,7 +14872,7 @@
         </p:nvSpPr>
         <p:spPr>
           <a:xfrm>
-            <a:off x="2193556" y="2931078"/>
+            <a:off x="2193557" y="2733435"/>
             <a:ext cx="222841" cy="232126"/>
           </a:xfrm>
           <a:prstGeom prst="rect">
@@ -14100,7 +14933,7 @@
         </p:nvSpPr>
         <p:spPr>
           <a:xfrm>
-            <a:off x="2193556" y="3176533"/>
+            <a:off x="2193557" y="2978890"/>
             <a:ext cx="222841" cy="232126"/>
           </a:xfrm>
           <a:prstGeom prst="rect">
@@ -14161,7 +14994,7 @@
         </p:nvSpPr>
         <p:spPr>
           <a:xfrm>
-            <a:off x="2193556" y="3433219"/>
+            <a:off x="2193557" y="3235576"/>
             <a:ext cx="222841" cy="232126"/>
           </a:xfrm>
           <a:prstGeom prst="rect">
@@ -14222,7 +15055,7 @@
         </p:nvSpPr>
         <p:spPr>
           <a:xfrm>
-            <a:off x="1702860" y="2249487"/>
+            <a:off x="1702860" y="2051844"/>
             <a:ext cx="928504" cy="232126"/>
           </a:xfrm>
           <a:prstGeom prst="rect">
@@ -14305,7 +15138,7 @@
         </p:nvSpPr>
         <p:spPr>
           <a:xfrm>
-            <a:off x="2651164" y="2931078"/>
+            <a:off x="2651165" y="2733435"/>
             <a:ext cx="222841" cy="232126"/>
           </a:xfrm>
           <a:prstGeom prst="rect">
@@ -14366,7 +15199,7 @@
         </p:nvSpPr>
         <p:spPr>
           <a:xfrm>
-            <a:off x="2651164" y="3176533"/>
+            <a:off x="2651165" y="2978890"/>
             <a:ext cx="222841" cy="232126"/>
           </a:xfrm>
           <a:prstGeom prst="rect">
@@ -14427,7 +15260,7 @@
         </p:nvSpPr>
         <p:spPr>
           <a:xfrm>
-            <a:off x="2651164" y="3433219"/>
+            <a:off x="2651165" y="3235576"/>
             <a:ext cx="222841" cy="232126"/>
           </a:xfrm>
           <a:prstGeom prst="rect">
@@ -14488,7 +15321,7 @@
         </p:nvSpPr>
         <p:spPr>
           <a:xfrm>
-            <a:off x="3400020" y="2575995"/>
+            <a:off x="3400021" y="2378352"/>
             <a:ext cx="185701" cy="232126"/>
           </a:xfrm>
           <a:prstGeom prst="rect">
@@ -14549,7 +15382,7 @@
         </p:nvSpPr>
         <p:spPr>
           <a:xfrm>
-            <a:off x="2899538" y="2931078"/>
+            <a:off x="2899539" y="2733435"/>
             <a:ext cx="222841" cy="232126"/>
           </a:xfrm>
           <a:prstGeom prst="rect">
@@ -14610,7 +15443,7 @@
         </p:nvSpPr>
         <p:spPr>
           <a:xfrm>
-            <a:off x="2899538" y="3176533"/>
+            <a:off x="2899539" y="2978890"/>
             <a:ext cx="222841" cy="232126"/>
           </a:xfrm>
           <a:prstGeom prst="rect">
@@ -14671,7 +15504,7 @@
         </p:nvSpPr>
         <p:spPr>
           <a:xfrm>
-            <a:off x="2899538" y="3433219"/>
+            <a:off x="2899539" y="3235576"/>
             <a:ext cx="222841" cy="232126"/>
           </a:xfrm>
           <a:prstGeom prst="rect">
@@ -14732,7 +15565,7 @@
         </p:nvSpPr>
         <p:spPr>
           <a:xfrm>
-            <a:off x="3147913" y="2931078"/>
+            <a:off x="3147914" y="2733435"/>
             <a:ext cx="222841" cy="232126"/>
           </a:xfrm>
           <a:prstGeom prst="rect">
@@ -14793,7 +15626,7 @@
         </p:nvSpPr>
         <p:spPr>
           <a:xfrm>
-            <a:off x="3147913" y="3176533"/>
+            <a:off x="3147914" y="2978890"/>
             <a:ext cx="222841" cy="232126"/>
           </a:xfrm>
           <a:prstGeom prst="rect">
@@ -14854,7 +15687,7 @@
         </p:nvSpPr>
         <p:spPr>
           <a:xfrm>
-            <a:off x="3147913" y="3433219"/>
+            <a:off x="3147914" y="3235576"/>
             <a:ext cx="222841" cy="232126"/>
           </a:xfrm>
           <a:prstGeom prst="rect">
@@ -14915,7 +15748,7 @@
         </p:nvSpPr>
         <p:spPr>
           <a:xfrm>
-            <a:off x="2657218" y="2249487"/>
+            <a:off x="2657218" y="2051844"/>
             <a:ext cx="928504" cy="232126"/>
           </a:xfrm>
           <a:prstGeom prst="rect">
@@ -14998,7 +15831,7 @@
         </p:nvSpPr>
         <p:spPr>
           <a:xfrm>
-            <a:off x="3612811" y="2931078"/>
+            <a:off x="3612812" y="2733435"/>
             <a:ext cx="222841" cy="232126"/>
           </a:xfrm>
           <a:prstGeom prst="rect">
@@ -15059,7 +15892,7 @@
         </p:nvSpPr>
         <p:spPr>
           <a:xfrm>
-            <a:off x="3612811" y="3176533"/>
+            <a:off x="3612812" y="2978890"/>
             <a:ext cx="222841" cy="232126"/>
           </a:xfrm>
           <a:prstGeom prst="rect">
@@ -15120,7 +15953,7 @@
         </p:nvSpPr>
         <p:spPr>
           <a:xfrm>
-            <a:off x="3612811" y="3433219"/>
+            <a:off x="3612812" y="3235576"/>
             <a:ext cx="222841" cy="232126"/>
           </a:xfrm>
           <a:prstGeom prst="rect">
@@ -15181,7 +16014,7 @@
         </p:nvSpPr>
         <p:spPr>
           <a:xfrm>
-            <a:off x="4361669" y="2575995"/>
+            <a:off x="4361669" y="2378352"/>
             <a:ext cx="185701" cy="232126"/>
           </a:xfrm>
           <a:prstGeom prst="rect">
@@ -15242,7 +16075,7 @@
         </p:nvSpPr>
         <p:spPr>
           <a:xfrm>
-            <a:off x="3861186" y="2931078"/>
+            <a:off x="3861187" y="2733435"/>
             <a:ext cx="222841" cy="232126"/>
           </a:xfrm>
           <a:prstGeom prst="rect">
@@ -15303,7 +16136,7 @@
         </p:nvSpPr>
         <p:spPr>
           <a:xfrm>
-            <a:off x="3861186" y="3176533"/>
+            <a:off x="3861187" y="2978890"/>
             <a:ext cx="222841" cy="232126"/>
           </a:xfrm>
           <a:prstGeom prst="rect">
@@ -15364,7 +16197,7 @@
         </p:nvSpPr>
         <p:spPr>
           <a:xfrm>
-            <a:off x="3861186" y="3433219"/>
+            <a:off x="3861187" y="3235576"/>
             <a:ext cx="222841" cy="232126"/>
           </a:xfrm>
           <a:prstGeom prst="rect">
@@ -15425,7 +16258,7 @@
         </p:nvSpPr>
         <p:spPr>
           <a:xfrm>
-            <a:off x="4109561" y="2931078"/>
+            <a:off x="4109562" y="2733435"/>
             <a:ext cx="222841" cy="232126"/>
           </a:xfrm>
           <a:prstGeom prst="rect">
@@ -15486,7 +16319,7 @@
         </p:nvSpPr>
         <p:spPr>
           <a:xfrm>
-            <a:off x="4109561" y="3176533"/>
+            <a:off x="4109562" y="2978890"/>
             <a:ext cx="222841" cy="232126"/>
           </a:xfrm>
           <a:prstGeom prst="rect">
@@ -15547,7 +16380,7 @@
         </p:nvSpPr>
         <p:spPr>
           <a:xfrm>
-            <a:off x="4109561" y="3433219"/>
+            <a:off x="4109562" y="3235576"/>
             <a:ext cx="222841" cy="232126"/>
           </a:xfrm>
           <a:prstGeom prst="rect">
@@ -15608,7 +16441,7 @@
         </p:nvSpPr>
         <p:spPr>
           <a:xfrm>
-            <a:off x="3618866" y="2249487"/>
+            <a:off x="3618866" y="2051844"/>
             <a:ext cx="928504" cy="232126"/>
           </a:xfrm>
           <a:prstGeom prst="rect">
@@ -15705,7 +16538,7 @@
         </p:blipFill>
         <p:spPr>
           <a:xfrm>
-            <a:off x="-539269" y="2323733"/>
+            <a:off x="-539269" y="2126090"/>
             <a:ext cx="139276" cy="139276"/>
           </a:xfrm>
           <a:prstGeom prst="rect">
@@ -15727,7 +16560,7 @@
         </p:nvSpPr>
         <p:spPr>
           <a:xfrm>
-            <a:off x="-1183695" y="2257419"/>
+            <a:off x="-1183695" y="2059776"/>
             <a:ext cx="998142" cy="251418"/>
           </a:xfrm>
           <a:prstGeom prst="rect">
@@ -15802,7 +16635,7 @@
         </p:nvSpPr>
         <p:spPr>
           <a:xfrm>
-            <a:off x="-1385404" y="3155001"/>
+            <a:off x="-1385404" y="2957358"/>
             <a:ext cx="998142" cy="251418"/>
           </a:xfrm>
           <a:prstGeom prst="rect">
@@ -15877,7 +16710,7 @@
         </p:nvSpPr>
         <p:spPr>
           <a:xfrm>
-            <a:off x="-471792" y="2931078"/>
+            <a:off x="-471792" y="2733435"/>
             <a:ext cx="171966" cy="709256"/>
           </a:xfrm>
           <a:prstGeom prst="leftBrace">
@@ -15949,7 +16782,7 @@
         </p:blipFill>
         <p:spPr>
           <a:xfrm>
-            <a:off x="-725725" y="3213449"/>
+            <a:off x="-725725" y="3015806"/>
             <a:ext cx="139276" cy="139276"/>
           </a:xfrm>
           <a:prstGeom prst="rect">
@@ -15971,7 +16804,7 @@
         </p:nvSpPr>
         <p:spPr>
           <a:xfrm>
-            <a:off x="-262201" y="2038802"/>
+            <a:off x="-262201" y="1841159"/>
             <a:ext cx="928288" cy="231282"/>
           </a:xfrm>
           <a:prstGeom prst="rect">
@@ -16016,7 +16849,7 @@
         </p:nvSpPr>
         <p:spPr>
           <a:xfrm>
-            <a:off x="741211" y="2575995"/>
+            <a:off x="741212" y="2378352"/>
             <a:ext cx="719591" cy="232126"/>
           </a:xfrm>
           <a:prstGeom prst="rect">
@@ -16085,7 +16918,7 @@
         </p:nvSpPr>
         <p:spPr>
           <a:xfrm>
-            <a:off x="1702860" y="2575995"/>
+            <a:off x="1702861" y="2378352"/>
             <a:ext cx="719591" cy="232126"/>
           </a:xfrm>
           <a:prstGeom prst="rect">
@@ -16154,7 +16987,7 @@
         </p:nvSpPr>
         <p:spPr>
           <a:xfrm>
-            <a:off x="2657217" y="2575995"/>
+            <a:off x="2657218" y="2378352"/>
             <a:ext cx="719591" cy="232126"/>
           </a:xfrm>
           <a:prstGeom prst="rect">
@@ -16223,7 +17056,7 @@
         </p:nvSpPr>
         <p:spPr>
           <a:xfrm>
-            <a:off x="3618865" y="2575995"/>
+            <a:off x="3618866" y="2378352"/>
             <a:ext cx="719591" cy="232126"/>
           </a:xfrm>
           <a:prstGeom prst="rect">
@@ -16292,7 +17125,7 @@
         </p:nvSpPr>
         <p:spPr>
           <a:xfrm>
-            <a:off x="744910" y="2038802"/>
+            <a:off x="744910" y="1841159"/>
             <a:ext cx="928288" cy="231282"/>
           </a:xfrm>
           <a:prstGeom prst="rect">
@@ -16337,7 +17170,7 @@
         </p:nvSpPr>
         <p:spPr>
           <a:xfrm>
-            <a:off x="1706164" y="2038802"/>
+            <a:off x="1706164" y="1841159"/>
             <a:ext cx="928288" cy="231282"/>
           </a:xfrm>
           <a:prstGeom prst="rect">
@@ -16382,7 +17215,7 @@
         </p:nvSpPr>
         <p:spPr>
           <a:xfrm>
-            <a:off x="2667417" y="2038802"/>
+            <a:off x="2667417" y="1841159"/>
             <a:ext cx="928288" cy="231282"/>
           </a:xfrm>
           <a:prstGeom prst="rect">
@@ -16427,7 +17260,7 @@
         </p:nvSpPr>
         <p:spPr>
           <a:xfrm>
-            <a:off x="3628667" y="2038802"/>
+            <a:off x="3628667" y="1841159"/>
             <a:ext cx="928288" cy="231282"/>
           </a:xfrm>
           <a:prstGeom prst="rect">
@@ -16486,7 +17319,7 @@
         </p:blipFill>
         <p:spPr>
           <a:xfrm>
-            <a:off x="1218620" y="1846200"/>
+            <a:off x="1218620" y="1648557"/>
             <a:ext cx="139276" cy="139276"/>
           </a:xfrm>
           <a:prstGeom prst="rect">
@@ -16508,7 +17341,7 @@
         </p:nvSpPr>
         <p:spPr>
           <a:xfrm>
-            <a:off x="1173977" y="1777846"/>
+            <a:off x="1173977" y="1580203"/>
             <a:ext cx="998142" cy="251418"/>
           </a:xfrm>
           <a:prstGeom prst="rect">
@@ -16613,7 +17446,7 @@
         </p:nvSpPr>
         <p:spPr>
           <a:xfrm>
-            <a:off x="158835" y="4683746"/>
+            <a:off x="158836" y="4486104"/>
             <a:ext cx="1043303" cy="221979"/>
           </a:xfrm>
           <a:prstGeom prst="rect">
@@ -16676,7 +17509,7 @@
         </p:nvSpPr>
         <p:spPr>
           <a:xfrm>
-            <a:off x="1235435" y="4683746"/>
+            <a:off x="1235436" y="4486104"/>
             <a:ext cx="1043303" cy="221979"/>
           </a:xfrm>
           <a:prstGeom prst="rect">
@@ -16739,7 +17572,7 @@
         </p:nvSpPr>
         <p:spPr>
           <a:xfrm>
-            <a:off x="2312036" y="4683746"/>
+            <a:off x="2312037" y="4486104"/>
             <a:ext cx="1043303" cy="221979"/>
           </a:xfrm>
           <a:prstGeom prst="rect">
@@ -16802,7 +17635,7 @@
         </p:nvSpPr>
         <p:spPr>
           <a:xfrm>
-            <a:off x="158835" y="4944284"/>
+            <a:off x="158836" y="4746642"/>
             <a:ext cx="1043303" cy="221979"/>
           </a:xfrm>
           <a:prstGeom prst="rect">
@@ -16865,7 +17698,7 @@
         </p:nvSpPr>
         <p:spPr>
           <a:xfrm>
-            <a:off x="1235435" y="4944284"/>
+            <a:off x="1235436" y="4746642"/>
             <a:ext cx="1043303" cy="221979"/>
           </a:xfrm>
           <a:prstGeom prst="rect">
@@ -16928,7 +17761,7 @@
         </p:nvSpPr>
         <p:spPr>
           <a:xfrm>
-            <a:off x="2312036" y="4944284"/>
+            <a:off x="2312037" y="4746642"/>
             <a:ext cx="1043303" cy="221979"/>
           </a:xfrm>
           <a:prstGeom prst="rect">
@@ -16991,7 +17824,7 @@
         </p:nvSpPr>
         <p:spPr>
           <a:xfrm>
-            <a:off x="158835" y="5194996"/>
+            <a:off x="158836" y="4997354"/>
             <a:ext cx="1043303" cy="221979"/>
           </a:xfrm>
           <a:prstGeom prst="rect">
@@ -17054,7 +17887,7 @@
         </p:nvSpPr>
         <p:spPr>
           <a:xfrm>
-            <a:off x="1235435" y="5194996"/>
+            <a:off x="1235436" y="4997354"/>
             <a:ext cx="1043303" cy="221979"/>
           </a:xfrm>
           <a:prstGeom prst="rect">
@@ -17117,7 +17950,7 @@
         </p:nvSpPr>
         <p:spPr>
           <a:xfrm>
-            <a:off x="2312036" y="5194996"/>
+            <a:off x="2312037" y="4997354"/>
             <a:ext cx="1043303" cy="221979"/>
           </a:xfrm>
           <a:prstGeom prst="rect">
@@ -17180,7 +18013,7 @@
         </p:nvSpPr>
         <p:spPr>
           <a:xfrm>
-            <a:off x="-252372" y="5717236"/>
+            <a:off x="-252372" y="5519594"/>
             <a:ext cx="3673110" cy="673531"/>
           </a:xfrm>
           <a:prstGeom prst="rect">
@@ -17290,7 +18123,7 @@
         </p:nvCxnSpPr>
         <p:spPr>
           <a:xfrm>
-            <a:off x="1566371" y="5483132"/>
+            <a:off x="1566371" y="5285490"/>
             <a:ext cx="0" cy="226535"/>
           </a:xfrm>
           <a:prstGeom prst="straightConnector1">
@@ -17335,7 +18168,7 @@
         </p:nvSpPr>
         <p:spPr>
           <a:xfrm>
-            <a:off x="-252372" y="3652086"/>
+            <a:off x="-252372" y="3454444"/>
             <a:ext cx="3664182" cy="391125"/>
           </a:xfrm>
           <a:prstGeom prst="rect">
@@ -17436,7 +18269,7 @@
         </p:nvSpPr>
         <p:spPr>
           <a:xfrm>
-            <a:off x="150161" y="4484062"/>
+            <a:off x="150162" y="4286420"/>
             <a:ext cx="1043303" cy="221979"/>
           </a:xfrm>
           <a:prstGeom prst="rect">
@@ -17511,7 +18344,7 @@
         </p:nvSpPr>
         <p:spPr>
           <a:xfrm>
-            <a:off x="1226761" y="4484062"/>
+            <a:off x="1226762" y="4286420"/>
             <a:ext cx="1043303" cy="221979"/>
           </a:xfrm>
           <a:prstGeom prst="rect">
@@ -17586,7 +18419,7 @@
         </p:nvSpPr>
         <p:spPr>
           <a:xfrm>
-            <a:off x="2303361" y="4484062"/>
+            <a:off x="2303362" y="4286420"/>
             <a:ext cx="1043303" cy="221979"/>
           </a:xfrm>
           <a:prstGeom prst="rect">
@@ -17661,7 +18494,7 @@
         </p:nvSpPr>
         <p:spPr>
           <a:xfrm>
-            <a:off x="-375889" y="4688938"/>
+            <a:off x="-375889" y="4491296"/>
             <a:ext cx="614111" cy="221979"/>
           </a:xfrm>
           <a:prstGeom prst="rect">
@@ -17723,7 +18556,7 @@
         </p:nvSpPr>
         <p:spPr>
           <a:xfrm>
-            <a:off x="-375889" y="4952058"/>
+            <a:off x="-375889" y="4754416"/>
             <a:ext cx="614111" cy="221979"/>
           </a:xfrm>
           <a:prstGeom prst="rect">
@@ -17785,7 +18618,7 @@
         </p:nvSpPr>
         <p:spPr>
           <a:xfrm>
-            <a:off x="-375889" y="5197948"/>
+            <a:off x="-375889" y="5000306"/>
             <a:ext cx="614111" cy="221979"/>
           </a:xfrm>
           <a:prstGeom prst="rect">
@@ -17847,7 +18680,7 @@
         </p:nvSpPr>
         <p:spPr>
           <a:xfrm>
-            <a:off x="-252370" y="4052329"/>
+            <a:off x="-252370" y="3854687"/>
             <a:ext cx="3664183" cy="3092009"/>
           </a:xfrm>
           <a:prstGeom prst="rect">
@@ -17910,7 +18743,7 @@
         </p:nvCxnSpPr>
         <p:spPr>
           <a:xfrm>
-            <a:off x="1582977" y="6396612"/>
+            <a:off x="1582977" y="6198970"/>
             <a:ext cx="0" cy="227443"/>
           </a:xfrm>
           <a:prstGeom prst="straightConnector1">
@@ -17955,7 +18788,7 @@
         </p:nvSpPr>
         <p:spPr>
           <a:xfrm>
-            <a:off x="-219748" y="6614028"/>
+            <a:off x="-219748" y="6416385"/>
             <a:ext cx="3631557" cy="530310"/>
           </a:xfrm>
           <a:prstGeom prst="rect">
@@ -18034,7 +18867,7 @@
         </p:nvSpPr>
         <p:spPr>
           <a:xfrm>
-            <a:off x="150161" y="4236866"/>
+            <a:off x="150161" y="4039224"/>
             <a:ext cx="3205178" cy="219821"/>
           </a:xfrm>
           <a:prstGeom prst="rect">
@@ -18106,7 +18939,7 @@
         </p:nvSpPr>
         <p:spPr>
           <a:xfrm>
-            <a:off x="182329" y="4031127"/>
+            <a:off x="182329" y="3833484"/>
             <a:ext cx="3196504" cy="244234"/>
           </a:xfrm>
           <a:prstGeom prst="rect">
@@ -18162,7 +18995,7 @@
         </p:blipFill>
         <p:spPr>
           <a:xfrm>
-            <a:off x="1113994" y="3857117"/>
+            <a:off x="1113994" y="3659474"/>
             <a:ext cx="133188" cy="133188"/>
           </a:xfrm>
           <a:prstGeom prst="rect">

</xml_diff>

<commit_message>
Modified the workflow for the repeated nested cross validation
</commit_message>
<xml_diff>
--- a/chapter_06/figures/cv_optuna.pptx
+++ b/chapter_06/figures/cv_optuna.pptx
@@ -117,7 +117,7 @@
 <file path=ppt/revisionInfo.xml><?xml version="1.0" encoding="utf-8"?>
 <p1510:revInfo xmlns:a="http://schemas.openxmlformats.org/drawingml/2006/main" xmlns:r="http://schemas.openxmlformats.org/officeDocument/2006/relationships" xmlns:p1510="http://schemas.microsoft.com/office/powerpoint/2015/10/main">
   <p1510:revLst>
-    <p1510:client id="{0478CFAF-F744-4001-ABF3-5E8A4958592B}" v="5" dt="2025-07-03T10:13:38.626"/>
+    <p1510:client id="{0478CFAF-F744-4001-ABF3-5E8A4958592B}" v="49" dt="2025-07-05T15:22:36.675"/>
   </p1510:revLst>
 </p1510:revInfo>
 </file>
@@ -5954,12 +5954,12 @@
   <pc:docChgLst>
     <pc:chgData name="Fatima Pillosu" userId="a6295d4dc9e22643" providerId="LiveId" clId="{0478CFAF-F744-4001-ABF3-5E8A4958592B}"/>
     <pc:docChg chg="undo custSel modSld">
-      <pc:chgData name="Fatima Pillosu" userId="a6295d4dc9e22643" providerId="LiveId" clId="{0478CFAF-F744-4001-ABF3-5E8A4958592B}" dt="2025-07-03T10:13:38.626" v="499"/>
+      <pc:chgData name="Fatima Pillosu" userId="a6295d4dc9e22643" providerId="LiveId" clId="{0478CFAF-F744-4001-ABF3-5E8A4958592B}" dt="2025-07-05T15:26:45.798" v="1176" actId="33524"/>
       <pc:docMkLst>
         <pc:docMk/>
       </pc:docMkLst>
       <pc:sldChg chg="addSp delSp modSp mod">
-        <pc:chgData name="Fatima Pillosu" userId="a6295d4dc9e22643" providerId="LiveId" clId="{0478CFAF-F744-4001-ABF3-5E8A4958592B}" dt="2025-07-03T10:13:38.626" v="499"/>
+        <pc:chgData name="Fatima Pillosu" userId="a6295d4dc9e22643" providerId="LiveId" clId="{0478CFAF-F744-4001-ABF3-5E8A4958592B}" dt="2025-07-05T15:26:45.798" v="1176" actId="33524"/>
         <pc:sldMkLst>
           <pc:docMk/>
           <pc:sldMk cId="2370713982" sldId="258"/>
@@ -5981,7 +5981,7 @@
           </ac:spMkLst>
         </pc:spChg>
         <pc:spChg chg="add mod">
-          <ac:chgData name="Fatima Pillosu" userId="a6295d4dc9e22643" providerId="LiveId" clId="{0478CFAF-F744-4001-ABF3-5E8A4958592B}" dt="2025-07-03T10:13:38.626" v="499"/>
+          <ac:chgData name="Fatima Pillosu" userId="a6295d4dc9e22643" providerId="LiveId" clId="{0478CFAF-F744-4001-ABF3-5E8A4958592B}" dt="2025-07-05T15:16:27.739" v="678" actId="207"/>
           <ac:spMkLst>
             <pc:docMk/>
             <pc:sldMk cId="2370713982" sldId="258"/>
@@ -5989,7 +5989,7 @@
           </ac:spMkLst>
         </pc:spChg>
         <pc:spChg chg="add mod">
-          <ac:chgData name="Fatima Pillosu" userId="a6295d4dc9e22643" providerId="LiveId" clId="{0478CFAF-F744-4001-ABF3-5E8A4958592B}" dt="2025-07-03T10:13:38.626" v="499"/>
+          <ac:chgData name="Fatima Pillosu" userId="a6295d4dc9e22643" providerId="LiveId" clId="{0478CFAF-F744-4001-ABF3-5E8A4958592B}" dt="2025-07-05T15:26:28.076" v="1175" actId="20577"/>
           <ac:spMkLst>
             <pc:docMk/>
             <pc:sldMk cId="2370713982" sldId="258"/>
@@ -5997,7 +5997,7 @@
           </ac:spMkLst>
         </pc:spChg>
         <pc:spChg chg="add mod">
-          <ac:chgData name="Fatima Pillosu" userId="a6295d4dc9e22643" providerId="LiveId" clId="{0478CFAF-F744-4001-ABF3-5E8A4958592B}" dt="2025-07-03T10:13:38.626" v="499"/>
+          <ac:chgData name="Fatima Pillosu" userId="a6295d4dc9e22643" providerId="LiveId" clId="{0478CFAF-F744-4001-ABF3-5E8A4958592B}" dt="2025-07-05T15:13:08.339" v="536" actId="1036"/>
           <ac:spMkLst>
             <pc:docMk/>
             <pc:sldMk cId="2370713982" sldId="258"/>
@@ -6005,7 +6005,7 @@
           </ac:spMkLst>
         </pc:spChg>
         <pc:spChg chg="add mod">
-          <ac:chgData name="Fatima Pillosu" userId="a6295d4dc9e22643" providerId="LiveId" clId="{0478CFAF-F744-4001-ABF3-5E8A4958592B}" dt="2025-07-03T10:13:38.626" v="499"/>
+          <ac:chgData name="Fatima Pillosu" userId="a6295d4dc9e22643" providerId="LiveId" clId="{0478CFAF-F744-4001-ABF3-5E8A4958592B}" dt="2025-07-05T15:22:33.451" v="1003" actId="114"/>
           <ac:spMkLst>
             <pc:docMk/>
             <pc:sldMk cId="2370713982" sldId="258"/>
@@ -6013,7 +6013,7 @@
           </ac:spMkLst>
         </pc:spChg>
         <pc:spChg chg="add mod">
-          <ac:chgData name="Fatima Pillosu" userId="a6295d4dc9e22643" providerId="LiveId" clId="{0478CFAF-F744-4001-ABF3-5E8A4958592B}" dt="2025-07-03T10:13:38.626" v="499"/>
+          <ac:chgData name="Fatima Pillosu" userId="a6295d4dc9e22643" providerId="LiveId" clId="{0478CFAF-F744-4001-ABF3-5E8A4958592B}" dt="2025-07-05T15:16:15.408" v="676" actId="207"/>
           <ac:spMkLst>
             <pc:docMk/>
             <pc:sldMk cId="2370713982" sldId="258"/>
@@ -6021,7 +6021,7 @@
           </ac:spMkLst>
         </pc:spChg>
         <pc:spChg chg="add mod">
-          <ac:chgData name="Fatima Pillosu" userId="a6295d4dc9e22643" providerId="LiveId" clId="{0478CFAF-F744-4001-ABF3-5E8A4958592B}" dt="2025-07-03T10:13:38.626" v="499"/>
+          <ac:chgData name="Fatima Pillosu" userId="a6295d4dc9e22643" providerId="LiveId" clId="{0478CFAF-F744-4001-ABF3-5E8A4958592B}" dt="2025-07-05T15:13:08.339" v="536" actId="1036"/>
           <ac:spMkLst>
             <pc:docMk/>
             <pc:sldMk cId="2370713982" sldId="258"/>
@@ -6029,7 +6029,7 @@
           </ac:spMkLst>
         </pc:spChg>
         <pc:spChg chg="add mod">
-          <ac:chgData name="Fatima Pillosu" userId="a6295d4dc9e22643" providerId="LiveId" clId="{0478CFAF-F744-4001-ABF3-5E8A4958592B}" dt="2025-07-03T10:13:38.626" v="499"/>
+          <ac:chgData name="Fatima Pillosu" userId="a6295d4dc9e22643" providerId="LiveId" clId="{0478CFAF-F744-4001-ABF3-5E8A4958592B}" dt="2025-07-05T15:19:05.350" v="786" actId="1035"/>
           <ac:spMkLst>
             <pc:docMk/>
             <pc:sldMk cId="2370713982" sldId="258"/>
@@ -6037,7 +6037,7 @@
           </ac:spMkLst>
         </pc:spChg>
         <pc:spChg chg="add mod">
-          <ac:chgData name="Fatima Pillosu" userId="a6295d4dc9e22643" providerId="LiveId" clId="{0478CFAF-F744-4001-ABF3-5E8A4958592B}" dt="2025-07-03T10:13:38.626" v="499"/>
+          <ac:chgData name="Fatima Pillosu" userId="a6295d4dc9e22643" providerId="LiveId" clId="{0478CFAF-F744-4001-ABF3-5E8A4958592B}" dt="2025-07-05T15:24:02.481" v="1036" actId="1037"/>
           <ac:spMkLst>
             <pc:docMk/>
             <pc:sldMk cId="2370713982" sldId="258"/>
@@ -6045,7 +6045,7 @@
           </ac:spMkLst>
         </pc:spChg>
         <pc:spChg chg="add mod">
-          <ac:chgData name="Fatima Pillosu" userId="a6295d4dc9e22643" providerId="LiveId" clId="{0478CFAF-F744-4001-ABF3-5E8A4958592B}" dt="2025-07-03T10:13:38.626" v="499"/>
+          <ac:chgData name="Fatima Pillosu" userId="a6295d4dc9e22643" providerId="LiveId" clId="{0478CFAF-F744-4001-ABF3-5E8A4958592B}" dt="2025-07-05T15:13:08.339" v="536" actId="1036"/>
           <ac:spMkLst>
             <pc:docMk/>
             <pc:sldMk cId="2370713982" sldId="258"/>
@@ -6053,7 +6053,7 @@
           </ac:spMkLst>
         </pc:spChg>
         <pc:spChg chg="add mod">
-          <ac:chgData name="Fatima Pillosu" userId="a6295d4dc9e22643" providerId="LiveId" clId="{0478CFAF-F744-4001-ABF3-5E8A4958592B}" dt="2025-07-03T10:13:38.626" v="499"/>
+          <ac:chgData name="Fatima Pillosu" userId="a6295d4dc9e22643" providerId="LiveId" clId="{0478CFAF-F744-4001-ABF3-5E8A4958592B}" dt="2025-07-05T15:13:08.339" v="536" actId="1036"/>
           <ac:spMkLst>
             <pc:docMk/>
             <pc:sldMk cId="2370713982" sldId="258"/>
@@ -6061,7 +6061,7 @@
           </ac:spMkLst>
         </pc:spChg>
         <pc:spChg chg="add mod">
-          <ac:chgData name="Fatima Pillosu" userId="a6295d4dc9e22643" providerId="LiveId" clId="{0478CFAF-F744-4001-ABF3-5E8A4958592B}" dt="2025-07-03T10:13:38.626" v="499"/>
+          <ac:chgData name="Fatima Pillosu" userId="a6295d4dc9e22643" providerId="LiveId" clId="{0478CFAF-F744-4001-ABF3-5E8A4958592B}" dt="2025-07-05T15:13:08.339" v="536" actId="1036"/>
           <ac:spMkLst>
             <pc:docMk/>
             <pc:sldMk cId="2370713982" sldId="258"/>
@@ -6069,7 +6069,7 @@
           </ac:spMkLst>
         </pc:spChg>
         <pc:spChg chg="add mod">
-          <ac:chgData name="Fatima Pillosu" userId="a6295d4dc9e22643" providerId="LiveId" clId="{0478CFAF-F744-4001-ABF3-5E8A4958592B}" dt="2025-07-03T10:13:38.626" v="499"/>
+          <ac:chgData name="Fatima Pillosu" userId="a6295d4dc9e22643" providerId="LiveId" clId="{0478CFAF-F744-4001-ABF3-5E8A4958592B}" dt="2025-07-05T15:13:08.339" v="536" actId="1036"/>
           <ac:spMkLst>
             <pc:docMk/>
             <pc:sldMk cId="2370713982" sldId="258"/>
@@ -6077,7 +6077,7 @@
           </ac:spMkLst>
         </pc:spChg>
         <pc:spChg chg="add mod">
-          <ac:chgData name="Fatima Pillosu" userId="a6295d4dc9e22643" providerId="LiveId" clId="{0478CFAF-F744-4001-ABF3-5E8A4958592B}" dt="2025-07-03T10:13:38.626" v="499"/>
+          <ac:chgData name="Fatima Pillosu" userId="a6295d4dc9e22643" providerId="LiveId" clId="{0478CFAF-F744-4001-ABF3-5E8A4958592B}" dt="2025-07-05T15:13:08.339" v="536" actId="1036"/>
           <ac:spMkLst>
             <pc:docMk/>
             <pc:sldMk cId="2370713982" sldId="258"/>
@@ -6085,7 +6085,7 @@
           </ac:spMkLst>
         </pc:spChg>
         <pc:spChg chg="add mod">
-          <ac:chgData name="Fatima Pillosu" userId="a6295d4dc9e22643" providerId="LiveId" clId="{0478CFAF-F744-4001-ABF3-5E8A4958592B}" dt="2025-07-03T10:13:38.626" v="499"/>
+          <ac:chgData name="Fatima Pillosu" userId="a6295d4dc9e22643" providerId="LiveId" clId="{0478CFAF-F744-4001-ABF3-5E8A4958592B}" dt="2025-07-05T15:13:08.339" v="536" actId="1036"/>
           <ac:spMkLst>
             <pc:docMk/>
             <pc:sldMk cId="2370713982" sldId="258"/>
@@ -6093,7 +6093,7 @@
           </ac:spMkLst>
         </pc:spChg>
         <pc:spChg chg="add mod">
-          <ac:chgData name="Fatima Pillosu" userId="a6295d4dc9e22643" providerId="LiveId" clId="{0478CFAF-F744-4001-ABF3-5E8A4958592B}" dt="2025-07-03T10:13:38.626" v="499"/>
+          <ac:chgData name="Fatima Pillosu" userId="a6295d4dc9e22643" providerId="LiveId" clId="{0478CFAF-F744-4001-ABF3-5E8A4958592B}" dt="2025-07-05T15:13:08.339" v="536" actId="1036"/>
           <ac:spMkLst>
             <pc:docMk/>
             <pc:sldMk cId="2370713982" sldId="258"/>
@@ -6101,7 +6101,7 @@
           </ac:spMkLst>
         </pc:spChg>
         <pc:spChg chg="add mod">
-          <ac:chgData name="Fatima Pillosu" userId="a6295d4dc9e22643" providerId="LiveId" clId="{0478CFAF-F744-4001-ABF3-5E8A4958592B}" dt="2025-07-03T10:13:38.626" v="499"/>
+          <ac:chgData name="Fatima Pillosu" userId="a6295d4dc9e22643" providerId="LiveId" clId="{0478CFAF-F744-4001-ABF3-5E8A4958592B}" dt="2025-07-05T15:13:08.339" v="536" actId="1036"/>
           <ac:spMkLst>
             <pc:docMk/>
             <pc:sldMk cId="2370713982" sldId="258"/>
@@ -6109,7 +6109,7 @@
           </ac:spMkLst>
         </pc:spChg>
         <pc:spChg chg="add mod">
-          <ac:chgData name="Fatima Pillosu" userId="a6295d4dc9e22643" providerId="LiveId" clId="{0478CFAF-F744-4001-ABF3-5E8A4958592B}" dt="2025-07-03T10:13:38.626" v="499"/>
+          <ac:chgData name="Fatima Pillosu" userId="a6295d4dc9e22643" providerId="LiveId" clId="{0478CFAF-F744-4001-ABF3-5E8A4958592B}" dt="2025-07-05T15:13:08.339" v="536" actId="1036"/>
           <ac:spMkLst>
             <pc:docMk/>
             <pc:sldMk cId="2370713982" sldId="258"/>
@@ -6117,7 +6117,7 @@
           </ac:spMkLst>
         </pc:spChg>
         <pc:spChg chg="add mod">
-          <ac:chgData name="Fatima Pillosu" userId="a6295d4dc9e22643" providerId="LiveId" clId="{0478CFAF-F744-4001-ABF3-5E8A4958592B}" dt="2025-07-03T10:13:38.626" v="499"/>
+          <ac:chgData name="Fatima Pillosu" userId="a6295d4dc9e22643" providerId="LiveId" clId="{0478CFAF-F744-4001-ABF3-5E8A4958592B}" dt="2025-07-05T15:13:08.339" v="536" actId="1036"/>
           <ac:spMkLst>
             <pc:docMk/>
             <pc:sldMk cId="2370713982" sldId="258"/>
@@ -6125,7 +6125,7 @@
           </ac:spMkLst>
         </pc:spChg>
         <pc:spChg chg="add mod">
-          <ac:chgData name="Fatima Pillosu" userId="a6295d4dc9e22643" providerId="LiveId" clId="{0478CFAF-F744-4001-ABF3-5E8A4958592B}" dt="2025-07-03T10:13:38.626" v="499"/>
+          <ac:chgData name="Fatima Pillosu" userId="a6295d4dc9e22643" providerId="LiveId" clId="{0478CFAF-F744-4001-ABF3-5E8A4958592B}" dt="2025-07-05T15:13:08.339" v="536" actId="1036"/>
           <ac:spMkLst>
             <pc:docMk/>
             <pc:sldMk cId="2370713982" sldId="258"/>
@@ -6133,7 +6133,7 @@
           </ac:spMkLst>
         </pc:spChg>
         <pc:spChg chg="add mod">
-          <ac:chgData name="Fatima Pillosu" userId="a6295d4dc9e22643" providerId="LiveId" clId="{0478CFAF-F744-4001-ABF3-5E8A4958592B}" dt="2025-07-03T10:13:38.626" v="499"/>
+          <ac:chgData name="Fatima Pillosu" userId="a6295d4dc9e22643" providerId="LiveId" clId="{0478CFAF-F744-4001-ABF3-5E8A4958592B}" dt="2025-07-05T15:13:08.339" v="536" actId="1036"/>
           <ac:spMkLst>
             <pc:docMk/>
             <pc:sldMk cId="2370713982" sldId="258"/>
@@ -6141,7 +6141,7 @@
           </ac:spMkLst>
         </pc:spChg>
         <pc:spChg chg="add mod">
-          <ac:chgData name="Fatima Pillosu" userId="a6295d4dc9e22643" providerId="LiveId" clId="{0478CFAF-F744-4001-ABF3-5E8A4958592B}" dt="2025-07-03T10:13:38.626" v="499"/>
+          <ac:chgData name="Fatima Pillosu" userId="a6295d4dc9e22643" providerId="LiveId" clId="{0478CFAF-F744-4001-ABF3-5E8A4958592B}" dt="2025-07-05T15:13:08.339" v="536" actId="1036"/>
           <ac:spMkLst>
             <pc:docMk/>
             <pc:sldMk cId="2370713982" sldId="258"/>
@@ -6149,7 +6149,7 @@
           </ac:spMkLst>
         </pc:spChg>
         <pc:spChg chg="add mod">
-          <ac:chgData name="Fatima Pillosu" userId="a6295d4dc9e22643" providerId="LiveId" clId="{0478CFAF-F744-4001-ABF3-5E8A4958592B}" dt="2025-07-03T10:13:38.626" v="499"/>
+          <ac:chgData name="Fatima Pillosu" userId="a6295d4dc9e22643" providerId="LiveId" clId="{0478CFAF-F744-4001-ABF3-5E8A4958592B}" dt="2025-07-05T15:13:08.339" v="536" actId="1036"/>
           <ac:spMkLst>
             <pc:docMk/>
             <pc:sldMk cId="2370713982" sldId="258"/>
@@ -6157,7 +6157,7 @@
           </ac:spMkLst>
         </pc:spChg>
         <pc:spChg chg="add mod">
-          <ac:chgData name="Fatima Pillosu" userId="a6295d4dc9e22643" providerId="LiveId" clId="{0478CFAF-F744-4001-ABF3-5E8A4958592B}" dt="2025-07-03T10:13:38.626" v="499"/>
+          <ac:chgData name="Fatima Pillosu" userId="a6295d4dc9e22643" providerId="LiveId" clId="{0478CFAF-F744-4001-ABF3-5E8A4958592B}" dt="2025-07-05T15:13:08.339" v="536" actId="1036"/>
           <ac:spMkLst>
             <pc:docMk/>
             <pc:sldMk cId="2370713982" sldId="258"/>
@@ -6165,7 +6165,7 @@
           </ac:spMkLst>
         </pc:spChg>
         <pc:spChg chg="add mod">
-          <ac:chgData name="Fatima Pillosu" userId="a6295d4dc9e22643" providerId="LiveId" clId="{0478CFAF-F744-4001-ABF3-5E8A4958592B}" dt="2025-07-03T10:13:38.626" v="499"/>
+          <ac:chgData name="Fatima Pillosu" userId="a6295d4dc9e22643" providerId="LiveId" clId="{0478CFAF-F744-4001-ABF3-5E8A4958592B}" dt="2025-07-05T15:13:08.339" v="536" actId="1036"/>
           <ac:spMkLst>
             <pc:docMk/>
             <pc:sldMk cId="2370713982" sldId="258"/>
@@ -6173,7 +6173,7 @@
           </ac:spMkLst>
         </pc:spChg>
         <pc:spChg chg="add mod">
-          <ac:chgData name="Fatima Pillosu" userId="a6295d4dc9e22643" providerId="LiveId" clId="{0478CFAF-F744-4001-ABF3-5E8A4958592B}" dt="2025-07-03T10:13:38.626" v="499"/>
+          <ac:chgData name="Fatima Pillosu" userId="a6295d4dc9e22643" providerId="LiveId" clId="{0478CFAF-F744-4001-ABF3-5E8A4958592B}" dt="2025-07-05T15:13:08.339" v="536" actId="1036"/>
           <ac:spMkLst>
             <pc:docMk/>
             <pc:sldMk cId="2370713982" sldId="258"/>
@@ -6181,7 +6181,7 @@
           </ac:spMkLst>
         </pc:spChg>
         <pc:spChg chg="add mod">
-          <ac:chgData name="Fatima Pillosu" userId="a6295d4dc9e22643" providerId="LiveId" clId="{0478CFAF-F744-4001-ABF3-5E8A4958592B}" dt="2025-07-03T10:13:38.626" v="499"/>
+          <ac:chgData name="Fatima Pillosu" userId="a6295d4dc9e22643" providerId="LiveId" clId="{0478CFAF-F744-4001-ABF3-5E8A4958592B}" dt="2025-07-05T15:13:08.339" v="536" actId="1036"/>
           <ac:spMkLst>
             <pc:docMk/>
             <pc:sldMk cId="2370713982" sldId="258"/>
@@ -6189,7 +6189,7 @@
           </ac:spMkLst>
         </pc:spChg>
         <pc:spChg chg="add mod">
-          <ac:chgData name="Fatima Pillosu" userId="a6295d4dc9e22643" providerId="LiveId" clId="{0478CFAF-F744-4001-ABF3-5E8A4958592B}" dt="2025-07-03T10:13:38.626" v="499"/>
+          <ac:chgData name="Fatima Pillosu" userId="a6295d4dc9e22643" providerId="LiveId" clId="{0478CFAF-F744-4001-ABF3-5E8A4958592B}" dt="2025-07-05T15:26:45.798" v="1176" actId="33524"/>
           <ac:spMkLst>
             <pc:docMk/>
             <pc:sldMk cId="2370713982" sldId="258"/>
@@ -6197,7 +6197,7 @@
           </ac:spMkLst>
         </pc:spChg>
         <pc:spChg chg="add mod">
-          <ac:chgData name="Fatima Pillosu" userId="a6295d4dc9e22643" providerId="LiveId" clId="{0478CFAF-F744-4001-ABF3-5E8A4958592B}" dt="2025-07-03T10:13:38.626" v="499"/>
+          <ac:chgData name="Fatima Pillosu" userId="a6295d4dc9e22643" providerId="LiveId" clId="{0478CFAF-F744-4001-ABF3-5E8A4958592B}" dt="2025-07-05T15:13:08.339" v="536" actId="1036"/>
           <ac:spMkLst>
             <pc:docMk/>
             <pc:sldMk cId="2370713982" sldId="258"/>
@@ -6205,7 +6205,7 @@
           </ac:spMkLst>
         </pc:spChg>
         <pc:spChg chg="add mod">
-          <ac:chgData name="Fatima Pillosu" userId="a6295d4dc9e22643" providerId="LiveId" clId="{0478CFAF-F744-4001-ABF3-5E8A4958592B}" dt="2025-07-03T10:13:38.626" v="499"/>
+          <ac:chgData name="Fatima Pillosu" userId="a6295d4dc9e22643" providerId="LiveId" clId="{0478CFAF-F744-4001-ABF3-5E8A4958592B}" dt="2025-07-05T15:13:08.339" v="536" actId="1036"/>
           <ac:spMkLst>
             <pc:docMk/>
             <pc:sldMk cId="2370713982" sldId="258"/>
@@ -6213,11 +6213,27 @@
           </ac:spMkLst>
         </pc:spChg>
         <pc:spChg chg="add mod">
-          <ac:chgData name="Fatima Pillosu" userId="a6295d4dc9e22643" providerId="LiveId" clId="{0478CFAF-F744-4001-ABF3-5E8A4958592B}" dt="2025-07-03T10:13:38.626" v="499"/>
+          <ac:chgData name="Fatima Pillosu" userId="a6295d4dc9e22643" providerId="LiveId" clId="{0478CFAF-F744-4001-ABF3-5E8A4958592B}" dt="2025-07-05T15:24:19.386" v="1044" actId="14100"/>
           <ac:spMkLst>
             <pc:docMk/>
             <pc:sldMk cId="2370713982" sldId="258"/>
             <ac:spMk id="53" creationId="{27B7D5CF-81CA-4EAF-61FB-FBDB71CAE40F}"/>
+          </ac:spMkLst>
+        </pc:spChg>
+        <pc:spChg chg="add del mod">
+          <ac:chgData name="Fatima Pillosu" userId="a6295d4dc9e22643" providerId="LiveId" clId="{0478CFAF-F744-4001-ABF3-5E8A4958592B}" dt="2025-07-05T15:19:38.870" v="812" actId="22"/>
+          <ac:spMkLst>
+            <pc:docMk/>
+            <pc:sldMk cId="2370713982" sldId="258"/>
+            <ac:spMk id="54" creationId="{93C34A20-7CB5-2F0A-0C2D-D6976B6CD62A}"/>
+          </ac:spMkLst>
+        </pc:spChg>
+        <pc:spChg chg="add mod">
+          <ac:chgData name="Fatima Pillosu" userId="a6295d4dc9e22643" providerId="LiveId" clId="{0478CFAF-F744-4001-ABF3-5E8A4958592B}" dt="2025-07-05T15:22:14.072" v="993" actId="207"/>
+          <ac:spMkLst>
+            <pc:docMk/>
+            <pc:sldMk cId="2370713982" sldId="258"/>
+            <ac:spMk id="55" creationId="{78B6A93C-975D-F2FB-2429-F211CE81F035}"/>
           </ac:spMkLst>
         </pc:spChg>
         <pc:spChg chg="del mod">
@@ -6461,7 +6477,7 @@
           </ac:spMkLst>
         </pc:spChg>
         <pc:picChg chg="add mod">
-          <ac:chgData name="Fatima Pillosu" userId="a6295d4dc9e22643" providerId="LiveId" clId="{0478CFAF-F744-4001-ABF3-5E8A4958592B}" dt="2025-07-03T10:13:38.626" v="499"/>
+          <ac:chgData name="Fatima Pillosu" userId="a6295d4dc9e22643" providerId="LiveId" clId="{0478CFAF-F744-4001-ABF3-5E8A4958592B}" dt="2025-07-05T15:22:36.674" v="1007" actId="1038"/>
           <ac:picMkLst>
             <pc:docMk/>
             <pc:sldMk cId="2370713982" sldId="258"/>
@@ -6469,7 +6485,7 @@
           </ac:picMkLst>
         </pc:picChg>
         <pc:picChg chg="add mod">
-          <ac:chgData name="Fatima Pillosu" userId="a6295d4dc9e22643" providerId="LiveId" clId="{0478CFAF-F744-4001-ABF3-5E8A4958592B}" dt="2025-07-03T10:13:38.626" v="499"/>
+          <ac:chgData name="Fatima Pillosu" userId="a6295d4dc9e22643" providerId="LiveId" clId="{0478CFAF-F744-4001-ABF3-5E8A4958592B}" dt="2025-07-05T15:13:08.339" v="536" actId="1036"/>
           <ac:picMkLst>
             <pc:docMk/>
             <pc:sldMk cId="2370713982" sldId="258"/>
@@ -6477,7 +6493,7 @@
           </ac:picMkLst>
         </pc:picChg>
         <pc:picChg chg="add mod">
-          <ac:chgData name="Fatima Pillosu" userId="a6295d4dc9e22643" providerId="LiveId" clId="{0478CFAF-F744-4001-ABF3-5E8A4958592B}" dt="2025-07-03T10:13:38.626" v="499"/>
+          <ac:chgData name="Fatima Pillosu" userId="a6295d4dc9e22643" providerId="LiveId" clId="{0478CFAF-F744-4001-ABF3-5E8A4958592B}" dt="2025-07-05T15:13:08.339" v="536" actId="1036"/>
           <ac:picMkLst>
             <pc:docMk/>
             <pc:sldMk cId="2370713982" sldId="258"/>
@@ -6517,7 +6533,7 @@
           </ac:cxnSpMkLst>
         </pc:cxnChg>
         <pc:cxnChg chg="add mod">
-          <ac:chgData name="Fatima Pillosu" userId="a6295d4dc9e22643" providerId="LiveId" clId="{0478CFAF-F744-4001-ABF3-5E8A4958592B}" dt="2025-07-03T10:13:38.626" v="499"/>
+          <ac:chgData name="Fatima Pillosu" userId="a6295d4dc9e22643" providerId="LiveId" clId="{0478CFAF-F744-4001-ABF3-5E8A4958592B}" dt="2025-07-05T15:13:08.339" v="536" actId="1036"/>
           <ac:cxnSpMkLst>
             <pc:docMk/>
             <pc:sldMk cId="2370713982" sldId="258"/>
@@ -6525,7 +6541,7 @@
           </ac:cxnSpMkLst>
         </pc:cxnChg>
         <pc:cxnChg chg="add mod">
-          <ac:chgData name="Fatima Pillosu" userId="a6295d4dc9e22643" providerId="LiveId" clId="{0478CFAF-F744-4001-ABF3-5E8A4958592B}" dt="2025-07-03T10:13:38.626" v="499"/>
+          <ac:chgData name="Fatima Pillosu" userId="a6295d4dc9e22643" providerId="LiveId" clId="{0478CFAF-F744-4001-ABF3-5E8A4958592B}" dt="2025-07-05T15:15:02.171" v="665" actId="14100"/>
           <ac:cxnSpMkLst>
             <pc:docMk/>
             <pc:sldMk cId="2370713982" sldId="258"/>
@@ -6533,7 +6549,7 @@
           </ac:cxnSpMkLst>
         </pc:cxnChg>
         <pc:cxnChg chg="add mod">
-          <ac:chgData name="Fatima Pillosu" userId="a6295d4dc9e22643" providerId="LiveId" clId="{0478CFAF-F744-4001-ABF3-5E8A4958592B}" dt="2025-07-03T10:13:38.626" v="499"/>
+          <ac:chgData name="Fatima Pillosu" userId="a6295d4dc9e22643" providerId="LiveId" clId="{0478CFAF-F744-4001-ABF3-5E8A4958592B}" dt="2025-07-05T15:15:08.516" v="666" actId="14100"/>
           <ac:cxnSpMkLst>
             <pc:docMk/>
             <pc:sldMk cId="2370713982" sldId="258"/>
@@ -6541,7 +6557,7 @@
           </ac:cxnSpMkLst>
         </pc:cxnChg>
         <pc:cxnChg chg="add mod">
-          <ac:chgData name="Fatima Pillosu" userId="a6295d4dc9e22643" providerId="LiveId" clId="{0478CFAF-F744-4001-ABF3-5E8A4958592B}" dt="2025-07-03T10:13:38.626" v="499"/>
+          <ac:chgData name="Fatima Pillosu" userId="a6295d4dc9e22643" providerId="LiveId" clId="{0478CFAF-F744-4001-ABF3-5E8A4958592B}" dt="2025-07-05T15:23:05.357" v="1012" actId="14100"/>
           <ac:cxnSpMkLst>
             <pc:docMk/>
             <pc:sldMk cId="2370713982" sldId="258"/>
@@ -6549,7 +6565,7 @@
           </ac:cxnSpMkLst>
         </pc:cxnChg>
         <pc:cxnChg chg="add mod">
-          <ac:chgData name="Fatima Pillosu" userId="a6295d4dc9e22643" providerId="LiveId" clId="{0478CFAF-F744-4001-ABF3-5E8A4958592B}" dt="2025-07-03T10:13:38.626" v="499"/>
+          <ac:chgData name="Fatima Pillosu" userId="a6295d4dc9e22643" providerId="LiveId" clId="{0478CFAF-F744-4001-ABF3-5E8A4958592B}" dt="2025-07-05T15:13:08.339" v="536" actId="1036"/>
           <ac:cxnSpMkLst>
             <pc:docMk/>
             <pc:sldMk cId="2370713982" sldId="258"/>
@@ -6557,7 +6573,7 @@
           </ac:cxnSpMkLst>
         </pc:cxnChg>
         <pc:cxnChg chg="add mod">
-          <ac:chgData name="Fatima Pillosu" userId="a6295d4dc9e22643" providerId="LiveId" clId="{0478CFAF-F744-4001-ABF3-5E8A4958592B}" dt="2025-07-03T10:13:38.626" v="499"/>
+          <ac:chgData name="Fatima Pillosu" userId="a6295d4dc9e22643" providerId="LiveId" clId="{0478CFAF-F744-4001-ABF3-5E8A4958592B}" dt="2025-07-05T15:13:08.339" v="536" actId="1036"/>
           <ac:cxnSpMkLst>
             <pc:docMk/>
             <pc:sldMk cId="2370713982" sldId="258"/>
@@ -6565,7 +6581,7 @@
           </ac:cxnSpMkLst>
         </pc:cxnChg>
         <pc:cxnChg chg="add mod">
-          <ac:chgData name="Fatima Pillosu" userId="a6295d4dc9e22643" providerId="LiveId" clId="{0478CFAF-F744-4001-ABF3-5E8A4958592B}" dt="2025-07-03T10:13:38.626" v="499"/>
+          <ac:chgData name="Fatima Pillosu" userId="a6295d4dc9e22643" providerId="LiveId" clId="{0478CFAF-F744-4001-ABF3-5E8A4958592B}" dt="2025-07-05T15:13:08.339" v="536" actId="1036"/>
           <ac:cxnSpMkLst>
             <pc:docMk/>
             <pc:sldMk cId="2370713982" sldId="258"/>
@@ -6573,7 +6589,7 @@
           </ac:cxnSpMkLst>
         </pc:cxnChg>
         <pc:cxnChg chg="add mod">
-          <ac:chgData name="Fatima Pillosu" userId="a6295d4dc9e22643" providerId="LiveId" clId="{0478CFAF-F744-4001-ABF3-5E8A4958592B}" dt="2025-07-03T10:13:38.626" v="499"/>
+          <ac:chgData name="Fatima Pillosu" userId="a6295d4dc9e22643" providerId="LiveId" clId="{0478CFAF-F744-4001-ABF3-5E8A4958592B}" dt="2025-07-05T15:13:08.339" v="536" actId="1036"/>
           <ac:cxnSpMkLst>
             <pc:docMk/>
             <pc:sldMk cId="2370713982" sldId="258"/>
@@ -6581,7 +6597,7 @@
           </ac:cxnSpMkLst>
         </pc:cxnChg>
         <pc:cxnChg chg="add mod">
-          <ac:chgData name="Fatima Pillosu" userId="a6295d4dc9e22643" providerId="LiveId" clId="{0478CFAF-F744-4001-ABF3-5E8A4958592B}" dt="2025-07-03T10:13:38.626" v="499"/>
+          <ac:chgData name="Fatima Pillosu" userId="a6295d4dc9e22643" providerId="LiveId" clId="{0478CFAF-F744-4001-ABF3-5E8A4958592B}" dt="2025-07-05T15:13:08.339" v="536" actId="1036"/>
           <ac:cxnSpMkLst>
             <pc:docMk/>
             <pc:sldMk cId="2370713982" sldId="258"/>
@@ -6589,7 +6605,7 @@
           </ac:cxnSpMkLst>
         </pc:cxnChg>
         <pc:cxnChg chg="add mod">
-          <ac:chgData name="Fatima Pillosu" userId="a6295d4dc9e22643" providerId="LiveId" clId="{0478CFAF-F744-4001-ABF3-5E8A4958592B}" dt="2025-07-03T10:13:38.626" v="499"/>
+          <ac:chgData name="Fatima Pillosu" userId="a6295d4dc9e22643" providerId="LiveId" clId="{0478CFAF-F744-4001-ABF3-5E8A4958592B}" dt="2025-07-05T15:13:08.339" v="536" actId="1036"/>
           <ac:cxnSpMkLst>
             <pc:docMk/>
             <pc:sldMk cId="2370713982" sldId="258"/>
@@ -6597,7 +6613,7 @@
           </ac:cxnSpMkLst>
         </pc:cxnChg>
         <pc:cxnChg chg="add mod">
-          <ac:chgData name="Fatima Pillosu" userId="a6295d4dc9e22643" providerId="LiveId" clId="{0478CFAF-F744-4001-ABF3-5E8A4958592B}" dt="2025-07-03T10:13:38.626" v="499"/>
+          <ac:chgData name="Fatima Pillosu" userId="a6295d4dc9e22643" providerId="LiveId" clId="{0478CFAF-F744-4001-ABF3-5E8A4958592B}" dt="2025-07-05T15:13:08.339" v="536" actId="1036"/>
           <ac:cxnSpMkLst>
             <pc:docMk/>
             <pc:sldMk cId="2370713982" sldId="258"/>
@@ -6605,7 +6621,7 @@
           </ac:cxnSpMkLst>
         </pc:cxnChg>
         <pc:cxnChg chg="add mod">
-          <ac:chgData name="Fatima Pillosu" userId="a6295d4dc9e22643" providerId="LiveId" clId="{0478CFAF-F744-4001-ABF3-5E8A4958592B}" dt="2025-07-03T10:13:38.626" v="499"/>
+          <ac:chgData name="Fatima Pillosu" userId="a6295d4dc9e22643" providerId="LiveId" clId="{0478CFAF-F744-4001-ABF3-5E8A4958592B}" dt="2025-07-05T15:13:08.339" v="536" actId="1036"/>
           <ac:cxnSpMkLst>
             <pc:docMk/>
             <pc:sldMk cId="2370713982" sldId="258"/>
@@ -6613,7 +6629,7 @@
           </ac:cxnSpMkLst>
         </pc:cxnChg>
         <pc:cxnChg chg="add mod">
-          <ac:chgData name="Fatima Pillosu" userId="a6295d4dc9e22643" providerId="LiveId" clId="{0478CFAF-F744-4001-ABF3-5E8A4958592B}" dt="2025-07-03T10:13:38.626" v="499"/>
+          <ac:chgData name="Fatima Pillosu" userId="a6295d4dc9e22643" providerId="LiveId" clId="{0478CFAF-F744-4001-ABF3-5E8A4958592B}" dt="2025-07-05T15:24:05.528" v="1041" actId="1037"/>
           <ac:cxnSpMkLst>
             <pc:docMk/>
             <pc:sldMk cId="2370713982" sldId="258"/>
@@ -6621,7 +6637,7 @@
           </ac:cxnSpMkLst>
         </pc:cxnChg>
         <pc:cxnChg chg="add mod">
-          <ac:chgData name="Fatima Pillosu" userId="a6295d4dc9e22643" providerId="LiveId" clId="{0478CFAF-F744-4001-ABF3-5E8A4958592B}" dt="2025-07-03T10:13:38.626" v="499"/>
+          <ac:chgData name="Fatima Pillosu" userId="a6295d4dc9e22643" providerId="LiveId" clId="{0478CFAF-F744-4001-ABF3-5E8A4958592B}" dt="2025-07-05T15:24:21.505" v="1046" actId="1037"/>
           <ac:cxnSpMkLst>
             <pc:docMk/>
             <pc:sldMk cId="2370713982" sldId="258"/>
@@ -6877,7 +6893,7 @@
           <a:p>
             <a:fld id="{26226F86-B123-4002-8175-586B5E8ACF57}" type="datetimeFigureOut">
               <a:rPr lang="en-GB" smtClean="0"/>
-              <a:t>02/07/2025</a:t>
+              <a:t>05/07/2025</a:t>
             </a:fld>
             <a:endParaRPr lang="en-GB"/>
           </a:p>
@@ -7047,7 +7063,7 @@
           <a:p>
             <a:fld id="{26226F86-B123-4002-8175-586B5E8ACF57}" type="datetimeFigureOut">
               <a:rPr lang="en-GB" smtClean="0"/>
-              <a:t>02/07/2025</a:t>
+              <a:t>05/07/2025</a:t>
             </a:fld>
             <a:endParaRPr lang="en-GB"/>
           </a:p>
@@ -7227,7 +7243,7 @@
           <a:p>
             <a:fld id="{26226F86-B123-4002-8175-586B5E8ACF57}" type="datetimeFigureOut">
               <a:rPr lang="en-GB" smtClean="0"/>
-              <a:t>02/07/2025</a:t>
+              <a:t>05/07/2025</a:t>
             </a:fld>
             <a:endParaRPr lang="en-GB"/>
           </a:p>
@@ -7397,7 +7413,7 @@
           <a:p>
             <a:fld id="{26226F86-B123-4002-8175-586B5E8ACF57}" type="datetimeFigureOut">
               <a:rPr lang="en-GB" smtClean="0"/>
-              <a:t>02/07/2025</a:t>
+              <a:t>05/07/2025</a:t>
             </a:fld>
             <a:endParaRPr lang="en-GB"/>
           </a:p>
@@ -7643,7 +7659,7 @@
           <a:p>
             <a:fld id="{26226F86-B123-4002-8175-586B5E8ACF57}" type="datetimeFigureOut">
               <a:rPr lang="en-GB" smtClean="0"/>
-              <a:t>02/07/2025</a:t>
+              <a:t>05/07/2025</a:t>
             </a:fld>
             <a:endParaRPr lang="en-GB"/>
           </a:p>
@@ -7875,7 +7891,7 @@
           <a:p>
             <a:fld id="{26226F86-B123-4002-8175-586B5E8ACF57}" type="datetimeFigureOut">
               <a:rPr lang="en-GB" smtClean="0"/>
-              <a:t>02/07/2025</a:t>
+              <a:t>05/07/2025</a:t>
             </a:fld>
             <a:endParaRPr lang="en-GB"/>
           </a:p>
@@ -8242,7 +8258,7 @@
           <a:p>
             <a:fld id="{26226F86-B123-4002-8175-586B5E8ACF57}" type="datetimeFigureOut">
               <a:rPr lang="en-GB" smtClean="0"/>
-              <a:t>02/07/2025</a:t>
+              <a:t>05/07/2025</a:t>
             </a:fld>
             <a:endParaRPr lang="en-GB"/>
           </a:p>
@@ -8360,7 +8376,7 @@
           <a:p>
             <a:fld id="{26226F86-B123-4002-8175-586B5E8ACF57}" type="datetimeFigureOut">
               <a:rPr lang="en-GB" smtClean="0"/>
-              <a:t>02/07/2025</a:t>
+              <a:t>05/07/2025</a:t>
             </a:fld>
             <a:endParaRPr lang="en-GB"/>
           </a:p>
@@ -8455,7 +8471,7 @@
           <a:p>
             <a:fld id="{26226F86-B123-4002-8175-586B5E8ACF57}" type="datetimeFigureOut">
               <a:rPr lang="en-GB" smtClean="0"/>
-              <a:t>02/07/2025</a:t>
+              <a:t>05/07/2025</a:t>
             </a:fld>
             <a:endParaRPr lang="en-GB"/>
           </a:p>
@@ -8732,7 +8748,7 @@
           <a:p>
             <a:fld id="{26226F86-B123-4002-8175-586B5E8ACF57}" type="datetimeFigureOut">
               <a:rPr lang="en-GB" smtClean="0"/>
-              <a:t>02/07/2025</a:t>
+              <a:t>05/07/2025</a:t>
             </a:fld>
             <a:endParaRPr lang="en-GB"/>
           </a:p>
@@ -8989,7 +9005,7 @@
           <a:p>
             <a:fld id="{26226F86-B123-4002-8175-586B5E8ACF57}" type="datetimeFigureOut">
               <a:rPr lang="en-GB" smtClean="0"/>
-              <a:t>02/07/2025</a:t>
+              <a:t>05/07/2025</a:t>
             </a:fld>
             <a:endParaRPr lang="en-GB"/>
           </a:p>
@@ -9202,7 +9218,7 @@
           <a:p>
             <a:fld id="{26226F86-B123-4002-8175-586B5E8ACF57}" type="datetimeFigureOut">
               <a:rPr lang="en-GB" smtClean="0"/>
-              <a:t>02/07/2025</a:t>
+              <a:t>05/07/2025</a:t>
             </a:fld>
             <a:endParaRPr lang="en-GB"/>
           </a:p>
@@ -9629,7 +9645,7 @@
         </p:nvCxnSpPr>
         <p:spPr>
           <a:xfrm>
-            <a:off x="1807853" y="5841781"/>
+            <a:off x="1807853" y="5658896"/>
             <a:ext cx="0" cy="184430"/>
           </a:xfrm>
           <a:prstGeom prst="straightConnector1">
@@ -9676,9 +9692,9 @@
           <p:nvPr/>
         </p:nvCxnSpPr>
         <p:spPr>
-          <a:xfrm>
-            <a:off x="3707851" y="3618194"/>
-            <a:ext cx="0" cy="2601023"/>
+          <a:xfrm flipH="1">
+            <a:off x="3707850" y="3435309"/>
+            <a:ext cx="1" cy="2555106"/>
           </a:xfrm>
           <a:prstGeom prst="straightConnector1">
             <a:avLst/>
@@ -9722,8 +9738,8 @@
         </p:nvSpPr>
         <p:spPr>
           <a:xfrm>
-            <a:off x="326662" y="6027167"/>
-            <a:ext cx="2971233" cy="384100"/>
+            <a:off x="326662" y="5844282"/>
+            <a:ext cx="2971233" cy="292266"/>
           </a:xfrm>
           <a:prstGeom prst="rect">
             <a:avLst/>
@@ -9757,37 +9773,17 @@
             <a:r>
               <a:rPr lang="en-GB" sz="800" dirty="0">
                 <a:solidFill>
-                  <a:srgbClr val="009900"/>
+                  <a:srgbClr val="2CA58D"/>
                 </a:solidFill>
                 <a:latin typeface="Calibri Light" panose="020F0302020204030204" pitchFamily="34" charset="0"/>
                 <a:cs typeface="Calibri Light" panose="020F0302020204030204" pitchFamily="34" charset="0"/>
               </a:rPr>
-              <a:t>Test predictions over the corresponding outer test dataset, computing </a:t>
+              <a:t>Test predictions (through </a:t>
             </a:r>
             <a:r>
               <a:rPr lang="en-GB" sz="800" b="1" dirty="0">
                 <a:solidFill>
-                  <a:srgbClr val="009900"/>
-                </a:solidFill>
-                <a:latin typeface="Calibri" panose="020F0502020204030204" pitchFamily="34" charset="0"/>
-                <a:cs typeface="Calibri" panose="020F0502020204030204" pitchFamily="34" charset="0"/>
-              </a:rPr>
-              <a:t>Precision-Recall curves</a:t>
-            </a:r>
-            <a:r>
-              <a:rPr lang="en-GB" sz="800" dirty="0">
-                <a:solidFill>
-                  <a:srgbClr val="009900"/>
-                </a:solidFill>
-                <a:latin typeface="Calibri Light" panose="020F0302020204030204" pitchFamily="34" charset="0"/>
-                <a:cs typeface="Calibri Light" panose="020F0302020204030204" pitchFamily="34" charset="0"/>
-              </a:rPr>
-              <a:t>, </a:t>
-            </a:r>
-            <a:r>
-              <a:rPr lang="en-GB" sz="800" b="1" dirty="0">
-                <a:solidFill>
-                  <a:srgbClr val="009900"/>
+                  <a:srgbClr val="2CA58D"/>
                 </a:solidFill>
                 <a:latin typeface="Calibri" panose="020F0502020204030204" pitchFamily="34" charset="0"/>
                 <a:cs typeface="Calibri" panose="020F0502020204030204" pitchFamily="34" charset="0"/>
@@ -9797,37 +9793,17 @@
             <a:r>
               <a:rPr lang="en-GB" sz="800" dirty="0">
                 <a:solidFill>
-                  <a:srgbClr val="009900"/>
+                  <a:srgbClr val="2CA58D"/>
                 </a:solidFill>
                 <a:latin typeface="Calibri Light" panose="020F0302020204030204" pitchFamily="34" charset="0"/>
                 <a:cs typeface="Calibri Light" panose="020F0302020204030204" pitchFamily="34" charset="0"/>
               </a:rPr>
-              <a:t>, </a:t>
+              <a:t> and </a:t>
             </a:r>
             <a:r>
               <a:rPr lang="en-GB" sz="800" b="1" dirty="0">
                 <a:solidFill>
-                  <a:srgbClr val="009900"/>
-                </a:solidFill>
-                <a:latin typeface="Calibri" panose="020F0502020204030204" pitchFamily="34" charset="0"/>
-                <a:cs typeface="Calibri" panose="020F0502020204030204" pitchFamily="34" charset="0"/>
-              </a:rPr>
-              <a:t>ROC curves</a:t>
-            </a:r>
-            <a:r>
-              <a:rPr lang="en-GB" sz="800" dirty="0">
-                <a:solidFill>
-                  <a:srgbClr val="009900"/>
-                </a:solidFill>
-                <a:latin typeface="Calibri Light" panose="020F0302020204030204" pitchFamily="34" charset="0"/>
-                <a:cs typeface="Calibri Light" panose="020F0302020204030204" pitchFamily="34" charset="0"/>
-              </a:rPr>
-              <a:t>, </a:t>
-            </a:r>
-            <a:r>
-              <a:rPr lang="en-GB" sz="800" b="1" dirty="0">
-                <a:solidFill>
-                  <a:srgbClr val="009900"/>
+                  <a:srgbClr val="2CA58D"/>
                 </a:solidFill>
                 <a:latin typeface="Calibri" panose="020F0502020204030204" pitchFamily="34" charset="0"/>
                 <a:cs typeface="Calibri" panose="020F0502020204030204" pitchFamily="34" charset="0"/>
@@ -9837,60 +9813,13 @@
             <a:r>
               <a:rPr lang="en-GB" sz="800" dirty="0">
                 <a:solidFill>
-                  <a:srgbClr val="009900"/>
+                  <a:srgbClr val="2CA58D"/>
                 </a:solidFill>
                 <a:latin typeface="Calibri Light" panose="020F0302020204030204" pitchFamily="34" charset="0"/>
                 <a:cs typeface="Calibri Light" panose="020F0302020204030204" pitchFamily="34" charset="0"/>
               </a:rPr>
-              <a:t>, </a:t>
-            </a:r>
-            <a:r>
-              <a:rPr lang="en-GB" sz="800" b="1" dirty="0">
-                <a:solidFill>
-                  <a:srgbClr val="009900"/>
-                </a:solidFill>
-                <a:latin typeface="Calibri" panose="020F0502020204030204" pitchFamily="34" charset="0"/>
-                <a:cs typeface="Calibri" panose="020F0502020204030204" pitchFamily="34" charset="0"/>
-              </a:rPr>
-              <a:t>reliability diagrams</a:t>
-            </a:r>
-            <a:r>
-              <a:rPr lang="en-GB" sz="800" dirty="0">
-                <a:solidFill>
-                  <a:srgbClr val="009900"/>
-                </a:solidFill>
-                <a:latin typeface="Calibri Light" panose="020F0302020204030204" pitchFamily="34" charset="0"/>
-                <a:cs typeface="Calibri Light" panose="020F0302020204030204" pitchFamily="34" charset="0"/>
-              </a:rPr>
-              <a:t>, and </a:t>
-            </a:r>
-            <a:r>
-              <a:rPr lang="en-GB" sz="800" b="1" dirty="0">
-                <a:solidFill>
-                  <a:srgbClr val="009900"/>
-                </a:solidFill>
-                <a:latin typeface="Calibri" panose="020F0502020204030204" pitchFamily="34" charset="0"/>
-                <a:cs typeface="Calibri" panose="020F0502020204030204" pitchFamily="34" charset="0"/>
-              </a:rPr>
-              <a:t>frequency bias</a:t>
-            </a:r>
-            <a:r>
-              <a:rPr lang="en-GB" sz="800" b="1" dirty="0">
-                <a:solidFill>
-                  <a:srgbClr val="009900"/>
-                </a:solidFill>
-                <a:latin typeface="Calibri Light" panose="020F0302020204030204" pitchFamily="34" charset="0"/>
-                <a:cs typeface="Calibri Light" panose="020F0302020204030204" pitchFamily="34" charset="0"/>
-              </a:rPr>
-              <a:t>.</a:t>
-            </a:r>
-            <a:endParaRPr lang="en-GB" sz="800" dirty="0">
-              <a:solidFill>
-                <a:srgbClr val="009900"/>
-              </a:solidFill>
-              <a:latin typeface="Calibri Light" panose="020F0302020204030204" pitchFamily="34" charset="0"/>
-              <a:cs typeface="Calibri Light" panose="020F0302020204030204" pitchFamily="34" charset="0"/>
-            </a:endParaRPr>
+              <a:t>) over the corresponding outer test dataset.</a:t>
+            </a:r>
           </a:p>
         </p:txBody>
       </p:sp>
@@ -9905,14 +9834,13 @@
           </p:cNvPr>
           <p:cNvCxnSpPr>
             <a:cxnSpLocks/>
-            <a:endCxn id="9" idx="3"/>
           </p:cNvCxnSpPr>
           <p:nvPr/>
         </p:nvCxnSpPr>
         <p:spPr>
           <a:xfrm flipH="1">
-            <a:off x="3297895" y="6219217"/>
-            <a:ext cx="409956" cy="0"/>
+            <a:off x="3099335" y="5990415"/>
+            <a:ext cx="608515" cy="0"/>
           </a:xfrm>
           <a:prstGeom prst="straightConnector1">
             <a:avLst/>
@@ -9956,8 +9884,8 @@
         </p:nvSpPr>
         <p:spPr>
           <a:xfrm>
-            <a:off x="-78147" y="-20095"/>
-            <a:ext cx="4335187" cy="507973"/>
+            <a:off x="-78147" y="-39345"/>
+            <a:ext cx="4335187" cy="348703"/>
           </a:xfrm>
           <a:prstGeom prst="rect">
             <a:avLst/>
@@ -9988,7 +9916,7 @@
           <a:lstStyle/>
           <a:p>
             <a:r>
-              <a:rPr lang="en-GB" sz="1200" b="1" dirty="0">
+              <a:rPr lang="en-US" sz="1200" b="1" dirty="0">
                 <a:solidFill>
                   <a:schemeClr val="tx1">
                     <a:lumMod val="75000"/>
@@ -9998,7 +9926,7 @@
                 <a:latin typeface="Calibri" panose="020F0502020204030204" pitchFamily="34" charset="0"/>
                 <a:cs typeface="Calibri" panose="020F0502020204030204" pitchFamily="34" charset="0"/>
               </a:rPr>
-              <a:t>Workflow for training data-driven predictive models</a:t>
+              <a:t>Repeated nested cross-validation</a:t>
             </a:r>
           </a:p>
           <a:p>
@@ -10013,7 +9941,7 @@
                 <a:latin typeface="Calibri Light" panose="020F0302020204030204" pitchFamily="34" charset="0"/>
                 <a:cs typeface="Calibri Light" panose="020F0302020204030204" pitchFamily="34" charset="0"/>
               </a:rPr>
-              <a:t>Hyperparameter tuning and model’s generalisation capabilities when using imbalanced observational datasets for training</a:t>
+              <a:t>For hyperparameter tuning and model’s generalisation capabilities</a:t>
             </a:r>
           </a:p>
         </p:txBody>
@@ -10032,7 +9960,7 @@
         </p:nvSpPr>
         <p:spPr>
           <a:xfrm>
-            <a:off x="490149" y="572085"/>
+            <a:off x="490149" y="389200"/>
             <a:ext cx="3159903" cy="264384"/>
           </a:xfrm>
           <a:prstGeom prst="rect">
@@ -10198,14 +10126,13 @@
           </p:cNvPr>
           <p:cNvCxnSpPr>
             <a:cxnSpLocks/>
-            <a:stCxn id="12" idx="2"/>
           </p:cNvCxnSpPr>
           <p:nvPr/>
         </p:nvCxnSpPr>
         <p:spPr>
           <a:xfrm>
-            <a:off x="2070101" y="836469"/>
-            <a:ext cx="0" cy="614581"/>
+            <a:off x="2070101" y="615084"/>
+            <a:ext cx="0" cy="684000"/>
           </a:xfrm>
           <a:prstGeom prst="straightConnector1">
             <a:avLst/>
@@ -10249,7 +10176,7 @@
         </p:nvSpPr>
         <p:spPr>
           <a:xfrm>
-            <a:off x="2115982" y="907450"/>
+            <a:off x="2115982" y="686065"/>
             <a:ext cx="1915552" cy="589128"/>
           </a:xfrm>
           <a:prstGeom prst="rect">
@@ -10281,15 +10208,15 @@
           <a:lstStyle/>
           <a:p>
             <a:r>
-              <a:rPr lang="en-GB" sz="800" b="1" i="1" dirty="0">
+              <a:rPr lang="en-GB" sz="800" b="1" dirty="0">
                 <a:solidFill>
                   <a:schemeClr val="tx1">
                     <a:lumMod val="75000"/>
                     <a:lumOff val="25000"/>
                   </a:schemeClr>
                 </a:solidFill>
-                <a:latin typeface="Calibri Light" panose="020F0302020204030204" pitchFamily="34" charset="0"/>
-                <a:cs typeface="Calibri Light" panose="020F0302020204030204" pitchFamily="34" charset="0"/>
+                <a:latin typeface="Calibri" panose="020F0502020204030204" pitchFamily="34" charset="0"/>
+                <a:cs typeface="Calibri" panose="020F0502020204030204" pitchFamily="34" charset="0"/>
               </a:rPr>
               <a:t>RepeatedStratifiedKfold</a:t>
             </a:r>
@@ -10338,7 +10265,7 @@
         </p:blipFill>
         <p:spPr bwMode="auto">
           <a:xfrm>
-            <a:off x="3216414" y="906641"/>
+            <a:off x="3264540" y="685256"/>
             <a:ext cx="262871" cy="171347"/>
           </a:xfrm>
           <a:prstGeom prst="rect">
@@ -10370,7 +10297,7 @@
         </p:nvSpPr>
         <p:spPr>
           <a:xfrm>
-            <a:off x="3347851" y="3438194"/>
+            <a:off x="3347851" y="3255309"/>
             <a:ext cx="720000" cy="180000"/>
           </a:xfrm>
           <a:prstGeom prst="rect">
@@ -10407,9 +10334,7 @@
             <a:r>
               <a:rPr lang="en-GB" sz="800" dirty="0">
                 <a:solidFill>
-                  <a:schemeClr val="bg1">
-                    <a:lumMod val="95000"/>
-                  </a:schemeClr>
+                  <a:srgbClr val="F2F2F2"/>
                 </a:solidFill>
                 <a:latin typeface="Calibri Light" panose="020F0302020204030204" pitchFamily="34" charset="0"/>
                 <a:cs typeface="Calibri Light" panose="020F0302020204030204" pitchFamily="34" charset="0"/>
@@ -10433,7 +10358,7 @@
         </p:nvSpPr>
         <p:spPr>
           <a:xfrm>
-            <a:off x="3347850" y="3271364"/>
+            <a:off x="3347850" y="3088479"/>
             <a:ext cx="720000" cy="215442"/>
           </a:xfrm>
           <a:prstGeom prst="rect">
@@ -10477,7 +10402,7 @@
         </p:nvCxnSpPr>
         <p:spPr>
           <a:xfrm>
-            <a:off x="1424066" y="2802126"/>
+            <a:off x="1424066" y="2619241"/>
             <a:ext cx="1881069" cy="159293"/>
           </a:xfrm>
           <a:prstGeom prst="straightConnector1">
@@ -10521,7 +10446,7 @@
         </p:nvCxnSpPr>
         <p:spPr>
           <a:xfrm>
-            <a:off x="74951" y="2796196"/>
+            <a:off x="74951" y="2613311"/>
             <a:ext cx="251711" cy="167808"/>
           </a:xfrm>
           <a:prstGeom prst="straightConnector1">
@@ -10565,7 +10490,7 @@
         </p:nvCxnSpPr>
         <p:spPr>
           <a:xfrm>
-            <a:off x="2070100" y="6486086"/>
+            <a:off x="2070100" y="6303201"/>
             <a:ext cx="0" cy="184430"/>
           </a:xfrm>
           <a:prstGeom prst="straightConnector1">
@@ -10610,8 +10535,8 @@
         </p:nvSpPr>
         <p:spPr>
           <a:xfrm>
-            <a:off x="0" y="6675785"/>
-            <a:ext cx="4140200" cy="323055"/>
+            <a:off x="0" y="6483276"/>
+            <a:ext cx="4140200" cy="173470"/>
           </a:xfrm>
           <a:prstGeom prst="rect">
             <a:avLst/>
@@ -10643,27 +10568,14 @@
           <a:p>
             <a:pPr algn="ctr"/>
             <a:r>
-              <a:rPr lang="en-GB" sz="800" dirty="0">
-                <a:solidFill>
-                  <a:schemeClr val="tx1">
-                    <a:lumMod val="75000"/>
-                    <a:lumOff val="25000"/>
-                  </a:schemeClr>
-                </a:solidFill>
-                <a:latin typeface="Calibri Light" panose="020F0302020204030204" pitchFamily="34" charset="0"/>
-                <a:cs typeface="Calibri Light" panose="020F0302020204030204" pitchFamily="34" charset="0"/>
-              </a:rPr>
-              <a:t>Select the </a:t>
-            </a:r>
-            <a:r>
               <a:rPr lang="en-GB" sz="800" b="1" dirty="0">
                 <a:solidFill>
-                  <a:srgbClr val="009900"/>
+                  <a:srgbClr val="2CA58D"/>
                 </a:solidFill>
                 <a:latin typeface="Calibri" panose="020F0502020204030204" pitchFamily="34" charset="0"/>
                 <a:cs typeface="Calibri" panose="020F0502020204030204" pitchFamily="34" charset="0"/>
               </a:rPr>
-              <a:t>model corresponding to the fold with the best set of hyperparameters over the outer test datasets</a:t>
+              <a:t>Select the best-performing fold</a:t>
             </a:r>
             <a:r>
               <a:rPr lang="en-GB" sz="800" dirty="0">
@@ -10735,8 +10647,8 @@
         </p:nvSpPr>
         <p:spPr>
           <a:xfrm>
-            <a:off x="92655" y="7174515"/>
-            <a:ext cx="2000607" cy="361106"/>
+            <a:off x="18108" y="6827996"/>
+            <a:ext cx="1720023" cy="444575"/>
           </a:xfrm>
           <a:prstGeom prst="parallelogram">
             <a:avLst>
@@ -10778,7 +10690,7 @@
           <a:p>
             <a:pPr algn="ctr"/>
             <a:r>
-              <a:rPr lang="en-GB" sz="1000" dirty="0">
+              <a:rPr lang="en-GB" sz="800" dirty="0">
                 <a:solidFill>
                   <a:schemeClr val="tx1">
                     <a:lumMod val="75000"/>
@@ -10788,7 +10700,23 @@
                 <a:latin typeface="Calibri Light" panose="020F0302020204030204" pitchFamily="34" charset="0"/>
                 <a:cs typeface="Calibri Light" panose="020F0302020204030204" pitchFamily="34" charset="0"/>
               </a:rPr>
-              <a:t>Model ready for forecast production</a:t>
+              <a:t>Model ready </a:t>
+            </a:r>
+          </a:p>
+          <a:p>
+            <a:pPr algn="ctr"/>
+            <a:r>
+              <a:rPr lang="en-GB" sz="800" dirty="0">
+                <a:solidFill>
+                  <a:schemeClr val="tx1">
+                    <a:lumMod val="75000"/>
+                    <a:lumOff val="25000"/>
+                  </a:schemeClr>
+                </a:solidFill>
+                <a:latin typeface="Calibri Light" panose="020F0302020204030204" pitchFamily="34" charset="0"/>
+                <a:cs typeface="Calibri Light" panose="020F0302020204030204" pitchFamily="34" charset="0"/>
+              </a:rPr>
+              <a:t>for forecast production</a:t>
             </a:r>
           </a:p>
         </p:txBody>
@@ -10815,7 +10743,7 @@
         </p:blipFill>
         <p:spPr>
           <a:xfrm>
-            <a:off x="-15240" y="1458479"/>
+            <a:off x="-15240" y="1275594"/>
             <a:ext cx="4140200" cy="1390443"/>
           </a:xfrm>
           <a:prstGeom prst="rect">
@@ -10837,7 +10765,7 @@
         </p:nvSpPr>
         <p:spPr>
           <a:xfrm>
-            <a:off x="660104" y="3800563"/>
+            <a:off x="660104" y="3617678"/>
             <a:ext cx="846000" cy="180000"/>
           </a:xfrm>
           <a:prstGeom prst="rect">
@@ -10900,7 +10828,7 @@
         </p:nvSpPr>
         <p:spPr>
           <a:xfrm>
-            <a:off x="1533104" y="3800563"/>
+            <a:off x="1533104" y="3617678"/>
             <a:ext cx="846000" cy="180000"/>
           </a:xfrm>
           <a:prstGeom prst="rect">
@@ -10963,7 +10891,7 @@
         </p:nvSpPr>
         <p:spPr>
           <a:xfrm>
-            <a:off x="2406104" y="3800563"/>
+            <a:off x="2406104" y="3617678"/>
             <a:ext cx="846000" cy="180000"/>
           </a:xfrm>
           <a:prstGeom prst="rect">
@@ -11026,7 +10954,7 @@
         </p:nvSpPr>
         <p:spPr>
           <a:xfrm>
-            <a:off x="660104" y="4011829"/>
+            <a:off x="660104" y="3828944"/>
             <a:ext cx="846000" cy="180000"/>
           </a:xfrm>
           <a:prstGeom prst="rect">
@@ -11089,7 +11017,7 @@
         </p:nvSpPr>
         <p:spPr>
           <a:xfrm>
-            <a:off x="1533104" y="4011829"/>
+            <a:off x="1533104" y="3828944"/>
             <a:ext cx="846000" cy="180000"/>
           </a:xfrm>
           <a:prstGeom prst="rect">
@@ -11152,7 +11080,7 @@
         </p:nvSpPr>
         <p:spPr>
           <a:xfrm>
-            <a:off x="2406104" y="4011829"/>
+            <a:off x="2406104" y="3828944"/>
             <a:ext cx="846000" cy="180000"/>
           </a:xfrm>
           <a:prstGeom prst="rect">
@@ -11215,7 +11143,7 @@
         </p:nvSpPr>
         <p:spPr>
           <a:xfrm>
-            <a:off x="660104" y="4215128"/>
+            <a:off x="660104" y="4032243"/>
             <a:ext cx="846000" cy="180000"/>
           </a:xfrm>
           <a:prstGeom prst="rect">
@@ -11278,7 +11206,7 @@
         </p:nvSpPr>
         <p:spPr>
           <a:xfrm>
-            <a:off x="1533104" y="4215128"/>
+            <a:off x="1533104" y="4032243"/>
             <a:ext cx="846000" cy="180000"/>
           </a:xfrm>
           <a:prstGeom prst="rect">
@@ -11341,7 +11269,7 @@
         </p:nvSpPr>
         <p:spPr>
           <a:xfrm>
-            <a:off x="2406104" y="4215128"/>
+            <a:off x="2406104" y="4032243"/>
             <a:ext cx="846000" cy="180000"/>
           </a:xfrm>
           <a:prstGeom prst="rect">
@@ -11404,7 +11332,7 @@
         </p:nvSpPr>
         <p:spPr>
           <a:xfrm>
-            <a:off x="288074" y="4638605"/>
+            <a:off x="288074" y="4455720"/>
             <a:ext cx="3028422" cy="546157"/>
           </a:xfrm>
           <a:prstGeom prst="rect">
@@ -11567,7 +11495,7 @@
         </p:nvCxnSpPr>
         <p:spPr>
           <a:xfrm>
-            <a:off x="1807853" y="4448774"/>
+            <a:off x="1807853" y="4265889"/>
             <a:ext cx="0" cy="183694"/>
           </a:xfrm>
           <a:prstGeom prst="straightConnector1">
@@ -11612,7 +11540,7 @@
         </p:nvSpPr>
         <p:spPr>
           <a:xfrm>
-            <a:off x="326662" y="2964004"/>
+            <a:off x="326662" y="2781119"/>
             <a:ext cx="2971234" cy="317158"/>
           </a:xfrm>
           <a:prstGeom prst="rect">
@@ -11713,7 +11641,7 @@
         </p:nvSpPr>
         <p:spPr>
           <a:xfrm>
-            <a:off x="653070" y="3638642"/>
+            <a:off x="653070" y="3455757"/>
             <a:ext cx="846000" cy="180000"/>
           </a:xfrm>
           <a:prstGeom prst="rect">
@@ -11788,7 +11716,7 @@
         </p:nvSpPr>
         <p:spPr>
           <a:xfrm>
-            <a:off x="1526070" y="3638642"/>
+            <a:off x="1526070" y="3455757"/>
             <a:ext cx="846000" cy="180000"/>
           </a:xfrm>
           <a:prstGeom prst="rect">
@@ -11863,7 +11791,7 @@
         </p:nvSpPr>
         <p:spPr>
           <a:xfrm>
-            <a:off x="2399070" y="3638642"/>
+            <a:off x="2399070" y="3455757"/>
             <a:ext cx="846000" cy="180000"/>
           </a:xfrm>
           <a:prstGeom prst="rect">
@@ -11938,7 +11866,7 @@
         </p:nvSpPr>
         <p:spPr>
           <a:xfrm>
-            <a:off x="226504" y="3804773"/>
+            <a:off x="226504" y="3621888"/>
             <a:ext cx="497974" cy="180000"/>
           </a:xfrm>
           <a:prstGeom prst="rect">
@@ -12000,7 +11928,7 @@
         </p:nvSpPr>
         <p:spPr>
           <a:xfrm>
-            <a:off x="226504" y="4018133"/>
+            <a:off x="226504" y="3835248"/>
             <a:ext cx="497974" cy="180000"/>
           </a:xfrm>
           <a:prstGeom prst="rect">
@@ -12062,7 +11990,7 @@
         </p:nvSpPr>
         <p:spPr>
           <a:xfrm>
-            <a:off x="226504" y="4217522"/>
+            <a:off x="226504" y="4034637"/>
             <a:ext cx="497974" cy="180000"/>
           </a:xfrm>
           <a:prstGeom prst="rect">
@@ -12124,7 +12052,7 @@
         </p:nvSpPr>
         <p:spPr>
           <a:xfrm>
-            <a:off x="326663" y="3288555"/>
+            <a:off x="326663" y="3105670"/>
             <a:ext cx="2971235" cy="2507267"/>
           </a:xfrm>
           <a:prstGeom prst="rect">
@@ -12187,7 +12115,7 @@
         </p:nvCxnSpPr>
         <p:spPr>
           <a:xfrm>
-            <a:off x="1807853" y="5189502"/>
+            <a:off x="1807853" y="5006617"/>
             <a:ext cx="0" cy="184430"/>
           </a:xfrm>
           <a:prstGeom prst="straightConnector1">
@@ -12232,7 +12160,7 @@
         </p:nvSpPr>
         <p:spPr>
           <a:xfrm>
-            <a:off x="353116" y="5365801"/>
+            <a:off x="353116" y="5182916"/>
             <a:ext cx="2944779" cy="430021"/>
           </a:xfrm>
           <a:prstGeom prst="rect">
@@ -12282,7 +12210,7 @@
                 <a:latin typeface="Calibri" panose="020F0502020204030204" pitchFamily="34" charset="0"/>
                 <a:cs typeface="Calibri" panose="020F0502020204030204" pitchFamily="34" charset="0"/>
               </a:rPr>
-              <a:t>best hyper-parameter set per outer fold</a:t>
+              <a:t>best hyper-parameter set per outer fold and</a:t>
             </a:r>
             <a:r>
               <a:rPr lang="en-GB" sz="800" dirty="0">
@@ -12292,27 +12220,7 @@
                 <a:latin typeface="Calibri Light" panose="020F0302020204030204" pitchFamily="34" charset="0"/>
                 <a:cs typeface="Calibri Light" panose="020F0302020204030204" pitchFamily="34" charset="0"/>
               </a:rPr>
-              <a:t>,</a:t>
-            </a:r>
-            <a:r>
-              <a:rPr lang="en-GB" sz="800" b="1" dirty="0">
-                <a:solidFill>
-                  <a:srgbClr val="3A0CA3"/>
-                </a:solidFill>
-                <a:latin typeface="Calibri" panose="020F0502020204030204" pitchFamily="34" charset="0"/>
-                <a:cs typeface="Calibri" panose="020F0502020204030204" pitchFamily="34" charset="0"/>
-              </a:rPr>
-              <a:t> </a:t>
-            </a:r>
-            <a:r>
-              <a:rPr lang="en-GB" sz="800" dirty="0">
-                <a:solidFill>
-                  <a:srgbClr val="3A0CA3"/>
-                </a:solidFill>
-                <a:latin typeface="Calibri Light" panose="020F0302020204030204" pitchFamily="34" charset="0"/>
-                <a:cs typeface="Calibri Light" panose="020F0302020204030204" pitchFamily="34" charset="0"/>
-              </a:rPr>
-              <a:t>and trains the model with it over the entire outer training dataset.</a:t>
+              <a:t> trains the model with it over the entire outer training dataset.</a:t>
             </a:r>
           </a:p>
         </p:txBody>
@@ -12331,7 +12239,7 @@
         </p:nvSpPr>
         <p:spPr>
           <a:xfrm>
-            <a:off x="653070" y="3438194"/>
+            <a:off x="653070" y="3255309"/>
             <a:ext cx="2599034" cy="178250"/>
           </a:xfrm>
           <a:prstGeom prst="rect">
@@ -12403,7 +12311,7 @@
         </p:nvSpPr>
         <p:spPr>
           <a:xfrm>
-            <a:off x="679155" y="3271363"/>
+            <a:off x="679155" y="3088478"/>
             <a:ext cx="2592000" cy="215444"/>
           </a:xfrm>
           <a:prstGeom prst="rect">
@@ -12459,7 +12367,7 @@
         </p:blipFill>
         <p:spPr>
           <a:xfrm>
-            <a:off x="1434629" y="3130261"/>
+            <a:off x="1434629" y="2947376"/>
             <a:ext cx="108000" cy="108000"/>
           </a:xfrm>
           <a:prstGeom prst="rect">
@@ -12483,7 +12391,7 @@
         </p:nvCxnSpPr>
         <p:spPr>
           <a:xfrm>
-            <a:off x="31750" y="6438900"/>
+            <a:off x="31750" y="6256015"/>
             <a:ext cx="4124960" cy="0"/>
           </a:xfrm>
           <a:prstGeom prst="line">
@@ -12530,7 +12438,7 @@
         </p:nvCxnSpPr>
         <p:spPr>
           <a:xfrm rot="16200000">
-            <a:off x="-165100" y="6246167"/>
+            <a:off x="-165100" y="6063282"/>
             <a:ext cx="393700" cy="0"/>
           </a:xfrm>
           <a:prstGeom prst="line">
@@ -12577,7 +12485,7 @@
         </p:nvCxnSpPr>
         <p:spPr>
           <a:xfrm rot="16200000">
-            <a:off x="3902750" y="6238267"/>
+            <a:off x="3902750" y="6055382"/>
             <a:ext cx="393700" cy="0"/>
           </a:xfrm>
           <a:prstGeom prst="line">
@@ -12624,7 +12532,7 @@
         </p:nvCxnSpPr>
         <p:spPr>
           <a:xfrm>
-            <a:off x="1089604" y="6987743"/>
+            <a:off x="1041479" y="6641225"/>
             <a:ext cx="0" cy="184430"/>
           </a:xfrm>
           <a:prstGeom prst="straightConnector1">
@@ -12671,7 +12579,7 @@
         </p:nvCxnSpPr>
         <p:spPr>
           <a:xfrm>
-            <a:off x="1848368" y="7380025"/>
+            <a:off x="1513854" y="7033507"/>
             <a:ext cx="345978" cy="0"/>
           </a:xfrm>
           <a:prstGeom prst="straightConnector1">
@@ -12716,8 +12624,8 @@
         </p:nvSpPr>
         <p:spPr>
           <a:xfrm>
-            <a:off x="2194346" y="7057502"/>
-            <a:ext cx="1856205" cy="485691"/>
+            <a:off x="1879082" y="6710984"/>
+            <a:ext cx="2171470" cy="485691"/>
           </a:xfrm>
           <a:prstGeom prst="rect">
             <a:avLst/>
@@ -12827,6 +12735,185 @@
                 <a:cs typeface="Calibri Light" panose="020F0302020204030204" pitchFamily="34" charset="0"/>
               </a:rPr>
               <a:t>) are gridded yes-events</a:t>
+            </a:r>
+          </a:p>
+        </p:txBody>
+      </p:sp>
+      <p:sp>
+        <p:nvSpPr>
+          <p:cNvPr id="55" name="Rectangle 54">
+            <a:extLst>
+              <a:ext uri="{FF2B5EF4-FFF2-40B4-BE49-F238E27FC236}">
+                <a16:creationId xmlns:a16="http://schemas.microsoft.com/office/drawing/2014/main" id="{78B6A93C-975D-F2FB-2429-F211CE81F035}"/>
+              </a:ext>
+            </a:extLst>
+          </p:cNvPr>
+          <p:cNvSpPr/>
+          <p:nvPr/>
+        </p:nvSpPr>
+        <p:spPr>
+          <a:xfrm>
+            <a:off x="1731819" y="7188082"/>
+            <a:ext cx="2525221" cy="406457"/>
+          </a:xfrm>
+          <a:prstGeom prst="rect">
+            <a:avLst/>
+          </a:prstGeom>
+          <a:noFill/>
+          <a:ln w="3175">
+            <a:noFill/>
+          </a:ln>
+        </p:spPr>
+        <p:style>
+          <a:lnRef idx="2">
+            <a:schemeClr val="accent1">
+              <a:shade val="15000"/>
+            </a:schemeClr>
+          </a:lnRef>
+          <a:fillRef idx="1">
+            <a:schemeClr val="accent1"/>
+          </a:fillRef>
+          <a:effectRef idx="0">
+            <a:schemeClr val="accent1"/>
+          </a:effectRef>
+          <a:fontRef idx="minor">
+            <a:schemeClr val="lt1"/>
+          </a:fontRef>
+        </p:style>
+        <p:txBody>
+          <a:bodyPr rtlCol="0" anchor="ctr"/>
+          <a:lstStyle/>
+          <a:p>
+            <a:pPr algn="ctr"/>
+            <a:r>
+              <a:rPr lang="en-GB" sz="800" dirty="0">
+                <a:solidFill>
+                  <a:srgbClr val="0099CC"/>
+                </a:solidFill>
+                <a:latin typeface="Calibri Light" panose="020F0302020204030204" pitchFamily="34" charset="0"/>
+                <a:cs typeface="Calibri Light" panose="020F0302020204030204" pitchFamily="34" charset="0"/>
+              </a:rPr>
+              <a:t>Test predictions using the </a:t>
+            </a:r>
+            <a:r>
+              <a:rPr lang="en-GB" sz="800" b="1" dirty="0">
+                <a:solidFill>
+                  <a:srgbClr val="0099CC"/>
+                </a:solidFill>
+                <a:latin typeface="Calibri" panose="020F0502020204030204" pitchFamily="34" charset="0"/>
+                <a:cs typeface="Calibri" panose="020F0502020204030204" pitchFamily="34" charset="0"/>
+              </a:rPr>
+              <a:t>Precision-Recall curve </a:t>
+            </a:r>
+            <a:r>
+              <a:rPr lang="en-GB" sz="800" dirty="0">
+                <a:solidFill>
+                  <a:srgbClr val="0099CC"/>
+                </a:solidFill>
+                <a:latin typeface="Calibri Light" panose="020F0302020204030204" pitchFamily="34" charset="0"/>
+                <a:cs typeface="Calibri Light" panose="020F0302020204030204" pitchFamily="34" charset="0"/>
+              </a:rPr>
+              <a:t>and </a:t>
+            </a:r>
+            <a:r>
+              <a:rPr lang="en-GB" sz="800" b="1" dirty="0">
+                <a:solidFill>
+                  <a:srgbClr val="0099CC"/>
+                </a:solidFill>
+                <a:latin typeface="Calibri" panose="020F0502020204030204" pitchFamily="34" charset="0"/>
+                <a:cs typeface="Calibri" panose="020F0502020204030204" pitchFamily="34" charset="0"/>
+              </a:rPr>
+              <a:t>AUC-PR</a:t>
+            </a:r>
+            <a:r>
+              <a:rPr lang="en-GB" sz="800" dirty="0">
+                <a:solidFill>
+                  <a:srgbClr val="0099CC"/>
+                </a:solidFill>
+                <a:latin typeface="Calibri Light" panose="020F0302020204030204" pitchFamily="34" charset="0"/>
+                <a:cs typeface="Calibri Light" panose="020F0302020204030204" pitchFamily="34" charset="0"/>
+              </a:rPr>
+              <a:t>,  the </a:t>
+            </a:r>
+            <a:r>
+              <a:rPr lang="en-GB" sz="800" b="1" dirty="0">
+                <a:solidFill>
+                  <a:srgbClr val="0099CC"/>
+                </a:solidFill>
+                <a:latin typeface="Calibri" panose="020F0502020204030204" pitchFamily="34" charset="0"/>
+                <a:cs typeface="Calibri" panose="020F0502020204030204" pitchFamily="34" charset="0"/>
+              </a:rPr>
+              <a:t>ROC curve </a:t>
+            </a:r>
+            <a:r>
+              <a:rPr lang="en-GB" sz="800" dirty="0">
+                <a:solidFill>
+                  <a:srgbClr val="0099CC"/>
+                </a:solidFill>
+                <a:latin typeface="Calibri Light" panose="020F0302020204030204" pitchFamily="34" charset="0"/>
+                <a:cs typeface="Calibri Light" panose="020F0302020204030204" pitchFamily="34" charset="0"/>
+              </a:rPr>
+              <a:t>and </a:t>
+            </a:r>
+            <a:r>
+              <a:rPr lang="en-GB" sz="800" b="1" dirty="0">
+                <a:solidFill>
+                  <a:srgbClr val="0099CC"/>
+                </a:solidFill>
+                <a:latin typeface="Calibri" panose="020F0502020204030204" pitchFamily="34" charset="0"/>
+                <a:cs typeface="Calibri" panose="020F0502020204030204" pitchFamily="34" charset="0"/>
+              </a:rPr>
+              <a:t>AUC-ROC</a:t>
+            </a:r>
+            <a:r>
+              <a:rPr lang="en-GB" sz="800" dirty="0">
+                <a:solidFill>
+                  <a:srgbClr val="0099CC"/>
+                </a:solidFill>
+                <a:latin typeface="Calibri Light" panose="020F0302020204030204" pitchFamily="34" charset="0"/>
+                <a:cs typeface="Calibri Light" panose="020F0302020204030204" pitchFamily="34" charset="0"/>
+              </a:rPr>
+              <a:t>, the </a:t>
+            </a:r>
+            <a:r>
+              <a:rPr lang="en-GB" sz="800" b="1" dirty="0">
+                <a:solidFill>
+                  <a:srgbClr val="0099CC"/>
+                </a:solidFill>
+                <a:latin typeface="Calibri" panose="020F0502020204030204" pitchFamily="34" charset="0"/>
+                <a:cs typeface="Calibri" panose="020F0502020204030204" pitchFamily="34" charset="0"/>
+              </a:rPr>
+              <a:t>reliability diagram </a:t>
+            </a:r>
+            <a:r>
+              <a:rPr lang="en-GB" sz="800" dirty="0">
+                <a:solidFill>
+                  <a:srgbClr val="0099CC"/>
+                </a:solidFill>
+                <a:latin typeface="Calibri Light" panose="020F0302020204030204" pitchFamily="34" charset="0"/>
+                <a:cs typeface="Calibri Light" panose="020F0302020204030204" pitchFamily="34" charset="0"/>
+              </a:rPr>
+              <a:t>and the </a:t>
+            </a:r>
+            <a:r>
+              <a:rPr lang="en-GB" sz="800" b="1" dirty="0">
+                <a:solidFill>
+                  <a:srgbClr val="0099CC"/>
+                </a:solidFill>
+                <a:latin typeface="Calibri" panose="020F0502020204030204" pitchFamily="34" charset="0"/>
+                <a:cs typeface="Calibri" panose="020F0502020204030204" pitchFamily="34" charset="0"/>
+              </a:rPr>
+              <a:t>frequency bias</a:t>
+            </a:r>
+            <a:r>
+              <a:rPr lang="en-GB" sz="800" dirty="0">
+                <a:solidFill>
+                  <a:srgbClr val="0099CC"/>
+                </a:solidFill>
+                <a:latin typeface="Calibri Light" panose="020F0302020204030204" pitchFamily="34" charset="0"/>
+                <a:cs typeface="Calibri Light" panose="020F0302020204030204" pitchFamily="34" charset="0"/>
+              </a:rPr>
+              <a:t>.</a:t>
             </a:r>
           </a:p>
         </p:txBody>

</xml_diff>

<commit_message>
Improved figure workflow in chapter 6
</commit_message>
<xml_diff>
--- a/chapter_06/figures/cv_optuna.pptx
+++ b/chapter_06/figures/cv_optuna.pptx
@@ -2,14 +2,14 @@
 <file path=ppt/presentation.xml><?xml version="1.0" encoding="utf-8"?>
 <p:presentation xmlns:a="http://schemas.openxmlformats.org/drawingml/2006/main" xmlns:r="http://schemas.openxmlformats.org/officeDocument/2006/relationships" xmlns:p="http://schemas.openxmlformats.org/presentationml/2006/main" saveSubsetFonts="1">
   <p:sldMasterIdLst>
-    <p:sldMasterId id="2147483720" r:id="rId1"/>
+    <p:sldMasterId id="2147483732" r:id="rId1"/>
   </p:sldMasterIdLst>
   <p:sldIdLst>
     <p:sldId id="258" r:id="rId2"/>
     <p:sldId id="257" r:id="rId3"/>
     <p:sldId id="259" r:id="rId4"/>
   </p:sldIdLst>
-  <p:sldSz cx="4140200" cy="7073900"/>
+  <p:sldSz cx="4140200" cy="6480175"/>
   <p:notesSz cx="6858000" cy="9144000"/>
   <p:defaultTextStyle>
     <a:defPPr>
@@ -117,7 +117,7 @@
 <file path=ppt/revisionInfo.xml><?xml version="1.0" encoding="utf-8"?>
 <p1510:revInfo xmlns:a="http://schemas.openxmlformats.org/drawingml/2006/main" xmlns:r="http://schemas.openxmlformats.org/officeDocument/2006/relationships" xmlns:p1510="http://schemas.microsoft.com/office/powerpoint/2015/10/main">
   <p1510:revLst>
-    <p1510:client id="{0478CFAF-F744-4001-ABF3-5E8A4958592B}" v="134" dt="2025-07-05T17:17:17.389"/>
+    <p1510:client id="{0478CFAF-F744-4001-ABF3-5E8A4958592B}" v="149" dt="2025-07-05T17:32:00.704"/>
   </p1510:revLst>
 </p1510:revInfo>
 </file>
@@ -5954,18 +5954,18 @@
   <pc:docChgLst>
     <pc:chgData name="Fatima Pillosu" userId="a6295d4dc9e22643" providerId="LiveId" clId="{0478CFAF-F744-4001-ABF3-5E8A4958592B}"/>
     <pc:docChg chg="undo custSel modSld">
-      <pc:chgData name="Fatima Pillosu" userId="a6295d4dc9e22643" providerId="LiveId" clId="{0478CFAF-F744-4001-ABF3-5E8A4958592B}" dt="2025-07-05T17:18:02.779" v="2609" actId="14100"/>
+      <pc:chgData name="Fatima Pillosu" userId="a6295d4dc9e22643" providerId="LiveId" clId="{0478CFAF-F744-4001-ABF3-5E8A4958592B}" dt="2025-07-05T17:32:07.102" v="2909" actId="1036"/>
       <pc:docMkLst>
         <pc:docMk/>
       </pc:docMkLst>
       <pc:sldChg chg="addSp delSp modSp mod">
-        <pc:chgData name="Fatima Pillosu" userId="a6295d4dc9e22643" providerId="LiveId" clId="{0478CFAF-F744-4001-ABF3-5E8A4958592B}" dt="2025-07-05T17:00:28.975" v="2272" actId="1035"/>
+        <pc:chgData name="Fatima Pillosu" userId="a6295d4dc9e22643" providerId="LiveId" clId="{0478CFAF-F744-4001-ABF3-5E8A4958592B}" dt="2025-07-05T17:26:25.543" v="2752" actId="1038"/>
         <pc:sldMkLst>
           <pc:docMk/>
           <pc:sldMk cId="2827987875" sldId="257"/>
         </pc:sldMkLst>
         <pc:spChg chg="add mod">
-          <ac:chgData name="Fatima Pillosu" userId="a6295d4dc9e22643" providerId="LiveId" clId="{0478CFAF-F744-4001-ABF3-5E8A4958592B}" dt="2025-07-05T16:35:56.842" v="1639" actId="1076"/>
+          <ac:chgData name="Fatima Pillosu" userId="a6295d4dc9e22643" providerId="LiveId" clId="{0478CFAF-F744-4001-ABF3-5E8A4958592B}" dt="2025-07-05T17:23:54.087" v="2694" actId="1036"/>
           <ac:spMkLst>
             <pc:docMk/>
             <pc:sldMk cId="2827987875" sldId="257"/>
@@ -5973,7 +5973,7 @@
           </ac:spMkLst>
         </pc:spChg>
         <pc:spChg chg="add mod">
-          <ac:chgData name="Fatima Pillosu" userId="a6295d4dc9e22643" providerId="LiveId" clId="{0478CFAF-F744-4001-ABF3-5E8A4958592B}" dt="2025-07-05T16:36:19.145" v="1669" actId="20577"/>
+          <ac:chgData name="Fatima Pillosu" userId="a6295d4dc9e22643" providerId="LiveId" clId="{0478CFAF-F744-4001-ABF3-5E8A4958592B}" dt="2025-07-05T17:26:25.543" v="2752" actId="1038"/>
           <ac:spMkLst>
             <pc:docMk/>
             <pc:sldMk cId="2827987875" sldId="257"/>
@@ -5981,7 +5981,7 @@
           </ac:spMkLst>
         </pc:spChg>
         <pc:spChg chg="add mod">
-          <ac:chgData name="Fatima Pillosu" userId="a6295d4dc9e22643" providerId="LiveId" clId="{0478CFAF-F744-4001-ABF3-5E8A4958592B}" dt="2025-07-05T16:36:40.013" v="1677" actId="14100"/>
+          <ac:chgData name="Fatima Pillosu" userId="a6295d4dc9e22643" providerId="LiveId" clId="{0478CFAF-F744-4001-ABF3-5E8A4958592B}" dt="2025-07-05T17:23:48.774" v="2690" actId="1035"/>
           <ac:spMkLst>
             <pc:docMk/>
             <pc:sldMk cId="2827987875" sldId="257"/>
@@ -5997,7 +5997,7 @@
           </ac:spMkLst>
         </pc:spChg>
         <pc:spChg chg="mod">
-          <ac:chgData name="Fatima Pillosu" userId="a6295d4dc9e22643" providerId="LiveId" clId="{0478CFAF-F744-4001-ABF3-5E8A4958592B}" dt="2025-07-05T16:59:52.774" v="2257" actId="14100"/>
+          <ac:chgData name="Fatima Pillosu" userId="a6295d4dc9e22643" providerId="LiveId" clId="{0478CFAF-F744-4001-ABF3-5E8A4958592B}" dt="2025-07-05T17:23:34.042" v="2682" actId="1035"/>
           <ac:spMkLst>
             <pc:docMk/>
             <pc:sldMk cId="2827987875" sldId="257"/>
@@ -6005,7 +6005,7 @@
           </ac:spMkLst>
         </pc:spChg>
         <pc:spChg chg="mod">
-          <ac:chgData name="Fatima Pillosu" userId="a6295d4dc9e22643" providerId="LiveId" clId="{0478CFAF-F744-4001-ABF3-5E8A4958592B}" dt="2025-07-05T16:34:14.723" v="1547" actId="14100"/>
+          <ac:chgData name="Fatima Pillosu" userId="a6295d4dc9e22643" providerId="LiveId" clId="{0478CFAF-F744-4001-ABF3-5E8A4958592B}" dt="2025-07-05T17:23:34.042" v="2682" actId="1035"/>
           <ac:spMkLst>
             <pc:docMk/>
             <pc:sldMk cId="2827987875" sldId="257"/>
@@ -6013,7 +6013,23 @@
           </ac:spMkLst>
         </pc:spChg>
         <pc:spChg chg="mod">
-          <ac:chgData name="Fatima Pillosu" userId="a6295d4dc9e22643" providerId="LiveId" clId="{0478CFAF-F744-4001-ABF3-5E8A4958592B}" dt="2025-07-05T16:34:06.397" v="1541" actId="1036"/>
+          <ac:chgData name="Fatima Pillosu" userId="a6295d4dc9e22643" providerId="LiveId" clId="{0478CFAF-F744-4001-ABF3-5E8A4958592B}" dt="2025-07-05T17:23:34.042" v="2682" actId="1035"/>
+          <ac:spMkLst>
+            <pc:docMk/>
+            <pc:sldMk cId="2827987875" sldId="257"/>
+            <ac:spMk id="170" creationId="{7C7D3C35-5EFB-3A13-6947-6762E19973F1}"/>
+          </ac:spMkLst>
+        </pc:spChg>
+        <pc:spChg chg="mod">
+          <ac:chgData name="Fatima Pillosu" userId="a6295d4dc9e22643" providerId="LiveId" clId="{0478CFAF-F744-4001-ABF3-5E8A4958592B}" dt="2025-07-05T17:23:34.042" v="2682" actId="1035"/>
+          <ac:spMkLst>
+            <pc:docMk/>
+            <pc:sldMk cId="2827987875" sldId="257"/>
+            <ac:spMk id="171" creationId="{21013CC2-2CBD-C39B-16E9-48002B516D7A}"/>
+          </ac:spMkLst>
+        </pc:spChg>
+        <pc:spChg chg="mod">
+          <ac:chgData name="Fatima Pillosu" userId="a6295d4dc9e22643" providerId="LiveId" clId="{0478CFAF-F744-4001-ABF3-5E8A4958592B}" dt="2025-07-05T17:23:34.042" v="2682" actId="1035"/>
           <ac:spMkLst>
             <pc:docMk/>
             <pc:sldMk cId="2827987875" sldId="257"/>
@@ -6021,7 +6037,7 @@
           </ac:spMkLst>
         </pc:spChg>
         <pc:spChg chg="mod">
-          <ac:chgData name="Fatima Pillosu" userId="a6295d4dc9e22643" providerId="LiveId" clId="{0478CFAF-F744-4001-ABF3-5E8A4958592B}" dt="2025-07-05T16:34:06.397" v="1541" actId="1036"/>
+          <ac:chgData name="Fatima Pillosu" userId="a6295d4dc9e22643" providerId="LiveId" clId="{0478CFAF-F744-4001-ABF3-5E8A4958592B}" dt="2025-07-05T17:23:34.042" v="2682" actId="1035"/>
           <ac:spMkLst>
             <pc:docMk/>
             <pc:sldMk cId="2827987875" sldId="257"/>
@@ -6029,7 +6045,7 @@
           </ac:spMkLst>
         </pc:spChg>
         <pc:spChg chg="mod">
-          <ac:chgData name="Fatima Pillosu" userId="a6295d4dc9e22643" providerId="LiveId" clId="{0478CFAF-F744-4001-ABF3-5E8A4958592B}" dt="2025-07-05T16:34:06.397" v="1541" actId="1036"/>
+          <ac:chgData name="Fatima Pillosu" userId="a6295d4dc9e22643" providerId="LiveId" clId="{0478CFAF-F744-4001-ABF3-5E8A4958592B}" dt="2025-07-05T17:23:34.042" v="2682" actId="1035"/>
           <ac:spMkLst>
             <pc:docMk/>
             <pc:sldMk cId="2827987875" sldId="257"/>
@@ -6037,7 +6053,15 @@
           </ac:spMkLst>
         </pc:spChg>
         <pc:spChg chg="mod">
-          <ac:chgData name="Fatima Pillosu" userId="a6295d4dc9e22643" providerId="LiveId" clId="{0478CFAF-F744-4001-ABF3-5E8A4958592B}" dt="2025-07-05T16:34:06.397" v="1541" actId="1036"/>
+          <ac:chgData name="Fatima Pillosu" userId="a6295d4dc9e22643" providerId="LiveId" clId="{0478CFAF-F744-4001-ABF3-5E8A4958592B}" dt="2025-07-05T17:23:34.042" v="2682" actId="1035"/>
+          <ac:spMkLst>
+            <pc:docMk/>
+            <pc:sldMk cId="2827987875" sldId="257"/>
+            <ac:spMk id="188" creationId="{93CC8F30-4764-CC3C-ABBE-B779B4448D7C}"/>
+          </ac:spMkLst>
+        </pc:spChg>
+        <pc:spChg chg="mod">
+          <ac:chgData name="Fatima Pillosu" userId="a6295d4dc9e22643" providerId="LiveId" clId="{0478CFAF-F744-4001-ABF3-5E8A4958592B}" dt="2025-07-05T17:23:34.042" v="2682" actId="1035"/>
           <ac:spMkLst>
             <pc:docMk/>
             <pc:sldMk cId="2827987875" sldId="257"/>
@@ -6045,7 +6069,7 @@
           </ac:spMkLst>
         </pc:spChg>
         <pc:spChg chg="mod">
-          <ac:chgData name="Fatima Pillosu" userId="a6295d4dc9e22643" providerId="LiveId" clId="{0478CFAF-F744-4001-ABF3-5E8A4958592B}" dt="2025-07-05T16:34:06.397" v="1541" actId="1036"/>
+          <ac:chgData name="Fatima Pillosu" userId="a6295d4dc9e22643" providerId="LiveId" clId="{0478CFAF-F744-4001-ABF3-5E8A4958592B}" dt="2025-07-05T17:23:34.042" v="2682" actId="1035"/>
           <ac:spMkLst>
             <pc:docMk/>
             <pc:sldMk cId="2827987875" sldId="257"/>
@@ -6053,7 +6077,7 @@
           </ac:spMkLst>
         </pc:spChg>
         <pc:spChg chg="mod">
-          <ac:chgData name="Fatima Pillosu" userId="a6295d4dc9e22643" providerId="LiveId" clId="{0478CFAF-F744-4001-ABF3-5E8A4958592B}" dt="2025-07-05T16:34:06.397" v="1541" actId="1036"/>
+          <ac:chgData name="Fatima Pillosu" userId="a6295d4dc9e22643" providerId="LiveId" clId="{0478CFAF-F744-4001-ABF3-5E8A4958592B}" dt="2025-07-05T17:23:34.042" v="2682" actId="1035"/>
           <ac:spMkLst>
             <pc:docMk/>
             <pc:sldMk cId="2827987875" sldId="257"/>
@@ -6061,7 +6085,7 @@
           </ac:spMkLst>
         </pc:spChg>
         <pc:spChg chg="mod">
-          <ac:chgData name="Fatima Pillosu" userId="a6295d4dc9e22643" providerId="LiveId" clId="{0478CFAF-F744-4001-ABF3-5E8A4958592B}" dt="2025-07-05T16:34:06.397" v="1541" actId="1036"/>
+          <ac:chgData name="Fatima Pillosu" userId="a6295d4dc9e22643" providerId="LiveId" clId="{0478CFAF-F744-4001-ABF3-5E8A4958592B}" dt="2025-07-05T17:23:34.042" v="2682" actId="1035"/>
           <ac:spMkLst>
             <pc:docMk/>
             <pc:sldMk cId="2827987875" sldId="257"/>
@@ -6069,7 +6093,7 @@
           </ac:spMkLst>
         </pc:spChg>
         <pc:spChg chg="mod">
-          <ac:chgData name="Fatima Pillosu" userId="a6295d4dc9e22643" providerId="LiveId" clId="{0478CFAF-F744-4001-ABF3-5E8A4958592B}" dt="2025-07-05T16:34:06.397" v="1541" actId="1036"/>
+          <ac:chgData name="Fatima Pillosu" userId="a6295d4dc9e22643" providerId="LiveId" clId="{0478CFAF-F744-4001-ABF3-5E8A4958592B}" dt="2025-07-05T17:23:34.042" v="2682" actId="1035"/>
           <ac:spMkLst>
             <pc:docMk/>
             <pc:sldMk cId="2827987875" sldId="257"/>
@@ -6077,7 +6101,7 @@
           </ac:spMkLst>
         </pc:spChg>
         <pc:spChg chg="mod">
-          <ac:chgData name="Fatima Pillosu" userId="a6295d4dc9e22643" providerId="LiveId" clId="{0478CFAF-F744-4001-ABF3-5E8A4958592B}" dt="2025-07-05T16:34:06.397" v="1541" actId="1036"/>
+          <ac:chgData name="Fatima Pillosu" userId="a6295d4dc9e22643" providerId="LiveId" clId="{0478CFAF-F744-4001-ABF3-5E8A4958592B}" dt="2025-07-05T17:23:34.042" v="2682" actId="1035"/>
           <ac:spMkLst>
             <pc:docMk/>
             <pc:sldMk cId="2827987875" sldId="257"/>
@@ -6085,7 +6109,359 @@
           </ac:spMkLst>
         </pc:spChg>
         <pc:spChg chg="mod">
-          <ac:chgData name="Fatima Pillosu" userId="a6295d4dc9e22643" providerId="LiveId" clId="{0478CFAF-F744-4001-ABF3-5E8A4958592B}" dt="2025-07-05T16:34:26.177" v="1553" actId="1037"/>
+          <ac:chgData name="Fatima Pillosu" userId="a6295d4dc9e22643" providerId="LiveId" clId="{0478CFAF-F744-4001-ABF3-5E8A4958592B}" dt="2025-07-05T17:23:34.042" v="2682" actId="1035"/>
+          <ac:spMkLst>
+            <pc:docMk/>
+            <pc:sldMk cId="2827987875" sldId="257"/>
+            <ac:spMk id="205" creationId="{FA282F67-8084-9E56-B834-4484CCDC84E3}"/>
+          </ac:spMkLst>
+        </pc:spChg>
+        <pc:spChg chg="mod">
+          <ac:chgData name="Fatima Pillosu" userId="a6295d4dc9e22643" providerId="LiveId" clId="{0478CFAF-F744-4001-ABF3-5E8A4958592B}" dt="2025-07-05T17:23:34.042" v="2682" actId="1035"/>
+          <ac:spMkLst>
+            <pc:docMk/>
+            <pc:sldMk cId="2827987875" sldId="257"/>
+            <ac:spMk id="206" creationId="{C81D98BC-2D2D-79A0-E985-C2CF33E2CF29}"/>
+          </ac:spMkLst>
+        </pc:spChg>
+        <pc:spChg chg="mod">
+          <ac:chgData name="Fatima Pillosu" userId="a6295d4dc9e22643" providerId="LiveId" clId="{0478CFAF-F744-4001-ABF3-5E8A4958592B}" dt="2025-07-05T17:23:34.042" v="2682" actId="1035"/>
+          <ac:spMkLst>
+            <pc:docMk/>
+            <pc:sldMk cId="2827987875" sldId="257"/>
+            <ac:spMk id="207" creationId="{FDC28721-23B8-EBB7-71A2-B83556298249}"/>
+          </ac:spMkLst>
+        </pc:spChg>
+        <pc:spChg chg="mod">
+          <ac:chgData name="Fatima Pillosu" userId="a6295d4dc9e22643" providerId="LiveId" clId="{0478CFAF-F744-4001-ABF3-5E8A4958592B}" dt="2025-07-05T17:23:34.042" v="2682" actId="1035"/>
+          <ac:spMkLst>
+            <pc:docMk/>
+            <pc:sldMk cId="2827987875" sldId="257"/>
+            <ac:spMk id="209" creationId="{ED1F9E4C-3B78-CEA9-7FCE-A5170203DA35}"/>
+          </ac:spMkLst>
+        </pc:spChg>
+        <pc:spChg chg="mod">
+          <ac:chgData name="Fatima Pillosu" userId="a6295d4dc9e22643" providerId="LiveId" clId="{0478CFAF-F744-4001-ABF3-5E8A4958592B}" dt="2025-07-05T17:23:34.042" v="2682" actId="1035"/>
+          <ac:spMkLst>
+            <pc:docMk/>
+            <pc:sldMk cId="2827987875" sldId="257"/>
+            <ac:spMk id="210" creationId="{6622E0D0-E807-65A1-4F7D-5AC133873464}"/>
+          </ac:spMkLst>
+        </pc:spChg>
+        <pc:spChg chg="mod">
+          <ac:chgData name="Fatima Pillosu" userId="a6295d4dc9e22643" providerId="LiveId" clId="{0478CFAF-F744-4001-ABF3-5E8A4958592B}" dt="2025-07-05T17:23:34.042" v="2682" actId="1035"/>
+          <ac:spMkLst>
+            <pc:docMk/>
+            <pc:sldMk cId="2827987875" sldId="257"/>
+            <ac:spMk id="211" creationId="{8462A943-9388-0455-3059-F928B8276707}"/>
+          </ac:spMkLst>
+        </pc:spChg>
+        <pc:spChg chg="mod">
+          <ac:chgData name="Fatima Pillosu" userId="a6295d4dc9e22643" providerId="LiveId" clId="{0478CFAF-F744-4001-ABF3-5E8A4958592B}" dt="2025-07-05T17:23:34.042" v="2682" actId="1035"/>
+          <ac:spMkLst>
+            <pc:docMk/>
+            <pc:sldMk cId="2827987875" sldId="257"/>
+            <ac:spMk id="212" creationId="{4A184943-2199-9A52-0167-939C15F9A318}"/>
+          </ac:spMkLst>
+        </pc:spChg>
+        <pc:spChg chg="mod">
+          <ac:chgData name="Fatima Pillosu" userId="a6295d4dc9e22643" providerId="LiveId" clId="{0478CFAF-F744-4001-ABF3-5E8A4958592B}" dt="2025-07-05T17:23:34.042" v="2682" actId="1035"/>
+          <ac:spMkLst>
+            <pc:docMk/>
+            <pc:sldMk cId="2827987875" sldId="257"/>
+            <ac:spMk id="213" creationId="{957C8477-35FC-0350-230A-D674CF5EF8C7}"/>
+          </ac:spMkLst>
+        </pc:spChg>
+        <pc:spChg chg="mod">
+          <ac:chgData name="Fatima Pillosu" userId="a6295d4dc9e22643" providerId="LiveId" clId="{0478CFAF-F744-4001-ABF3-5E8A4958592B}" dt="2025-07-05T17:23:34.042" v="2682" actId="1035"/>
+          <ac:spMkLst>
+            <pc:docMk/>
+            <pc:sldMk cId="2827987875" sldId="257"/>
+            <ac:spMk id="214" creationId="{18B83974-1713-8978-DABF-B66B3B534F5C}"/>
+          </ac:spMkLst>
+        </pc:spChg>
+        <pc:spChg chg="mod">
+          <ac:chgData name="Fatima Pillosu" userId="a6295d4dc9e22643" providerId="LiveId" clId="{0478CFAF-F744-4001-ABF3-5E8A4958592B}" dt="2025-07-05T17:23:34.042" v="2682" actId="1035"/>
+          <ac:spMkLst>
+            <pc:docMk/>
+            <pc:sldMk cId="2827987875" sldId="257"/>
+            <ac:spMk id="215" creationId="{1E0300A3-F516-67F5-529B-5235613B6340}"/>
+          </ac:spMkLst>
+        </pc:spChg>
+        <pc:spChg chg="mod">
+          <ac:chgData name="Fatima Pillosu" userId="a6295d4dc9e22643" providerId="LiveId" clId="{0478CFAF-F744-4001-ABF3-5E8A4958592B}" dt="2025-07-05T17:23:34.042" v="2682" actId="1035"/>
+          <ac:spMkLst>
+            <pc:docMk/>
+            <pc:sldMk cId="2827987875" sldId="257"/>
+            <ac:spMk id="217" creationId="{280B9147-4787-B602-2AE9-E85DF03A2F3F}"/>
+          </ac:spMkLst>
+        </pc:spChg>
+        <pc:spChg chg="mod">
+          <ac:chgData name="Fatima Pillosu" userId="a6295d4dc9e22643" providerId="LiveId" clId="{0478CFAF-F744-4001-ABF3-5E8A4958592B}" dt="2025-07-05T17:23:34.042" v="2682" actId="1035"/>
+          <ac:spMkLst>
+            <pc:docMk/>
+            <pc:sldMk cId="2827987875" sldId="257"/>
+            <ac:spMk id="219" creationId="{7ECA3901-3DB1-6E1D-5036-0DB5DF0C7576}"/>
+          </ac:spMkLst>
+        </pc:spChg>
+        <pc:spChg chg="mod">
+          <ac:chgData name="Fatima Pillosu" userId="a6295d4dc9e22643" providerId="LiveId" clId="{0478CFAF-F744-4001-ABF3-5E8A4958592B}" dt="2025-07-05T17:23:34.042" v="2682" actId="1035"/>
+          <ac:spMkLst>
+            <pc:docMk/>
+            <pc:sldMk cId="2827987875" sldId="257"/>
+            <ac:spMk id="220" creationId="{C5304D2E-D381-327C-5C60-6C5D381B7125}"/>
+          </ac:spMkLst>
+        </pc:spChg>
+        <pc:spChg chg="mod">
+          <ac:chgData name="Fatima Pillosu" userId="a6295d4dc9e22643" providerId="LiveId" clId="{0478CFAF-F744-4001-ABF3-5E8A4958592B}" dt="2025-07-05T17:23:34.042" v="2682" actId="1035"/>
+          <ac:spMkLst>
+            <pc:docMk/>
+            <pc:sldMk cId="2827987875" sldId="257"/>
+            <ac:spMk id="221" creationId="{E83E585C-BCE1-515E-96B8-4B69D9B9C91E}"/>
+          </ac:spMkLst>
+        </pc:spChg>
+        <pc:spChg chg="mod">
+          <ac:chgData name="Fatima Pillosu" userId="a6295d4dc9e22643" providerId="LiveId" clId="{0478CFAF-F744-4001-ABF3-5E8A4958592B}" dt="2025-07-05T17:23:34.042" v="2682" actId="1035"/>
+          <ac:spMkLst>
+            <pc:docMk/>
+            <pc:sldMk cId="2827987875" sldId="257"/>
+            <ac:spMk id="223" creationId="{C426AD2C-DF9C-29A2-8170-D8D303C2DA73}"/>
+          </ac:spMkLst>
+        </pc:spChg>
+        <pc:spChg chg="mod">
+          <ac:chgData name="Fatima Pillosu" userId="a6295d4dc9e22643" providerId="LiveId" clId="{0478CFAF-F744-4001-ABF3-5E8A4958592B}" dt="2025-07-05T17:23:34.042" v="2682" actId="1035"/>
+          <ac:spMkLst>
+            <pc:docMk/>
+            <pc:sldMk cId="2827987875" sldId="257"/>
+            <ac:spMk id="224" creationId="{F351FBF1-1DB8-EFE9-BD08-17451B714551}"/>
+          </ac:spMkLst>
+        </pc:spChg>
+        <pc:spChg chg="mod">
+          <ac:chgData name="Fatima Pillosu" userId="a6295d4dc9e22643" providerId="LiveId" clId="{0478CFAF-F744-4001-ABF3-5E8A4958592B}" dt="2025-07-05T17:23:34.042" v="2682" actId="1035"/>
+          <ac:spMkLst>
+            <pc:docMk/>
+            <pc:sldMk cId="2827987875" sldId="257"/>
+            <ac:spMk id="225" creationId="{9B95412B-D806-143C-3830-9B8801E66792}"/>
+          </ac:spMkLst>
+        </pc:spChg>
+        <pc:spChg chg="mod">
+          <ac:chgData name="Fatima Pillosu" userId="a6295d4dc9e22643" providerId="LiveId" clId="{0478CFAF-F744-4001-ABF3-5E8A4958592B}" dt="2025-07-05T17:23:34.042" v="2682" actId="1035"/>
+          <ac:spMkLst>
+            <pc:docMk/>
+            <pc:sldMk cId="2827987875" sldId="257"/>
+            <ac:spMk id="226" creationId="{562B4D07-D19B-D168-2215-C3CD4342B333}"/>
+          </ac:spMkLst>
+        </pc:spChg>
+        <pc:spChg chg="mod">
+          <ac:chgData name="Fatima Pillosu" userId="a6295d4dc9e22643" providerId="LiveId" clId="{0478CFAF-F744-4001-ABF3-5E8A4958592B}" dt="2025-07-05T17:23:34.042" v="2682" actId="1035"/>
+          <ac:spMkLst>
+            <pc:docMk/>
+            <pc:sldMk cId="2827987875" sldId="257"/>
+            <ac:spMk id="227" creationId="{BBE9715F-452C-C7FC-052C-1718B74FFCCB}"/>
+          </ac:spMkLst>
+        </pc:spChg>
+        <pc:spChg chg="mod">
+          <ac:chgData name="Fatima Pillosu" userId="a6295d4dc9e22643" providerId="LiveId" clId="{0478CFAF-F744-4001-ABF3-5E8A4958592B}" dt="2025-07-05T17:23:34.042" v="2682" actId="1035"/>
+          <ac:spMkLst>
+            <pc:docMk/>
+            <pc:sldMk cId="2827987875" sldId="257"/>
+            <ac:spMk id="228" creationId="{7B3C287B-1DA5-EC40-9A72-DFDE07DD4917}"/>
+          </ac:spMkLst>
+        </pc:spChg>
+        <pc:spChg chg="mod">
+          <ac:chgData name="Fatima Pillosu" userId="a6295d4dc9e22643" providerId="LiveId" clId="{0478CFAF-F744-4001-ABF3-5E8A4958592B}" dt="2025-07-05T17:23:34.042" v="2682" actId="1035"/>
+          <ac:spMkLst>
+            <pc:docMk/>
+            <pc:sldMk cId="2827987875" sldId="257"/>
+            <ac:spMk id="229" creationId="{E1D2FDBD-5990-AA59-D135-738D5B5BB537}"/>
+          </ac:spMkLst>
+        </pc:spChg>
+        <pc:spChg chg="mod">
+          <ac:chgData name="Fatima Pillosu" userId="a6295d4dc9e22643" providerId="LiveId" clId="{0478CFAF-F744-4001-ABF3-5E8A4958592B}" dt="2025-07-05T17:23:34.042" v="2682" actId="1035"/>
+          <ac:spMkLst>
+            <pc:docMk/>
+            <pc:sldMk cId="2827987875" sldId="257"/>
+            <ac:spMk id="231" creationId="{0FFEAB08-8128-36EC-585B-946DE19FF360}"/>
+          </ac:spMkLst>
+        </pc:spChg>
+        <pc:spChg chg="mod">
+          <ac:chgData name="Fatima Pillosu" userId="a6295d4dc9e22643" providerId="LiveId" clId="{0478CFAF-F744-4001-ABF3-5E8A4958592B}" dt="2025-07-05T17:23:34.042" v="2682" actId="1035"/>
+          <ac:spMkLst>
+            <pc:docMk/>
+            <pc:sldMk cId="2827987875" sldId="257"/>
+            <ac:spMk id="233" creationId="{77D3E3A7-04A2-EE4E-4C7D-9B7B76DD8FF4}"/>
+          </ac:spMkLst>
+        </pc:spChg>
+        <pc:spChg chg="mod">
+          <ac:chgData name="Fatima Pillosu" userId="a6295d4dc9e22643" providerId="LiveId" clId="{0478CFAF-F744-4001-ABF3-5E8A4958592B}" dt="2025-07-05T17:23:34.042" v="2682" actId="1035"/>
+          <ac:spMkLst>
+            <pc:docMk/>
+            <pc:sldMk cId="2827987875" sldId="257"/>
+            <ac:spMk id="234" creationId="{3B74AE2E-7C33-ED9E-28B7-650B9766EF62}"/>
+          </ac:spMkLst>
+        </pc:spChg>
+        <pc:spChg chg="mod">
+          <ac:chgData name="Fatima Pillosu" userId="a6295d4dc9e22643" providerId="LiveId" clId="{0478CFAF-F744-4001-ABF3-5E8A4958592B}" dt="2025-07-05T17:23:34.042" v="2682" actId="1035"/>
+          <ac:spMkLst>
+            <pc:docMk/>
+            <pc:sldMk cId="2827987875" sldId="257"/>
+            <ac:spMk id="235" creationId="{A4700F22-87FF-E3F3-0AB5-FE64CC71C970}"/>
+          </ac:spMkLst>
+        </pc:spChg>
+        <pc:spChg chg="mod">
+          <ac:chgData name="Fatima Pillosu" userId="a6295d4dc9e22643" providerId="LiveId" clId="{0478CFAF-F744-4001-ABF3-5E8A4958592B}" dt="2025-07-05T17:23:34.042" v="2682" actId="1035"/>
+          <ac:spMkLst>
+            <pc:docMk/>
+            <pc:sldMk cId="2827987875" sldId="257"/>
+            <ac:spMk id="237" creationId="{684D11EF-8EE3-3095-57C1-ECA5759EA1A5}"/>
+          </ac:spMkLst>
+        </pc:spChg>
+        <pc:spChg chg="mod">
+          <ac:chgData name="Fatima Pillosu" userId="a6295d4dc9e22643" providerId="LiveId" clId="{0478CFAF-F744-4001-ABF3-5E8A4958592B}" dt="2025-07-05T17:23:34.042" v="2682" actId="1035"/>
+          <ac:spMkLst>
+            <pc:docMk/>
+            <pc:sldMk cId="2827987875" sldId="257"/>
+            <ac:spMk id="238" creationId="{49AF96A6-4EC9-00A3-8497-B65D39AA3C75}"/>
+          </ac:spMkLst>
+        </pc:spChg>
+        <pc:spChg chg="mod">
+          <ac:chgData name="Fatima Pillosu" userId="a6295d4dc9e22643" providerId="LiveId" clId="{0478CFAF-F744-4001-ABF3-5E8A4958592B}" dt="2025-07-05T17:23:34.042" v="2682" actId="1035"/>
+          <ac:spMkLst>
+            <pc:docMk/>
+            <pc:sldMk cId="2827987875" sldId="257"/>
+            <ac:spMk id="239" creationId="{FF05681B-B742-6F1B-25A4-63EBEFDF3B7F}"/>
+          </ac:spMkLst>
+        </pc:spChg>
+        <pc:spChg chg="mod">
+          <ac:chgData name="Fatima Pillosu" userId="a6295d4dc9e22643" providerId="LiveId" clId="{0478CFAF-F744-4001-ABF3-5E8A4958592B}" dt="2025-07-05T17:23:34.042" v="2682" actId="1035"/>
+          <ac:spMkLst>
+            <pc:docMk/>
+            <pc:sldMk cId="2827987875" sldId="257"/>
+            <ac:spMk id="240" creationId="{3476CD23-92F5-79F6-02B2-30620036B905}"/>
+          </ac:spMkLst>
+        </pc:spChg>
+        <pc:spChg chg="mod">
+          <ac:chgData name="Fatima Pillosu" userId="a6295d4dc9e22643" providerId="LiveId" clId="{0478CFAF-F744-4001-ABF3-5E8A4958592B}" dt="2025-07-05T17:23:34.042" v="2682" actId="1035"/>
+          <ac:spMkLst>
+            <pc:docMk/>
+            <pc:sldMk cId="2827987875" sldId="257"/>
+            <ac:spMk id="241" creationId="{B25532B5-CE42-9DD2-9150-B63484A87891}"/>
+          </ac:spMkLst>
+        </pc:spChg>
+        <pc:spChg chg="mod">
+          <ac:chgData name="Fatima Pillosu" userId="a6295d4dc9e22643" providerId="LiveId" clId="{0478CFAF-F744-4001-ABF3-5E8A4958592B}" dt="2025-07-05T17:23:34.042" v="2682" actId="1035"/>
+          <ac:spMkLst>
+            <pc:docMk/>
+            <pc:sldMk cId="2827987875" sldId="257"/>
+            <ac:spMk id="242" creationId="{C3BFD9C3-2B9C-3D8D-6F09-EB5695DC0615}"/>
+          </ac:spMkLst>
+        </pc:spChg>
+        <pc:spChg chg="mod">
+          <ac:chgData name="Fatima Pillosu" userId="a6295d4dc9e22643" providerId="LiveId" clId="{0478CFAF-F744-4001-ABF3-5E8A4958592B}" dt="2025-07-05T17:23:34.042" v="2682" actId="1035"/>
+          <ac:spMkLst>
+            <pc:docMk/>
+            <pc:sldMk cId="2827987875" sldId="257"/>
+            <ac:spMk id="243" creationId="{311EE729-5BDB-1DED-5042-10C2639D12C2}"/>
+          </ac:spMkLst>
+        </pc:spChg>
+        <pc:spChg chg="mod">
+          <ac:chgData name="Fatima Pillosu" userId="a6295d4dc9e22643" providerId="LiveId" clId="{0478CFAF-F744-4001-ABF3-5E8A4958592B}" dt="2025-07-05T17:23:34.042" v="2682" actId="1035"/>
+          <ac:spMkLst>
+            <pc:docMk/>
+            <pc:sldMk cId="2827987875" sldId="257"/>
+            <ac:spMk id="245" creationId="{320718EB-EA18-F146-1688-68C7FF7410B4}"/>
+          </ac:spMkLst>
+        </pc:spChg>
+        <pc:spChg chg="mod">
+          <ac:chgData name="Fatima Pillosu" userId="a6295d4dc9e22643" providerId="LiveId" clId="{0478CFAF-F744-4001-ABF3-5E8A4958592B}" dt="2025-07-05T17:23:34.042" v="2682" actId="1035"/>
+          <ac:spMkLst>
+            <pc:docMk/>
+            <pc:sldMk cId="2827987875" sldId="257"/>
+            <ac:spMk id="247" creationId="{F5E83FE7-E223-A34B-1AA5-63C6D4927847}"/>
+          </ac:spMkLst>
+        </pc:spChg>
+        <pc:spChg chg="mod">
+          <ac:chgData name="Fatima Pillosu" userId="a6295d4dc9e22643" providerId="LiveId" clId="{0478CFAF-F744-4001-ABF3-5E8A4958592B}" dt="2025-07-05T17:23:34.042" v="2682" actId="1035"/>
+          <ac:spMkLst>
+            <pc:docMk/>
+            <pc:sldMk cId="2827987875" sldId="257"/>
+            <ac:spMk id="248" creationId="{C4F278CC-89FC-102D-C64D-9E0D80ECDA19}"/>
+          </ac:spMkLst>
+        </pc:spChg>
+        <pc:spChg chg="mod">
+          <ac:chgData name="Fatima Pillosu" userId="a6295d4dc9e22643" providerId="LiveId" clId="{0478CFAF-F744-4001-ABF3-5E8A4958592B}" dt="2025-07-05T17:23:34.042" v="2682" actId="1035"/>
+          <ac:spMkLst>
+            <pc:docMk/>
+            <pc:sldMk cId="2827987875" sldId="257"/>
+            <ac:spMk id="249" creationId="{EC627BA5-8EA7-715D-A0C8-BC6B2265871D}"/>
+          </ac:spMkLst>
+        </pc:spChg>
+        <pc:spChg chg="mod">
+          <ac:chgData name="Fatima Pillosu" userId="a6295d4dc9e22643" providerId="LiveId" clId="{0478CFAF-F744-4001-ABF3-5E8A4958592B}" dt="2025-07-05T17:23:34.042" v="2682" actId="1035"/>
+          <ac:spMkLst>
+            <pc:docMk/>
+            <pc:sldMk cId="2827987875" sldId="257"/>
+            <ac:spMk id="251" creationId="{2932F01D-ACD4-977D-6F37-910556CF8A45}"/>
+          </ac:spMkLst>
+        </pc:spChg>
+        <pc:spChg chg="mod">
+          <ac:chgData name="Fatima Pillosu" userId="a6295d4dc9e22643" providerId="LiveId" clId="{0478CFAF-F744-4001-ABF3-5E8A4958592B}" dt="2025-07-05T17:23:34.042" v="2682" actId="1035"/>
+          <ac:spMkLst>
+            <pc:docMk/>
+            <pc:sldMk cId="2827987875" sldId="257"/>
+            <ac:spMk id="252" creationId="{E3EE0089-BDFC-C426-5F18-3B0748B58620}"/>
+          </ac:spMkLst>
+        </pc:spChg>
+        <pc:spChg chg="mod">
+          <ac:chgData name="Fatima Pillosu" userId="a6295d4dc9e22643" providerId="LiveId" clId="{0478CFAF-F744-4001-ABF3-5E8A4958592B}" dt="2025-07-05T17:23:34.042" v="2682" actId="1035"/>
+          <ac:spMkLst>
+            <pc:docMk/>
+            <pc:sldMk cId="2827987875" sldId="257"/>
+            <ac:spMk id="253" creationId="{0C53BAB0-D220-AF31-1AD4-EE2CD308359D}"/>
+          </ac:spMkLst>
+        </pc:spChg>
+        <pc:spChg chg="mod">
+          <ac:chgData name="Fatima Pillosu" userId="a6295d4dc9e22643" providerId="LiveId" clId="{0478CFAF-F744-4001-ABF3-5E8A4958592B}" dt="2025-07-05T17:23:34.042" v="2682" actId="1035"/>
+          <ac:spMkLst>
+            <pc:docMk/>
+            <pc:sldMk cId="2827987875" sldId="257"/>
+            <ac:spMk id="254" creationId="{72C9621B-4A51-E446-0DFE-5B56299EE705}"/>
+          </ac:spMkLst>
+        </pc:spChg>
+        <pc:spChg chg="mod">
+          <ac:chgData name="Fatima Pillosu" userId="a6295d4dc9e22643" providerId="LiveId" clId="{0478CFAF-F744-4001-ABF3-5E8A4958592B}" dt="2025-07-05T17:23:34.042" v="2682" actId="1035"/>
+          <ac:spMkLst>
+            <pc:docMk/>
+            <pc:sldMk cId="2827987875" sldId="257"/>
+            <ac:spMk id="255" creationId="{195F49FD-B57E-86DF-8892-33895D300551}"/>
+          </ac:spMkLst>
+        </pc:spChg>
+        <pc:spChg chg="mod">
+          <ac:chgData name="Fatima Pillosu" userId="a6295d4dc9e22643" providerId="LiveId" clId="{0478CFAF-F744-4001-ABF3-5E8A4958592B}" dt="2025-07-05T17:23:34.042" v="2682" actId="1035"/>
+          <ac:spMkLst>
+            <pc:docMk/>
+            <pc:sldMk cId="2827987875" sldId="257"/>
+            <ac:spMk id="256" creationId="{15F2EBE1-F19B-E61F-FCA9-6B9ABF4E855C}"/>
+          </ac:spMkLst>
+        </pc:spChg>
+        <pc:spChg chg="mod">
+          <ac:chgData name="Fatima Pillosu" userId="a6295d4dc9e22643" providerId="LiveId" clId="{0478CFAF-F744-4001-ABF3-5E8A4958592B}" dt="2025-07-05T17:23:34.042" v="2682" actId="1035"/>
+          <ac:spMkLst>
+            <pc:docMk/>
+            <pc:sldMk cId="2827987875" sldId="257"/>
+            <ac:spMk id="257" creationId="{08BD692E-B98C-93F4-B769-C2EA09747AE7}"/>
+          </ac:spMkLst>
+        </pc:spChg>
+        <pc:spChg chg="mod">
+          <ac:chgData name="Fatima Pillosu" userId="a6295d4dc9e22643" providerId="LiveId" clId="{0478CFAF-F744-4001-ABF3-5E8A4958592B}" dt="2025-07-05T17:23:34.042" v="2682" actId="1035"/>
+          <ac:spMkLst>
+            <pc:docMk/>
+            <pc:sldMk cId="2827987875" sldId="257"/>
+            <ac:spMk id="259" creationId="{0D62A59A-16B8-50D6-6107-13060486C2B1}"/>
+          </ac:spMkLst>
+        </pc:spChg>
+        <pc:spChg chg="mod">
+          <ac:chgData name="Fatima Pillosu" userId="a6295d4dc9e22643" providerId="LiveId" clId="{0478CFAF-F744-4001-ABF3-5E8A4958592B}" dt="2025-07-05T17:23:34.042" v="2682" actId="1035"/>
           <ac:spMkLst>
             <pc:docMk/>
             <pc:sldMk cId="2827987875" sldId="257"/>
@@ -6093,7 +6469,7 @@
           </ac:spMkLst>
         </pc:spChg>
         <pc:spChg chg="mod">
-          <ac:chgData name="Fatima Pillosu" userId="a6295d4dc9e22643" providerId="LiveId" clId="{0478CFAF-F744-4001-ABF3-5E8A4958592B}" dt="2025-07-05T16:34:06.397" v="1541" actId="1036"/>
+          <ac:chgData name="Fatima Pillosu" userId="a6295d4dc9e22643" providerId="LiveId" clId="{0478CFAF-F744-4001-ABF3-5E8A4958592B}" dt="2025-07-05T17:23:34.042" v="2682" actId="1035"/>
           <ac:spMkLst>
             <pc:docMk/>
             <pc:sldMk cId="2827987875" sldId="257"/>
@@ -6101,7 +6477,7 @@
           </ac:spMkLst>
         </pc:spChg>
         <pc:spChg chg="mod">
-          <ac:chgData name="Fatima Pillosu" userId="a6295d4dc9e22643" providerId="LiveId" clId="{0478CFAF-F744-4001-ABF3-5E8A4958592B}" dt="2025-07-05T16:34:06.397" v="1541" actId="1036"/>
+          <ac:chgData name="Fatima Pillosu" userId="a6295d4dc9e22643" providerId="LiveId" clId="{0478CFAF-F744-4001-ABF3-5E8A4958592B}" dt="2025-07-05T17:23:34.042" v="2682" actId="1035"/>
           <ac:spMkLst>
             <pc:docMk/>
             <pc:sldMk cId="2827987875" sldId="257"/>
@@ -6109,7 +6485,79 @@
           </ac:spMkLst>
         </pc:spChg>
         <pc:spChg chg="mod">
-          <ac:chgData name="Fatima Pillosu" userId="a6295d4dc9e22643" providerId="LiveId" clId="{0478CFAF-F744-4001-ABF3-5E8A4958592B}" dt="2025-07-05T17:00:28.975" v="2272" actId="1035"/>
+          <ac:chgData name="Fatima Pillosu" userId="a6295d4dc9e22643" providerId="LiveId" clId="{0478CFAF-F744-4001-ABF3-5E8A4958592B}" dt="2025-07-05T17:23:34.042" v="2682" actId="1035"/>
+          <ac:spMkLst>
+            <pc:docMk/>
+            <pc:sldMk cId="2827987875" sldId="257"/>
+            <ac:spMk id="274" creationId="{67D32D45-2DC0-2072-3AB4-37C1E02B2376}"/>
+          </ac:spMkLst>
+        </pc:spChg>
+        <pc:spChg chg="mod">
+          <ac:chgData name="Fatima Pillosu" userId="a6295d4dc9e22643" providerId="LiveId" clId="{0478CFAF-F744-4001-ABF3-5E8A4958592B}" dt="2025-07-05T17:23:34.042" v="2682" actId="1035"/>
+          <ac:spMkLst>
+            <pc:docMk/>
+            <pc:sldMk cId="2827987875" sldId="257"/>
+            <ac:spMk id="275" creationId="{7938D923-20CB-2406-E297-81877AE34A20}"/>
+          </ac:spMkLst>
+        </pc:spChg>
+        <pc:spChg chg="mod">
+          <ac:chgData name="Fatima Pillosu" userId="a6295d4dc9e22643" providerId="LiveId" clId="{0478CFAF-F744-4001-ABF3-5E8A4958592B}" dt="2025-07-05T17:23:34.042" v="2682" actId="1035"/>
+          <ac:spMkLst>
+            <pc:docMk/>
+            <pc:sldMk cId="2827987875" sldId="257"/>
+            <ac:spMk id="276" creationId="{441375F6-99C6-2084-D67D-86B3E4D001DE}"/>
+          </ac:spMkLst>
+        </pc:spChg>
+        <pc:spChg chg="mod">
+          <ac:chgData name="Fatima Pillosu" userId="a6295d4dc9e22643" providerId="LiveId" clId="{0478CFAF-F744-4001-ABF3-5E8A4958592B}" dt="2025-07-05T17:23:34.042" v="2682" actId="1035"/>
+          <ac:spMkLst>
+            <pc:docMk/>
+            <pc:sldMk cId="2827987875" sldId="257"/>
+            <ac:spMk id="277" creationId="{9E8F7CF7-A90C-1AD2-08D2-9F2178169D22}"/>
+          </ac:spMkLst>
+        </pc:spChg>
+        <pc:spChg chg="mod">
+          <ac:chgData name="Fatima Pillosu" userId="a6295d4dc9e22643" providerId="LiveId" clId="{0478CFAF-F744-4001-ABF3-5E8A4958592B}" dt="2025-07-05T17:23:34.042" v="2682" actId="1035"/>
+          <ac:spMkLst>
+            <pc:docMk/>
+            <pc:sldMk cId="2827987875" sldId="257"/>
+            <ac:spMk id="278" creationId="{4A1B64CC-958D-29C7-FB12-944551D1EC5E}"/>
+          </ac:spMkLst>
+        </pc:spChg>
+        <pc:spChg chg="mod">
+          <ac:chgData name="Fatima Pillosu" userId="a6295d4dc9e22643" providerId="LiveId" clId="{0478CFAF-F744-4001-ABF3-5E8A4958592B}" dt="2025-07-05T17:23:34.042" v="2682" actId="1035"/>
+          <ac:spMkLst>
+            <pc:docMk/>
+            <pc:sldMk cId="2827987875" sldId="257"/>
+            <ac:spMk id="280" creationId="{9A749F05-307B-FA25-C140-2F3CDEE31F99}"/>
+          </ac:spMkLst>
+        </pc:spChg>
+        <pc:spChg chg="mod">
+          <ac:chgData name="Fatima Pillosu" userId="a6295d4dc9e22643" providerId="LiveId" clId="{0478CFAF-F744-4001-ABF3-5E8A4958592B}" dt="2025-07-05T17:23:34.042" v="2682" actId="1035"/>
+          <ac:spMkLst>
+            <pc:docMk/>
+            <pc:sldMk cId="2827987875" sldId="257"/>
+            <ac:spMk id="281" creationId="{DDB7608A-94FF-D7FA-DFC7-3043808ABA47}"/>
+          </ac:spMkLst>
+        </pc:spChg>
+        <pc:spChg chg="mod">
+          <ac:chgData name="Fatima Pillosu" userId="a6295d4dc9e22643" providerId="LiveId" clId="{0478CFAF-F744-4001-ABF3-5E8A4958592B}" dt="2025-07-05T17:23:34.042" v="2682" actId="1035"/>
+          <ac:spMkLst>
+            <pc:docMk/>
+            <pc:sldMk cId="2827987875" sldId="257"/>
+            <ac:spMk id="282" creationId="{643743EA-89F9-46BE-7FAD-DBF45DA84B52}"/>
+          </ac:spMkLst>
+        </pc:spChg>
+        <pc:spChg chg="mod">
+          <ac:chgData name="Fatima Pillosu" userId="a6295d4dc9e22643" providerId="LiveId" clId="{0478CFAF-F744-4001-ABF3-5E8A4958592B}" dt="2025-07-05T17:23:34.042" v="2682" actId="1035"/>
+          <ac:spMkLst>
+            <pc:docMk/>
+            <pc:sldMk cId="2827987875" sldId="257"/>
+            <ac:spMk id="283" creationId="{B01D0432-B4AC-D486-7531-B5BB267EDFF4}"/>
+          </ac:spMkLst>
+        </pc:spChg>
+        <pc:spChg chg="mod">
+          <ac:chgData name="Fatima Pillosu" userId="a6295d4dc9e22643" providerId="LiveId" clId="{0478CFAF-F744-4001-ABF3-5E8A4958592B}" dt="2025-07-05T17:23:48.774" v="2690" actId="1035"/>
           <ac:spMkLst>
             <pc:docMk/>
             <pc:sldMk cId="2827987875" sldId="257"/>
@@ -6117,7 +6565,7 @@
           </ac:spMkLst>
         </pc:spChg>
         <pc:picChg chg="add mod">
-          <ac:chgData name="Fatima Pillosu" userId="a6295d4dc9e22643" providerId="LiveId" clId="{0478CFAF-F744-4001-ABF3-5E8A4958592B}" dt="2025-07-05T17:00:28.975" v="2272" actId="1035"/>
+          <ac:chgData name="Fatima Pillosu" userId="a6295d4dc9e22643" providerId="LiveId" clId="{0478CFAF-F744-4001-ABF3-5E8A4958592B}" dt="2025-07-05T17:23:48.774" v="2690" actId="1035"/>
           <ac:picMkLst>
             <pc:docMk/>
             <pc:sldMk cId="2827987875" sldId="257"/>
@@ -6125,7 +6573,7 @@
           </ac:picMkLst>
         </pc:picChg>
         <pc:picChg chg="mod">
-          <ac:chgData name="Fatima Pillosu" userId="a6295d4dc9e22643" providerId="LiveId" clId="{0478CFAF-F744-4001-ABF3-5E8A4958592B}" dt="2025-07-05T16:34:28.510" v="1554" actId="1037"/>
+          <ac:chgData name="Fatima Pillosu" userId="a6295d4dc9e22643" providerId="LiveId" clId="{0478CFAF-F744-4001-ABF3-5E8A4958592B}" dt="2025-07-05T17:23:34.042" v="2682" actId="1035"/>
           <ac:picMkLst>
             <pc:docMk/>
             <pc:sldMk cId="2827987875" sldId="257"/>
@@ -6133,7 +6581,7 @@
           </ac:picMkLst>
         </pc:picChg>
         <pc:picChg chg="mod">
-          <ac:chgData name="Fatima Pillosu" userId="a6295d4dc9e22643" providerId="LiveId" clId="{0478CFAF-F744-4001-ABF3-5E8A4958592B}" dt="2025-07-05T16:34:32.798" v="1555" actId="1036"/>
+          <ac:chgData name="Fatima Pillosu" userId="a6295d4dc9e22643" providerId="LiveId" clId="{0478CFAF-F744-4001-ABF3-5E8A4958592B}" dt="2025-07-05T17:23:34.042" v="2682" actId="1035"/>
           <ac:picMkLst>
             <pc:docMk/>
             <pc:sldMk cId="2827987875" sldId="257"/>
@@ -6141,7 +6589,7 @@
           </ac:picMkLst>
         </pc:picChg>
         <pc:picChg chg="mod">
-          <ac:chgData name="Fatima Pillosu" userId="a6295d4dc9e22643" providerId="LiveId" clId="{0478CFAF-F744-4001-ABF3-5E8A4958592B}" dt="2025-07-05T17:00:28.975" v="2272" actId="1035"/>
+          <ac:chgData name="Fatima Pillosu" userId="a6295d4dc9e22643" providerId="LiveId" clId="{0478CFAF-F744-4001-ABF3-5E8A4958592B}" dt="2025-07-05T17:23:48.774" v="2690" actId="1035"/>
           <ac:picMkLst>
             <pc:docMk/>
             <pc:sldMk cId="2827987875" sldId="257"/>
@@ -6150,12 +6598,20 @@
         </pc:picChg>
       </pc:sldChg>
       <pc:sldChg chg="addSp delSp modSp mod">
-        <pc:chgData name="Fatima Pillosu" userId="a6295d4dc9e22643" providerId="LiveId" clId="{0478CFAF-F744-4001-ABF3-5E8A4958592B}" dt="2025-07-05T17:18:02.779" v="2609" actId="14100"/>
+        <pc:chgData name="Fatima Pillosu" userId="a6295d4dc9e22643" providerId="LiveId" clId="{0478CFAF-F744-4001-ABF3-5E8A4958592B}" dt="2025-07-05T17:32:07.102" v="2909" actId="1036"/>
         <pc:sldMkLst>
           <pc:docMk/>
           <pc:sldMk cId="2370713982" sldId="258"/>
         </pc:sldMkLst>
         <pc:spChg chg="add del mod">
+          <ac:chgData name="Fatima Pillosu" userId="a6295d4dc9e22643" providerId="LiveId" clId="{0478CFAF-F744-4001-ABF3-5E8A4958592B}" dt="2025-07-05T17:31:48.799" v="2906" actId="21"/>
+          <ac:spMkLst>
+            <pc:docMk/>
+            <pc:sldMk cId="2370713982" sldId="258"/>
+            <ac:spMk id="3" creationId="{28AEAA1C-A4B2-C456-3DF2-85203C0EBF3D}"/>
+          </ac:spMkLst>
+        </pc:spChg>
+        <pc:spChg chg="add del mod">
           <ac:chgData name="Fatima Pillosu" userId="a6295d4dc9e22643" providerId="LiveId" clId="{0478CFAF-F744-4001-ABF3-5E8A4958592B}" dt="2025-07-03T10:13:29.318" v="498" actId="21"/>
           <ac:spMkLst>
             <pc:docMk/>
@@ -6187,6 +6643,22 @@
             <ac:spMk id="11" creationId="{6E3975A0-04BD-A32C-5C8E-87D363BCBF43}"/>
           </ac:spMkLst>
         </pc:spChg>
+        <pc:spChg chg="add mod">
+          <ac:chgData name="Fatima Pillosu" userId="a6295d4dc9e22643" providerId="LiveId" clId="{0478CFAF-F744-4001-ABF3-5E8A4958592B}" dt="2025-07-05T17:26:33.797" v="2754"/>
+          <ac:spMkLst>
+            <pc:docMk/>
+            <pc:sldMk cId="2370713982" sldId="258"/>
+            <ac:spMk id="11" creationId="{A0ACF2E1-D29A-5256-9717-A860D4788647}"/>
+          </ac:spMkLst>
+        </pc:spChg>
+        <pc:spChg chg="add mod">
+          <ac:chgData name="Fatima Pillosu" userId="a6295d4dc9e22643" providerId="LiveId" clId="{0478CFAF-F744-4001-ABF3-5E8A4958592B}" dt="2025-07-05T17:26:33.797" v="2754"/>
+          <ac:spMkLst>
+            <pc:docMk/>
+            <pc:sldMk cId="2370713982" sldId="258"/>
+            <ac:spMk id="12" creationId="{952E81D7-FB0C-003A-DD10-EFBE4081F362}"/>
+          </ac:spMkLst>
+        </pc:spChg>
         <pc:spChg chg="add del mod">
           <ac:chgData name="Fatima Pillosu" userId="a6295d4dc9e22643" providerId="LiveId" clId="{0478CFAF-F744-4001-ABF3-5E8A4958592B}" dt="2025-07-05T17:16:51.266" v="2578" actId="21"/>
           <ac:spMkLst>
@@ -6195,6 +6667,22 @@
             <ac:spMk id="12" creationId="{EC3C4672-BBD3-831C-7CA8-0C6A492C9F9C}"/>
           </ac:spMkLst>
         </pc:spChg>
+        <pc:spChg chg="add mod">
+          <ac:chgData name="Fatima Pillosu" userId="a6295d4dc9e22643" providerId="LiveId" clId="{0478CFAF-F744-4001-ABF3-5E8A4958592B}" dt="2025-07-05T17:26:33.797" v="2754"/>
+          <ac:spMkLst>
+            <pc:docMk/>
+            <pc:sldMk cId="2370713982" sldId="258"/>
+            <ac:spMk id="13" creationId="{2E82EF19-A781-28CD-E7FD-3C419DE7C8E4}"/>
+          </ac:spMkLst>
+        </pc:spChg>
+        <pc:spChg chg="add mod">
+          <ac:chgData name="Fatima Pillosu" userId="a6295d4dc9e22643" providerId="LiveId" clId="{0478CFAF-F744-4001-ABF3-5E8A4958592B}" dt="2025-07-05T17:26:33.797" v="2754"/>
+          <ac:spMkLst>
+            <pc:docMk/>
+            <pc:sldMk cId="2370713982" sldId="258"/>
+            <ac:spMk id="14" creationId="{06250B55-45AF-36A2-5648-6B3389F55E3B}"/>
+          </ac:spMkLst>
+        </pc:spChg>
         <pc:spChg chg="add del mod">
           <ac:chgData name="Fatima Pillosu" userId="a6295d4dc9e22643" providerId="LiveId" clId="{0478CFAF-F744-4001-ABF3-5E8A4958592B}" dt="2025-07-05T16:40:32.927" v="1802" actId="478"/>
           <ac:spMkLst>
@@ -6203,6 +6691,22 @@
             <ac:spMk id="14" creationId="{A98AD652-CC49-61CB-93BF-590382B2DB5F}"/>
           </ac:spMkLst>
         </pc:spChg>
+        <pc:spChg chg="add mod">
+          <ac:chgData name="Fatima Pillosu" userId="a6295d4dc9e22643" providerId="LiveId" clId="{0478CFAF-F744-4001-ABF3-5E8A4958592B}" dt="2025-07-05T17:26:33.797" v="2754"/>
+          <ac:spMkLst>
+            <pc:docMk/>
+            <pc:sldMk cId="2370713982" sldId="258"/>
+            <ac:spMk id="15" creationId="{B34065B8-8B75-A1B5-BD2A-F3F6219964AF}"/>
+          </ac:spMkLst>
+        </pc:spChg>
+        <pc:spChg chg="add mod">
+          <ac:chgData name="Fatima Pillosu" userId="a6295d4dc9e22643" providerId="LiveId" clId="{0478CFAF-F744-4001-ABF3-5E8A4958592B}" dt="2025-07-05T17:26:33.797" v="2754"/>
+          <ac:spMkLst>
+            <pc:docMk/>
+            <pc:sldMk cId="2370713982" sldId="258"/>
+            <ac:spMk id="16" creationId="{64D33ED3-C040-AFCE-0A0A-8132F094242E}"/>
+          </ac:spMkLst>
+        </pc:spChg>
         <pc:spChg chg="add del mod">
           <ac:chgData name="Fatima Pillosu" userId="a6295d4dc9e22643" providerId="LiveId" clId="{0478CFAF-F744-4001-ABF3-5E8A4958592B}" dt="2025-07-05T17:16:51.266" v="2578" actId="21"/>
           <ac:spMkLst>
@@ -6217,6 +6721,46 @@
             <pc:docMk/>
             <pc:sldMk cId="2370713982" sldId="258"/>
             <ac:spMk id="17" creationId="{4DC959A9-7C89-6A9D-8C2C-4CCD3B47ECC5}"/>
+          </ac:spMkLst>
+        </pc:spChg>
+        <pc:spChg chg="add mod">
+          <ac:chgData name="Fatima Pillosu" userId="a6295d4dc9e22643" providerId="LiveId" clId="{0478CFAF-F744-4001-ABF3-5E8A4958592B}" dt="2025-07-05T17:26:33.797" v="2754"/>
+          <ac:spMkLst>
+            <pc:docMk/>
+            <pc:sldMk cId="2370713982" sldId="258"/>
+            <ac:spMk id="17" creationId="{FF012970-E6D6-1E76-9B1D-7D951903D28A}"/>
+          </ac:spMkLst>
+        </pc:spChg>
+        <pc:spChg chg="add mod">
+          <ac:chgData name="Fatima Pillosu" userId="a6295d4dc9e22643" providerId="LiveId" clId="{0478CFAF-F744-4001-ABF3-5E8A4958592B}" dt="2025-07-05T17:26:33.797" v="2754"/>
+          <ac:spMkLst>
+            <pc:docMk/>
+            <pc:sldMk cId="2370713982" sldId="258"/>
+            <ac:spMk id="18" creationId="{E02CE945-4EFD-45B1-168A-76AC2E4D089B}"/>
+          </ac:spMkLst>
+        </pc:spChg>
+        <pc:spChg chg="add mod">
+          <ac:chgData name="Fatima Pillosu" userId="a6295d4dc9e22643" providerId="LiveId" clId="{0478CFAF-F744-4001-ABF3-5E8A4958592B}" dt="2025-07-05T17:26:33.797" v="2754"/>
+          <ac:spMkLst>
+            <pc:docMk/>
+            <pc:sldMk cId="2370713982" sldId="258"/>
+            <ac:spMk id="19" creationId="{DE4B189B-0083-2A75-9B8F-1425FB9D620A}"/>
+          </ac:spMkLst>
+        </pc:spChg>
+        <pc:spChg chg="add mod">
+          <ac:chgData name="Fatima Pillosu" userId="a6295d4dc9e22643" providerId="LiveId" clId="{0478CFAF-F744-4001-ABF3-5E8A4958592B}" dt="2025-07-05T17:26:33.797" v="2754"/>
+          <ac:spMkLst>
+            <pc:docMk/>
+            <pc:sldMk cId="2370713982" sldId="258"/>
+            <ac:spMk id="20" creationId="{8BB5558F-3593-749D-9DB1-0AFD00D2DDFA}"/>
+          </ac:spMkLst>
+        </pc:spChg>
+        <pc:spChg chg="add mod">
+          <ac:chgData name="Fatima Pillosu" userId="a6295d4dc9e22643" providerId="LiveId" clId="{0478CFAF-F744-4001-ABF3-5E8A4958592B}" dt="2025-07-05T17:26:33.797" v="2754"/>
+          <ac:spMkLst>
+            <pc:docMk/>
+            <pc:sldMk cId="2370713982" sldId="258"/>
+            <ac:spMk id="21" creationId="{448E6E5E-7709-5F9E-357E-F1AC58CDB5B8}"/>
           </ac:spMkLst>
         </pc:spChg>
         <pc:spChg chg="add del mod ord">
@@ -6235,6 +6779,22 @@
             <ac:spMk id="22" creationId="{1A0731B8-37BC-29FF-5EFB-3505DFCBB060}"/>
           </ac:spMkLst>
         </pc:spChg>
+        <pc:spChg chg="add mod">
+          <ac:chgData name="Fatima Pillosu" userId="a6295d4dc9e22643" providerId="LiveId" clId="{0478CFAF-F744-4001-ABF3-5E8A4958592B}" dt="2025-07-05T17:26:33.797" v="2754"/>
+          <ac:spMkLst>
+            <pc:docMk/>
+            <pc:sldMk cId="2370713982" sldId="258"/>
+            <ac:spMk id="22" creationId="{E6F62E0A-9A7C-CEEB-0444-C7A3050641D1}"/>
+          </ac:spMkLst>
+        </pc:spChg>
+        <pc:spChg chg="add mod">
+          <ac:chgData name="Fatima Pillosu" userId="a6295d4dc9e22643" providerId="LiveId" clId="{0478CFAF-F744-4001-ABF3-5E8A4958592B}" dt="2025-07-05T17:26:33.797" v="2754"/>
+          <ac:spMkLst>
+            <pc:docMk/>
+            <pc:sldMk cId="2370713982" sldId="258"/>
+            <ac:spMk id="23" creationId="{A38EC5F8-2817-0C7C-D3F6-6DADF19357A5}"/>
+          </ac:spMkLst>
+        </pc:spChg>
         <pc:spChg chg="add del mod">
           <ac:chgData name="Fatima Pillosu" userId="a6295d4dc9e22643" providerId="LiveId" clId="{0478CFAF-F744-4001-ABF3-5E8A4958592B}" dt="2025-07-05T17:16:51.266" v="2578" actId="21"/>
           <ac:spMkLst>
@@ -6243,6 +6803,14 @@
             <ac:spMk id="24" creationId="{5382C8C2-6F3C-50EB-0A51-B5F6DC1665D1}"/>
           </ac:spMkLst>
         </pc:spChg>
+        <pc:spChg chg="add mod">
+          <ac:chgData name="Fatima Pillosu" userId="a6295d4dc9e22643" providerId="LiveId" clId="{0478CFAF-F744-4001-ABF3-5E8A4958592B}" dt="2025-07-05T17:26:33.797" v="2754"/>
+          <ac:spMkLst>
+            <pc:docMk/>
+            <pc:sldMk cId="2370713982" sldId="258"/>
+            <ac:spMk id="24" creationId="{B2D52315-9D9B-3AF3-A310-7E56CABFA047}"/>
+          </ac:spMkLst>
+        </pc:spChg>
         <pc:spChg chg="add del mod">
           <ac:chgData name="Fatima Pillosu" userId="a6295d4dc9e22643" providerId="LiveId" clId="{0478CFAF-F744-4001-ABF3-5E8A4958592B}" dt="2025-07-05T17:16:51.266" v="2578" actId="21"/>
           <ac:spMkLst>
@@ -6251,6 +6819,22 @@
             <ac:spMk id="25" creationId="{AFE3A951-104C-CEDE-A21D-544D4B214711}"/>
           </ac:spMkLst>
         </pc:spChg>
+        <pc:spChg chg="add mod">
+          <ac:chgData name="Fatima Pillosu" userId="a6295d4dc9e22643" providerId="LiveId" clId="{0478CFAF-F744-4001-ABF3-5E8A4958592B}" dt="2025-07-05T17:26:33.797" v="2754"/>
+          <ac:spMkLst>
+            <pc:docMk/>
+            <pc:sldMk cId="2370713982" sldId="258"/>
+            <ac:spMk id="25" creationId="{BE8EC922-1FB4-1FC6-2670-845C891BAEFB}"/>
+          </ac:spMkLst>
+        </pc:spChg>
+        <pc:spChg chg="add mod">
+          <ac:chgData name="Fatima Pillosu" userId="a6295d4dc9e22643" providerId="LiveId" clId="{0478CFAF-F744-4001-ABF3-5E8A4958592B}" dt="2025-07-05T17:26:33.797" v="2754"/>
+          <ac:spMkLst>
+            <pc:docMk/>
+            <pc:sldMk cId="2370713982" sldId="258"/>
+            <ac:spMk id="26" creationId="{E6CB9905-25B6-2F78-7A8A-67C873877D40}"/>
+          </ac:spMkLst>
+        </pc:spChg>
         <pc:spChg chg="add del mod">
           <ac:chgData name="Fatima Pillosu" userId="a6295d4dc9e22643" providerId="LiveId" clId="{0478CFAF-F744-4001-ABF3-5E8A4958592B}" dt="2025-07-05T17:16:51.266" v="2578" actId="21"/>
           <ac:spMkLst>
@@ -6259,6 +6843,14 @@
             <ac:spMk id="26" creationId="{F81123FD-1880-7B13-64BB-A61B32D6C3FC}"/>
           </ac:spMkLst>
         </pc:spChg>
+        <pc:spChg chg="add mod">
+          <ac:chgData name="Fatima Pillosu" userId="a6295d4dc9e22643" providerId="LiveId" clId="{0478CFAF-F744-4001-ABF3-5E8A4958592B}" dt="2025-07-05T17:26:33.797" v="2754"/>
+          <ac:spMkLst>
+            <pc:docMk/>
+            <pc:sldMk cId="2370713982" sldId="258"/>
+            <ac:spMk id="27" creationId="{43157AAA-D5A4-EFD1-9726-74B1AD23948B}"/>
+          </ac:spMkLst>
+        </pc:spChg>
         <pc:spChg chg="add del mod">
           <ac:chgData name="Fatima Pillosu" userId="a6295d4dc9e22643" providerId="LiveId" clId="{0478CFAF-F744-4001-ABF3-5E8A4958592B}" dt="2025-07-05T17:16:51.266" v="2578" actId="21"/>
           <ac:spMkLst>
@@ -6267,6 +6859,14 @@
             <ac:spMk id="27" creationId="{68F25C0E-89BD-9175-A93B-76E013FBF0DD}"/>
           </ac:spMkLst>
         </pc:spChg>
+        <pc:spChg chg="add mod">
+          <ac:chgData name="Fatima Pillosu" userId="a6295d4dc9e22643" providerId="LiveId" clId="{0478CFAF-F744-4001-ABF3-5E8A4958592B}" dt="2025-07-05T17:26:33.797" v="2754"/>
+          <ac:spMkLst>
+            <pc:docMk/>
+            <pc:sldMk cId="2370713982" sldId="258"/>
+            <ac:spMk id="28" creationId="{2DE607AD-68CE-62CC-0478-2FE081F2C4A8}"/>
+          </ac:spMkLst>
+        </pc:spChg>
         <pc:spChg chg="add del mod">
           <ac:chgData name="Fatima Pillosu" userId="a6295d4dc9e22643" providerId="LiveId" clId="{0478CFAF-F744-4001-ABF3-5E8A4958592B}" dt="2025-07-05T17:16:51.266" v="2578" actId="21"/>
           <ac:spMkLst>
@@ -6283,6 +6883,22 @@
             <ac:spMk id="29" creationId="{9CADC630-E44A-1A89-9FDE-8EDA7123B19C}"/>
           </ac:spMkLst>
         </pc:spChg>
+        <pc:spChg chg="add mod">
+          <ac:chgData name="Fatima Pillosu" userId="a6295d4dc9e22643" providerId="LiveId" clId="{0478CFAF-F744-4001-ABF3-5E8A4958592B}" dt="2025-07-05T17:26:33.797" v="2754"/>
+          <ac:spMkLst>
+            <pc:docMk/>
+            <pc:sldMk cId="2370713982" sldId="258"/>
+            <ac:spMk id="29" creationId="{B19A2B9B-EAA5-4571-E016-B2E46AEB7548}"/>
+          </ac:spMkLst>
+        </pc:spChg>
+        <pc:spChg chg="add mod">
+          <ac:chgData name="Fatima Pillosu" userId="a6295d4dc9e22643" providerId="LiveId" clId="{0478CFAF-F744-4001-ABF3-5E8A4958592B}" dt="2025-07-05T17:26:33.797" v="2754"/>
+          <ac:spMkLst>
+            <pc:docMk/>
+            <pc:sldMk cId="2370713982" sldId="258"/>
+            <ac:spMk id="30" creationId="{93AAB058-03F7-9673-AF68-E546E03B1376}"/>
+          </ac:spMkLst>
+        </pc:spChg>
         <pc:spChg chg="add del mod">
           <ac:chgData name="Fatima Pillosu" userId="a6295d4dc9e22643" providerId="LiveId" clId="{0478CFAF-F744-4001-ABF3-5E8A4958592B}" dt="2025-07-05T17:16:51.266" v="2578" actId="21"/>
           <ac:spMkLst>
@@ -6291,6 +6907,14 @@
             <ac:spMk id="30" creationId="{EAF3C8BC-9003-987C-E4A9-44A032A5528E}"/>
           </ac:spMkLst>
         </pc:spChg>
+        <pc:spChg chg="add mod">
+          <ac:chgData name="Fatima Pillosu" userId="a6295d4dc9e22643" providerId="LiveId" clId="{0478CFAF-F744-4001-ABF3-5E8A4958592B}" dt="2025-07-05T17:26:33.797" v="2754"/>
+          <ac:spMkLst>
+            <pc:docMk/>
+            <pc:sldMk cId="2370713982" sldId="258"/>
+            <ac:spMk id="31" creationId="{264947DC-43EA-4E55-43C8-0689FEDFA6D7}"/>
+          </ac:spMkLst>
+        </pc:spChg>
         <pc:spChg chg="add del mod">
           <ac:chgData name="Fatima Pillosu" userId="a6295d4dc9e22643" providerId="LiveId" clId="{0478CFAF-F744-4001-ABF3-5E8A4958592B}" dt="2025-07-05T17:16:51.266" v="2578" actId="21"/>
           <ac:spMkLst>
@@ -6299,6 +6923,14 @@
             <ac:spMk id="31" creationId="{28B436EB-88AE-9EF3-EB76-64B6D1FB6EEB}"/>
           </ac:spMkLst>
         </pc:spChg>
+        <pc:spChg chg="add mod">
+          <ac:chgData name="Fatima Pillosu" userId="a6295d4dc9e22643" providerId="LiveId" clId="{0478CFAF-F744-4001-ABF3-5E8A4958592B}" dt="2025-07-05T17:26:33.797" v="2754"/>
+          <ac:spMkLst>
+            <pc:docMk/>
+            <pc:sldMk cId="2370713982" sldId="258"/>
+            <ac:spMk id="32" creationId="{965253E4-BF86-279F-427E-DE57D85DF04E}"/>
+          </ac:spMkLst>
+        </pc:spChg>
         <pc:spChg chg="add del mod">
           <ac:chgData name="Fatima Pillosu" userId="a6295d4dc9e22643" providerId="LiveId" clId="{0478CFAF-F744-4001-ABF3-5E8A4958592B}" dt="2025-07-05T17:16:51.266" v="2578" actId="21"/>
           <ac:spMkLst>
@@ -6315,6 +6947,22 @@
             <ac:spMk id="33" creationId="{41C377DF-3C36-42E1-684D-12BC83DB59C3}"/>
           </ac:spMkLst>
         </pc:spChg>
+        <pc:spChg chg="add mod">
+          <ac:chgData name="Fatima Pillosu" userId="a6295d4dc9e22643" providerId="LiveId" clId="{0478CFAF-F744-4001-ABF3-5E8A4958592B}" dt="2025-07-05T17:26:33.797" v="2754"/>
+          <ac:spMkLst>
+            <pc:docMk/>
+            <pc:sldMk cId="2370713982" sldId="258"/>
+            <ac:spMk id="33" creationId="{43666F44-2205-87B5-B1DF-45C1F12D24D7}"/>
+          </ac:spMkLst>
+        </pc:spChg>
+        <pc:spChg chg="add mod">
+          <ac:chgData name="Fatima Pillosu" userId="a6295d4dc9e22643" providerId="LiveId" clId="{0478CFAF-F744-4001-ABF3-5E8A4958592B}" dt="2025-07-05T17:26:33.797" v="2754"/>
+          <ac:spMkLst>
+            <pc:docMk/>
+            <pc:sldMk cId="2370713982" sldId="258"/>
+            <ac:spMk id="34" creationId="{315BDA41-1EA7-E73B-13B5-6C43657B48B0}"/>
+          </ac:spMkLst>
+        </pc:spChg>
         <pc:spChg chg="add del mod">
           <ac:chgData name="Fatima Pillosu" userId="a6295d4dc9e22643" providerId="LiveId" clId="{0478CFAF-F744-4001-ABF3-5E8A4958592B}" dt="2025-07-05T17:16:51.266" v="2578" actId="21"/>
           <ac:spMkLst>
@@ -6323,6 +6971,14 @@
             <ac:spMk id="35" creationId="{2CFA74E3-D91E-2C27-4A99-D3D1A111919C}"/>
           </ac:spMkLst>
         </pc:spChg>
+        <pc:spChg chg="add mod">
+          <ac:chgData name="Fatima Pillosu" userId="a6295d4dc9e22643" providerId="LiveId" clId="{0478CFAF-F744-4001-ABF3-5E8A4958592B}" dt="2025-07-05T17:26:33.797" v="2754"/>
+          <ac:spMkLst>
+            <pc:docMk/>
+            <pc:sldMk cId="2370713982" sldId="258"/>
+            <ac:spMk id="35" creationId="{6E0EEF82-9A39-FD4F-B830-5C3AB288E1C4}"/>
+          </ac:spMkLst>
+        </pc:spChg>
         <pc:spChg chg="add del mod">
           <ac:chgData name="Fatima Pillosu" userId="a6295d4dc9e22643" providerId="LiveId" clId="{0478CFAF-F744-4001-ABF3-5E8A4958592B}" dt="2025-07-05T17:16:51.266" v="2578" actId="21"/>
           <ac:spMkLst>
@@ -6331,6 +6987,14 @@
             <ac:spMk id="36" creationId="{CC497459-D1DC-EE9A-EE1D-815F28D2818C}"/>
           </ac:spMkLst>
         </pc:spChg>
+        <pc:spChg chg="add mod">
+          <ac:chgData name="Fatima Pillosu" userId="a6295d4dc9e22643" providerId="LiveId" clId="{0478CFAF-F744-4001-ABF3-5E8A4958592B}" dt="2025-07-05T17:26:33.797" v="2754"/>
+          <ac:spMkLst>
+            <pc:docMk/>
+            <pc:sldMk cId="2370713982" sldId="258"/>
+            <ac:spMk id="36" creationId="{DA417FCB-EA49-933C-C7DD-CE4884F84813}"/>
+          </ac:spMkLst>
+        </pc:spChg>
         <pc:spChg chg="add del mod">
           <ac:chgData name="Fatima Pillosu" userId="a6295d4dc9e22643" providerId="LiveId" clId="{0478CFAF-F744-4001-ABF3-5E8A4958592B}" dt="2025-07-05T17:16:51.266" v="2578" actId="21"/>
           <ac:spMkLst>
@@ -6339,6 +7003,14 @@
             <ac:spMk id="37" creationId="{8A74094E-C336-74AA-E520-6856C354301A}"/>
           </ac:spMkLst>
         </pc:spChg>
+        <pc:spChg chg="add mod">
+          <ac:chgData name="Fatima Pillosu" userId="a6295d4dc9e22643" providerId="LiveId" clId="{0478CFAF-F744-4001-ABF3-5E8A4958592B}" dt="2025-07-05T17:26:33.797" v="2754"/>
+          <ac:spMkLst>
+            <pc:docMk/>
+            <pc:sldMk cId="2370713982" sldId="258"/>
+            <ac:spMk id="37" creationId="{A5EABE5F-5D26-F9B7-E1F8-4D47565A13B6}"/>
+          </ac:spMkLst>
+        </pc:spChg>
         <pc:spChg chg="add del mod">
           <ac:chgData name="Fatima Pillosu" userId="a6295d4dc9e22643" providerId="LiveId" clId="{0478CFAF-F744-4001-ABF3-5E8A4958592B}" dt="2025-07-05T17:16:51.266" v="2578" actId="21"/>
           <ac:spMkLst>
@@ -6347,6 +7019,14 @@
             <ac:spMk id="38" creationId="{10B23706-9C8A-69A2-B423-B2EEB1C4D06D}"/>
           </ac:spMkLst>
         </pc:spChg>
+        <pc:spChg chg="add mod">
+          <ac:chgData name="Fatima Pillosu" userId="a6295d4dc9e22643" providerId="LiveId" clId="{0478CFAF-F744-4001-ABF3-5E8A4958592B}" dt="2025-07-05T17:26:33.797" v="2754"/>
+          <ac:spMkLst>
+            <pc:docMk/>
+            <pc:sldMk cId="2370713982" sldId="258"/>
+            <ac:spMk id="38" creationId="{6B96EE93-71BF-1E1B-F699-FD70D76A177A}"/>
+          </ac:spMkLst>
+        </pc:spChg>
         <pc:spChg chg="add del mod">
           <ac:chgData name="Fatima Pillosu" userId="a6295d4dc9e22643" providerId="LiveId" clId="{0478CFAF-F744-4001-ABF3-5E8A4958592B}" dt="2025-07-05T17:16:51.266" v="2578" actId="21"/>
           <ac:spMkLst>
@@ -6355,6 +7035,14 @@
             <ac:spMk id="39" creationId="{14A7D952-0782-7271-7F2A-BC6BC775B542}"/>
           </ac:spMkLst>
         </pc:spChg>
+        <pc:spChg chg="add mod">
+          <ac:chgData name="Fatima Pillosu" userId="a6295d4dc9e22643" providerId="LiveId" clId="{0478CFAF-F744-4001-ABF3-5E8A4958592B}" dt="2025-07-05T17:26:33.797" v="2754"/>
+          <ac:spMkLst>
+            <pc:docMk/>
+            <pc:sldMk cId="2370713982" sldId="258"/>
+            <ac:spMk id="39" creationId="{276D24FB-50FA-E923-39FC-3665777B5FF8}"/>
+          </ac:spMkLst>
+        </pc:spChg>
         <pc:spChg chg="add del mod">
           <ac:chgData name="Fatima Pillosu" userId="a6295d4dc9e22643" providerId="LiveId" clId="{0478CFAF-F744-4001-ABF3-5E8A4958592B}" dt="2025-07-05T17:16:51.266" v="2578" actId="21"/>
           <ac:spMkLst>
@@ -6363,6 +7051,22 @@
             <ac:spMk id="40" creationId="{06432789-ABB4-135D-C8F1-01F8D760F247}"/>
           </ac:spMkLst>
         </pc:spChg>
+        <pc:spChg chg="add mod">
+          <ac:chgData name="Fatima Pillosu" userId="a6295d4dc9e22643" providerId="LiveId" clId="{0478CFAF-F744-4001-ABF3-5E8A4958592B}" dt="2025-07-05T17:26:33.797" v="2754"/>
+          <ac:spMkLst>
+            <pc:docMk/>
+            <pc:sldMk cId="2370713982" sldId="258"/>
+            <ac:spMk id="40" creationId="{212F7925-D6EF-01DE-D0A0-E45770E2E3EE}"/>
+          </ac:spMkLst>
+        </pc:spChg>
+        <pc:spChg chg="add mod">
+          <ac:chgData name="Fatima Pillosu" userId="a6295d4dc9e22643" providerId="LiveId" clId="{0478CFAF-F744-4001-ABF3-5E8A4958592B}" dt="2025-07-05T17:26:33.797" v="2754"/>
+          <ac:spMkLst>
+            <pc:docMk/>
+            <pc:sldMk cId="2370713982" sldId="258"/>
+            <ac:spMk id="41" creationId="{B6594B1C-F9D8-A36F-E6EA-C7076A435D7C}"/>
+          </ac:spMkLst>
+        </pc:spChg>
         <pc:spChg chg="add del mod">
           <ac:chgData name="Fatima Pillosu" userId="a6295d4dc9e22643" providerId="LiveId" clId="{0478CFAF-F744-4001-ABF3-5E8A4958592B}" dt="2025-07-05T17:16:51.266" v="2578" actId="21"/>
           <ac:spMkLst>
@@ -6371,6 +7075,14 @@
             <ac:spMk id="41" creationId="{C5603496-23AC-2551-E5E0-BDF8C60E9816}"/>
           </ac:spMkLst>
         </pc:spChg>
+        <pc:spChg chg="add mod">
+          <ac:chgData name="Fatima Pillosu" userId="a6295d4dc9e22643" providerId="LiveId" clId="{0478CFAF-F744-4001-ABF3-5E8A4958592B}" dt="2025-07-05T17:26:33.797" v="2754"/>
+          <ac:spMkLst>
+            <pc:docMk/>
+            <pc:sldMk cId="2370713982" sldId="258"/>
+            <ac:spMk id="42" creationId="{630AFC62-F36D-BA65-E615-2BD1DBF9BDBB}"/>
+          </ac:spMkLst>
+        </pc:spChg>
         <pc:spChg chg="add del mod">
           <ac:chgData name="Fatima Pillosu" userId="a6295d4dc9e22643" providerId="LiveId" clId="{0478CFAF-F744-4001-ABF3-5E8A4958592B}" dt="2025-07-05T17:16:51.266" v="2578" actId="21"/>
           <ac:spMkLst>
@@ -6379,6 +7091,14 @@
             <ac:spMk id="42" creationId="{BD4FCEEF-D9EE-3F9D-274E-A275AE7207AC}"/>
           </ac:spMkLst>
         </pc:spChg>
+        <pc:spChg chg="add mod">
+          <ac:chgData name="Fatima Pillosu" userId="a6295d4dc9e22643" providerId="LiveId" clId="{0478CFAF-F744-4001-ABF3-5E8A4958592B}" dt="2025-07-05T17:26:33.797" v="2754"/>
+          <ac:spMkLst>
+            <pc:docMk/>
+            <pc:sldMk cId="2370713982" sldId="258"/>
+            <ac:spMk id="43" creationId="{2A292B58-8AB3-8D59-0574-E4CCCF4A2D7A}"/>
+          </ac:spMkLst>
+        </pc:spChg>
         <pc:spChg chg="add del mod">
           <ac:chgData name="Fatima Pillosu" userId="a6295d4dc9e22643" providerId="LiveId" clId="{0478CFAF-F744-4001-ABF3-5E8A4958592B}" dt="2025-07-05T17:16:51.266" v="2578" actId="21"/>
           <ac:spMkLst>
@@ -6387,6 +7107,14 @@
             <ac:spMk id="44" creationId="{54B4C05C-53AB-88AD-E871-B8862B4F61D3}"/>
           </ac:spMkLst>
         </pc:spChg>
+        <pc:spChg chg="add mod">
+          <ac:chgData name="Fatima Pillosu" userId="a6295d4dc9e22643" providerId="LiveId" clId="{0478CFAF-F744-4001-ABF3-5E8A4958592B}" dt="2025-07-05T17:26:33.797" v="2754"/>
+          <ac:spMkLst>
+            <pc:docMk/>
+            <pc:sldMk cId="2370713982" sldId="258"/>
+            <ac:spMk id="44" creationId="{E6ADD90F-7EFF-1455-69CB-7A67A7E532E4}"/>
+          </ac:spMkLst>
+        </pc:spChg>
         <pc:spChg chg="add del mod">
           <ac:chgData name="Fatima Pillosu" userId="a6295d4dc9e22643" providerId="LiveId" clId="{0478CFAF-F744-4001-ABF3-5E8A4958592B}" dt="2025-07-05T17:16:51.266" v="2578" actId="21"/>
           <ac:spMkLst>
@@ -6395,6 +7123,14 @@
             <ac:spMk id="45" creationId="{6EE46427-6BDE-882E-3A72-3DF2ED872F0A}"/>
           </ac:spMkLst>
         </pc:spChg>
+        <pc:spChg chg="add mod">
+          <ac:chgData name="Fatima Pillosu" userId="a6295d4dc9e22643" providerId="LiveId" clId="{0478CFAF-F744-4001-ABF3-5E8A4958592B}" dt="2025-07-05T17:26:33.797" v="2754"/>
+          <ac:spMkLst>
+            <pc:docMk/>
+            <pc:sldMk cId="2370713982" sldId="258"/>
+            <ac:spMk id="45" creationId="{DAF0F48A-A089-F201-1712-29E8B26D8E7E}"/>
+          </ac:spMkLst>
+        </pc:spChg>
         <pc:spChg chg="add del mod">
           <ac:chgData name="Fatima Pillosu" userId="a6295d4dc9e22643" providerId="LiveId" clId="{0478CFAF-F744-4001-ABF3-5E8A4958592B}" dt="2025-07-05T17:16:51.266" v="2578" actId="21"/>
           <ac:spMkLst>
@@ -6403,6 +7139,62 @@
             <ac:spMk id="46" creationId="{0BBE180E-9D2D-A30D-B94E-AB6240A4F89E}"/>
           </ac:spMkLst>
         </pc:spChg>
+        <pc:spChg chg="add mod">
+          <ac:chgData name="Fatima Pillosu" userId="a6295d4dc9e22643" providerId="LiveId" clId="{0478CFAF-F744-4001-ABF3-5E8A4958592B}" dt="2025-07-05T17:26:33.797" v="2754"/>
+          <ac:spMkLst>
+            <pc:docMk/>
+            <pc:sldMk cId="2370713982" sldId="258"/>
+            <ac:spMk id="46" creationId="{F120D217-E596-6126-B6BF-63FA6C0CF137}"/>
+          </ac:spMkLst>
+        </pc:spChg>
+        <pc:spChg chg="add mod">
+          <ac:chgData name="Fatima Pillosu" userId="a6295d4dc9e22643" providerId="LiveId" clId="{0478CFAF-F744-4001-ABF3-5E8A4958592B}" dt="2025-07-05T17:26:33.797" v="2754"/>
+          <ac:spMkLst>
+            <pc:docMk/>
+            <pc:sldMk cId="2370713982" sldId="258"/>
+            <ac:spMk id="47" creationId="{75797DDF-DC1F-12FD-7899-A85F17C9CAC5}"/>
+          </ac:spMkLst>
+        </pc:spChg>
+        <pc:spChg chg="add mod">
+          <ac:chgData name="Fatima Pillosu" userId="a6295d4dc9e22643" providerId="LiveId" clId="{0478CFAF-F744-4001-ABF3-5E8A4958592B}" dt="2025-07-05T17:26:33.797" v="2754"/>
+          <ac:spMkLst>
+            <pc:docMk/>
+            <pc:sldMk cId="2370713982" sldId="258"/>
+            <ac:spMk id="48" creationId="{EECC1CF0-F5BA-685B-9BBC-9EE4DC4C0337}"/>
+          </ac:spMkLst>
+        </pc:spChg>
+        <pc:spChg chg="add mod">
+          <ac:chgData name="Fatima Pillosu" userId="a6295d4dc9e22643" providerId="LiveId" clId="{0478CFAF-F744-4001-ABF3-5E8A4958592B}" dt="2025-07-05T17:26:33.797" v="2754"/>
+          <ac:spMkLst>
+            <pc:docMk/>
+            <pc:sldMk cId="2370713982" sldId="258"/>
+            <ac:spMk id="49" creationId="{E829A4CC-942E-210E-FE6B-7A501AB453E6}"/>
+          </ac:spMkLst>
+        </pc:spChg>
+        <pc:spChg chg="add mod">
+          <ac:chgData name="Fatima Pillosu" userId="a6295d4dc9e22643" providerId="LiveId" clId="{0478CFAF-F744-4001-ABF3-5E8A4958592B}" dt="2025-07-05T17:26:33.797" v="2754"/>
+          <ac:spMkLst>
+            <pc:docMk/>
+            <pc:sldMk cId="2370713982" sldId="258"/>
+            <ac:spMk id="50" creationId="{7E7CF391-97C1-1BED-CE52-7883EB3AE401}"/>
+          </ac:spMkLst>
+        </pc:spChg>
+        <pc:spChg chg="add mod">
+          <ac:chgData name="Fatima Pillosu" userId="a6295d4dc9e22643" providerId="LiveId" clId="{0478CFAF-F744-4001-ABF3-5E8A4958592B}" dt="2025-07-05T17:26:33.797" v="2754"/>
+          <ac:spMkLst>
+            <pc:docMk/>
+            <pc:sldMk cId="2370713982" sldId="258"/>
+            <ac:spMk id="51" creationId="{3FDBE631-4A9B-F6F9-1B2C-E4D218042D6F}"/>
+          </ac:spMkLst>
+        </pc:spChg>
+        <pc:spChg chg="add mod">
+          <ac:chgData name="Fatima Pillosu" userId="a6295d4dc9e22643" providerId="LiveId" clId="{0478CFAF-F744-4001-ABF3-5E8A4958592B}" dt="2025-07-05T17:26:33.797" v="2754"/>
+          <ac:spMkLst>
+            <pc:docMk/>
+            <pc:sldMk cId="2370713982" sldId="258"/>
+            <ac:spMk id="52" creationId="{215C4F69-24A6-F015-FBC7-15E336EC4E70}"/>
+          </ac:spMkLst>
+        </pc:spChg>
         <pc:spChg chg="add del mod">
           <ac:chgData name="Fatima Pillosu" userId="a6295d4dc9e22643" providerId="LiveId" clId="{0478CFAF-F744-4001-ABF3-5E8A4958592B}" dt="2025-07-05T17:16:51.266" v="2578" actId="21"/>
           <ac:spMkLst>
@@ -6411,6 +7203,22 @@
             <ac:spMk id="53" creationId="{27B7D5CF-81CA-4EAF-61FB-FBDB71CAE40F}"/>
           </ac:spMkLst>
         </pc:spChg>
+        <pc:spChg chg="add mod">
+          <ac:chgData name="Fatima Pillosu" userId="a6295d4dc9e22643" providerId="LiveId" clId="{0478CFAF-F744-4001-ABF3-5E8A4958592B}" dt="2025-07-05T17:26:33.797" v="2754"/>
+          <ac:spMkLst>
+            <pc:docMk/>
+            <pc:sldMk cId="2370713982" sldId="258"/>
+            <ac:spMk id="53" creationId="{48FCA2E9-A339-39CE-EDAE-3C137F0E9B4C}"/>
+          </ac:spMkLst>
+        </pc:spChg>
+        <pc:spChg chg="add mod">
+          <ac:chgData name="Fatima Pillosu" userId="a6295d4dc9e22643" providerId="LiveId" clId="{0478CFAF-F744-4001-ABF3-5E8A4958592B}" dt="2025-07-05T17:26:33.797" v="2754"/>
+          <ac:spMkLst>
+            <pc:docMk/>
+            <pc:sldMk cId="2370713982" sldId="258"/>
+            <ac:spMk id="54" creationId="{7F22F789-9647-252A-631A-9D4A2B28AEFC}"/>
+          </ac:spMkLst>
+        </pc:spChg>
         <pc:spChg chg="add del mod">
           <ac:chgData name="Fatima Pillosu" userId="a6295d4dc9e22643" providerId="LiveId" clId="{0478CFAF-F744-4001-ABF3-5E8A4958592B}" dt="2025-07-05T15:19:38.870" v="812" actId="22"/>
           <ac:spMkLst>
@@ -6419,6 +7227,14 @@
             <ac:spMk id="54" creationId="{93C34A20-7CB5-2F0A-0C2D-D6976B6CD62A}"/>
           </ac:spMkLst>
         </pc:spChg>
+        <pc:spChg chg="add mod">
+          <ac:chgData name="Fatima Pillosu" userId="a6295d4dc9e22643" providerId="LiveId" clId="{0478CFAF-F744-4001-ABF3-5E8A4958592B}" dt="2025-07-05T17:26:33.797" v="2754"/>
+          <ac:spMkLst>
+            <pc:docMk/>
+            <pc:sldMk cId="2370713982" sldId="258"/>
+            <ac:spMk id="55" creationId="{20614E3F-7B5B-AA08-9D95-C80F19F2ABD8}"/>
+          </ac:spMkLst>
+        </pc:spChg>
         <pc:spChg chg="add del mod">
           <ac:chgData name="Fatima Pillosu" userId="a6295d4dc9e22643" providerId="LiveId" clId="{0478CFAF-F744-4001-ABF3-5E8A4958592B}" dt="2025-07-05T17:16:51.266" v="2578" actId="21"/>
           <ac:spMkLst>
@@ -6428,11 +7244,75 @@
           </ac:spMkLst>
         </pc:spChg>
         <pc:spChg chg="add mod">
+          <ac:chgData name="Fatima Pillosu" userId="a6295d4dc9e22643" providerId="LiveId" clId="{0478CFAF-F744-4001-ABF3-5E8A4958592B}" dt="2025-07-05T17:26:33.797" v="2754"/>
+          <ac:spMkLst>
+            <pc:docMk/>
+            <pc:sldMk cId="2370713982" sldId="258"/>
+            <ac:spMk id="56" creationId="{88969B4A-BBFC-0BCD-4C4F-1EBED9E73B67}"/>
+          </ac:spMkLst>
+        </pc:spChg>
+        <pc:spChg chg="add mod">
+          <ac:chgData name="Fatima Pillosu" userId="a6295d4dc9e22643" providerId="LiveId" clId="{0478CFAF-F744-4001-ABF3-5E8A4958592B}" dt="2025-07-05T17:26:33.797" v="2754"/>
+          <ac:spMkLst>
+            <pc:docMk/>
+            <pc:sldMk cId="2370713982" sldId="258"/>
+            <ac:spMk id="57" creationId="{68334C70-1B43-56C9-D1C9-5AE6A3BF9922}"/>
+          </ac:spMkLst>
+        </pc:spChg>
+        <pc:spChg chg="add mod">
+          <ac:chgData name="Fatima Pillosu" userId="a6295d4dc9e22643" providerId="LiveId" clId="{0478CFAF-F744-4001-ABF3-5E8A4958592B}" dt="2025-07-05T17:26:33.797" v="2754"/>
+          <ac:spMkLst>
+            <pc:docMk/>
+            <pc:sldMk cId="2370713982" sldId="258"/>
+            <ac:spMk id="58" creationId="{AA85B453-442C-1792-8D35-EC2E9F974AA0}"/>
+          </ac:spMkLst>
+        </pc:spChg>
+        <pc:spChg chg="add mod">
+          <ac:chgData name="Fatima Pillosu" userId="a6295d4dc9e22643" providerId="LiveId" clId="{0478CFAF-F744-4001-ABF3-5E8A4958592B}" dt="2025-07-05T17:26:33.797" v="2754"/>
+          <ac:spMkLst>
+            <pc:docMk/>
+            <pc:sldMk cId="2370713982" sldId="258"/>
+            <ac:spMk id="59" creationId="{B22666D9-9AAF-231D-4347-73725EF633F5}"/>
+          </ac:spMkLst>
+        </pc:spChg>
+        <pc:spChg chg="add mod">
+          <ac:chgData name="Fatima Pillosu" userId="a6295d4dc9e22643" providerId="LiveId" clId="{0478CFAF-F744-4001-ABF3-5E8A4958592B}" dt="2025-07-05T17:26:33.797" v="2754"/>
+          <ac:spMkLst>
+            <pc:docMk/>
+            <pc:sldMk cId="2370713982" sldId="258"/>
+            <ac:spMk id="60" creationId="{B04A8053-CE15-15A7-EF47-215CBAE180F3}"/>
+          </ac:spMkLst>
+        </pc:spChg>
+        <pc:spChg chg="add mod">
+          <ac:chgData name="Fatima Pillosu" userId="a6295d4dc9e22643" providerId="LiveId" clId="{0478CFAF-F744-4001-ABF3-5E8A4958592B}" dt="2025-07-05T17:26:33.797" v="2754"/>
+          <ac:spMkLst>
+            <pc:docMk/>
+            <pc:sldMk cId="2370713982" sldId="258"/>
+            <ac:spMk id="61" creationId="{48FEDD4E-7388-0801-B84D-77DEC1C9FB4D}"/>
+          </ac:spMkLst>
+        </pc:spChg>
+        <pc:spChg chg="add mod">
+          <ac:chgData name="Fatima Pillosu" userId="a6295d4dc9e22643" providerId="LiveId" clId="{0478CFAF-F744-4001-ABF3-5E8A4958592B}" dt="2025-07-05T17:26:33.797" v="2754"/>
+          <ac:spMkLst>
+            <pc:docMk/>
+            <pc:sldMk cId="2370713982" sldId="258"/>
+            <ac:spMk id="62" creationId="{823F1A11-94E0-29B5-F59B-99C0158EFA85}"/>
+          </ac:spMkLst>
+        </pc:spChg>
+        <pc:spChg chg="add mod">
           <ac:chgData name="Fatima Pillosu" userId="a6295d4dc9e22643" providerId="LiveId" clId="{0478CFAF-F744-4001-ABF3-5E8A4958592B}" dt="2025-07-05T16:37:00.957" v="1695"/>
           <ac:spMkLst>
             <pc:docMk/>
             <pc:sldMk cId="2370713982" sldId="258"/>
             <ac:spMk id="63" creationId="{318D1204-CCB6-3F04-441C-185E60523032}"/>
+          </ac:spMkLst>
+        </pc:spChg>
+        <pc:spChg chg="add mod">
+          <ac:chgData name="Fatima Pillosu" userId="a6295d4dc9e22643" providerId="LiveId" clId="{0478CFAF-F744-4001-ABF3-5E8A4958592B}" dt="2025-07-05T17:26:33.797" v="2754"/>
+          <ac:spMkLst>
+            <pc:docMk/>
+            <pc:sldMk cId="2370713982" sldId="258"/>
+            <ac:spMk id="63" creationId="{98925BC7-048A-908B-A3CC-4530AA91E7D1}"/>
           </ac:spMkLst>
         </pc:spChg>
         <pc:spChg chg="add mod">
@@ -8459,6 +9339,30 @@
             <ac:spMk id="320" creationId="{5102E2A0-5102-0C2A-81E7-3CE0B1C71E8E}"/>
           </ac:spMkLst>
         </pc:spChg>
+        <pc:spChg chg="add mod">
+          <ac:chgData name="Fatima Pillosu" userId="a6295d4dc9e22643" providerId="LiveId" clId="{0478CFAF-F744-4001-ABF3-5E8A4958592B}" dt="2025-07-05T17:26:33.797" v="2754"/>
+          <ac:spMkLst>
+            <pc:docMk/>
+            <pc:sldMk cId="2370713982" sldId="258"/>
+            <ac:spMk id="320" creationId="{99CBFCCB-C1AB-A602-D17C-AB3281B03E45}"/>
+          </ac:spMkLst>
+        </pc:spChg>
+        <pc:spChg chg="add mod">
+          <ac:chgData name="Fatima Pillosu" userId="a6295d4dc9e22643" providerId="LiveId" clId="{0478CFAF-F744-4001-ABF3-5E8A4958592B}" dt="2025-07-05T17:26:33.797" v="2754"/>
+          <ac:spMkLst>
+            <pc:docMk/>
+            <pc:sldMk cId="2370713982" sldId="258"/>
+            <ac:spMk id="321" creationId="{86718F0D-BD34-E0A3-74A1-3FB863EE64B1}"/>
+          </ac:spMkLst>
+        </pc:spChg>
+        <pc:spChg chg="add mod">
+          <ac:chgData name="Fatima Pillosu" userId="a6295d4dc9e22643" providerId="LiveId" clId="{0478CFAF-F744-4001-ABF3-5E8A4958592B}" dt="2025-07-05T17:26:33.797" v="2754"/>
+          <ac:spMkLst>
+            <pc:docMk/>
+            <pc:sldMk cId="2370713982" sldId="258"/>
+            <ac:spMk id="322" creationId="{F9215A04-B24F-0418-08E2-D9E47621F577}"/>
+          </ac:spMkLst>
+        </pc:spChg>
         <pc:spChg chg="add del mod">
           <ac:chgData name="Fatima Pillosu" userId="a6295d4dc9e22643" providerId="LiveId" clId="{0478CFAF-F744-4001-ABF3-5E8A4958592B}" dt="2025-07-05T17:17:09.004" v="2580" actId="21"/>
           <ac:spMkLst>
@@ -8467,6 +9371,22 @@
             <ac:spMk id="323" creationId="{37757665-AC28-C2D7-9288-A4F262BEDCA5}"/>
           </ac:spMkLst>
         </pc:spChg>
+        <pc:spChg chg="add mod">
+          <ac:chgData name="Fatima Pillosu" userId="a6295d4dc9e22643" providerId="LiveId" clId="{0478CFAF-F744-4001-ABF3-5E8A4958592B}" dt="2025-07-05T17:26:33.797" v="2754"/>
+          <ac:spMkLst>
+            <pc:docMk/>
+            <pc:sldMk cId="2370713982" sldId="258"/>
+            <ac:spMk id="323" creationId="{DF10195A-ED35-31A3-D4E7-00C38FDC3DAF}"/>
+          </ac:spMkLst>
+        </pc:spChg>
+        <pc:spChg chg="add mod">
+          <ac:chgData name="Fatima Pillosu" userId="a6295d4dc9e22643" providerId="LiveId" clId="{0478CFAF-F744-4001-ABF3-5E8A4958592B}" dt="2025-07-05T17:26:33.797" v="2754"/>
+          <ac:spMkLst>
+            <pc:docMk/>
+            <pc:sldMk cId="2370713982" sldId="258"/>
+            <ac:spMk id="324" creationId="{5B6C4763-6B0E-D586-D0B5-1D54B0EC42C9}"/>
+          </ac:spMkLst>
+        </pc:spChg>
         <pc:spChg chg="add del mod">
           <ac:chgData name="Fatima Pillosu" userId="a6295d4dc9e22643" providerId="LiveId" clId="{0478CFAF-F744-4001-ABF3-5E8A4958592B}" dt="2025-07-05T17:17:09.004" v="2580" actId="21"/>
           <ac:spMkLst>
@@ -8483,6 +9403,22 @@
             <ac:spMk id="325" creationId="{EC3C4672-BBD3-831C-7CA8-0C6A492C9F9C}"/>
           </ac:spMkLst>
         </pc:spChg>
+        <pc:spChg chg="add mod">
+          <ac:chgData name="Fatima Pillosu" userId="a6295d4dc9e22643" providerId="LiveId" clId="{0478CFAF-F744-4001-ABF3-5E8A4958592B}" dt="2025-07-05T17:26:33.797" v="2754"/>
+          <ac:spMkLst>
+            <pc:docMk/>
+            <pc:sldMk cId="2370713982" sldId="258"/>
+            <ac:spMk id="326" creationId="{21F70C20-FC02-1136-3665-B0E19793C67F}"/>
+          </ac:spMkLst>
+        </pc:spChg>
+        <pc:spChg chg="add mod">
+          <ac:chgData name="Fatima Pillosu" userId="a6295d4dc9e22643" providerId="LiveId" clId="{0478CFAF-F744-4001-ABF3-5E8A4958592B}" dt="2025-07-05T17:26:33.797" v="2754"/>
+          <ac:spMkLst>
+            <pc:docMk/>
+            <pc:sldMk cId="2370713982" sldId="258"/>
+            <ac:spMk id="327" creationId="{31711C9E-2A5A-760F-C652-C7DEE237D786}"/>
+          </ac:spMkLst>
+        </pc:spChg>
         <pc:spChg chg="add del mod">
           <ac:chgData name="Fatima Pillosu" userId="a6295d4dc9e22643" providerId="LiveId" clId="{0478CFAF-F744-4001-ABF3-5E8A4958592B}" dt="2025-07-05T17:17:09.004" v="2580" actId="21"/>
           <ac:spMkLst>
@@ -8499,6 +9435,30 @@
             <ac:spMk id="328" creationId="{4DC959A9-7C89-6A9D-8C2C-4CCD3B47ECC5}"/>
           </ac:spMkLst>
         </pc:spChg>
+        <pc:spChg chg="add mod">
+          <ac:chgData name="Fatima Pillosu" userId="a6295d4dc9e22643" providerId="LiveId" clId="{0478CFAF-F744-4001-ABF3-5E8A4958592B}" dt="2025-07-05T17:26:33.797" v="2754"/>
+          <ac:spMkLst>
+            <pc:docMk/>
+            <pc:sldMk cId="2370713982" sldId="258"/>
+            <ac:spMk id="328" creationId="{DB059085-E0D5-CADA-3F36-A56C730A8473}"/>
+          </ac:spMkLst>
+        </pc:spChg>
+        <pc:spChg chg="add mod">
+          <ac:chgData name="Fatima Pillosu" userId="a6295d4dc9e22643" providerId="LiveId" clId="{0478CFAF-F744-4001-ABF3-5E8A4958592B}" dt="2025-07-05T17:26:33.797" v="2754"/>
+          <ac:spMkLst>
+            <pc:docMk/>
+            <pc:sldMk cId="2370713982" sldId="258"/>
+            <ac:spMk id="330" creationId="{EFCD7474-517B-B36F-AF3F-E369331CEA7E}"/>
+          </ac:spMkLst>
+        </pc:spChg>
+        <pc:spChg chg="add mod">
+          <ac:chgData name="Fatima Pillosu" userId="a6295d4dc9e22643" providerId="LiveId" clId="{0478CFAF-F744-4001-ABF3-5E8A4958592B}" dt="2025-07-05T17:26:33.797" v="2754"/>
+          <ac:spMkLst>
+            <pc:docMk/>
+            <pc:sldMk cId="2370713982" sldId="258"/>
+            <ac:spMk id="331" creationId="{04799BE8-60EA-E757-9A94-DB8FEB681C81}"/>
+          </ac:spMkLst>
+        </pc:spChg>
         <pc:spChg chg="add del mod">
           <ac:chgData name="Fatima Pillosu" userId="a6295d4dc9e22643" providerId="LiveId" clId="{0478CFAF-F744-4001-ABF3-5E8A4958592B}" dt="2025-07-05T17:17:09.004" v="2580" actId="21"/>
           <ac:spMkLst>
@@ -8507,6 +9467,14 @@
             <ac:spMk id="332" creationId="{1A0731B8-37BC-29FF-5EFB-3505DFCBB060}"/>
           </ac:spMkLst>
         </pc:spChg>
+        <pc:spChg chg="add mod">
+          <ac:chgData name="Fatima Pillosu" userId="a6295d4dc9e22643" providerId="LiveId" clId="{0478CFAF-F744-4001-ABF3-5E8A4958592B}" dt="2025-07-05T17:26:33.797" v="2754"/>
+          <ac:spMkLst>
+            <pc:docMk/>
+            <pc:sldMk cId="2370713982" sldId="258"/>
+            <ac:spMk id="332" creationId="{248829A6-BE36-E5E9-F00B-E5FA0055DC9A}"/>
+          </ac:spMkLst>
+        </pc:spChg>
         <pc:spChg chg="add del mod">
           <ac:chgData name="Fatima Pillosu" userId="a6295d4dc9e22643" providerId="LiveId" clId="{0478CFAF-F744-4001-ABF3-5E8A4958592B}" dt="2025-07-05T17:17:09.004" v="2580" actId="21"/>
           <ac:spMkLst>
@@ -8515,6 +9483,22 @@
             <ac:spMk id="333" creationId="{5382C8C2-6F3C-50EB-0A51-B5F6DC1665D1}"/>
           </ac:spMkLst>
         </pc:spChg>
+        <pc:spChg chg="add mod">
+          <ac:chgData name="Fatima Pillosu" userId="a6295d4dc9e22643" providerId="LiveId" clId="{0478CFAF-F744-4001-ABF3-5E8A4958592B}" dt="2025-07-05T17:26:33.797" v="2754"/>
+          <ac:spMkLst>
+            <pc:docMk/>
+            <pc:sldMk cId="2370713982" sldId="258"/>
+            <ac:spMk id="333" creationId="{742439C6-92AE-9BD9-9415-15F2420BB0E4}"/>
+          </ac:spMkLst>
+        </pc:spChg>
+        <pc:spChg chg="add mod">
+          <ac:chgData name="Fatima Pillosu" userId="a6295d4dc9e22643" providerId="LiveId" clId="{0478CFAF-F744-4001-ABF3-5E8A4958592B}" dt="2025-07-05T17:26:33.797" v="2754"/>
+          <ac:spMkLst>
+            <pc:docMk/>
+            <pc:sldMk cId="2370713982" sldId="258"/>
+            <ac:spMk id="334" creationId="{5ACC015C-C125-61F6-C80D-082E4DA1855F}"/>
+          </ac:spMkLst>
+        </pc:spChg>
         <pc:spChg chg="add del mod">
           <ac:chgData name="Fatima Pillosu" userId="a6295d4dc9e22643" providerId="LiveId" clId="{0478CFAF-F744-4001-ABF3-5E8A4958592B}" dt="2025-07-05T17:17:09.004" v="2580" actId="21"/>
           <ac:spMkLst>
@@ -8523,6 +9507,14 @@
             <ac:spMk id="334" creationId="{AFE3A951-104C-CEDE-A21D-544D4B214711}"/>
           </ac:spMkLst>
         </pc:spChg>
+        <pc:spChg chg="add mod">
+          <ac:chgData name="Fatima Pillosu" userId="a6295d4dc9e22643" providerId="LiveId" clId="{0478CFAF-F744-4001-ABF3-5E8A4958592B}" dt="2025-07-05T17:26:33.797" v="2754"/>
+          <ac:spMkLst>
+            <pc:docMk/>
+            <pc:sldMk cId="2370713982" sldId="258"/>
+            <ac:spMk id="335" creationId="{8F80601E-4CB8-C9D3-F8D7-6CAF3543AC34}"/>
+          </ac:spMkLst>
+        </pc:spChg>
         <pc:spChg chg="add del mod">
           <ac:chgData name="Fatima Pillosu" userId="a6295d4dc9e22643" providerId="LiveId" clId="{0478CFAF-F744-4001-ABF3-5E8A4958592B}" dt="2025-07-05T17:17:09.004" v="2580" actId="21"/>
           <ac:spMkLst>
@@ -8531,6 +9523,14 @@
             <ac:spMk id="335" creationId="{F81123FD-1880-7B13-64BB-A61B32D6C3FC}"/>
           </ac:spMkLst>
         </pc:spChg>
+        <pc:spChg chg="add mod">
+          <ac:chgData name="Fatima Pillosu" userId="a6295d4dc9e22643" providerId="LiveId" clId="{0478CFAF-F744-4001-ABF3-5E8A4958592B}" dt="2025-07-05T17:26:33.797" v="2754"/>
+          <ac:spMkLst>
+            <pc:docMk/>
+            <pc:sldMk cId="2370713982" sldId="258"/>
+            <ac:spMk id="336" creationId="{419CA6F4-9D8A-5E95-66F6-EB3742697349}"/>
+          </ac:spMkLst>
+        </pc:spChg>
         <pc:spChg chg="add del mod">
           <ac:chgData name="Fatima Pillosu" userId="a6295d4dc9e22643" providerId="LiveId" clId="{0478CFAF-F744-4001-ABF3-5E8A4958592B}" dt="2025-07-05T17:17:09.004" v="2580" actId="21"/>
           <ac:spMkLst>
@@ -8539,6 +9539,14 @@
             <ac:spMk id="336" creationId="{68F25C0E-89BD-9175-A93B-76E013FBF0DD}"/>
           </ac:spMkLst>
         </pc:spChg>
+        <pc:spChg chg="add mod">
+          <ac:chgData name="Fatima Pillosu" userId="a6295d4dc9e22643" providerId="LiveId" clId="{0478CFAF-F744-4001-ABF3-5E8A4958592B}" dt="2025-07-05T17:26:33.797" v="2754"/>
+          <ac:spMkLst>
+            <pc:docMk/>
+            <pc:sldMk cId="2370713982" sldId="258"/>
+            <ac:spMk id="337" creationId="{8FF7EC8F-85ED-82BC-1411-C58F124D6A8E}"/>
+          </ac:spMkLst>
+        </pc:spChg>
         <pc:spChg chg="add del mod">
           <ac:chgData name="Fatima Pillosu" userId="a6295d4dc9e22643" providerId="LiveId" clId="{0478CFAF-F744-4001-ABF3-5E8A4958592B}" dt="2025-07-05T17:17:09.004" v="2580" actId="21"/>
           <ac:spMkLst>
@@ -8547,6 +9555,14 @@
             <ac:spMk id="337" creationId="{96248778-630E-7601-4FAE-FF9CFCDF1B42}"/>
           </ac:spMkLst>
         </pc:spChg>
+        <pc:spChg chg="add mod">
+          <ac:chgData name="Fatima Pillosu" userId="a6295d4dc9e22643" providerId="LiveId" clId="{0478CFAF-F744-4001-ABF3-5E8A4958592B}" dt="2025-07-05T17:26:33.797" v="2754"/>
+          <ac:spMkLst>
+            <pc:docMk/>
+            <pc:sldMk cId="2370713982" sldId="258"/>
+            <ac:spMk id="338" creationId="{496347D2-A129-07FB-E06A-D1C5C85D3E9D}"/>
+          </ac:spMkLst>
+        </pc:spChg>
         <pc:spChg chg="add del mod">
           <ac:chgData name="Fatima Pillosu" userId="a6295d4dc9e22643" providerId="LiveId" clId="{0478CFAF-F744-4001-ABF3-5E8A4958592B}" dt="2025-07-05T17:17:09.004" v="2580" actId="21"/>
           <ac:spMkLst>
@@ -8571,6 +9587,22 @@
             <ac:spMk id="340" creationId="{28B436EB-88AE-9EF3-EB76-64B6D1FB6EEB}"/>
           </ac:spMkLst>
         </pc:spChg>
+        <pc:spChg chg="add mod">
+          <ac:chgData name="Fatima Pillosu" userId="a6295d4dc9e22643" providerId="LiveId" clId="{0478CFAF-F744-4001-ABF3-5E8A4958592B}" dt="2025-07-05T17:26:33.797" v="2754"/>
+          <ac:spMkLst>
+            <pc:docMk/>
+            <pc:sldMk cId="2370713982" sldId="258"/>
+            <ac:spMk id="340" creationId="{51711E70-ED7A-E612-FC22-61E0BA727939}"/>
+          </ac:spMkLst>
+        </pc:spChg>
+        <pc:spChg chg="add mod">
+          <ac:chgData name="Fatima Pillosu" userId="a6295d4dc9e22643" providerId="LiveId" clId="{0478CFAF-F744-4001-ABF3-5E8A4958592B}" dt="2025-07-05T17:26:33.797" v="2754"/>
+          <ac:spMkLst>
+            <pc:docMk/>
+            <pc:sldMk cId="2370713982" sldId="258"/>
+            <ac:spMk id="341" creationId="{8F0EA465-9CB1-746A-CF6F-708E8BF5CD36}"/>
+          </ac:spMkLst>
+        </pc:spChg>
         <pc:spChg chg="add del mod">
           <ac:chgData name="Fatima Pillosu" userId="a6295d4dc9e22643" providerId="LiveId" clId="{0478CFAF-F744-4001-ABF3-5E8A4958592B}" dt="2025-07-05T17:17:09.004" v="2580" actId="21"/>
           <ac:spMkLst>
@@ -8579,6 +9611,14 @@
             <ac:spMk id="341" creationId="{F27C24D0-AB2A-41DB-6171-C0B6ED9E9A68}"/>
           </ac:spMkLst>
         </pc:spChg>
+        <pc:spChg chg="add mod">
+          <ac:chgData name="Fatima Pillosu" userId="a6295d4dc9e22643" providerId="LiveId" clId="{0478CFAF-F744-4001-ABF3-5E8A4958592B}" dt="2025-07-05T17:26:33.797" v="2754"/>
+          <ac:spMkLst>
+            <pc:docMk/>
+            <pc:sldMk cId="2370713982" sldId="258"/>
+            <ac:spMk id="342" creationId="{1CCB6C72-CEC8-FD46-A0F3-7707AB65E8D1}"/>
+          </ac:spMkLst>
+        </pc:spChg>
         <pc:spChg chg="add del mod">
           <ac:chgData name="Fatima Pillosu" userId="a6295d4dc9e22643" providerId="LiveId" clId="{0478CFAF-F744-4001-ABF3-5E8A4958592B}" dt="2025-07-05T17:17:09.004" v="2580" actId="21"/>
           <ac:spMkLst>
@@ -8595,6 +9635,14 @@
             <ac:spMk id="343" creationId="{2CFA74E3-D91E-2C27-4A99-D3D1A111919C}"/>
           </ac:spMkLst>
         </pc:spChg>
+        <pc:spChg chg="add mod">
+          <ac:chgData name="Fatima Pillosu" userId="a6295d4dc9e22643" providerId="LiveId" clId="{0478CFAF-F744-4001-ABF3-5E8A4958592B}" dt="2025-07-05T17:26:33.797" v="2754"/>
+          <ac:spMkLst>
+            <pc:docMk/>
+            <pc:sldMk cId="2370713982" sldId="258"/>
+            <ac:spMk id="343" creationId="{413D2B48-02A6-B2E0-8549-CE7E0BD00714}"/>
+          </ac:spMkLst>
+        </pc:spChg>
         <pc:spChg chg="add del mod">
           <ac:chgData name="Fatima Pillosu" userId="a6295d4dc9e22643" providerId="LiveId" clId="{0478CFAF-F744-4001-ABF3-5E8A4958592B}" dt="2025-07-05T17:17:09.004" v="2580" actId="21"/>
           <ac:spMkLst>
@@ -8651,6 +9699,14 @@
             <ac:spMk id="350" creationId="{BD4FCEEF-D9EE-3F9D-274E-A275AE7207AC}"/>
           </ac:spMkLst>
         </pc:spChg>
+        <pc:spChg chg="add del">
+          <ac:chgData name="Fatima Pillosu" userId="a6295d4dc9e22643" providerId="LiveId" clId="{0478CFAF-F744-4001-ABF3-5E8A4958592B}" dt="2025-07-05T17:31:47.344" v="2905" actId="478"/>
+          <ac:spMkLst>
+            <pc:docMk/>
+            <pc:sldMk cId="2370713982" sldId="258"/>
+            <ac:spMk id="351" creationId="{CD846D1F-5F51-5BCB-DA23-D711CF6120EA}"/>
+          </ac:spMkLst>
+        </pc:spChg>
         <pc:spChg chg="add del mod">
           <ac:chgData name="Fatima Pillosu" userId="a6295d4dc9e22643" providerId="LiveId" clId="{0478CFAF-F744-4001-ABF3-5E8A4958592B}" dt="2025-07-05T17:17:09.004" v="2580" actId="21"/>
           <ac:spMkLst>
@@ -8675,6 +9731,14 @@
             <ac:spMk id="354" creationId="{0BBE180E-9D2D-A30D-B94E-AB6240A4F89E}"/>
           </ac:spMkLst>
         </pc:spChg>
+        <pc:spChg chg="add mod">
+          <ac:chgData name="Fatima Pillosu" userId="a6295d4dc9e22643" providerId="LiveId" clId="{0478CFAF-F744-4001-ABF3-5E8A4958592B}" dt="2025-07-05T17:32:07.102" v="2909" actId="1036"/>
+          <ac:spMkLst>
+            <pc:docMk/>
+            <pc:sldMk cId="2370713982" sldId="258"/>
+            <ac:spMk id="354" creationId="{37757665-AC28-C2D7-9288-A4F262BEDCA5}"/>
+          </ac:spMkLst>
+        </pc:spChg>
         <pc:spChg chg="add del mod">
           <ac:chgData name="Fatima Pillosu" userId="a6295d4dc9e22643" providerId="LiveId" clId="{0478CFAF-F744-4001-ABF3-5E8A4958592B}" dt="2025-07-05T17:17:09.004" v="2580" actId="21"/>
           <ac:spMkLst>
@@ -8683,6 +9747,14 @@
             <ac:spMk id="355" creationId="{27B7D5CF-81CA-4EAF-61FB-FBDB71CAE40F}"/>
           </ac:spMkLst>
         </pc:spChg>
+        <pc:spChg chg="add mod">
+          <ac:chgData name="Fatima Pillosu" userId="a6295d4dc9e22643" providerId="LiveId" clId="{0478CFAF-F744-4001-ABF3-5E8A4958592B}" dt="2025-07-05T17:32:07.102" v="2909" actId="1036"/>
+          <ac:spMkLst>
+            <pc:docMk/>
+            <pc:sldMk cId="2370713982" sldId="258"/>
+            <ac:spMk id="355" creationId="{6E3975A0-04BD-A32C-5C8E-87D363BCBF43}"/>
+          </ac:spMkLst>
+        </pc:spChg>
         <pc:spChg chg="add del mod">
           <ac:chgData name="Fatima Pillosu" userId="a6295d4dc9e22643" providerId="LiveId" clId="{0478CFAF-F744-4001-ABF3-5E8A4958592B}" dt="2025-07-05T17:17:09.004" v="2580" actId="21"/>
           <ac:spMkLst>
@@ -8691,6 +9763,22 @@
             <ac:spMk id="356" creationId="{78B6A93C-975D-F2FB-2429-F211CE81F035}"/>
           </ac:spMkLst>
         </pc:spChg>
+        <pc:spChg chg="add mod">
+          <ac:chgData name="Fatima Pillosu" userId="a6295d4dc9e22643" providerId="LiveId" clId="{0478CFAF-F744-4001-ABF3-5E8A4958592B}" dt="2025-07-05T17:32:07.102" v="2909" actId="1036"/>
+          <ac:spMkLst>
+            <pc:docMk/>
+            <pc:sldMk cId="2370713982" sldId="258"/>
+            <ac:spMk id="356" creationId="{EC3C4672-BBD3-831C-7CA8-0C6A492C9F9C}"/>
+          </ac:spMkLst>
+        </pc:spChg>
+        <pc:spChg chg="add mod">
+          <ac:chgData name="Fatima Pillosu" userId="a6295d4dc9e22643" providerId="LiveId" clId="{0478CFAF-F744-4001-ABF3-5E8A4958592B}" dt="2025-07-05T17:32:07.102" v="2909" actId="1036"/>
+          <ac:spMkLst>
+            <pc:docMk/>
+            <pc:sldMk cId="2370713982" sldId="258"/>
+            <ac:spMk id="358" creationId="{66347620-DBE3-A5F5-F8A3-7C2F7C6EBDE6}"/>
+          </ac:spMkLst>
+        </pc:spChg>
         <pc:spChg chg="add del mod">
           <ac:chgData name="Fatima Pillosu" userId="a6295d4dc9e22643" providerId="LiveId" clId="{0478CFAF-F744-4001-ABF3-5E8A4958592B}" dt="2025-07-05T17:17:09.004" v="2580" actId="21"/>
           <ac:spMkLst>
@@ -8700,245 +9788,461 @@
           </ac:spMkLst>
         </pc:spChg>
         <pc:spChg chg="add mod">
-          <ac:chgData name="Fatima Pillosu" userId="a6295d4dc9e22643" providerId="LiveId" clId="{0478CFAF-F744-4001-ABF3-5E8A4958592B}" dt="2025-07-05T17:17:58.193" v="2608" actId="1036"/>
+          <ac:chgData name="Fatima Pillosu" userId="a6295d4dc9e22643" providerId="LiveId" clId="{0478CFAF-F744-4001-ABF3-5E8A4958592B}" dt="2025-07-05T17:32:07.102" v="2909" actId="1036"/>
+          <ac:spMkLst>
+            <pc:docMk/>
+            <pc:sldMk cId="2370713982" sldId="258"/>
+            <ac:spMk id="359" creationId="{4DC959A9-7C89-6A9D-8C2C-4CCD3B47ECC5}"/>
+          </ac:spMkLst>
+        </pc:spChg>
+        <pc:spChg chg="add mod">
+          <ac:chgData name="Fatima Pillosu" userId="a6295d4dc9e22643" providerId="LiveId" clId="{0478CFAF-F744-4001-ABF3-5E8A4958592B}" dt="2025-07-05T17:32:07.102" v="2909" actId="1036"/>
+          <ac:spMkLst>
+            <pc:docMk/>
+            <pc:sldMk cId="2370713982" sldId="258"/>
+            <ac:spMk id="363" creationId="{1A0731B8-37BC-29FF-5EFB-3505DFCBB060}"/>
+          </ac:spMkLst>
+        </pc:spChg>
+        <pc:spChg chg="add mod">
+          <ac:chgData name="Fatima Pillosu" userId="a6295d4dc9e22643" providerId="LiveId" clId="{0478CFAF-F744-4001-ABF3-5E8A4958592B}" dt="2025-07-05T17:32:07.102" v="2909" actId="1036"/>
+          <ac:spMkLst>
+            <pc:docMk/>
+            <pc:sldMk cId="2370713982" sldId="258"/>
+            <ac:spMk id="364" creationId="{5382C8C2-6F3C-50EB-0A51-B5F6DC1665D1}"/>
+          </ac:spMkLst>
+        </pc:spChg>
+        <pc:spChg chg="add del mod">
+          <ac:chgData name="Fatima Pillosu" userId="a6295d4dc9e22643" providerId="LiveId" clId="{0478CFAF-F744-4001-ABF3-5E8A4958592B}" dt="2025-07-05T17:31:48.799" v="2906" actId="21"/>
           <ac:spMkLst>
             <pc:docMk/>
             <pc:sldMk cId="2370713982" sldId="258"/>
             <ac:spMk id="367" creationId="{37757665-AC28-C2D7-9288-A4F262BEDCA5}"/>
           </ac:spMkLst>
         </pc:spChg>
-        <pc:spChg chg="add mod">
-          <ac:chgData name="Fatima Pillosu" userId="a6295d4dc9e22643" providerId="LiveId" clId="{0478CFAF-F744-4001-ABF3-5E8A4958592B}" dt="2025-07-05T17:17:17.389" v="2581"/>
+        <pc:spChg chg="add del mod">
+          <ac:chgData name="Fatima Pillosu" userId="a6295d4dc9e22643" providerId="LiveId" clId="{0478CFAF-F744-4001-ABF3-5E8A4958592B}" dt="2025-07-05T17:31:48.799" v="2906" actId="21"/>
           <ac:spMkLst>
             <pc:docMk/>
             <pc:sldMk cId="2370713982" sldId="258"/>
             <ac:spMk id="368" creationId="{6E3975A0-04BD-A32C-5C8E-87D363BCBF43}"/>
           </ac:spMkLst>
         </pc:spChg>
-        <pc:spChg chg="add mod">
-          <ac:chgData name="Fatima Pillosu" userId="a6295d4dc9e22643" providerId="LiveId" clId="{0478CFAF-F744-4001-ABF3-5E8A4958592B}" dt="2025-07-05T17:17:17.389" v="2581"/>
+        <pc:spChg chg="add del mod">
+          <ac:chgData name="Fatima Pillosu" userId="a6295d4dc9e22643" providerId="LiveId" clId="{0478CFAF-F744-4001-ABF3-5E8A4958592B}" dt="2025-07-05T17:31:48.799" v="2906" actId="21"/>
           <ac:spMkLst>
             <pc:docMk/>
             <pc:sldMk cId="2370713982" sldId="258"/>
             <ac:spMk id="369" creationId="{EC3C4672-BBD3-831C-7CA8-0C6A492C9F9C}"/>
           </ac:spMkLst>
         </pc:spChg>
-        <pc:spChg chg="add mod">
-          <ac:chgData name="Fatima Pillosu" userId="a6295d4dc9e22643" providerId="LiveId" clId="{0478CFAF-F744-4001-ABF3-5E8A4958592B}" dt="2025-07-05T17:17:58.193" v="2608" actId="1036"/>
+        <pc:spChg chg="add del mod">
+          <ac:chgData name="Fatima Pillosu" userId="a6295d4dc9e22643" providerId="LiveId" clId="{0478CFAF-F744-4001-ABF3-5E8A4958592B}" dt="2025-07-05T17:31:48.799" v="2906" actId="21"/>
           <ac:spMkLst>
             <pc:docMk/>
             <pc:sldMk cId="2370713982" sldId="258"/>
             <ac:spMk id="371" creationId="{66347620-DBE3-A5F5-F8A3-7C2F7C6EBDE6}"/>
           </ac:spMkLst>
         </pc:spChg>
-        <pc:spChg chg="add mod">
-          <ac:chgData name="Fatima Pillosu" userId="a6295d4dc9e22643" providerId="LiveId" clId="{0478CFAF-F744-4001-ABF3-5E8A4958592B}" dt="2025-07-05T17:17:58.193" v="2608" actId="1036"/>
+        <pc:spChg chg="add del mod">
+          <ac:chgData name="Fatima Pillosu" userId="a6295d4dc9e22643" providerId="LiveId" clId="{0478CFAF-F744-4001-ABF3-5E8A4958592B}" dt="2025-07-05T17:31:48.799" v="2906" actId="21"/>
           <ac:spMkLst>
             <pc:docMk/>
             <pc:sldMk cId="2370713982" sldId="258"/>
             <ac:spMk id="372" creationId="{4DC959A9-7C89-6A9D-8C2C-4CCD3B47ECC5}"/>
           </ac:spMkLst>
         </pc:spChg>
-        <pc:spChg chg="add mod">
-          <ac:chgData name="Fatima Pillosu" userId="a6295d4dc9e22643" providerId="LiveId" clId="{0478CFAF-F744-4001-ABF3-5E8A4958592B}" dt="2025-07-05T17:17:58.193" v="2608" actId="1036"/>
+        <pc:spChg chg="add del mod">
+          <ac:chgData name="Fatima Pillosu" userId="a6295d4dc9e22643" providerId="LiveId" clId="{0478CFAF-F744-4001-ABF3-5E8A4958592B}" dt="2025-07-05T17:31:48.799" v="2906" actId="21"/>
           <ac:spMkLst>
             <pc:docMk/>
             <pc:sldMk cId="2370713982" sldId="258"/>
             <ac:spMk id="376" creationId="{1A0731B8-37BC-29FF-5EFB-3505DFCBB060}"/>
           </ac:spMkLst>
         </pc:spChg>
-        <pc:spChg chg="add mod">
-          <ac:chgData name="Fatima Pillosu" userId="a6295d4dc9e22643" providerId="LiveId" clId="{0478CFAF-F744-4001-ABF3-5E8A4958592B}" dt="2025-07-05T17:17:58.193" v="2608" actId="1036"/>
+        <pc:spChg chg="add del mod">
+          <ac:chgData name="Fatima Pillosu" userId="a6295d4dc9e22643" providerId="LiveId" clId="{0478CFAF-F744-4001-ABF3-5E8A4958592B}" dt="2025-07-05T17:31:48.799" v="2906" actId="21"/>
           <ac:spMkLst>
             <pc:docMk/>
             <pc:sldMk cId="2370713982" sldId="258"/>
             <ac:spMk id="377" creationId="{5382C8C2-6F3C-50EB-0A51-B5F6DC1665D1}"/>
           </ac:spMkLst>
         </pc:spChg>
-        <pc:spChg chg="add mod">
-          <ac:chgData name="Fatima Pillosu" userId="a6295d4dc9e22643" providerId="LiveId" clId="{0478CFAF-F744-4001-ABF3-5E8A4958592B}" dt="2025-07-05T17:17:58.193" v="2608" actId="1036"/>
+        <pc:spChg chg="add del mod">
+          <ac:chgData name="Fatima Pillosu" userId="a6295d4dc9e22643" providerId="LiveId" clId="{0478CFAF-F744-4001-ABF3-5E8A4958592B}" dt="2025-07-05T17:31:48.799" v="2906" actId="21"/>
           <ac:spMkLst>
             <pc:docMk/>
             <pc:sldMk cId="2370713982" sldId="258"/>
             <ac:spMk id="378" creationId="{AFE3A951-104C-CEDE-A21D-544D4B214711}"/>
           </ac:spMkLst>
         </pc:spChg>
-        <pc:spChg chg="add mod">
-          <ac:chgData name="Fatima Pillosu" userId="a6295d4dc9e22643" providerId="LiveId" clId="{0478CFAF-F744-4001-ABF3-5E8A4958592B}" dt="2025-07-05T17:17:58.193" v="2608" actId="1036"/>
+        <pc:spChg chg="add del mod">
+          <ac:chgData name="Fatima Pillosu" userId="a6295d4dc9e22643" providerId="LiveId" clId="{0478CFAF-F744-4001-ABF3-5E8A4958592B}" dt="2025-07-05T17:31:48.799" v="2906" actId="21"/>
           <ac:spMkLst>
             <pc:docMk/>
             <pc:sldMk cId="2370713982" sldId="258"/>
             <ac:spMk id="379" creationId="{F81123FD-1880-7B13-64BB-A61B32D6C3FC}"/>
           </ac:spMkLst>
         </pc:spChg>
-        <pc:spChg chg="add mod">
-          <ac:chgData name="Fatima Pillosu" userId="a6295d4dc9e22643" providerId="LiveId" clId="{0478CFAF-F744-4001-ABF3-5E8A4958592B}" dt="2025-07-05T17:17:58.193" v="2608" actId="1036"/>
+        <pc:spChg chg="add del mod">
+          <ac:chgData name="Fatima Pillosu" userId="a6295d4dc9e22643" providerId="LiveId" clId="{0478CFAF-F744-4001-ABF3-5E8A4958592B}" dt="2025-07-05T17:31:48.799" v="2906" actId="21"/>
           <ac:spMkLst>
             <pc:docMk/>
             <pc:sldMk cId="2370713982" sldId="258"/>
             <ac:spMk id="380" creationId="{68F25C0E-89BD-9175-A93B-76E013FBF0DD}"/>
           </ac:spMkLst>
         </pc:spChg>
-        <pc:spChg chg="add mod">
-          <ac:chgData name="Fatima Pillosu" userId="a6295d4dc9e22643" providerId="LiveId" clId="{0478CFAF-F744-4001-ABF3-5E8A4958592B}" dt="2025-07-05T17:17:58.193" v="2608" actId="1036"/>
+        <pc:spChg chg="add del mod">
+          <ac:chgData name="Fatima Pillosu" userId="a6295d4dc9e22643" providerId="LiveId" clId="{0478CFAF-F744-4001-ABF3-5E8A4958592B}" dt="2025-07-05T17:31:48.799" v="2906" actId="21"/>
           <ac:spMkLst>
             <pc:docMk/>
             <pc:sldMk cId="2370713982" sldId="258"/>
             <ac:spMk id="381" creationId="{96248778-630E-7601-4FAE-FF9CFCDF1B42}"/>
           </ac:spMkLst>
         </pc:spChg>
-        <pc:spChg chg="add mod">
-          <ac:chgData name="Fatima Pillosu" userId="a6295d4dc9e22643" providerId="LiveId" clId="{0478CFAF-F744-4001-ABF3-5E8A4958592B}" dt="2025-07-05T17:17:58.193" v="2608" actId="1036"/>
+        <pc:spChg chg="add del mod">
+          <ac:chgData name="Fatima Pillosu" userId="a6295d4dc9e22643" providerId="LiveId" clId="{0478CFAF-F744-4001-ABF3-5E8A4958592B}" dt="2025-07-05T17:31:48.799" v="2906" actId="21"/>
           <ac:spMkLst>
             <pc:docMk/>
             <pc:sldMk cId="2370713982" sldId="258"/>
             <ac:spMk id="382" creationId="{9CADC630-E44A-1A89-9FDE-8EDA7123B19C}"/>
           </ac:spMkLst>
         </pc:spChg>
-        <pc:spChg chg="add mod">
-          <ac:chgData name="Fatima Pillosu" userId="a6295d4dc9e22643" providerId="LiveId" clId="{0478CFAF-F744-4001-ABF3-5E8A4958592B}" dt="2025-07-05T17:17:58.193" v="2608" actId="1036"/>
+        <pc:spChg chg="add del mod">
+          <ac:chgData name="Fatima Pillosu" userId="a6295d4dc9e22643" providerId="LiveId" clId="{0478CFAF-F744-4001-ABF3-5E8A4958592B}" dt="2025-07-05T17:31:48.799" v="2906" actId="21"/>
           <ac:spMkLst>
             <pc:docMk/>
             <pc:sldMk cId="2370713982" sldId="258"/>
             <ac:spMk id="383" creationId="{EAF3C8BC-9003-987C-E4A9-44A032A5528E}"/>
           </ac:spMkLst>
         </pc:spChg>
-        <pc:spChg chg="add mod">
-          <ac:chgData name="Fatima Pillosu" userId="a6295d4dc9e22643" providerId="LiveId" clId="{0478CFAF-F744-4001-ABF3-5E8A4958592B}" dt="2025-07-05T17:17:58.193" v="2608" actId="1036"/>
+        <pc:spChg chg="add del mod">
+          <ac:chgData name="Fatima Pillosu" userId="a6295d4dc9e22643" providerId="LiveId" clId="{0478CFAF-F744-4001-ABF3-5E8A4958592B}" dt="2025-07-05T17:31:48.799" v="2906" actId="21"/>
           <ac:spMkLst>
             <pc:docMk/>
             <pc:sldMk cId="2370713982" sldId="258"/>
             <ac:spMk id="384" creationId="{28B436EB-88AE-9EF3-EB76-64B6D1FB6EEB}"/>
           </ac:spMkLst>
         </pc:spChg>
-        <pc:spChg chg="add mod">
-          <ac:chgData name="Fatima Pillosu" userId="a6295d4dc9e22643" providerId="LiveId" clId="{0478CFAF-F744-4001-ABF3-5E8A4958592B}" dt="2025-07-05T17:17:58.193" v="2608" actId="1036"/>
+        <pc:spChg chg="add del mod">
+          <ac:chgData name="Fatima Pillosu" userId="a6295d4dc9e22643" providerId="LiveId" clId="{0478CFAF-F744-4001-ABF3-5E8A4958592B}" dt="2025-07-05T17:31:48.799" v="2906" actId="21"/>
           <ac:spMkLst>
             <pc:docMk/>
             <pc:sldMk cId="2370713982" sldId="258"/>
             <ac:spMk id="385" creationId="{F27C24D0-AB2A-41DB-6171-C0B6ED9E9A68}"/>
           </ac:spMkLst>
         </pc:spChg>
-        <pc:spChg chg="add mod">
-          <ac:chgData name="Fatima Pillosu" userId="a6295d4dc9e22643" providerId="LiveId" clId="{0478CFAF-F744-4001-ABF3-5E8A4958592B}" dt="2025-07-05T17:17:58.193" v="2608" actId="1036"/>
+        <pc:spChg chg="add del mod">
+          <ac:chgData name="Fatima Pillosu" userId="a6295d4dc9e22643" providerId="LiveId" clId="{0478CFAF-F744-4001-ABF3-5E8A4958592B}" dt="2025-07-05T17:31:48.799" v="2906" actId="21"/>
           <ac:spMkLst>
             <pc:docMk/>
             <pc:sldMk cId="2370713982" sldId="258"/>
             <ac:spMk id="386" creationId="{41C377DF-3C36-42E1-684D-12BC83DB59C3}"/>
           </ac:spMkLst>
         </pc:spChg>
-        <pc:spChg chg="add mod">
-          <ac:chgData name="Fatima Pillosu" userId="a6295d4dc9e22643" providerId="LiveId" clId="{0478CFAF-F744-4001-ABF3-5E8A4958592B}" dt="2025-07-05T17:17:58.193" v="2608" actId="1036"/>
+        <pc:spChg chg="add del mod">
+          <ac:chgData name="Fatima Pillosu" userId="a6295d4dc9e22643" providerId="LiveId" clId="{0478CFAF-F744-4001-ABF3-5E8A4958592B}" dt="2025-07-05T17:24:48.976" v="2717" actId="478"/>
           <ac:spMkLst>
             <pc:docMk/>
             <pc:sldMk cId="2370713982" sldId="258"/>
             <ac:spMk id="387" creationId="{2CFA74E3-D91E-2C27-4A99-D3D1A111919C}"/>
           </ac:spMkLst>
         </pc:spChg>
-        <pc:spChg chg="add mod">
-          <ac:chgData name="Fatima Pillosu" userId="a6295d4dc9e22643" providerId="LiveId" clId="{0478CFAF-F744-4001-ABF3-5E8A4958592B}" dt="2025-07-05T17:17:58.193" v="2608" actId="1036"/>
+        <pc:spChg chg="add del mod">
+          <ac:chgData name="Fatima Pillosu" userId="a6295d4dc9e22643" providerId="LiveId" clId="{0478CFAF-F744-4001-ABF3-5E8A4958592B}" dt="2025-07-05T17:31:48.799" v="2906" actId="21"/>
           <ac:spMkLst>
             <pc:docMk/>
             <pc:sldMk cId="2370713982" sldId="258"/>
             <ac:spMk id="388" creationId="{CC497459-D1DC-EE9A-EE1D-815F28D2818C}"/>
           </ac:spMkLst>
         </pc:spChg>
-        <pc:spChg chg="add mod">
-          <ac:chgData name="Fatima Pillosu" userId="a6295d4dc9e22643" providerId="LiveId" clId="{0478CFAF-F744-4001-ABF3-5E8A4958592B}" dt="2025-07-05T17:17:58.193" v="2608" actId="1036"/>
+        <pc:spChg chg="add del mod">
+          <ac:chgData name="Fatima Pillosu" userId="a6295d4dc9e22643" providerId="LiveId" clId="{0478CFAF-F744-4001-ABF3-5E8A4958592B}" dt="2025-07-05T17:31:48.799" v="2906" actId="21"/>
           <ac:spMkLst>
             <pc:docMk/>
             <pc:sldMk cId="2370713982" sldId="258"/>
             <ac:spMk id="389" creationId="{8A74094E-C336-74AA-E520-6856C354301A}"/>
           </ac:spMkLst>
         </pc:spChg>
-        <pc:spChg chg="add mod">
-          <ac:chgData name="Fatima Pillosu" userId="a6295d4dc9e22643" providerId="LiveId" clId="{0478CFAF-F744-4001-ABF3-5E8A4958592B}" dt="2025-07-05T17:17:58.193" v="2608" actId="1036"/>
+        <pc:spChg chg="add del mod">
+          <ac:chgData name="Fatima Pillosu" userId="a6295d4dc9e22643" providerId="LiveId" clId="{0478CFAF-F744-4001-ABF3-5E8A4958592B}" dt="2025-07-05T17:31:48.799" v="2906" actId="21"/>
           <ac:spMkLst>
             <pc:docMk/>
             <pc:sldMk cId="2370713982" sldId="258"/>
             <ac:spMk id="390" creationId="{10B23706-9C8A-69A2-B423-B2EEB1C4D06D}"/>
           </ac:spMkLst>
         </pc:spChg>
-        <pc:spChg chg="add mod">
-          <ac:chgData name="Fatima Pillosu" userId="a6295d4dc9e22643" providerId="LiveId" clId="{0478CFAF-F744-4001-ABF3-5E8A4958592B}" dt="2025-07-05T17:17:58.193" v="2608" actId="1036"/>
+        <pc:spChg chg="add del mod">
+          <ac:chgData name="Fatima Pillosu" userId="a6295d4dc9e22643" providerId="LiveId" clId="{0478CFAF-F744-4001-ABF3-5E8A4958592B}" dt="2025-07-05T17:31:48.799" v="2906" actId="21"/>
           <ac:spMkLst>
             <pc:docMk/>
             <pc:sldMk cId="2370713982" sldId="258"/>
             <ac:spMk id="391" creationId="{14A7D952-0782-7271-7F2A-BC6BC775B542}"/>
           </ac:spMkLst>
         </pc:spChg>
-        <pc:spChg chg="add mod">
-          <ac:chgData name="Fatima Pillosu" userId="a6295d4dc9e22643" providerId="LiveId" clId="{0478CFAF-F744-4001-ABF3-5E8A4958592B}" dt="2025-07-05T17:17:58.193" v="2608" actId="1036"/>
+        <pc:spChg chg="add del mod">
+          <ac:chgData name="Fatima Pillosu" userId="a6295d4dc9e22643" providerId="LiveId" clId="{0478CFAF-F744-4001-ABF3-5E8A4958592B}" dt="2025-07-05T17:31:48.799" v="2906" actId="21"/>
           <ac:spMkLst>
             <pc:docMk/>
             <pc:sldMk cId="2370713982" sldId="258"/>
             <ac:spMk id="392" creationId="{06432789-ABB4-135D-C8F1-01F8D760F247}"/>
           </ac:spMkLst>
         </pc:spChg>
-        <pc:spChg chg="add mod">
-          <ac:chgData name="Fatima Pillosu" userId="a6295d4dc9e22643" providerId="LiveId" clId="{0478CFAF-F744-4001-ABF3-5E8A4958592B}" dt="2025-07-05T17:17:58.193" v="2608" actId="1036"/>
+        <pc:spChg chg="add del mod">
+          <ac:chgData name="Fatima Pillosu" userId="a6295d4dc9e22643" providerId="LiveId" clId="{0478CFAF-F744-4001-ABF3-5E8A4958592B}" dt="2025-07-05T17:31:48.799" v="2906" actId="21"/>
           <ac:spMkLst>
             <pc:docMk/>
             <pc:sldMk cId="2370713982" sldId="258"/>
             <ac:spMk id="393" creationId="{C5603496-23AC-2551-E5E0-BDF8C60E9816}"/>
           </ac:spMkLst>
         </pc:spChg>
-        <pc:spChg chg="add mod">
-          <ac:chgData name="Fatima Pillosu" userId="a6295d4dc9e22643" providerId="LiveId" clId="{0478CFAF-F744-4001-ABF3-5E8A4958592B}" dt="2025-07-05T17:17:58.193" v="2608" actId="1036"/>
+        <pc:spChg chg="add del mod">
+          <ac:chgData name="Fatima Pillosu" userId="a6295d4dc9e22643" providerId="LiveId" clId="{0478CFAF-F744-4001-ABF3-5E8A4958592B}" dt="2025-07-05T17:31:48.799" v="2906" actId="21"/>
           <ac:spMkLst>
             <pc:docMk/>
             <pc:sldMk cId="2370713982" sldId="258"/>
             <ac:spMk id="394" creationId="{BD4FCEEF-D9EE-3F9D-274E-A275AE7207AC}"/>
           </ac:spMkLst>
         </pc:spChg>
-        <pc:spChg chg="add mod">
-          <ac:chgData name="Fatima Pillosu" userId="a6295d4dc9e22643" providerId="LiveId" clId="{0478CFAF-F744-4001-ABF3-5E8A4958592B}" dt="2025-07-05T17:17:58.193" v="2608" actId="1036"/>
+        <pc:spChg chg="add del mod">
+          <ac:chgData name="Fatima Pillosu" userId="a6295d4dc9e22643" providerId="LiveId" clId="{0478CFAF-F744-4001-ABF3-5E8A4958592B}" dt="2025-07-05T17:31:48.799" v="2906" actId="21"/>
           <ac:spMkLst>
             <pc:docMk/>
             <pc:sldMk cId="2370713982" sldId="258"/>
             <ac:spMk id="396" creationId="{54B4C05C-53AB-88AD-E871-B8862B4F61D3}"/>
           </ac:spMkLst>
         </pc:spChg>
-        <pc:spChg chg="add mod">
-          <ac:chgData name="Fatima Pillosu" userId="a6295d4dc9e22643" providerId="LiveId" clId="{0478CFAF-F744-4001-ABF3-5E8A4958592B}" dt="2025-07-05T17:17:58.193" v="2608" actId="1036"/>
+        <pc:spChg chg="add del mod">
+          <ac:chgData name="Fatima Pillosu" userId="a6295d4dc9e22643" providerId="LiveId" clId="{0478CFAF-F744-4001-ABF3-5E8A4958592B}" dt="2025-07-05T17:31:48.799" v="2906" actId="21"/>
           <ac:spMkLst>
             <pc:docMk/>
             <pc:sldMk cId="2370713982" sldId="258"/>
             <ac:spMk id="397" creationId="{6EE46427-6BDE-882E-3A72-3DF2ED872F0A}"/>
           </ac:spMkLst>
         </pc:spChg>
-        <pc:spChg chg="add mod">
-          <ac:chgData name="Fatima Pillosu" userId="a6295d4dc9e22643" providerId="LiveId" clId="{0478CFAF-F744-4001-ABF3-5E8A4958592B}" dt="2025-07-05T17:17:58.193" v="2608" actId="1036"/>
+        <pc:spChg chg="add del mod">
+          <ac:chgData name="Fatima Pillosu" userId="a6295d4dc9e22643" providerId="LiveId" clId="{0478CFAF-F744-4001-ABF3-5E8A4958592B}" dt="2025-07-05T17:31:48.799" v="2906" actId="21"/>
           <ac:spMkLst>
             <pc:docMk/>
             <pc:sldMk cId="2370713982" sldId="258"/>
             <ac:spMk id="398" creationId="{0BBE180E-9D2D-A30D-B94E-AB6240A4F89E}"/>
           </ac:spMkLst>
         </pc:spChg>
-        <pc:spChg chg="add mod">
-          <ac:chgData name="Fatima Pillosu" userId="a6295d4dc9e22643" providerId="LiveId" clId="{0478CFAF-F744-4001-ABF3-5E8A4958592B}" dt="2025-07-05T17:17:58.193" v="2608" actId="1036"/>
+        <pc:spChg chg="add del mod">
+          <ac:chgData name="Fatima Pillosu" userId="a6295d4dc9e22643" providerId="LiveId" clId="{0478CFAF-F744-4001-ABF3-5E8A4958592B}" dt="2025-07-05T17:31:48.799" v="2906" actId="21"/>
           <ac:spMkLst>
             <pc:docMk/>
             <pc:sldMk cId="2370713982" sldId="258"/>
             <ac:spMk id="399" creationId="{27B7D5CF-81CA-4EAF-61FB-FBDB71CAE40F}"/>
           </ac:spMkLst>
         </pc:spChg>
-        <pc:spChg chg="add mod">
-          <ac:chgData name="Fatima Pillosu" userId="a6295d4dc9e22643" providerId="LiveId" clId="{0478CFAF-F744-4001-ABF3-5E8A4958592B}" dt="2025-07-05T17:17:58.193" v="2608" actId="1036"/>
+        <pc:spChg chg="add del mod">
+          <ac:chgData name="Fatima Pillosu" userId="a6295d4dc9e22643" providerId="LiveId" clId="{0478CFAF-F744-4001-ABF3-5E8A4958592B}" dt="2025-07-05T17:31:48.799" v="2906" actId="21"/>
           <ac:spMkLst>
             <pc:docMk/>
             <pc:sldMk cId="2370713982" sldId="258"/>
             <ac:spMk id="400" creationId="{78B6A93C-975D-F2FB-2429-F211CE81F035}"/>
           </ac:spMkLst>
         </pc:spChg>
-        <pc:spChg chg="add mod">
-          <ac:chgData name="Fatima Pillosu" userId="a6295d4dc9e22643" providerId="LiveId" clId="{0478CFAF-F744-4001-ABF3-5E8A4958592B}" dt="2025-07-05T17:17:58.193" v="2608" actId="1036"/>
+        <pc:spChg chg="add del mod">
+          <ac:chgData name="Fatima Pillosu" userId="a6295d4dc9e22643" providerId="LiveId" clId="{0478CFAF-F744-4001-ABF3-5E8A4958592B}" dt="2025-07-05T17:31:48.799" v="2906" actId="21"/>
           <ac:spMkLst>
             <pc:docMk/>
             <pc:sldMk cId="2370713982" sldId="258"/>
             <ac:spMk id="402" creationId="{A6BD9B84-7D11-E6C4-714D-168348DA6A59}"/>
           </ac:spMkLst>
         </pc:spChg>
+        <pc:spChg chg="add mod">
+          <ac:chgData name="Fatima Pillosu" userId="a6295d4dc9e22643" providerId="LiveId" clId="{0478CFAF-F744-4001-ABF3-5E8A4958592B}" dt="2025-07-05T17:32:07.102" v="2909" actId="1036"/>
+          <ac:spMkLst>
+            <pc:docMk/>
+            <pc:sldMk cId="2370713982" sldId="258"/>
+            <ac:spMk id="409" creationId="{AFE3A951-104C-CEDE-A21D-544D4B214711}"/>
+          </ac:spMkLst>
+        </pc:spChg>
+        <pc:spChg chg="add mod">
+          <ac:chgData name="Fatima Pillosu" userId="a6295d4dc9e22643" providerId="LiveId" clId="{0478CFAF-F744-4001-ABF3-5E8A4958592B}" dt="2025-07-05T17:32:07.102" v="2909" actId="1036"/>
+          <ac:spMkLst>
+            <pc:docMk/>
+            <pc:sldMk cId="2370713982" sldId="258"/>
+            <ac:spMk id="410" creationId="{F81123FD-1880-7B13-64BB-A61B32D6C3FC}"/>
+          </ac:spMkLst>
+        </pc:spChg>
+        <pc:spChg chg="add mod">
+          <ac:chgData name="Fatima Pillosu" userId="a6295d4dc9e22643" providerId="LiveId" clId="{0478CFAF-F744-4001-ABF3-5E8A4958592B}" dt="2025-07-05T17:32:07.102" v="2909" actId="1036"/>
+          <ac:spMkLst>
+            <pc:docMk/>
+            <pc:sldMk cId="2370713982" sldId="258"/>
+            <ac:spMk id="411" creationId="{68F25C0E-89BD-9175-A93B-76E013FBF0DD}"/>
+          </ac:spMkLst>
+        </pc:spChg>
+        <pc:spChg chg="add mod">
+          <ac:chgData name="Fatima Pillosu" userId="a6295d4dc9e22643" providerId="LiveId" clId="{0478CFAF-F744-4001-ABF3-5E8A4958592B}" dt="2025-07-05T17:32:07.102" v="2909" actId="1036"/>
+          <ac:spMkLst>
+            <pc:docMk/>
+            <pc:sldMk cId="2370713982" sldId="258"/>
+            <ac:spMk id="412" creationId="{96248778-630E-7601-4FAE-FF9CFCDF1B42}"/>
+          </ac:spMkLst>
+        </pc:spChg>
+        <pc:spChg chg="add mod">
+          <ac:chgData name="Fatima Pillosu" userId="a6295d4dc9e22643" providerId="LiveId" clId="{0478CFAF-F744-4001-ABF3-5E8A4958592B}" dt="2025-07-05T17:32:07.102" v="2909" actId="1036"/>
+          <ac:spMkLst>
+            <pc:docMk/>
+            <pc:sldMk cId="2370713982" sldId="258"/>
+            <ac:spMk id="413" creationId="{9CADC630-E44A-1A89-9FDE-8EDA7123B19C}"/>
+          </ac:spMkLst>
+        </pc:spChg>
+        <pc:spChg chg="add mod">
+          <ac:chgData name="Fatima Pillosu" userId="a6295d4dc9e22643" providerId="LiveId" clId="{0478CFAF-F744-4001-ABF3-5E8A4958592B}" dt="2025-07-05T17:32:07.102" v="2909" actId="1036"/>
+          <ac:spMkLst>
+            <pc:docMk/>
+            <pc:sldMk cId="2370713982" sldId="258"/>
+            <ac:spMk id="414" creationId="{EAF3C8BC-9003-987C-E4A9-44A032A5528E}"/>
+          </ac:spMkLst>
+        </pc:spChg>
+        <pc:spChg chg="add mod">
+          <ac:chgData name="Fatima Pillosu" userId="a6295d4dc9e22643" providerId="LiveId" clId="{0478CFAF-F744-4001-ABF3-5E8A4958592B}" dt="2025-07-05T17:32:07.102" v="2909" actId="1036"/>
+          <ac:spMkLst>
+            <pc:docMk/>
+            <pc:sldMk cId="2370713982" sldId="258"/>
+            <ac:spMk id="415" creationId="{28B436EB-88AE-9EF3-EB76-64B6D1FB6EEB}"/>
+          </ac:spMkLst>
+        </pc:spChg>
+        <pc:spChg chg="add mod">
+          <ac:chgData name="Fatima Pillosu" userId="a6295d4dc9e22643" providerId="LiveId" clId="{0478CFAF-F744-4001-ABF3-5E8A4958592B}" dt="2025-07-05T17:32:07.102" v="2909" actId="1036"/>
+          <ac:spMkLst>
+            <pc:docMk/>
+            <pc:sldMk cId="2370713982" sldId="258"/>
+            <ac:spMk id="416" creationId="{F27C24D0-AB2A-41DB-6171-C0B6ED9E9A68}"/>
+          </ac:spMkLst>
+        </pc:spChg>
+        <pc:spChg chg="add mod">
+          <ac:chgData name="Fatima Pillosu" userId="a6295d4dc9e22643" providerId="LiveId" clId="{0478CFAF-F744-4001-ABF3-5E8A4958592B}" dt="2025-07-05T17:32:07.102" v="2909" actId="1036"/>
+          <ac:spMkLst>
+            <pc:docMk/>
+            <pc:sldMk cId="2370713982" sldId="258"/>
+            <ac:spMk id="417" creationId="{41C377DF-3C36-42E1-684D-12BC83DB59C3}"/>
+          </ac:spMkLst>
+        </pc:spChg>
+        <pc:spChg chg="add mod">
+          <ac:chgData name="Fatima Pillosu" userId="a6295d4dc9e22643" providerId="LiveId" clId="{0478CFAF-F744-4001-ABF3-5E8A4958592B}" dt="2025-07-05T17:32:07.102" v="2909" actId="1036"/>
+          <ac:spMkLst>
+            <pc:docMk/>
+            <pc:sldMk cId="2370713982" sldId="258"/>
+            <ac:spMk id="418" creationId="{CC497459-D1DC-EE9A-EE1D-815F28D2818C}"/>
+          </ac:spMkLst>
+        </pc:spChg>
+        <pc:spChg chg="add mod">
+          <ac:chgData name="Fatima Pillosu" userId="a6295d4dc9e22643" providerId="LiveId" clId="{0478CFAF-F744-4001-ABF3-5E8A4958592B}" dt="2025-07-05T17:32:07.102" v="2909" actId="1036"/>
+          <ac:spMkLst>
+            <pc:docMk/>
+            <pc:sldMk cId="2370713982" sldId="258"/>
+            <ac:spMk id="419" creationId="{8A74094E-C336-74AA-E520-6856C354301A}"/>
+          </ac:spMkLst>
+        </pc:spChg>
+        <pc:spChg chg="add mod">
+          <ac:chgData name="Fatima Pillosu" userId="a6295d4dc9e22643" providerId="LiveId" clId="{0478CFAF-F744-4001-ABF3-5E8A4958592B}" dt="2025-07-05T17:32:07.102" v="2909" actId="1036"/>
+          <ac:spMkLst>
+            <pc:docMk/>
+            <pc:sldMk cId="2370713982" sldId="258"/>
+            <ac:spMk id="420" creationId="{10B23706-9C8A-69A2-B423-B2EEB1C4D06D}"/>
+          </ac:spMkLst>
+        </pc:spChg>
+        <pc:spChg chg="add mod">
+          <ac:chgData name="Fatima Pillosu" userId="a6295d4dc9e22643" providerId="LiveId" clId="{0478CFAF-F744-4001-ABF3-5E8A4958592B}" dt="2025-07-05T17:32:07.102" v="2909" actId="1036"/>
+          <ac:spMkLst>
+            <pc:docMk/>
+            <pc:sldMk cId="2370713982" sldId="258"/>
+            <ac:spMk id="421" creationId="{14A7D952-0782-7271-7F2A-BC6BC775B542}"/>
+          </ac:spMkLst>
+        </pc:spChg>
+        <pc:spChg chg="add mod">
+          <ac:chgData name="Fatima Pillosu" userId="a6295d4dc9e22643" providerId="LiveId" clId="{0478CFAF-F744-4001-ABF3-5E8A4958592B}" dt="2025-07-05T17:32:07.102" v="2909" actId="1036"/>
+          <ac:spMkLst>
+            <pc:docMk/>
+            <pc:sldMk cId="2370713982" sldId="258"/>
+            <ac:spMk id="422" creationId="{06432789-ABB4-135D-C8F1-01F8D760F247}"/>
+          </ac:spMkLst>
+        </pc:spChg>
+        <pc:spChg chg="add mod">
+          <ac:chgData name="Fatima Pillosu" userId="a6295d4dc9e22643" providerId="LiveId" clId="{0478CFAF-F744-4001-ABF3-5E8A4958592B}" dt="2025-07-05T17:32:07.102" v="2909" actId="1036"/>
+          <ac:spMkLst>
+            <pc:docMk/>
+            <pc:sldMk cId="2370713982" sldId="258"/>
+            <ac:spMk id="423" creationId="{C5603496-23AC-2551-E5E0-BDF8C60E9816}"/>
+          </ac:spMkLst>
+        </pc:spChg>
+        <pc:spChg chg="add mod">
+          <ac:chgData name="Fatima Pillosu" userId="a6295d4dc9e22643" providerId="LiveId" clId="{0478CFAF-F744-4001-ABF3-5E8A4958592B}" dt="2025-07-05T17:32:07.102" v="2909" actId="1036"/>
+          <ac:spMkLst>
+            <pc:docMk/>
+            <pc:sldMk cId="2370713982" sldId="258"/>
+            <ac:spMk id="424" creationId="{BD4FCEEF-D9EE-3F9D-274E-A275AE7207AC}"/>
+          </ac:spMkLst>
+        </pc:spChg>
+        <pc:spChg chg="add mod">
+          <ac:chgData name="Fatima Pillosu" userId="a6295d4dc9e22643" providerId="LiveId" clId="{0478CFAF-F744-4001-ABF3-5E8A4958592B}" dt="2025-07-05T17:32:07.102" v="2909" actId="1036"/>
+          <ac:spMkLst>
+            <pc:docMk/>
+            <pc:sldMk cId="2370713982" sldId="258"/>
+            <ac:spMk id="426" creationId="{54B4C05C-53AB-88AD-E871-B8862B4F61D3}"/>
+          </ac:spMkLst>
+        </pc:spChg>
+        <pc:spChg chg="add mod">
+          <ac:chgData name="Fatima Pillosu" userId="a6295d4dc9e22643" providerId="LiveId" clId="{0478CFAF-F744-4001-ABF3-5E8A4958592B}" dt="2025-07-05T17:32:07.102" v="2909" actId="1036"/>
+          <ac:spMkLst>
+            <pc:docMk/>
+            <pc:sldMk cId="2370713982" sldId="258"/>
+            <ac:spMk id="427" creationId="{6EE46427-6BDE-882E-3A72-3DF2ED872F0A}"/>
+          </ac:spMkLst>
+        </pc:spChg>
+        <pc:spChg chg="add mod">
+          <ac:chgData name="Fatima Pillosu" userId="a6295d4dc9e22643" providerId="LiveId" clId="{0478CFAF-F744-4001-ABF3-5E8A4958592B}" dt="2025-07-05T17:32:07.102" v="2909" actId="1036"/>
+          <ac:spMkLst>
+            <pc:docMk/>
+            <pc:sldMk cId="2370713982" sldId="258"/>
+            <ac:spMk id="428" creationId="{0BBE180E-9D2D-A30D-B94E-AB6240A4F89E}"/>
+          </ac:spMkLst>
+        </pc:spChg>
+        <pc:spChg chg="add mod">
+          <ac:chgData name="Fatima Pillosu" userId="a6295d4dc9e22643" providerId="LiveId" clId="{0478CFAF-F744-4001-ABF3-5E8A4958592B}" dt="2025-07-05T17:32:07.102" v="2909" actId="1036"/>
+          <ac:spMkLst>
+            <pc:docMk/>
+            <pc:sldMk cId="2370713982" sldId="258"/>
+            <ac:spMk id="429" creationId="{27B7D5CF-81CA-4EAF-61FB-FBDB71CAE40F}"/>
+          </ac:spMkLst>
+        </pc:spChg>
+        <pc:spChg chg="add mod">
+          <ac:chgData name="Fatima Pillosu" userId="a6295d4dc9e22643" providerId="LiveId" clId="{0478CFAF-F744-4001-ABF3-5E8A4958592B}" dt="2025-07-05T17:32:07.102" v="2909" actId="1036"/>
+          <ac:spMkLst>
+            <pc:docMk/>
+            <pc:sldMk cId="2370713982" sldId="258"/>
+            <ac:spMk id="430" creationId="{78B6A93C-975D-F2FB-2429-F211CE81F035}"/>
+          </ac:spMkLst>
+        </pc:spChg>
+        <pc:spChg chg="add mod">
+          <ac:chgData name="Fatima Pillosu" userId="a6295d4dc9e22643" providerId="LiveId" clId="{0478CFAF-F744-4001-ABF3-5E8A4958592B}" dt="2025-07-05T17:32:07.102" v="2909" actId="1036"/>
+          <ac:spMkLst>
+            <pc:docMk/>
+            <pc:sldMk cId="2370713982" sldId="258"/>
+            <ac:spMk id="432" creationId="{A6BD9B84-7D11-E6C4-714D-168348DA6A59}"/>
+          </ac:spMkLst>
+        </pc:spChg>
+        <pc:spChg chg="add mod">
+          <ac:chgData name="Fatima Pillosu" userId="a6295d4dc9e22643" providerId="LiveId" clId="{0478CFAF-F744-4001-ABF3-5E8A4958592B}" dt="2025-07-05T17:32:07.102" v="2909" actId="1036"/>
+          <ac:spMkLst>
+            <pc:docMk/>
+            <pc:sldMk cId="2370713982" sldId="258"/>
+            <ac:spMk id="438" creationId="{28AEAA1C-A4B2-C456-3DF2-85203C0EBF3D}"/>
+          </ac:spMkLst>
+        </pc:spChg>
+        <pc:picChg chg="add del mod">
+          <ac:chgData name="Fatima Pillosu" userId="a6295d4dc9e22643" providerId="LiveId" clId="{0478CFAF-F744-4001-ABF3-5E8A4958592B}" dt="2025-07-05T17:26:32.759" v="2753" actId="478"/>
+          <ac:picMkLst>
+            <pc:docMk/>
+            <pc:sldMk cId="2370713982" sldId="258"/>
+            <ac:picMk id="2" creationId="{1363CC68-D7B8-7537-5211-12DB6DE04B5C}"/>
+          </ac:picMkLst>
+        </pc:picChg>
         <pc:picChg chg="add del mod">
           <ac:chgData name="Fatima Pillosu" userId="a6295d4dc9e22643" providerId="LiveId" clId="{0478CFAF-F744-4001-ABF3-5E8A4958592B}" dt="2025-07-05T16:36:59.453" v="1694" actId="478"/>
           <ac:picMkLst>
@@ -9123,6 +10427,46 @@
             <ac:picMk id="309" creationId="{52CA6A54-CC59-58A1-4074-7DA36EA27AEA}"/>
           </ac:picMkLst>
         </pc:picChg>
+        <pc:picChg chg="add mod">
+          <ac:chgData name="Fatima Pillosu" userId="a6295d4dc9e22643" providerId="LiveId" clId="{0478CFAF-F744-4001-ABF3-5E8A4958592B}" dt="2025-07-05T17:26:33.797" v="2754"/>
+          <ac:picMkLst>
+            <pc:docMk/>
+            <pc:sldMk cId="2370713982" sldId="258"/>
+            <ac:picMk id="325" creationId="{BE5C86E8-BB66-777E-AD88-10DAB370B9C0}"/>
+          </ac:picMkLst>
+        </pc:picChg>
+        <pc:picChg chg="add mod">
+          <ac:chgData name="Fatima Pillosu" userId="a6295d4dc9e22643" providerId="LiveId" clId="{0478CFAF-F744-4001-ABF3-5E8A4958592B}" dt="2025-07-05T17:26:33.797" v="2754"/>
+          <ac:picMkLst>
+            <pc:docMk/>
+            <pc:sldMk cId="2370713982" sldId="258"/>
+            <ac:picMk id="329" creationId="{5403DEBF-F1AA-8702-ED30-6361311A7F09}"/>
+          </ac:picMkLst>
+        </pc:picChg>
+        <pc:picChg chg="add mod">
+          <ac:chgData name="Fatima Pillosu" userId="a6295d4dc9e22643" providerId="LiveId" clId="{0478CFAF-F744-4001-ABF3-5E8A4958592B}" dt="2025-07-05T17:26:33.797" v="2754"/>
+          <ac:picMkLst>
+            <pc:docMk/>
+            <pc:sldMk cId="2370713982" sldId="258"/>
+            <ac:picMk id="339" creationId="{D1ED3AD3-B111-83BC-B58F-4E55294893C8}"/>
+          </ac:picMkLst>
+        </pc:picChg>
+        <pc:picChg chg="add mod">
+          <ac:chgData name="Fatima Pillosu" userId="a6295d4dc9e22643" providerId="LiveId" clId="{0478CFAF-F744-4001-ABF3-5E8A4958592B}" dt="2025-07-05T17:26:33.797" v="2754"/>
+          <ac:picMkLst>
+            <pc:docMk/>
+            <pc:sldMk cId="2370713982" sldId="258"/>
+            <ac:picMk id="344" creationId="{AE19FBDE-88D8-3C8A-774A-3C16F1AB9B2B}"/>
+          </ac:picMkLst>
+        </pc:picChg>
+        <pc:picChg chg="add del mod">
+          <ac:chgData name="Fatima Pillosu" userId="a6295d4dc9e22643" providerId="LiveId" clId="{0478CFAF-F744-4001-ABF3-5E8A4958592B}" dt="2025-07-05T17:31:48.799" v="2906" actId="21"/>
+          <ac:picMkLst>
+            <pc:docMk/>
+            <pc:sldMk cId="2370713982" sldId="258"/>
+            <ac:picMk id="345" creationId="{5478F336-4A82-C851-031E-7B68A3B8EB1A}"/>
+          </ac:picMkLst>
+        </pc:picChg>
         <pc:picChg chg="add del mod">
           <ac:chgData name="Fatima Pillosu" userId="a6295d4dc9e22643" providerId="LiveId" clId="{0478CFAF-F744-4001-ABF3-5E8A4958592B}" dt="2025-07-05T17:17:09.004" v="2580" actId="21"/>
           <ac:picMkLst>
@@ -9139,20 +10483,36 @@
             <ac:picMk id="360" creationId="{52CA6A54-CC59-58A1-4074-7DA36EA27AEA}"/>
           </ac:picMkLst>
         </pc:picChg>
-        <pc:picChg chg="add mod">
-          <ac:chgData name="Fatima Pillosu" userId="a6295d4dc9e22643" providerId="LiveId" clId="{0478CFAF-F744-4001-ABF3-5E8A4958592B}" dt="2025-07-05T17:17:58.193" v="2608" actId="1036"/>
+        <pc:picChg chg="add del mod">
+          <ac:chgData name="Fatima Pillosu" userId="a6295d4dc9e22643" providerId="LiveId" clId="{0478CFAF-F744-4001-ABF3-5E8A4958592B}" dt="2025-07-05T17:31:48.799" v="2906" actId="21"/>
           <ac:picMkLst>
             <pc:docMk/>
             <pc:sldMk cId="2370713982" sldId="258"/>
             <ac:picMk id="401" creationId="{4943A585-56F4-BE8B-C666-8836FD94BB13}"/>
           </ac:picMkLst>
         </pc:picChg>
+        <pc:picChg chg="add del mod">
+          <ac:chgData name="Fatima Pillosu" userId="a6295d4dc9e22643" providerId="LiveId" clId="{0478CFAF-F744-4001-ABF3-5E8A4958592B}" dt="2025-07-05T17:24:08.409" v="2701" actId="478"/>
+          <ac:picMkLst>
+            <pc:docMk/>
+            <pc:sldMk cId="2370713982" sldId="258"/>
+            <ac:picMk id="404" creationId="{52CA6A54-CC59-58A1-4074-7DA36EA27AEA}"/>
+          </ac:picMkLst>
+        </pc:picChg>
         <pc:picChg chg="add mod">
-          <ac:chgData name="Fatima Pillosu" userId="a6295d4dc9e22643" providerId="LiveId" clId="{0478CFAF-F744-4001-ABF3-5E8A4958592B}" dt="2025-07-05T17:18:02.779" v="2609" actId="14100"/>
+          <ac:chgData name="Fatima Pillosu" userId="a6295d4dc9e22643" providerId="LiveId" clId="{0478CFAF-F744-4001-ABF3-5E8A4958592B}" dt="2025-07-05T17:32:07.102" v="2909" actId="1036"/>
           <ac:picMkLst>
             <pc:docMk/>
             <pc:sldMk cId="2370713982" sldId="258"/>
-            <ac:picMk id="404" creationId="{52CA6A54-CC59-58A1-4074-7DA36EA27AEA}"/>
+            <ac:picMk id="431" creationId="{4943A585-56F4-BE8B-C666-8836FD94BB13}"/>
+          </ac:picMkLst>
+        </pc:picChg>
+        <pc:picChg chg="add mod">
+          <ac:chgData name="Fatima Pillosu" userId="a6295d4dc9e22643" providerId="LiveId" clId="{0478CFAF-F744-4001-ABF3-5E8A4958592B}" dt="2025-07-05T17:32:07.102" v="2909" actId="1036"/>
+          <ac:picMkLst>
+            <pc:docMk/>
+            <pc:sldMk cId="2370713982" sldId="258"/>
+            <ac:picMk id="439" creationId="{5478F336-4A82-C851-031E-7B68A3B8EB1A}"/>
           </ac:picMkLst>
         </pc:picChg>
         <pc:cxnChg chg="add del mod">
@@ -9491,12 +10851,28 @@
             <ac:cxnSpMk id="351" creationId="{C7C3581F-BB46-6BFD-88EC-1685548CDC83}"/>
           </ac:cxnSpMkLst>
         </pc:cxnChg>
-        <pc:cxnChg chg="add del mod">
-          <ac:chgData name="Fatima Pillosu" userId="a6295d4dc9e22643" providerId="LiveId" clId="{0478CFAF-F744-4001-ABF3-5E8A4958592B}" dt="2025-07-05T17:17:09.004" v="2580" actId="21"/>
+        <pc:cxnChg chg="add mod">
+          <ac:chgData name="Fatima Pillosu" userId="a6295d4dc9e22643" providerId="LiveId" clId="{0478CFAF-F744-4001-ABF3-5E8A4958592B}" dt="2025-07-05T17:32:07.102" v="2909" actId="1036"/>
           <ac:cxnSpMkLst>
             <pc:docMk/>
             <pc:sldMk cId="2370713982" sldId="258"/>
-            <ac:cxnSpMk id="359" creationId="{346B4E64-3EEF-D973-3957-F55293E7F745}"/>
+            <ac:cxnSpMk id="352" creationId="{6B2B5BF2-676C-E1AE-BA62-2F7C9F6C9C70}"/>
+          </ac:cxnSpMkLst>
+        </pc:cxnChg>
+        <pc:cxnChg chg="add mod">
+          <ac:chgData name="Fatima Pillosu" userId="a6295d4dc9e22643" providerId="LiveId" clId="{0478CFAF-F744-4001-ABF3-5E8A4958592B}" dt="2025-07-05T17:32:07.102" v="2909" actId="1036"/>
+          <ac:cxnSpMkLst>
+            <pc:docMk/>
+            <pc:sldMk cId="2370713982" sldId="258"/>
+            <ac:cxnSpMk id="353" creationId="{C03C5827-406F-B7CA-16D5-2D1C3286C854}"/>
+          </ac:cxnSpMkLst>
+        </pc:cxnChg>
+        <pc:cxnChg chg="add mod">
+          <ac:chgData name="Fatima Pillosu" userId="a6295d4dc9e22643" providerId="LiveId" clId="{0478CFAF-F744-4001-ABF3-5E8A4958592B}" dt="2025-07-05T17:32:07.102" v="2909" actId="1036"/>
+          <ac:cxnSpMkLst>
+            <pc:docMk/>
+            <pc:sldMk cId="2370713982" sldId="258"/>
+            <ac:cxnSpMk id="357" creationId="{7DC2AC43-F265-6066-8ACE-435A1F981070}"/>
           </ac:cxnSpMkLst>
         </pc:cxnChg>
         <pc:cxnChg chg="add del mod">
@@ -9504,7 +10880,39 @@
           <ac:cxnSpMkLst>
             <pc:docMk/>
             <pc:sldMk cId="2370713982" sldId="258"/>
+            <ac:cxnSpMk id="359" creationId="{346B4E64-3EEF-D973-3957-F55293E7F745}"/>
+          </ac:cxnSpMkLst>
+        </pc:cxnChg>
+        <pc:cxnChg chg="add mod">
+          <ac:chgData name="Fatima Pillosu" userId="a6295d4dc9e22643" providerId="LiveId" clId="{0478CFAF-F744-4001-ABF3-5E8A4958592B}" dt="2025-07-05T17:32:07.102" v="2909" actId="1036"/>
+          <ac:cxnSpMkLst>
+            <pc:docMk/>
+            <pc:sldMk cId="2370713982" sldId="258"/>
+            <ac:cxnSpMk id="360" creationId="{B54C17C6-3C4D-8A4F-59E1-33BB2363B4F2}"/>
+          </ac:cxnSpMkLst>
+        </pc:cxnChg>
+        <pc:cxnChg chg="add mod">
+          <ac:chgData name="Fatima Pillosu" userId="a6295d4dc9e22643" providerId="LiveId" clId="{0478CFAF-F744-4001-ABF3-5E8A4958592B}" dt="2025-07-05T17:32:07.102" v="2909" actId="1036"/>
+          <ac:cxnSpMkLst>
+            <pc:docMk/>
+            <pc:sldMk cId="2370713982" sldId="258"/>
+            <ac:cxnSpMk id="361" creationId="{256D26E3-8C15-B026-B526-6022B54CCA43}"/>
+          </ac:cxnSpMkLst>
+        </pc:cxnChg>
+        <pc:cxnChg chg="add del mod">
+          <ac:chgData name="Fatima Pillosu" userId="a6295d4dc9e22643" providerId="LiveId" clId="{0478CFAF-F744-4001-ABF3-5E8A4958592B}" dt="2025-07-05T17:17:09.004" v="2580" actId="21"/>
+          <ac:cxnSpMkLst>
+            <pc:docMk/>
+            <pc:sldMk cId="2370713982" sldId="258"/>
             <ac:cxnSpMk id="361" creationId="{F820DBFC-D482-D362-AD9A-EB720E92CEF4}"/>
+          </ac:cxnSpMkLst>
+        </pc:cxnChg>
+        <pc:cxnChg chg="add mod">
+          <ac:chgData name="Fatima Pillosu" userId="a6295d4dc9e22643" providerId="LiveId" clId="{0478CFAF-F744-4001-ABF3-5E8A4958592B}" dt="2025-07-05T17:32:07.102" v="2909" actId="1036"/>
+          <ac:cxnSpMkLst>
+            <pc:docMk/>
+            <pc:sldMk cId="2370713982" sldId="258"/>
+            <ac:cxnSpMk id="362" creationId="{8B8A5069-7969-C164-8418-15F4BE24B20F}"/>
           </ac:cxnSpMkLst>
         </pc:cxnChg>
         <pc:cxnChg chg="add del mod">
@@ -9531,100 +10939,148 @@
             <ac:cxnSpMk id="364" creationId="{16B06205-7085-528A-105F-F605E5D44E11}"/>
           </ac:cxnSpMkLst>
         </pc:cxnChg>
-        <pc:cxnChg chg="add mod">
-          <ac:chgData name="Fatima Pillosu" userId="a6295d4dc9e22643" providerId="LiveId" clId="{0478CFAF-F744-4001-ABF3-5E8A4958592B}" dt="2025-07-05T17:17:58.193" v="2608" actId="1036"/>
+        <pc:cxnChg chg="add del mod">
+          <ac:chgData name="Fatima Pillosu" userId="a6295d4dc9e22643" providerId="LiveId" clId="{0478CFAF-F744-4001-ABF3-5E8A4958592B}" dt="2025-07-05T17:31:48.799" v="2906" actId="21"/>
           <ac:cxnSpMkLst>
             <pc:docMk/>
             <pc:sldMk cId="2370713982" sldId="258"/>
             <ac:cxnSpMk id="365" creationId="{6B2B5BF2-676C-E1AE-BA62-2F7C9F6C9C70}"/>
           </ac:cxnSpMkLst>
         </pc:cxnChg>
-        <pc:cxnChg chg="add mod">
-          <ac:chgData name="Fatima Pillosu" userId="a6295d4dc9e22643" providerId="LiveId" clId="{0478CFAF-F744-4001-ABF3-5E8A4958592B}" dt="2025-07-05T17:17:58.193" v="2608" actId="1036"/>
+        <pc:cxnChg chg="add del mod">
+          <ac:chgData name="Fatima Pillosu" userId="a6295d4dc9e22643" providerId="LiveId" clId="{0478CFAF-F744-4001-ABF3-5E8A4958592B}" dt="2025-07-05T17:31:48.799" v="2906" actId="21"/>
           <ac:cxnSpMkLst>
             <pc:docMk/>
             <pc:sldMk cId="2370713982" sldId="258"/>
             <ac:cxnSpMk id="366" creationId="{C03C5827-406F-B7CA-16D5-2D1C3286C854}"/>
           </ac:cxnSpMkLst>
         </pc:cxnChg>
-        <pc:cxnChg chg="add mod">
-          <ac:chgData name="Fatima Pillosu" userId="a6295d4dc9e22643" providerId="LiveId" clId="{0478CFAF-F744-4001-ABF3-5E8A4958592B}" dt="2025-07-05T17:17:17.389" v="2581"/>
+        <pc:cxnChg chg="add del mod">
+          <ac:chgData name="Fatima Pillosu" userId="a6295d4dc9e22643" providerId="LiveId" clId="{0478CFAF-F744-4001-ABF3-5E8A4958592B}" dt="2025-07-05T17:31:48.799" v="2906" actId="21"/>
           <ac:cxnSpMkLst>
             <pc:docMk/>
             <pc:sldMk cId="2370713982" sldId="258"/>
             <ac:cxnSpMk id="370" creationId="{7DC2AC43-F265-6066-8ACE-435A1F981070}"/>
           </ac:cxnSpMkLst>
         </pc:cxnChg>
-        <pc:cxnChg chg="add mod">
-          <ac:chgData name="Fatima Pillosu" userId="a6295d4dc9e22643" providerId="LiveId" clId="{0478CFAF-F744-4001-ABF3-5E8A4958592B}" dt="2025-07-05T17:17:58.193" v="2608" actId="1036"/>
+        <pc:cxnChg chg="add del mod">
+          <ac:chgData name="Fatima Pillosu" userId="a6295d4dc9e22643" providerId="LiveId" clId="{0478CFAF-F744-4001-ABF3-5E8A4958592B}" dt="2025-07-05T17:31:48.799" v="2906" actId="21"/>
           <ac:cxnSpMkLst>
             <pc:docMk/>
             <pc:sldMk cId="2370713982" sldId="258"/>
             <ac:cxnSpMk id="373" creationId="{B54C17C6-3C4D-8A4F-59E1-33BB2363B4F2}"/>
           </ac:cxnSpMkLst>
         </pc:cxnChg>
-        <pc:cxnChg chg="add mod">
-          <ac:chgData name="Fatima Pillosu" userId="a6295d4dc9e22643" providerId="LiveId" clId="{0478CFAF-F744-4001-ABF3-5E8A4958592B}" dt="2025-07-05T17:17:58.193" v="2608" actId="1036"/>
+        <pc:cxnChg chg="add del mod">
+          <ac:chgData name="Fatima Pillosu" userId="a6295d4dc9e22643" providerId="LiveId" clId="{0478CFAF-F744-4001-ABF3-5E8A4958592B}" dt="2025-07-05T17:31:48.799" v="2906" actId="21"/>
           <ac:cxnSpMkLst>
             <pc:docMk/>
             <pc:sldMk cId="2370713982" sldId="258"/>
             <ac:cxnSpMk id="374" creationId="{256D26E3-8C15-B026-B526-6022B54CCA43}"/>
           </ac:cxnSpMkLst>
         </pc:cxnChg>
-        <pc:cxnChg chg="add mod">
-          <ac:chgData name="Fatima Pillosu" userId="a6295d4dc9e22643" providerId="LiveId" clId="{0478CFAF-F744-4001-ABF3-5E8A4958592B}" dt="2025-07-05T17:17:58.193" v="2608" actId="1036"/>
+        <pc:cxnChg chg="add del mod">
+          <ac:chgData name="Fatima Pillosu" userId="a6295d4dc9e22643" providerId="LiveId" clId="{0478CFAF-F744-4001-ABF3-5E8A4958592B}" dt="2025-07-05T17:31:48.799" v="2906" actId="21"/>
           <ac:cxnSpMkLst>
             <pc:docMk/>
             <pc:sldMk cId="2370713982" sldId="258"/>
             <ac:cxnSpMk id="375" creationId="{8B8A5069-7969-C164-8418-15F4BE24B20F}"/>
           </ac:cxnSpMkLst>
         </pc:cxnChg>
-        <pc:cxnChg chg="add mod">
-          <ac:chgData name="Fatima Pillosu" userId="a6295d4dc9e22643" providerId="LiveId" clId="{0478CFAF-F744-4001-ABF3-5E8A4958592B}" dt="2025-07-05T17:17:58.193" v="2608" actId="1036"/>
+        <pc:cxnChg chg="add del mod">
+          <ac:chgData name="Fatima Pillosu" userId="a6295d4dc9e22643" providerId="LiveId" clId="{0478CFAF-F744-4001-ABF3-5E8A4958592B}" dt="2025-07-05T17:31:48.799" v="2906" actId="21"/>
           <ac:cxnSpMkLst>
             <pc:docMk/>
             <pc:sldMk cId="2370713982" sldId="258"/>
             <ac:cxnSpMk id="395" creationId="{C7C3581F-BB46-6BFD-88EC-1685548CDC83}"/>
           </ac:cxnSpMkLst>
         </pc:cxnChg>
-        <pc:cxnChg chg="add mod">
-          <ac:chgData name="Fatima Pillosu" userId="a6295d4dc9e22643" providerId="LiveId" clId="{0478CFAF-F744-4001-ABF3-5E8A4958592B}" dt="2025-07-05T17:17:58.193" v="2608" actId="1036"/>
+        <pc:cxnChg chg="add del mod">
+          <ac:chgData name="Fatima Pillosu" userId="a6295d4dc9e22643" providerId="LiveId" clId="{0478CFAF-F744-4001-ABF3-5E8A4958592B}" dt="2025-07-05T17:31:48.799" v="2906" actId="21"/>
           <ac:cxnSpMkLst>
             <pc:docMk/>
             <pc:sldMk cId="2370713982" sldId="258"/>
             <ac:cxnSpMk id="403" creationId="{346B4E64-3EEF-D973-3957-F55293E7F745}"/>
           </ac:cxnSpMkLst>
         </pc:cxnChg>
-        <pc:cxnChg chg="add mod">
-          <ac:chgData name="Fatima Pillosu" userId="a6295d4dc9e22643" providerId="LiveId" clId="{0478CFAF-F744-4001-ABF3-5E8A4958592B}" dt="2025-07-05T17:17:58.193" v="2608" actId="1036"/>
+        <pc:cxnChg chg="add del mod">
+          <ac:chgData name="Fatima Pillosu" userId="a6295d4dc9e22643" providerId="LiveId" clId="{0478CFAF-F744-4001-ABF3-5E8A4958592B}" dt="2025-07-05T17:31:48.799" v="2906" actId="21"/>
           <ac:cxnSpMkLst>
             <pc:docMk/>
             <pc:sldMk cId="2370713982" sldId="258"/>
             <ac:cxnSpMk id="405" creationId="{F820DBFC-D482-D362-AD9A-EB720E92CEF4}"/>
           </ac:cxnSpMkLst>
         </pc:cxnChg>
-        <pc:cxnChg chg="add mod">
-          <ac:chgData name="Fatima Pillosu" userId="a6295d4dc9e22643" providerId="LiveId" clId="{0478CFAF-F744-4001-ABF3-5E8A4958592B}" dt="2025-07-05T17:17:58.193" v="2608" actId="1036"/>
+        <pc:cxnChg chg="add del mod">
+          <ac:chgData name="Fatima Pillosu" userId="a6295d4dc9e22643" providerId="LiveId" clId="{0478CFAF-F744-4001-ABF3-5E8A4958592B}" dt="2025-07-05T17:31:48.799" v="2906" actId="21"/>
           <ac:cxnSpMkLst>
             <pc:docMk/>
             <pc:sldMk cId="2370713982" sldId="258"/>
             <ac:cxnSpMk id="406" creationId="{8DF50D70-4022-681C-3D6E-62589944E0DE}"/>
           </ac:cxnSpMkLst>
         </pc:cxnChg>
-        <pc:cxnChg chg="add mod">
-          <ac:chgData name="Fatima Pillosu" userId="a6295d4dc9e22643" providerId="LiveId" clId="{0478CFAF-F744-4001-ABF3-5E8A4958592B}" dt="2025-07-05T17:17:58.193" v="2608" actId="1036"/>
+        <pc:cxnChg chg="add del mod">
+          <ac:chgData name="Fatima Pillosu" userId="a6295d4dc9e22643" providerId="LiveId" clId="{0478CFAF-F744-4001-ABF3-5E8A4958592B}" dt="2025-07-05T17:31:48.799" v="2906" actId="21"/>
           <ac:cxnSpMkLst>
             <pc:docMk/>
             <pc:sldMk cId="2370713982" sldId="258"/>
             <ac:cxnSpMk id="407" creationId="{1838FD34-08CA-AAAA-623C-682B4FB2B83D}"/>
           </ac:cxnSpMkLst>
         </pc:cxnChg>
+        <pc:cxnChg chg="add del mod">
+          <ac:chgData name="Fatima Pillosu" userId="a6295d4dc9e22643" providerId="LiveId" clId="{0478CFAF-F744-4001-ABF3-5E8A4958592B}" dt="2025-07-05T17:31:48.799" v="2906" actId="21"/>
+          <ac:cxnSpMkLst>
+            <pc:docMk/>
+            <pc:sldMk cId="2370713982" sldId="258"/>
+            <ac:cxnSpMk id="408" creationId="{16B06205-7085-528A-105F-F605E5D44E11}"/>
+          </ac:cxnSpMkLst>
+        </pc:cxnChg>
         <pc:cxnChg chg="add mod">
-          <ac:chgData name="Fatima Pillosu" userId="a6295d4dc9e22643" providerId="LiveId" clId="{0478CFAF-F744-4001-ABF3-5E8A4958592B}" dt="2025-07-05T17:17:58.193" v="2608" actId="1036"/>
+          <ac:chgData name="Fatima Pillosu" userId="a6295d4dc9e22643" providerId="LiveId" clId="{0478CFAF-F744-4001-ABF3-5E8A4958592B}" dt="2025-07-05T17:32:07.102" v="2909" actId="1036"/>
           <ac:cxnSpMkLst>
             <pc:docMk/>
             <pc:sldMk cId="2370713982" sldId="258"/>
-            <ac:cxnSpMk id="408" creationId="{16B06205-7085-528A-105F-F605E5D44E11}"/>
+            <ac:cxnSpMk id="425" creationId="{C7C3581F-BB46-6BFD-88EC-1685548CDC83}"/>
+          </ac:cxnSpMkLst>
+        </pc:cxnChg>
+        <pc:cxnChg chg="add mod">
+          <ac:chgData name="Fatima Pillosu" userId="a6295d4dc9e22643" providerId="LiveId" clId="{0478CFAF-F744-4001-ABF3-5E8A4958592B}" dt="2025-07-05T17:32:07.102" v="2909" actId="1036"/>
+          <ac:cxnSpMkLst>
+            <pc:docMk/>
+            <pc:sldMk cId="2370713982" sldId="258"/>
+            <ac:cxnSpMk id="433" creationId="{346B4E64-3EEF-D973-3957-F55293E7F745}"/>
+          </ac:cxnSpMkLst>
+        </pc:cxnChg>
+        <pc:cxnChg chg="add mod">
+          <ac:chgData name="Fatima Pillosu" userId="a6295d4dc9e22643" providerId="LiveId" clId="{0478CFAF-F744-4001-ABF3-5E8A4958592B}" dt="2025-07-05T17:32:07.102" v="2909" actId="1036"/>
+          <ac:cxnSpMkLst>
+            <pc:docMk/>
+            <pc:sldMk cId="2370713982" sldId="258"/>
+            <ac:cxnSpMk id="434" creationId="{F820DBFC-D482-D362-AD9A-EB720E92CEF4}"/>
+          </ac:cxnSpMkLst>
+        </pc:cxnChg>
+        <pc:cxnChg chg="add mod">
+          <ac:chgData name="Fatima Pillosu" userId="a6295d4dc9e22643" providerId="LiveId" clId="{0478CFAF-F744-4001-ABF3-5E8A4958592B}" dt="2025-07-05T17:32:07.102" v="2909" actId="1036"/>
+          <ac:cxnSpMkLst>
+            <pc:docMk/>
+            <pc:sldMk cId="2370713982" sldId="258"/>
+            <ac:cxnSpMk id="435" creationId="{8DF50D70-4022-681C-3D6E-62589944E0DE}"/>
+          </ac:cxnSpMkLst>
+        </pc:cxnChg>
+        <pc:cxnChg chg="add mod">
+          <ac:chgData name="Fatima Pillosu" userId="a6295d4dc9e22643" providerId="LiveId" clId="{0478CFAF-F744-4001-ABF3-5E8A4958592B}" dt="2025-07-05T17:32:07.102" v="2909" actId="1036"/>
+          <ac:cxnSpMkLst>
+            <pc:docMk/>
+            <pc:sldMk cId="2370713982" sldId="258"/>
+            <ac:cxnSpMk id="436" creationId="{1838FD34-08CA-AAAA-623C-682B4FB2B83D}"/>
+          </ac:cxnSpMkLst>
+        </pc:cxnChg>
+        <pc:cxnChg chg="add mod">
+          <ac:chgData name="Fatima Pillosu" userId="a6295d4dc9e22643" providerId="LiveId" clId="{0478CFAF-F744-4001-ABF3-5E8A4958592B}" dt="2025-07-05T17:32:07.102" v="2909" actId="1036"/>
+          <ac:cxnSpMkLst>
+            <pc:docMk/>
+            <pc:sldMk cId="2370713982" sldId="258"/>
+            <ac:cxnSpMk id="437" creationId="{16B06205-7085-528A-105F-F605E5D44E11}"/>
           </ac:cxnSpMkLst>
         </pc:cxnChg>
       </pc:sldChg>
@@ -9662,8 +11118,8 @@
         </p:nvSpPr>
         <p:spPr>
           <a:xfrm>
-            <a:off x="310515" y="1157697"/>
-            <a:ext cx="3519170" cy="2462765"/>
+            <a:off x="310515" y="1060529"/>
+            <a:ext cx="3519170" cy="2256061"/>
           </a:xfrm>
         </p:spPr>
         <p:txBody>
@@ -9694,8 +11150,8 @@
         </p:nvSpPr>
         <p:spPr>
           <a:xfrm>
-            <a:off x="517525" y="3715435"/>
-            <a:ext cx="3105150" cy="1707888"/>
+            <a:off x="517525" y="3403592"/>
+            <a:ext cx="3105150" cy="1564542"/>
           </a:xfrm>
         </p:spPr>
         <p:txBody>
@@ -9815,7 +11271,7 @@
     </p:spTree>
     <p:extLst>
       <p:ext uri="{BB962C8B-B14F-4D97-AF65-F5344CB8AC3E}">
-        <p14:creationId xmlns:p14="http://schemas.microsoft.com/office/powerpoint/2010/main" val="4274378304"/>
+        <p14:creationId xmlns:p14="http://schemas.microsoft.com/office/powerpoint/2010/main" val="3021007488"/>
       </p:ext>
     </p:extLst>
   </p:cSld>
@@ -9985,7 +11441,7 @@
     </p:spTree>
     <p:extLst>
       <p:ext uri="{BB962C8B-B14F-4D97-AF65-F5344CB8AC3E}">
-        <p14:creationId xmlns:p14="http://schemas.microsoft.com/office/powerpoint/2010/main" val="4026866859"/>
+        <p14:creationId xmlns:p14="http://schemas.microsoft.com/office/powerpoint/2010/main" val="1182851395"/>
       </p:ext>
     </p:extLst>
   </p:cSld>
@@ -10024,8 +11480,8 @@
         </p:nvSpPr>
         <p:spPr>
           <a:xfrm>
-            <a:off x="2962831" y="376620"/>
-            <a:ext cx="892731" cy="5994803"/>
+            <a:off x="2962831" y="345009"/>
+            <a:ext cx="892731" cy="5491649"/>
           </a:xfrm>
         </p:spPr>
         <p:txBody>
@@ -10052,8 +11508,8 @@
         </p:nvSpPr>
         <p:spPr>
           <a:xfrm>
-            <a:off x="284639" y="376620"/>
-            <a:ext cx="2626439" cy="5994803"/>
+            <a:off x="284639" y="345009"/>
+            <a:ext cx="2626439" cy="5491649"/>
           </a:xfrm>
         </p:spPr>
         <p:txBody>
@@ -10165,7 +11621,7 @@
     </p:spTree>
     <p:extLst>
       <p:ext uri="{BB962C8B-B14F-4D97-AF65-F5344CB8AC3E}">
-        <p14:creationId xmlns:p14="http://schemas.microsoft.com/office/powerpoint/2010/main" val="2217184676"/>
+        <p14:creationId xmlns:p14="http://schemas.microsoft.com/office/powerpoint/2010/main" val="800982695"/>
       </p:ext>
     </p:extLst>
   </p:cSld>
@@ -10335,7 +11791,7 @@
     </p:spTree>
     <p:extLst>
       <p:ext uri="{BB962C8B-B14F-4D97-AF65-F5344CB8AC3E}">
-        <p14:creationId xmlns:p14="http://schemas.microsoft.com/office/powerpoint/2010/main" val="813223132"/>
+        <p14:creationId xmlns:p14="http://schemas.microsoft.com/office/powerpoint/2010/main" val="4208266042"/>
       </p:ext>
     </p:extLst>
   </p:cSld>
@@ -10374,8 +11830,8 @@
         </p:nvSpPr>
         <p:spPr>
           <a:xfrm>
-            <a:off x="282482" y="1763565"/>
-            <a:ext cx="3570923" cy="2942545"/>
+            <a:off x="282482" y="1615546"/>
+            <a:ext cx="3570923" cy="2695572"/>
           </a:xfrm>
         </p:spPr>
         <p:txBody>
@@ -10406,8 +11862,8 @@
         </p:nvSpPr>
         <p:spPr>
           <a:xfrm>
-            <a:off x="282482" y="4733948"/>
-            <a:ext cx="3570923" cy="1547415"/>
+            <a:off x="282482" y="4336619"/>
+            <a:ext cx="3570923" cy="1417538"/>
           </a:xfrm>
         </p:spPr>
         <p:txBody>
@@ -10581,7 +12037,7 @@
     </p:spTree>
     <p:extLst>
       <p:ext uri="{BB962C8B-B14F-4D97-AF65-F5344CB8AC3E}">
-        <p14:creationId xmlns:p14="http://schemas.microsoft.com/office/powerpoint/2010/main" val="3690236990"/>
+        <p14:creationId xmlns:p14="http://schemas.microsoft.com/office/powerpoint/2010/main" val="1673863519"/>
       </p:ext>
     </p:extLst>
   </p:cSld>
@@ -10643,8 +12099,8 @@
         </p:nvSpPr>
         <p:spPr>
           <a:xfrm>
-            <a:off x="284639" y="1883098"/>
-            <a:ext cx="1759585" cy="4488325"/>
+            <a:off x="284639" y="1725046"/>
+            <a:ext cx="1759585" cy="4111612"/>
           </a:xfrm>
         </p:spPr>
         <p:txBody>
@@ -10700,8 +12156,8 @@
         </p:nvSpPr>
         <p:spPr>
           <a:xfrm>
-            <a:off x="2095976" y="1883098"/>
-            <a:ext cx="1759585" cy="4488325"/>
+            <a:off x="2095976" y="1725046"/>
+            <a:ext cx="1759585" cy="4111612"/>
           </a:xfrm>
         </p:spPr>
         <p:txBody>
@@ -10813,7 +12269,7 @@
     </p:spTree>
     <p:extLst>
       <p:ext uri="{BB962C8B-B14F-4D97-AF65-F5344CB8AC3E}">
-        <p14:creationId xmlns:p14="http://schemas.microsoft.com/office/powerpoint/2010/main" val="2284491772"/>
+        <p14:creationId xmlns:p14="http://schemas.microsoft.com/office/powerpoint/2010/main" val="381723357"/>
       </p:ext>
     </p:extLst>
   </p:cSld>
@@ -10852,8 +12308,8 @@
         </p:nvSpPr>
         <p:spPr>
           <a:xfrm>
-            <a:off x="285178" y="376621"/>
-            <a:ext cx="3570923" cy="1367294"/>
+            <a:off x="285178" y="345011"/>
+            <a:ext cx="3570923" cy="1252534"/>
           </a:xfrm>
         </p:spPr>
         <p:txBody>
@@ -10880,8 +12336,8 @@
         </p:nvSpPr>
         <p:spPr>
           <a:xfrm>
-            <a:off x="285179" y="1734088"/>
-            <a:ext cx="1751498" cy="849850"/>
+            <a:off x="285179" y="1588543"/>
+            <a:ext cx="1751498" cy="778521"/>
           </a:xfrm>
         </p:spPr>
         <p:txBody>
@@ -10945,8 +12401,8 @@
         </p:nvSpPr>
         <p:spPr>
           <a:xfrm>
-            <a:off x="285179" y="2583939"/>
-            <a:ext cx="1751498" cy="3800584"/>
+            <a:off x="285179" y="2367064"/>
+            <a:ext cx="1751498" cy="3481594"/>
           </a:xfrm>
         </p:spPr>
         <p:txBody>
@@ -11002,8 +12458,8 @@
         </p:nvSpPr>
         <p:spPr>
           <a:xfrm>
-            <a:off x="2095977" y="1734088"/>
-            <a:ext cx="1760124" cy="849850"/>
+            <a:off x="2095977" y="1588543"/>
+            <a:ext cx="1760124" cy="778521"/>
           </a:xfrm>
         </p:spPr>
         <p:txBody>
@@ -11067,8 +12523,8 @@
         </p:nvSpPr>
         <p:spPr>
           <a:xfrm>
-            <a:off x="2095977" y="2583939"/>
-            <a:ext cx="1760124" cy="3800584"/>
+            <a:off x="2095977" y="2367064"/>
+            <a:ext cx="1760124" cy="3481594"/>
           </a:xfrm>
         </p:spPr>
         <p:txBody>
@@ -11180,7 +12636,7 @@
     </p:spTree>
     <p:extLst>
       <p:ext uri="{BB962C8B-B14F-4D97-AF65-F5344CB8AC3E}">
-        <p14:creationId xmlns:p14="http://schemas.microsoft.com/office/powerpoint/2010/main" val="1266245513"/>
+        <p14:creationId xmlns:p14="http://schemas.microsoft.com/office/powerpoint/2010/main" val="1430748303"/>
       </p:ext>
     </p:extLst>
   </p:cSld>
@@ -11298,7 +12754,7 @@
     </p:spTree>
     <p:extLst>
       <p:ext uri="{BB962C8B-B14F-4D97-AF65-F5344CB8AC3E}">
-        <p14:creationId xmlns:p14="http://schemas.microsoft.com/office/powerpoint/2010/main" val="1175873221"/>
+        <p14:creationId xmlns:p14="http://schemas.microsoft.com/office/powerpoint/2010/main" val="2891547395"/>
       </p:ext>
     </p:extLst>
   </p:cSld>
@@ -11393,7 +12849,7 @@
     </p:spTree>
     <p:extLst>
       <p:ext uri="{BB962C8B-B14F-4D97-AF65-F5344CB8AC3E}">
-        <p14:creationId xmlns:p14="http://schemas.microsoft.com/office/powerpoint/2010/main" val="2834463349"/>
+        <p14:creationId xmlns:p14="http://schemas.microsoft.com/office/powerpoint/2010/main" val="1206424216"/>
       </p:ext>
     </p:extLst>
   </p:cSld>
@@ -11432,8 +12888,8 @@
         </p:nvSpPr>
         <p:spPr>
           <a:xfrm>
-            <a:off x="285178" y="471593"/>
-            <a:ext cx="1335322" cy="1650577"/>
+            <a:off x="285178" y="432012"/>
+            <a:ext cx="1335322" cy="1512041"/>
           </a:xfrm>
         </p:spPr>
         <p:txBody>
@@ -11464,8 +12920,8 @@
         </p:nvSpPr>
         <p:spPr>
           <a:xfrm>
-            <a:off x="1760124" y="1018512"/>
-            <a:ext cx="2095976" cy="5027054"/>
+            <a:off x="1760124" y="933027"/>
+            <a:ext cx="2095976" cy="4605124"/>
           </a:xfrm>
         </p:spPr>
         <p:txBody>
@@ -11549,8 +13005,8 @@
         </p:nvSpPr>
         <p:spPr>
           <a:xfrm>
-            <a:off x="285178" y="2122170"/>
-            <a:ext cx="1335322" cy="3931582"/>
+            <a:off x="285178" y="1944052"/>
+            <a:ext cx="1335322" cy="3601598"/>
           </a:xfrm>
         </p:spPr>
         <p:txBody>
@@ -11670,7 +13126,7 @@
     </p:spTree>
     <p:extLst>
       <p:ext uri="{BB962C8B-B14F-4D97-AF65-F5344CB8AC3E}">
-        <p14:creationId xmlns:p14="http://schemas.microsoft.com/office/powerpoint/2010/main" val="2472019006"/>
+        <p14:creationId xmlns:p14="http://schemas.microsoft.com/office/powerpoint/2010/main" val="3690160164"/>
       </p:ext>
     </p:extLst>
   </p:cSld>
@@ -11709,8 +13165,8 @@
         </p:nvSpPr>
         <p:spPr>
           <a:xfrm>
-            <a:off x="285178" y="471593"/>
-            <a:ext cx="1335322" cy="1650577"/>
+            <a:off x="285178" y="432012"/>
+            <a:ext cx="1335322" cy="1512041"/>
           </a:xfrm>
         </p:spPr>
         <p:txBody>
@@ -11741,8 +13197,8 @@
         </p:nvSpPr>
         <p:spPr>
           <a:xfrm>
-            <a:off x="1760124" y="1018512"/>
-            <a:ext cx="2095976" cy="5027054"/>
+            <a:off x="1760124" y="933027"/>
+            <a:ext cx="2095976" cy="4605124"/>
           </a:xfrm>
         </p:spPr>
         <p:txBody>
@@ -11806,8 +13262,8 @@
         </p:nvSpPr>
         <p:spPr>
           <a:xfrm>
-            <a:off x="285178" y="2122170"/>
-            <a:ext cx="1335322" cy="3931582"/>
+            <a:off x="285178" y="1944052"/>
+            <a:ext cx="1335322" cy="3601598"/>
           </a:xfrm>
         </p:spPr>
         <p:txBody>
@@ -11927,7 +13383,7 @@
     </p:spTree>
     <p:extLst>
       <p:ext uri="{BB962C8B-B14F-4D97-AF65-F5344CB8AC3E}">
-        <p14:creationId xmlns:p14="http://schemas.microsoft.com/office/powerpoint/2010/main" val="2930249768"/>
+        <p14:creationId xmlns:p14="http://schemas.microsoft.com/office/powerpoint/2010/main" val="609244000"/>
       </p:ext>
     </p:extLst>
   </p:cSld>
@@ -11971,8 +13427,8 @@
         </p:nvSpPr>
         <p:spPr>
           <a:xfrm>
-            <a:off x="284639" y="376621"/>
-            <a:ext cx="3570923" cy="1367294"/>
+            <a:off x="284639" y="345011"/>
+            <a:ext cx="3570923" cy="1252534"/>
           </a:xfrm>
           <a:prstGeom prst="rect">
             <a:avLst/>
@@ -12004,8 +13460,8 @@
         </p:nvSpPr>
         <p:spPr>
           <a:xfrm>
-            <a:off x="284639" y="1883098"/>
-            <a:ext cx="3570923" cy="4488325"/>
+            <a:off x="284639" y="1725046"/>
+            <a:ext cx="3570923" cy="4111612"/>
           </a:xfrm>
           <a:prstGeom prst="rect">
             <a:avLst/>
@@ -12066,8 +13522,8 @@
         </p:nvSpPr>
         <p:spPr>
           <a:xfrm>
-            <a:off x="284639" y="6556459"/>
-            <a:ext cx="931545" cy="376620"/>
+            <a:off x="284639" y="6006164"/>
+            <a:ext cx="931545" cy="345009"/>
           </a:xfrm>
           <a:prstGeom prst="rect">
             <a:avLst/>
@@ -12107,8 +13563,8 @@
         </p:nvSpPr>
         <p:spPr>
           <a:xfrm>
-            <a:off x="1371441" y="6556459"/>
-            <a:ext cx="1397318" cy="376620"/>
+            <a:off x="1371441" y="6006164"/>
+            <a:ext cx="1397318" cy="345009"/>
           </a:xfrm>
           <a:prstGeom prst="rect">
             <a:avLst/>
@@ -12144,8 +13600,8 @@
         </p:nvSpPr>
         <p:spPr>
           <a:xfrm>
-            <a:off x="2924016" y="6556459"/>
-            <a:ext cx="931545" cy="376620"/>
+            <a:off x="2924016" y="6006164"/>
+            <a:ext cx="931545" cy="345009"/>
           </a:xfrm>
           <a:prstGeom prst="rect">
             <a:avLst/>
@@ -12176,23 +13632,23 @@
     </p:spTree>
     <p:extLst>
       <p:ext uri="{BB962C8B-B14F-4D97-AF65-F5344CB8AC3E}">
-        <p14:creationId xmlns:p14="http://schemas.microsoft.com/office/powerpoint/2010/main" val="3354170364"/>
+        <p14:creationId xmlns:p14="http://schemas.microsoft.com/office/powerpoint/2010/main" val="628611097"/>
       </p:ext>
     </p:extLst>
   </p:cSld>
   <p:clrMap bg1="lt1" tx1="dk1" bg2="lt2" tx2="dk2" accent1="accent1" accent2="accent2" accent3="accent3" accent4="accent4" accent5="accent5" accent6="accent6" hlink="hlink" folHlink="folHlink"/>
   <p:sldLayoutIdLst>
-    <p:sldLayoutId id="2147483721" r:id="rId1"/>
-    <p:sldLayoutId id="2147483722" r:id="rId2"/>
-    <p:sldLayoutId id="2147483723" r:id="rId3"/>
-    <p:sldLayoutId id="2147483724" r:id="rId4"/>
-    <p:sldLayoutId id="2147483725" r:id="rId5"/>
-    <p:sldLayoutId id="2147483726" r:id="rId6"/>
-    <p:sldLayoutId id="2147483727" r:id="rId7"/>
-    <p:sldLayoutId id="2147483728" r:id="rId8"/>
-    <p:sldLayoutId id="2147483729" r:id="rId9"/>
-    <p:sldLayoutId id="2147483730" r:id="rId10"/>
-    <p:sldLayoutId id="2147483731" r:id="rId11"/>
+    <p:sldLayoutId id="2147483733" r:id="rId1"/>
+    <p:sldLayoutId id="2147483734" r:id="rId2"/>
+    <p:sldLayoutId id="2147483735" r:id="rId3"/>
+    <p:sldLayoutId id="2147483736" r:id="rId4"/>
+    <p:sldLayoutId id="2147483737" r:id="rId5"/>
+    <p:sldLayoutId id="2147483738" r:id="rId6"/>
+    <p:sldLayoutId id="2147483739" r:id="rId7"/>
+    <p:sldLayoutId id="2147483740" r:id="rId8"/>
+    <p:sldLayoutId id="2147483741" r:id="rId9"/>
+    <p:sldLayoutId id="2147483742" r:id="rId10"/>
+    <p:sldLayoutId id="2147483743" r:id="rId11"/>
   </p:sldLayoutIdLst>
   <p:txStyles>
     <p:titleStyle>
@@ -12502,7 +13958,7 @@
       </p:grpSpPr>
       <p:cxnSp>
         <p:nvCxnSpPr>
-          <p:cNvPr id="365" name="Straight Arrow Connector 364">
+          <p:cNvPr id="352" name="Straight Arrow Connector 351">
             <a:extLst>
               <a:ext uri="{FF2B5EF4-FFF2-40B4-BE49-F238E27FC236}">
                 <a16:creationId xmlns:a16="http://schemas.microsoft.com/office/drawing/2014/main" id="{6B2B5BF2-676C-E1AE-BA62-2F7C9F6C9C70}"/>
@@ -12516,8 +13972,8 @@
         </p:nvCxnSpPr>
         <p:spPr>
           <a:xfrm>
-            <a:off x="1836420" y="4900935"/>
-            <a:ext cx="0" cy="184430"/>
+            <a:off x="1664406" y="4535767"/>
+            <a:ext cx="0" cy="90000"/>
           </a:xfrm>
           <a:prstGeom prst="straightConnector1">
             <a:avLst/>
@@ -12549,7 +14005,7 @@
       </p:cxnSp>
       <p:cxnSp>
         <p:nvCxnSpPr>
-          <p:cNvPr id="366" name="Straight Arrow Connector 365">
+          <p:cNvPr id="353" name="Straight Arrow Connector 352">
             <a:extLst>
               <a:ext uri="{FF2B5EF4-FFF2-40B4-BE49-F238E27FC236}">
                 <a16:creationId xmlns:a16="http://schemas.microsoft.com/office/drawing/2014/main" id="{C03C5827-406F-B7CA-16D5-2D1C3286C854}"/>
@@ -12558,15 +14014,15 @@
           </p:cNvPr>
           <p:cNvCxnSpPr>
             <a:cxnSpLocks/>
-            <a:stCxn id="371" idx="2"/>
-            <a:endCxn id="367" idx="0"/>
+            <a:stCxn id="358" idx="2"/>
+            <a:endCxn id="354" idx="0"/>
           </p:cNvCxnSpPr>
           <p:nvPr/>
         </p:nvCxnSpPr>
         <p:spPr>
           <a:xfrm>
-            <a:off x="3663888" y="3236060"/>
-            <a:ext cx="3103" cy="1717493"/>
+            <a:off x="3663888" y="2986513"/>
+            <a:ext cx="3103" cy="1500211"/>
           </a:xfrm>
           <a:prstGeom prst="straightConnector1">
             <a:avLst/>
@@ -12598,7 +14054,7 @@
       </p:cxnSp>
       <p:sp>
         <p:nvSpPr>
-          <p:cNvPr id="367" name="Rectangle 366">
+          <p:cNvPr id="354" name="Rectangle 353">
             <a:extLst>
               <a:ext uri="{FF2B5EF4-FFF2-40B4-BE49-F238E27FC236}">
                 <a16:creationId xmlns:a16="http://schemas.microsoft.com/office/drawing/2014/main" id="{37757665-AC28-C2D7-9288-A4F262BEDCA5}"/>
@@ -12610,7 +14066,7 @@
         </p:nvSpPr>
         <p:spPr>
           <a:xfrm>
-            <a:off x="3158824" y="4953553"/>
+            <a:off x="3158824" y="4486724"/>
             <a:ext cx="1016334" cy="678851"/>
           </a:xfrm>
           <a:prstGeom prst="rect">
@@ -12697,7 +14153,7 @@
       </p:sp>
       <p:sp>
         <p:nvSpPr>
-          <p:cNvPr id="368" name="Rectangle 367">
+          <p:cNvPr id="355" name="Rectangle 354">
             <a:extLst>
               <a:ext uri="{FF2B5EF4-FFF2-40B4-BE49-F238E27FC236}">
                 <a16:creationId xmlns:a16="http://schemas.microsoft.com/office/drawing/2014/main" id="{6E3975A0-04BD-A32C-5C8E-87D363BCBF43}"/>
@@ -12709,7 +14165,7 @@
         </p:nvSpPr>
         <p:spPr>
           <a:xfrm>
-            <a:off x="-78147" y="-39345"/>
+            <a:off x="-78147" y="-21239"/>
             <a:ext cx="4335187" cy="348703"/>
           </a:xfrm>
           <a:prstGeom prst="rect">
@@ -12773,7 +14229,7 @@
       </p:sp>
       <p:sp>
         <p:nvSpPr>
-          <p:cNvPr id="369" name="Rectangle 368">
+          <p:cNvPr id="356" name="Rectangle 355">
             <a:extLst>
               <a:ext uri="{FF2B5EF4-FFF2-40B4-BE49-F238E27FC236}">
                 <a16:creationId xmlns:a16="http://schemas.microsoft.com/office/drawing/2014/main" id="{EC3C4672-BBD3-831C-7CA8-0C6A492C9F9C}"/>
@@ -12785,7 +14241,7 @@
         </p:nvSpPr>
         <p:spPr>
           <a:xfrm>
-            <a:off x="490149" y="372108"/>
+            <a:off x="490149" y="390214"/>
             <a:ext cx="3159903" cy="264384"/>
           </a:xfrm>
           <a:prstGeom prst="rect">
@@ -12862,7 +14318,7 @@
       </p:sp>
       <p:cxnSp>
         <p:nvCxnSpPr>
-          <p:cNvPr id="370" name="Straight Arrow Connector 369">
+          <p:cNvPr id="357" name="Straight Arrow Connector 356">
             <a:extLst>
               <a:ext uri="{FF2B5EF4-FFF2-40B4-BE49-F238E27FC236}">
                 <a16:creationId xmlns:a16="http://schemas.microsoft.com/office/drawing/2014/main" id="{7DC2AC43-F265-6066-8ACE-435A1F981070}"/>
@@ -12876,8 +14332,8 @@
         </p:nvCxnSpPr>
         <p:spPr>
           <a:xfrm>
-            <a:off x="2070101" y="640722"/>
-            <a:ext cx="0" cy="180000"/>
+            <a:off x="2070101" y="658828"/>
+            <a:ext cx="0" cy="90000"/>
           </a:xfrm>
           <a:prstGeom prst="straightConnector1">
             <a:avLst/>
@@ -12909,7 +14365,7 @@
       </p:cxnSp>
       <p:sp>
         <p:nvSpPr>
-          <p:cNvPr id="371" name="Rectangle 370">
+          <p:cNvPr id="358" name="Rectangle 357">
             <a:extLst>
               <a:ext uri="{FF2B5EF4-FFF2-40B4-BE49-F238E27FC236}">
                 <a16:creationId xmlns:a16="http://schemas.microsoft.com/office/drawing/2014/main" id="{66347620-DBE3-A5F5-F8A3-7C2F7C6EBDE6}"/>
@@ -12921,7 +14377,7 @@
         </p:nvSpPr>
         <p:spPr>
           <a:xfrm>
-            <a:off x="3303888" y="3056060"/>
+            <a:off x="3303888" y="2806513"/>
             <a:ext cx="720000" cy="180000"/>
           </a:xfrm>
           <a:prstGeom prst="rect">
@@ -12970,7 +14426,7 @@
       </p:sp>
       <p:sp>
         <p:nvSpPr>
-          <p:cNvPr id="372" name="TextBox 371">
+          <p:cNvPr id="359" name="TextBox 358">
             <a:extLst>
               <a:ext uri="{FF2B5EF4-FFF2-40B4-BE49-F238E27FC236}">
                 <a16:creationId xmlns:a16="http://schemas.microsoft.com/office/drawing/2014/main" id="{4DC959A9-7C89-6A9D-8C2C-4CCD3B47ECC5}"/>
@@ -12982,7 +14438,7 @@
         </p:nvSpPr>
         <p:spPr>
           <a:xfrm>
-            <a:off x="3303887" y="2889230"/>
+            <a:off x="3303887" y="2639683"/>
             <a:ext cx="720000" cy="215442"/>
           </a:xfrm>
           <a:prstGeom prst="rect">
@@ -13012,7 +14468,7 @@
       </p:sp>
       <p:cxnSp>
         <p:nvCxnSpPr>
-          <p:cNvPr id="373" name="Straight Arrow Connector 372">
+          <p:cNvPr id="360" name="Straight Arrow Connector 359">
             <a:extLst>
               <a:ext uri="{FF2B5EF4-FFF2-40B4-BE49-F238E27FC236}">
                 <a16:creationId xmlns:a16="http://schemas.microsoft.com/office/drawing/2014/main" id="{B54C17C6-3C4D-8A4F-59E1-33BB2363B4F2}"/>
@@ -13026,8 +14482,8 @@
         </p:nvCxnSpPr>
         <p:spPr>
           <a:xfrm>
-            <a:off x="1262303" y="2375488"/>
-            <a:ext cx="1957445" cy="317480"/>
+            <a:off x="1268048" y="2374593"/>
+            <a:ext cx="1968793" cy="272657"/>
           </a:xfrm>
           <a:prstGeom prst="straightConnector1">
             <a:avLst/>
@@ -13059,7 +14515,7 @@
       </p:cxnSp>
       <p:cxnSp>
         <p:nvCxnSpPr>
-          <p:cNvPr id="374" name="Straight Arrow Connector 373">
+          <p:cNvPr id="361" name="Straight Arrow Connector 360">
             <a:extLst>
               <a:ext uri="{FF2B5EF4-FFF2-40B4-BE49-F238E27FC236}">
                 <a16:creationId xmlns:a16="http://schemas.microsoft.com/office/drawing/2014/main" id="{256D26E3-8C15-B026-B526-6022B54CCA43}"/>
@@ -13073,8 +14529,8 @@
         </p:nvCxnSpPr>
         <p:spPr>
           <a:xfrm>
-            <a:off x="95442" y="2365460"/>
-            <a:ext cx="170165" cy="317480"/>
+            <a:off x="89284" y="2372138"/>
+            <a:ext cx="27027" cy="275112"/>
           </a:xfrm>
           <a:prstGeom prst="straightConnector1">
             <a:avLst/>
@@ -13106,7 +14562,7 @@
       </p:cxnSp>
       <p:cxnSp>
         <p:nvCxnSpPr>
-          <p:cNvPr id="375" name="Straight Arrow Connector 374">
+          <p:cNvPr id="362" name="Straight Arrow Connector 361">
             <a:extLst>
               <a:ext uri="{FF2B5EF4-FFF2-40B4-BE49-F238E27FC236}">
                 <a16:creationId xmlns:a16="http://schemas.microsoft.com/office/drawing/2014/main" id="{8B8A5069-7969-C164-8418-15F4BE24B20F}"/>
@@ -13120,8 +14576,8 @@
         </p:nvCxnSpPr>
         <p:spPr>
           <a:xfrm>
-            <a:off x="2070100" y="5676576"/>
-            <a:ext cx="0" cy="184430"/>
+            <a:off x="2070100" y="5209747"/>
+            <a:ext cx="0" cy="90000"/>
           </a:xfrm>
           <a:prstGeom prst="straightConnector1">
             <a:avLst/>
@@ -13153,7 +14609,7 @@
       </p:cxnSp>
       <p:sp>
         <p:nvSpPr>
-          <p:cNvPr id="376" name="Parallelogram 375">
+          <p:cNvPr id="363" name="Parallelogram 362">
             <a:extLst>
               <a:ext uri="{FF2B5EF4-FFF2-40B4-BE49-F238E27FC236}">
                 <a16:creationId xmlns:a16="http://schemas.microsoft.com/office/drawing/2014/main" id="{1A0731B8-37BC-29FF-5EFB-3505DFCBB060}"/>
@@ -13165,7 +14621,7 @@
         </p:nvSpPr>
         <p:spPr>
           <a:xfrm>
-            <a:off x="581957" y="5866875"/>
+            <a:off x="591010" y="5318569"/>
             <a:ext cx="2976579" cy="444575"/>
           </a:xfrm>
           <a:prstGeom prst="parallelogram">
@@ -13264,7 +14720,7 @@
       </p:sp>
       <p:sp>
         <p:nvSpPr>
-          <p:cNvPr id="377" name="Rectangle 376">
+          <p:cNvPr id="364" name="Rectangle 363">
             <a:extLst>
               <a:ext uri="{FF2B5EF4-FFF2-40B4-BE49-F238E27FC236}">
                 <a16:creationId xmlns:a16="http://schemas.microsoft.com/office/drawing/2014/main" id="{5382C8C2-6F3C-50EB-0A51-B5F6DC1665D1}"/>
@@ -13276,7 +14732,7 @@
         </p:nvSpPr>
         <p:spPr>
           <a:xfrm>
-            <a:off x="581957" y="3418429"/>
+            <a:off x="581957" y="3168882"/>
             <a:ext cx="846000" cy="180000"/>
           </a:xfrm>
           <a:prstGeom prst="rect">
@@ -13327,7 +14783,7 @@
       </p:sp>
       <p:sp>
         <p:nvSpPr>
-          <p:cNvPr id="378" name="Rectangle 377">
+          <p:cNvPr id="409" name="Rectangle 408">
             <a:extLst>
               <a:ext uri="{FF2B5EF4-FFF2-40B4-BE49-F238E27FC236}">
                 <a16:creationId xmlns:a16="http://schemas.microsoft.com/office/drawing/2014/main" id="{AFE3A951-104C-CEDE-A21D-544D4B214711}"/>
@@ -13339,7 +14795,7 @@
         </p:nvSpPr>
         <p:spPr>
           <a:xfrm>
-            <a:off x="1454957" y="3418429"/>
+            <a:off x="1454957" y="3168882"/>
             <a:ext cx="846000" cy="180000"/>
           </a:xfrm>
           <a:prstGeom prst="rect">
@@ -13390,7 +14846,7 @@
       </p:sp>
       <p:sp>
         <p:nvSpPr>
-          <p:cNvPr id="379" name="Rectangle 378">
+          <p:cNvPr id="410" name="Rectangle 409">
             <a:extLst>
               <a:ext uri="{FF2B5EF4-FFF2-40B4-BE49-F238E27FC236}">
                 <a16:creationId xmlns:a16="http://schemas.microsoft.com/office/drawing/2014/main" id="{F81123FD-1880-7B13-64BB-A61B32D6C3FC}"/>
@@ -13402,7 +14858,7 @@
         </p:nvSpPr>
         <p:spPr>
           <a:xfrm>
-            <a:off x="2327957" y="3418429"/>
+            <a:off x="2327957" y="3168882"/>
             <a:ext cx="846000" cy="180000"/>
           </a:xfrm>
           <a:prstGeom prst="rect">
@@ -13453,7 +14909,7 @@
       </p:sp>
       <p:sp>
         <p:nvSpPr>
-          <p:cNvPr id="380" name="Rectangle 379">
+          <p:cNvPr id="411" name="Rectangle 410">
             <a:extLst>
               <a:ext uri="{FF2B5EF4-FFF2-40B4-BE49-F238E27FC236}">
                 <a16:creationId xmlns:a16="http://schemas.microsoft.com/office/drawing/2014/main" id="{68F25C0E-89BD-9175-A93B-76E013FBF0DD}"/>
@@ -13465,7 +14921,7 @@
         </p:nvSpPr>
         <p:spPr>
           <a:xfrm>
-            <a:off x="581957" y="3629695"/>
+            <a:off x="581957" y="3380148"/>
             <a:ext cx="846000" cy="180000"/>
           </a:xfrm>
           <a:prstGeom prst="rect">
@@ -13516,7 +14972,7 @@
       </p:sp>
       <p:sp>
         <p:nvSpPr>
-          <p:cNvPr id="381" name="Rectangle 380">
+          <p:cNvPr id="412" name="Rectangle 411">
             <a:extLst>
               <a:ext uri="{FF2B5EF4-FFF2-40B4-BE49-F238E27FC236}">
                 <a16:creationId xmlns:a16="http://schemas.microsoft.com/office/drawing/2014/main" id="{96248778-630E-7601-4FAE-FF9CFCDF1B42}"/>
@@ -13528,7 +14984,7 @@
         </p:nvSpPr>
         <p:spPr>
           <a:xfrm>
-            <a:off x="1454957" y="3629695"/>
+            <a:off x="1454957" y="3380148"/>
             <a:ext cx="846000" cy="180000"/>
           </a:xfrm>
           <a:prstGeom prst="rect">
@@ -13579,7 +15035,7 @@
       </p:sp>
       <p:sp>
         <p:nvSpPr>
-          <p:cNvPr id="382" name="Rectangle 381">
+          <p:cNvPr id="413" name="Rectangle 412">
             <a:extLst>
               <a:ext uri="{FF2B5EF4-FFF2-40B4-BE49-F238E27FC236}">
                 <a16:creationId xmlns:a16="http://schemas.microsoft.com/office/drawing/2014/main" id="{9CADC630-E44A-1A89-9FDE-8EDA7123B19C}"/>
@@ -13591,7 +15047,7 @@
         </p:nvSpPr>
         <p:spPr>
           <a:xfrm>
-            <a:off x="2327957" y="3629695"/>
+            <a:off x="2327957" y="3380148"/>
             <a:ext cx="846000" cy="180000"/>
           </a:xfrm>
           <a:prstGeom prst="rect">
@@ -13642,7 +15098,7 @@
       </p:sp>
       <p:sp>
         <p:nvSpPr>
-          <p:cNvPr id="383" name="Rectangle 382">
+          <p:cNvPr id="414" name="Rectangle 413">
             <a:extLst>
               <a:ext uri="{FF2B5EF4-FFF2-40B4-BE49-F238E27FC236}">
                 <a16:creationId xmlns:a16="http://schemas.microsoft.com/office/drawing/2014/main" id="{EAF3C8BC-9003-987C-E4A9-44A032A5528E}"/>
@@ -13654,7 +15110,7 @@
         </p:nvSpPr>
         <p:spPr>
           <a:xfrm>
-            <a:off x="581957" y="3832994"/>
+            <a:off x="581957" y="3583447"/>
             <a:ext cx="846000" cy="180000"/>
           </a:xfrm>
           <a:prstGeom prst="rect">
@@ -13705,7 +15161,7 @@
       </p:sp>
       <p:sp>
         <p:nvSpPr>
-          <p:cNvPr id="384" name="Rectangle 383">
+          <p:cNvPr id="415" name="Rectangle 414">
             <a:extLst>
               <a:ext uri="{FF2B5EF4-FFF2-40B4-BE49-F238E27FC236}">
                 <a16:creationId xmlns:a16="http://schemas.microsoft.com/office/drawing/2014/main" id="{28B436EB-88AE-9EF3-EB76-64B6D1FB6EEB}"/>
@@ -13717,7 +15173,7 @@
         </p:nvSpPr>
         <p:spPr>
           <a:xfrm>
-            <a:off x="1454957" y="3832994"/>
+            <a:off x="1454957" y="3583447"/>
             <a:ext cx="846000" cy="180000"/>
           </a:xfrm>
           <a:prstGeom prst="rect">
@@ -13768,7 +15224,7 @@
       </p:sp>
       <p:sp>
         <p:nvSpPr>
-          <p:cNvPr id="385" name="Rectangle 384">
+          <p:cNvPr id="416" name="Rectangle 415">
             <a:extLst>
               <a:ext uri="{FF2B5EF4-FFF2-40B4-BE49-F238E27FC236}">
                 <a16:creationId xmlns:a16="http://schemas.microsoft.com/office/drawing/2014/main" id="{F27C24D0-AB2A-41DB-6171-C0B6ED9E9A68}"/>
@@ -13780,7 +15236,7 @@
         </p:nvSpPr>
         <p:spPr>
           <a:xfrm>
-            <a:off x="2327957" y="3832994"/>
+            <a:off x="2327957" y="3583447"/>
             <a:ext cx="846000" cy="180000"/>
           </a:xfrm>
           <a:prstGeom prst="rect">
@@ -13831,7 +15287,7 @@
       </p:sp>
       <p:sp>
         <p:nvSpPr>
-          <p:cNvPr id="386" name="Rectangle 385">
+          <p:cNvPr id="417" name="Rectangle 416">
             <a:extLst>
               <a:ext uri="{FF2B5EF4-FFF2-40B4-BE49-F238E27FC236}">
                 <a16:creationId xmlns:a16="http://schemas.microsoft.com/office/drawing/2014/main" id="{41C377DF-3C36-42E1-684D-12BC83DB59C3}"/>
@@ -13843,7 +15299,7 @@
         </p:nvSpPr>
         <p:spPr>
           <a:xfrm>
-            <a:off x="410199" y="4008640"/>
+            <a:off x="410199" y="3759093"/>
             <a:ext cx="2888472" cy="413416"/>
           </a:xfrm>
           <a:prstGeom prst="rect">
@@ -13959,117 +15415,7 @@
       </p:sp>
       <p:sp>
         <p:nvSpPr>
-          <p:cNvPr id="387" name="Rectangle 386">
-            <a:extLst>
-              <a:ext uri="{FF2B5EF4-FFF2-40B4-BE49-F238E27FC236}">
-                <a16:creationId xmlns:a16="http://schemas.microsoft.com/office/drawing/2014/main" id="{2CFA74E3-D91E-2C27-4A99-D3D1A111919C}"/>
-              </a:ext>
-            </a:extLst>
-          </p:cNvPr>
-          <p:cNvSpPr/>
-          <p:nvPr/>
-        </p:nvSpPr>
-        <p:spPr>
-          <a:xfrm>
-            <a:off x="265607" y="2692968"/>
-            <a:ext cx="2971234" cy="203321"/>
-          </a:xfrm>
-          <a:prstGeom prst="rect">
-            <a:avLst/>
-          </a:prstGeom>
-          <a:solidFill>
-            <a:schemeClr val="bg1">
-              <a:lumMod val="95000"/>
-            </a:schemeClr>
-          </a:solidFill>
-          <a:ln w="19050">
-            <a:solidFill>
-              <a:schemeClr val="tx1">
-                <a:lumMod val="75000"/>
-                <a:lumOff val="25000"/>
-              </a:schemeClr>
-            </a:solidFill>
-          </a:ln>
-        </p:spPr>
-        <p:style>
-          <a:lnRef idx="2">
-            <a:schemeClr val="accent1">
-              <a:shade val="15000"/>
-            </a:schemeClr>
-          </a:lnRef>
-          <a:fillRef idx="1">
-            <a:schemeClr val="accent1"/>
-          </a:fillRef>
-          <a:effectRef idx="0">
-            <a:schemeClr val="accent1"/>
-          </a:effectRef>
-          <a:fontRef idx="minor">
-            <a:schemeClr val="lt1"/>
-          </a:fontRef>
-        </p:style>
-        <p:txBody>
-          <a:bodyPr rtlCol="0" anchor="ctr"/>
-          <a:lstStyle/>
-          <a:p>
-            <a:pPr algn="ctr"/>
-            <a:r>
-              <a:rPr lang="en-GB" sz="800" dirty="0">
-                <a:solidFill>
-                  <a:schemeClr val="tx1">
-                    <a:lumMod val="75000"/>
-                    <a:lumOff val="25000"/>
-                  </a:schemeClr>
-                </a:solidFill>
-                <a:latin typeface="Calibri Light" panose="020F0302020204030204" pitchFamily="34" charset="0"/>
-                <a:cs typeface="Calibri Light" panose="020F0302020204030204" pitchFamily="34" charset="0"/>
-              </a:rPr>
-              <a:t>Hyperparameter tuning with Optuna (      </a:t>
-            </a:r>
-            <a:r>
-              <a:rPr lang="en-GB" sz="800" b="1" dirty="0">
-                <a:solidFill>
-                  <a:schemeClr val="tx1">
-                    <a:lumMod val="75000"/>
-                    <a:lumOff val="25000"/>
-                  </a:schemeClr>
-                </a:solidFill>
-                <a:latin typeface="Calibri" panose="020F0502020204030204" pitchFamily="34" charset="0"/>
-                <a:cs typeface="Calibri" panose="020F0502020204030204" pitchFamily="34" charset="0"/>
-              </a:rPr>
-              <a:t>n_trials </a:t>
-            </a:r>
-            <a:r>
-              <a:rPr lang="en-GB" sz="800" b="1" dirty="0">
-                <a:solidFill>
-                  <a:schemeClr val="tx1">
-                    <a:lumMod val="75000"/>
-                    <a:lumOff val="25000"/>
-                  </a:schemeClr>
-                </a:solidFill>
-                <a:latin typeface="Calibri Light" panose="020F0302020204030204" pitchFamily="34" charset="0"/>
-                <a:cs typeface="Calibri Light" panose="020F0302020204030204" pitchFamily="34" charset="0"/>
-              </a:rPr>
-              <a:t>= 20 </a:t>
-            </a:r>
-            <a:r>
-              <a:rPr lang="en-GB" sz="800" dirty="0">
-                <a:solidFill>
-                  <a:schemeClr val="tx1">
-                    <a:lumMod val="75000"/>
-                    <a:lumOff val="25000"/>
-                  </a:schemeClr>
-                </a:solidFill>
-                <a:latin typeface="Calibri Light" panose="020F0302020204030204" pitchFamily="34" charset="0"/>
-                <a:cs typeface="Calibri Light" panose="020F0302020204030204" pitchFamily="34" charset="0"/>
-              </a:rPr>
-              <a:t>)</a:t>
-            </a:r>
-          </a:p>
-        </p:txBody>
-      </p:sp>
-      <p:sp>
-        <p:nvSpPr>
-          <p:cNvPr id="388" name="Rectangle 387">
+          <p:cNvPr id="418" name="Rectangle 417">
             <a:extLst>
               <a:ext uri="{FF2B5EF4-FFF2-40B4-BE49-F238E27FC236}">
                 <a16:creationId xmlns:a16="http://schemas.microsoft.com/office/drawing/2014/main" id="{CC497459-D1DC-EE9A-EE1D-815F28D2818C}"/>
@@ -14081,7 +15427,7 @@
         </p:nvSpPr>
         <p:spPr>
           <a:xfrm>
-            <a:off x="574923" y="3256508"/>
+            <a:off x="574923" y="3006961"/>
             <a:ext cx="846000" cy="180000"/>
           </a:xfrm>
           <a:prstGeom prst="rect">
@@ -14144,7 +15490,7 @@
       </p:sp>
       <p:sp>
         <p:nvSpPr>
-          <p:cNvPr id="389" name="Rectangle 388">
+          <p:cNvPr id="419" name="Rectangle 418">
             <a:extLst>
               <a:ext uri="{FF2B5EF4-FFF2-40B4-BE49-F238E27FC236}">
                 <a16:creationId xmlns:a16="http://schemas.microsoft.com/office/drawing/2014/main" id="{8A74094E-C336-74AA-E520-6856C354301A}"/>
@@ -14156,7 +15502,7 @@
         </p:nvSpPr>
         <p:spPr>
           <a:xfrm>
-            <a:off x="1447923" y="3256508"/>
+            <a:off x="1447923" y="3006961"/>
             <a:ext cx="846000" cy="180000"/>
           </a:xfrm>
           <a:prstGeom prst="rect">
@@ -14219,7 +15565,7 @@
       </p:sp>
       <p:sp>
         <p:nvSpPr>
-          <p:cNvPr id="390" name="Rectangle 389">
+          <p:cNvPr id="420" name="Rectangle 419">
             <a:extLst>
               <a:ext uri="{FF2B5EF4-FFF2-40B4-BE49-F238E27FC236}">
                 <a16:creationId xmlns:a16="http://schemas.microsoft.com/office/drawing/2014/main" id="{10B23706-9C8A-69A2-B423-B2EEB1C4D06D}"/>
@@ -14231,7 +15577,7 @@
         </p:nvSpPr>
         <p:spPr>
           <a:xfrm>
-            <a:off x="2320923" y="3256508"/>
+            <a:off x="2320923" y="3006961"/>
             <a:ext cx="846000" cy="180000"/>
           </a:xfrm>
           <a:prstGeom prst="rect">
@@ -14294,7 +15640,7 @@
       </p:sp>
       <p:sp>
         <p:nvSpPr>
-          <p:cNvPr id="391" name="Rectangle 390">
+          <p:cNvPr id="421" name="Rectangle 420">
             <a:extLst>
               <a:ext uri="{FF2B5EF4-FFF2-40B4-BE49-F238E27FC236}">
                 <a16:creationId xmlns:a16="http://schemas.microsoft.com/office/drawing/2014/main" id="{14A7D952-0782-7271-7F2A-BC6BC775B542}"/>
@@ -14306,7 +15652,7 @@
         </p:nvSpPr>
         <p:spPr>
           <a:xfrm>
-            <a:off x="148357" y="3422639"/>
+            <a:off x="148357" y="3173092"/>
             <a:ext cx="497974" cy="180000"/>
           </a:xfrm>
           <a:prstGeom prst="rect">
@@ -14356,7 +15702,7 @@
       </p:sp>
       <p:sp>
         <p:nvSpPr>
-          <p:cNvPr id="392" name="Rectangle 391">
+          <p:cNvPr id="422" name="Rectangle 421">
             <a:extLst>
               <a:ext uri="{FF2B5EF4-FFF2-40B4-BE49-F238E27FC236}">
                 <a16:creationId xmlns:a16="http://schemas.microsoft.com/office/drawing/2014/main" id="{06432789-ABB4-135D-C8F1-01F8D760F247}"/>
@@ -14368,7 +15714,7 @@
         </p:nvSpPr>
         <p:spPr>
           <a:xfrm>
-            <a:off x="148357" y="3635999"/>
+            <a:off x="148357" y="3386452"/>
             <a:ext cx="497974" cy="180000"/>
           </a:xfrm>
           <a:prstGeom prst="rect">
@@ -14418,7 +15764,7 @@
       </p:sp>
       <p:sp>
         <p:nvSpPr>
-          <p:cNvPr id="393" name="Rectangle 392">
+          <p:cNvPr id="423" name="Rectangle 422">
             <a:extLst>
               <a:ext uri="{FF2B5EF4-FFF2-40B4-BE49-F238E27FC236}">
                 <a16:creationId xmlns:a16="http://schemas.microsoft.com/office/drawing/2014/main" id="{C5603496-23AC-2551-E5E0-BDF8C60E9816}"/>
@@ -14430,7 +15776,7 @@
         </p:nvSpPr>
         <p:spPr>
           <a:xfrm>
-            <a:off x="148357" y="3835388"/>
+            <a:off x="148357" y="3585841"/>
             <a:ext cx="497974" cy="180000"/>
           </a:xfrm>
           <a:prstGeom prst="rect">
@@ -14480,7 +15826,7 @@
       </p:sp>
       <p:sp>
         <p:nvSpPr>
-          <p:cNvPr id="394" name="Rectangle 393">
+          <p:cNvPr id="424" name="Rectangle 423">
             <a:extLst>
               <a:ext uri="{FF2B5EF4-FFF2-40B4-BE49-F238E27FC236}">
                 <a16:creationId xmlns:a16="http://schemas.microsoft.com/office/drawing/2014/main" id="{BD4FCEEF-D9EE-3F9D-274E-A275AE7207AC}"/>
@@ -14492,8 +15838,8 @@
         </p:nvSpPr>
         <p:spPr>
           <a:xfrm>
-            <a:off x="265609" y="2896797"/>
-            <a:ext cx="2971232" cy="1994571"/>
+            <a:off x="116312" y="2647250"/>
+            <a:ext cx="3120529" cy="1888517"/>
           </a:xfrm>
           <a:prstGeom prst="rect">
             <a:avLst/>
@@ -14544,7 +15890,7 @@
       </p:sp>
       <p:cxnSp>
         <p:nvCxnSpPr>
-          <p:cNvPr id="395" name="Straight Arrow Connector 394">
+          <p:cNvPr id="425" name="Straight Arrow Connector 424">
             <a:extLst>
               <a:ext uri="{FF2B5EF4-FFF2-40B4-BE49-F238E27FC236}">
                 <a16:creationId xmlns:a16="http://schemas.microsoft.com/office/drawing/2014/main" id="{C7C3581F-BB46-6BFD-88EC-1685548CDC83}"/>
@@ -14558,8 +15904,8 @@
         </p:nvCxnSpPr>
         <p:spPr>
           <a:xfrm>
-            <a:off x="1836420" y="4414672"/>
-            <a:ext cx="0" cy="184430"/>
+            <a:off x="1836420" y="4165125"/>
+            <a:ext cx="0" cy="90000"/>
           </a:xfrm>
           <a:prstGeom prst="straightConnector1">
             <a:avLst/>
@@ -14591,7 +15937,7 @@
       </p:cxnSp>
       <p:sp>
         <p:nvSpPr>
-          <p:cNvPr id="396" name="Rectangle 395">
+          <p:cNvPr id="426" name="Rectangle 425">
             <a:extLst>
               <a:ext uri="{FF2B5EF4-FFF2-40B4-BE49-F238E27FC236}">
                 <a16:creationId xmlns:a16="http://schemas.microsoft.com/office/drawing/2014/main" id="{54B4C05C-53AB-88AD-E871-B8862B4F61D3}"/>
@@ -14603,8 +15949,8 @@
         </p:nvSpPr>
         <p:spPr>
           <a:xfrm>
-            <a:off x="574923" y="4599102"/>
-            <a:ext cx="2592000" cy="292266"/>
+            <a:off x="101734" y="4231866"/>
+            <a:ext cx="3135106" cy="292266"/>
           </a:xfrm>
           <a:prstGeom prst="rect">
             <a:avLst/>
@@ -14676,7 +16022,7 @@
       </p:sp>
       <p:sp>
         <p:nvSpPr>
-          <p:cNvPr id="397" name="Rectangle 396">
+          <p:cNvPr id="427" name="Rectangle 426">
             <a:extLst>
               <a:ext uri="{FF2B5EF4-FFF2-40B4-BE49-F238E27FC236}">
                 <a16:creationId xmlns:a16="http://schemas.microsoft.com/office/drawing/2014/main" id="{6EE46427-6BDE-882E-3A72-3DF2ED872F0A}"/>
@@ -14688,7 +16034,7 @@
         </p:nvSpPr>
         <p:spPr>
           <a:xfrm>
-            <a:off x="574923" y="3056060"/>
+            <a:off x="574923" y="2806513"/>
             <a:ext cx="2599034" cy="178250"/>
           </a:xfrm>
           <a:prstGeom prst="rect">
@@ -14748,7 +16094,7 @@
       </p:sp>
       <p:sp>
         <p:nvSpPr>
-          <p:cNvPr id="398" name="TextBox 397">
+          <p:cNvPr id="428" name="TextBox 427">
             <a:extLst>
               <a:ext uri="{FF2B5EF4-FFF2-40B4-BE49-F238E27FC236}">
                 <a16:creationId xmlns:a16="http://schemas.microsoft.com/office/drawing/2014/main" id="{0BBE180E-9D2D-A30D-B94E-AB6240A4F89E}"/>
@@ -14760,7 +16106,7 @@
         </p:nvSpPr>
         <p:spPr>
           <a:xfrm>
-            <a:off x="601008" y="2889229"/>
+            <a:off x="601008" y="2639682"/>
             <a:ext cx="2592000" cy="215444"/>
           </a:xfrm>
           <a:prstGeom prst="rect">
@@ -14790,7 +16136,7 @@
       </p:sp>
       <p:sp>
         <p:nvSpPr>
-          <p:cNvPr id="399" name="Rectangle 398">
+          <p:cNvPr id="429" name="Rectangle 428">
             <a:extLst>
               <a:ext uri="{FF2B5EF4-FFF2-40B4-BE49-F238E27FC236}">
                 <a16:creationId xmlns:a16="http://schemas.microsoft.com/office/drawing/2014/main" id="{27B7D5CF-81CA-4EAF-61FB-FBDB71CAE40F}"/>
@@ -14802,7 +16148,7 @@
         </p:nvSpPr>
         <p:spPr>
           <a:xfrm>
-            <a:off x="490150" y="6520282"/>
+            <a:off x="499203" y="5881446"/>
             <a:ext cx="3159900" cy="282573"/>
           </a:xfrm>
           <a:prstGeom prst="rect">
@@ -14879,7 +16225,7 @@
       </p:sp>
       <p:sp>
         <p:nvSpPr>
-          <p:cNvPr id="400" name="Rectangle 399">
+          <p:cNvPr id="430" name="Rectangle 429">
             <a:extLst>
               <a:ext uri="{FF2B5EF4-FFF2-40B4-BE49-F238E27FC236}">
                 <a16:creationId xmlns:a16="http://schemas.microsoft.com/office/drawing/2014/main" id="{78B6A93C-975D-F2FB-2429-F211CE81F035}"/>
@@ -14891,7 +16237,7 @@
         </p:nvSpPr>
         <p:spPr>
           <a:xfrm>
-            <a:off x="0" y="6801619"/>
+            <a:off x="9053" y="6162783"/>
             <a:ext cx="4102002" cy="322057"/>
           </a:xfrm>
           <a:prstGeom prst="rect">
@@ -15058,7 +16404,7 @@
       </p:sp>
       <p:pic>
         <p:nvPicPr>
-          <p:cNvPr id="401" name="Graphic 400" descr="Refresh with solid fill">
+          <p:cNvPr id="431" name="Graphic 430" descr="Refresh with solid fill">
             <a:extLst>
               <a:ext uri="{FF2B5EF4-FFF2-40B4-BE49-F238E27FC236}">
                 <a16:creationId xmlns:a16="http://schemas.microsoft.com/office/drawing/2014/main" id="{4943A585-56F4-BE8B-C666-8836FD94BB13}"/>
@@ -15084,7 +16430,7 @@
         </p:blipFill>
         <p:spPr>
           <a:xfrm>
-            <a:off x="2197512" y="2764467"/>
+            <a:off x="1520027" y="2546882"/>
             <a:ext cx="72000" cy="72000"/>
           </a:xfrm>
           <a:prstGeom prst="rect">
@@ -15094,7 +16440,7 @@
       </p:pic>
       <p:sp>
         <p:nvSpPr>
-          <p:cNvPr id="402" name="Rectangle 401">
+          <p:cNvPr id="432" name="Rectangle 431">
             <a:extLst>
               <a:ext uri="{FF2B5EF4-FFF2-40B4-BE49-F238E27FC236}">
                 <a16:creationId xmlns:a16="http://schemas.microsoft.com/office/drawing/2014/main" id="{A6BD9B84-7D11-E6C4-714D-168348DA6A59}"/>
@@ -15106,7 +16452,7 @@
         </p:nvSpPr>
         <p:spPr>
           <a:xfrm>
-            <a:off x="962227" y="5106135"/>
+            <a:off x="795766" y="4637809"/>
             <a:ext cx="1761620" cy="393580"/>
           </a:xfrm>
           <a:prstGeom prst="rect">
@@ -15156,7 +16502,7 @@
       </p:sp>
       <p:cxnSp>
         <p:nvCxnSpPr>
-          <p:cNvPr id="403" name="Straight Arrow Connector 402">
+          <p:cNvPr id="433" name="Straight Arrow Connector 432">
             <a:extLst>
               <a:ext uri="{FF2B5EF4-FFF2-40B4-BE49-F238E27FC236}">
                 <a16:creationId xmlns:a16="http://schemas.microsoft.com/office/drawing/2014/main" id="{346B4E64-3EEF-D973-3957-F55293E7F745}"/>
@@ -15169,9 +16515,9 @@
           <p:nvPr/>
         </p:nvCxnSpPr>
         <p:spPr>
-          <a:xfrm rot="10800000" flipH="1">
-            <a:off x="2648337" y="5304054"/>
-            <a:ext cx="544671" cy="0"/>
+          <a:xfrm>
+            <a:off x="2471596" y="4837225"/>
+            <a:ext cx="721411" cy="0"/>
           </a:xfrm>
           <a:prstGeom prst="straightConnector1">
             <a:avLst/>
@@ -15201,39 +16547,9 @@
           </a:fontRef>
         </p:style>
       </p:cxnSp>
-      <p:pic>
-        <p:nvPicPr>
-          <p:cNvPr id="404" name="Picture 403">
-            <a:extLst>
-              <a:ext uri="{FF2B5EF4-FFF2-40B4-BE49-F238E27FC236}">
-                <a16:creationId xmlns:a16="http://schemas.microsoft.com/office/drawing/2014/main" id="{52CA6A54-CC59-58A1-4074-7DA36EA27AEA}"/>
-              </a:ext>
-            </a:extLst>
-          </p:cNvPr>
-          <p:cNvPicPr>
-            <a:picLocks noChangeAspect="1"/>
-          </p:cNvPicPr>
-          <p:nvPr/>
-        </p:nvPicPr>
-        <p:blipFill>
-          <a:blip r:embed="rId4"/>
-          <a:stretch>
-            <a:fillRect/>
-          </a:stretch>
-        </p:blipFill>
-        <p:spPr>
-          <a:xfrm>
-            <a:off x="-32165" y="802653"/>
-            <a:ext cx="4140200" cy="1801878"/>
-          </a:xfrm>
-          <a:prstGeom prst="rect">
-            <a:avLst/>
-          </a:prstGeom>
-        </p:spPr>
-      </p:pic>
       <p:cxnSp>
         <p:nvCxnSpPr>
-          <p:cNvPr id="405" name="Straight Connector 404">
+          <p:cNvPr id="434" name="Straight Connector 433">
             <a:extLst>
               <a:ext uri="{FF2B5EF4-FFF2-40B4-BE49-F238E27FC236}">
                 <a16:creationId xmlns:a16="http://schemas.microsoft.com/office/drawing/2014/main" id="{F820DBFC-D482-D362-AD9A-EB720E92CEF4}"/>
@@ -15247,7 +16563,7 @@
         </p:nvCxnSpPr>
         <p:spPr>
           <a:xfrm>
-            <a:off x="18337" y="5658042"/>
+            <a:off x="18337" y="5191213"/>
             <a:ext cx="4098244" cy="0"/>
           </a:xfrm>
           <a:prstGeom prst="line">
@@ -15280,7 +16596,7 @@
       </p:cxnSp>
       <p:cxnSp>
         <p:nvCxnSpPr>
-          <p:cNvPr id="406" name="Straight Connector 405">
+          <p:cNvPr id="435" name="Straight Connector 434">
             <a:extLst>
               <a:ext uri="{FF2B5EF4-FFF2-40B4-BE49-F238E27FC236}">
                 <a16:creationId xmlns:a16="http://schemas.microsoft.com/office/drawing/2014/main" id="{8DF50D70-4022-681C-3D6E-62589944E0DE}"/>
@@ -15294,7 +16610,7 @@
         </p:nvCxnSpPr>
         <p:spPr>
           <a:xfrm rot="5400000">
-            <a:off x="3202002" y="4766588"/>
+            <a:off x="3202002" y="4291213"/>
             <a:ext cx="1800000" cy="0"/>
           </a:xfrm>
           <a:prstGeom prst="line">
@@ -15327,7 +16643,7 @@
       </p:cxnSp>
       <p:cxnSp>
         <p:nvCxnSpPr>
-          <p:cNvPr id="407" name="Straight Connector 406">
+          <p:cNvPr id="436" name="Straight Connector 435">
             <a:extLst>
               <a:ext uri="{FF2B5EF4-FFF2-40B4-BE49-F238E27FC236}">
                 <a16:creationId xmlns:a16="http://schemas.microsoft.com/office/drawing/2014/main" id="{1838FD34-08CA-AAAA-623C-682B4FB2B83D}"/>
@@ -15341,7 +16657,7 @@
         </p:nvCxnSpPr>
         <p:spPr>
           <a:xfrm rot="5400000">
-            <a:off x="-881663" y="4766588"/>
+            <a:off x="-881663" y="4291213"/>
             <a:ext cx="1800000" cy="0"/>
           </a:xfrm>
           <a:prstGeom prst="line">
@@ -15374,7 +16690,7 @@
       </p:cxnSp>
       <p:cxnSp>
         <p:nvCxnSpPr>
-          <p:cNvPr id="408" name="Straight Arrow Connector 407">
+          <p:cNvPr id="437" name="Straight Arrow Connector 436">
             <a:extLst>
               <a:ext uri="{FF2B5EF4-FFF2-40B4-BE49-F238E27FC236}">
                 <a16:creationId xmlns:a16="http://schemas.microsoft.com/office/drawing/2014/main" id="{16B06205-7085-528A-105F-F605E5D44E11}"/>
@@ -15388,8 +16704,8 @@
         </p:nvCxnSpPr>
         <p:spPr>
           <a:xfrm>
-            <a:off x="2062148" y="6319996"/>
-            <a:ext cx="0" cy="184430"/>
+            <a:off x="2071201" y="5771690"/>
+            <a:ext cx="0" cy="90000"/>
           </a:xfrm>
           <a:prstGeom prst="straightConnector1">
             <a:avLst/>
@@ -15419,6 +16735,121 @@
           </a:fontRef>
         </p:style>
       </p:cxnSp>
+      <p:sp>
+        <p:nvSpPr>
+          <p:cNvPr id="438" name="Rectangle 437">
+            <a:extLst>
+              <a:ext uri="{FF2B5EF4-FFF2-40B4-BE49-F238E27FC236}">
+                <a16:creationId xmlns:a16="http://schemas.microsoft.com/office/drawing/2014/main" id="{28AEAA1C-A4B2-C456-3DF2-85203C0EBF3D}"/>
+              </a:ext>
+            </a:extLst>
+          </p:cNvPr>
+          <p:cNvSpPr/>
+          <p:nvPr/>
+        </p:nvSpPr>
+        <p:spPr>
+          <a:xfrm>
+            <a:off x="1490225" y="2496860"/>
+            <a:ext cx="761396" cy="152436"/>
+          </a:xfrm>
+          <a:prstGeom prst="rect">
+            <a:avLst/>
+          </a:prstGeom>
+          <a:noFill/>
+          <a:ln w="19050">
+            <a:noFill/>
+          </a:ln>
+        </p:spPr>
+        <p:style>
+          <a:lnRef idx="2">
+            <a:schemeClr val="accent1">
+              <a:shade val="15000"/>
+            </a:schemeClr>
+          </a:lnRef>
+          <a:fillRef idx="1">
+            <a:schemeClr val="accent1"/>
+          </a:fillRef>
+          <a:effectRef idx="0">
+            <a:schemeClr val="accent1"/>
+          </a:effectRef>
+          <a:fontRef idx="minor">
+            <a:schemeClr val="lt1"/>
+          </a:fontRef>
+        </p:style>
+        <p:txBody>
+          <a:bodyPr rtlCol="0" anchor="ctr"/>
+          <a:lstStyle/>
+          <a:p>
+            <a:pPr algn="ctr"/>
+            <a:r>
+              <a:rPr lang="en-GB" sz="800" b="1" dirty="0">
+                <a:solidFill>
+                  <a:schemeClr val="tx1">
+                    <a:lumMod val="75000"/>
+                    <a:lumOff val="25000"/>
+                  </a:schemeClr>
+                </a:solidFill>
+                <a:latin typeface="Calibri" panose="020F0502020204030204" pitchFamily="34" charset="0"/>
+                <a:cs typeface="Calibri" panose="020F0502020204030204" pitchFamily="34" charset="0"/>
+              </a:rPr>
+              <a:t>n_trials </a:t>
+            </a:r>
+            <a:r>
+              <a:rPr lang="en-GB" sz="800" b="1" dirty="0">
+                <a:solidFill>
+                  <a:schemeClr val="tx1">
+                    <a:lumMod val="75000"/>
+                    <a:lumOff val="25000"/>
+                  </a:schemeClr>
+                </a:solidFill>
+                <a:latin typeface="Calibri Light" panose="020F0302020204030204" pitchFamily="34" charset="0"/>
+                <a:cs typeface="Calibri Light" panose="020F0302020204030204" pitchFamily="34" charset="0"/>
+              </a:rPr>
+              <a:t>= 20 </a:t>
+            </a:r>
+            <a:endParaRPr lang="en-GB" sz="800" dirty="0">
+              <a:solidFill>
+                <a:schemeClr val="tx1">
+                  <a:lumMod val="75000"/>
+                  <a:lumOff val="25000"/>
+                </a:schemeClr>
+              </a:solidFill>
+              <a:latin typeface="Calibri Light" panose="020F0302020204030204" pitchFamily="34" charset="0"/>
+              <a:cs typeface="Calibri Light" panose="020F0302020204030204" pitchFamily="34" charset="0"/>
+            </a:endParaRPr>
+          </a:p>
+        </p:txBody>
+      </p:sp>
+      <p:pic>
+        <p:nvPicPr>
+          <p:cNvPr id="439" name="Picture 438">
+            <a:extLst>
+              <a:ext uri="{FF2B5EF4-FFF2-40B4-BE49-F238E27FC236}">
+                <a16:creationId xmlns:a16="http://schemas.microsoft.com/office/drawing/2014/main" id="{5478F336-4A82-C851-031E-7B68A3B8EB1A}"/>
+              </a:ext>
+            </a:extLst>
+          </p:cNvPr>
+          <p:cNvPicPr>
+            <a:picLocks noChangeAspect="1"/>
+          </p:cNvPicPr>
+          <p:nvPr/>
+        </p:nvPicPr>
+        <p:blipFill>
+          <a:blip r:embed="rId4"/>
+          <a:stretch>
+            <a:fillRect/>
+          </a:stretch>
+        </p:blipFill>
+        <p:spPr>
+          <a:xfrm>
+            <a:off x="-27159" y="753245"/>
+            <a:ext cx="4140200" cy="1875899"/>
+          </a:xfrm>
+          <a:prstGeom prst="rect">
+            <a:avLst/>
+          </a:prstGeom>
+        </p:spPr>
+      </p:pic>
     </p:spTree>
     <p:extLst>
       <p:ext uri="{BB962C8B-B14F-4D97-AF65-F5344CB8AC3E}">
@@ -15463,8 +16894,8 @@
         </p:nvSpPr>
         <p:spPr>
           <a:xfrm>
-            <a:off x="-1093826" y="1540268"/>
-            <a:ext cx="5752304" cy="815363"/>
+            <a:off x="-1139092" y="1125717"/>
+            <a:ext cx="5797569" cy="815363"/>
           </a:xfrm>
           <a:prstGeom prst="rect">
             <a:avLst/>
@@ -15522,7 +16953,7 @@
         </p:nvSpPr>
         <p:spPr>
           <a:xfrm>
-            <a:off x="-1270727" y="2419306"/>
+            <a:off x="-1270727" y="2004755"/>
             <a:ext cx="1738395" cy="815363"/>
           </a:xfrm>
           <a:prstGeom prst="rect">
@@ -15581,7 +17012,7 @@
         </p:nvSpPr>
         <p:spPr>
           <a:xfrm>
-            <a:off x="-317225" y="2087610"/>
+            <a:off x="-317225" y="1673059"/>
             <a:ext cx="734593" cy="236965"/>
           </a:xfrm>
           <a:prstGeom prst="rect">
@@ -15650,7 +17081,7 @@
         </p:nvSpPr>
         <p:spPr>
           <a:xfrm>
-            <a:off x="-274068" y="2450096"/>
+            <a:off x="-274068" y="2035545"/>
             <a:ext cx="227487" cy="236965"/>
           </a:xfrm>
           <a:prstGeom prst="rect">
@@ -15711,7 +17142,7 @@
         </p:nvSpPr>
         <p:spPr>
           <a:xfrm>
-            <a:off x="-274068" y="2700668"/>
+            <a:off x="-274068" y="2286117"/>
             <a:ext cx="227487" cy="236965"/>
           </a:xfrm>
           <a:prstGeom prst="rect">
@@ -15772,7 +17203,7 @@
         </p:nvSpPr>
         <p:spPr>
           <a:xfrm>
-            <a:off x="-274068" y="2962705"/>
+            <a:off x="-274068" y="2548154"/>
             <a:ext cx="227487" cy="236965"/>
           </a:xfrm>
           <a:prstGeom prst="rect">
@@ -15833,7 +17264,7 @@
         </p:nvSpPr>
         <p:spPr>
           <a:xfrm>
-            <a:off x="447247" y="2087610"/>
+            <a:off x="447247" y="1673059"/>
             <a:ext cx="189572" cy="236965"/>
           </a:xfrm>
           <a:prstGeom prst="rect">
@@ -15894,7 +17325,7 @@
         </p:nvSpPr>
         <p:spPr>
           <a:xfrm>
-            <a:off x="-63672" y="2450096"/>
+            <a:off x="-63672" y="2035545"/>
             <a:ext cx="227487" cy="236965"/>
           </a:xfrm>
           <a:prstGeom prst="rect">
@@ -15955,7 +17386,7 @@
         </p:nvSpPr>
         <p:spPr>
           <a:xfrm>
-            <a:off x="-63672" y="2700668"/>
+            <a:off x="-63672" y="2286117"/>
             <a:ext cx="227487" cy="236965"/>
           </a:xfrm>
           <a:prstGeom prst="rect">
@@ -16016,7 +17447,7 @@
         </p:nvSpPr>
         <p:spPr>
           <a:xfrm>
-            <a:off x="-63672" y="2962705"/>
+            <a:off x="-63672" y="2548154"/>
             <a:ext cx="227487" cy="236965"/>
           </a:xfrm>
           <a:prstGeom prst="rect">
@@ -16077,7 +17508,7 @@
         </p:nvSpPr>
         <p:spPr>
           <a:xfrm>
-            <a:off x="189883" y="2450096"/>
+            <a:off x="189884" y="2035545"/>
             <a:ext cx="227487" cy="236965"/>
           </a:xfrm>
           <a:prstGeom prst="rect">
@@ -16138,7 +17569,7 @@
         </p:nvSpPr>
         <p:spPr>
           <a:xfrm>
-            <a:off x="189883" y="2700668"/>
+            <a:off x="189884" y="2286117"/>
             <a:ext cx="227487" cy="236965"/>
           </a:xfrm>
           <a:prstGeom prst="rect">
@@ -16199,7 +17630,7 @@
         </p:nvSpPr>
         <p:spPr>
           <a:xfrm>
-            <a:off x="189883" y="2962705"/>
+            <a:off x="189884" y="2548154"/>
             <a:ext cx="227487" cy="236965"/>
           </a:xfrm>
           <a:prstGeom prst="rect">
@@ -16260,7 +17691,7 @@
         </p:nvSpPr>
         <p:spPr>
           <a:xfrm>
-            <a:off x="-311043" y="1754295"/>
+            <a:off x="-311043" y="1339744"/>
             <a:ext cx="947861" cy="236965"/>
           </a:xfrm>
           <a:prstGeom prst="rect">
@@ -16343,7 +17774,7 @@
         </p:nvSpPr>
         <p:spPr>
           <a:xfrm>
-            <a:off x="707331" y="2450096"/>
+            <a:off x="707332" y="2035545"/>
             <a:ext cx="227487" cy="236965"/>
           </a:xfrm>
           <a:prstGeom prst="rect">
@@ -16404,7 +17835,7 @@
         </p:nvSpPr>
         <p:spPr>
           <a:xfrm>
-            <a:off x="707331" y="2700668"/>
+            <a:off x="707332" y="2286117"/>
             <a:ext cx="227487" cy="236965"/>
           </a:xfrm>
           <a:prstGeom prst="rect">
@@ -16465,7 +17896,7 @@
         </p:nvSpPr>
         <p:spPr>
           <a:xfrm>
-            <a:off x="707331" y="2962705"/>
+            <a:off x="707332" y="2548154"/>
             <a:ext cx="227487" cy="236965"/>
           </a:xfrm>
           <a:prstGeom prst="rect">
@@ -16526,7 +17957,7 @@
         </p:nvSpPr>
         <p:spPr>
           <a:xfrm>
-            <a:off x="1471799" y="2087610"/>
+            <a:off x="1471799" y="1673059"/>
             <a:ext cx="189572" cy="236965"/>
           </a:xfrm>
           <a:prstGeom prst="rect">
@@ -16587,7 +18018,7 @@
         </p:nvSpPr>
         <p:spPr>
           <a:xfrm>
-            <a:off x="960883" y="2450096"/>
+            <a:off x="960884" y="2035545"/>
             <a:ext cx="227487" cy="236965"/>
           </a:xfrm>
           <a:prstGeom prst="rect">
@@ -16648,7 +18079,7 @@
         </p:nvSpPr>
         <p:spPr>
           <a:xfrm>
-            <a:off x="960883" y="2700668"/>
+            <a:off x="960884" y="2286117"/>
             <a:ext cx="227487" cy="236965"/>
           </a:xfrm>
           <a:prstGeom prst="rect">
@@ -16709,7 +18140,7 @@
         </p:nvSpPr>
         <p:spPr>
           <a:xfrm>
-            <a:off x="960883" y="2962705"/>
+            <a:off x="960884" y="2548154"/>
             <a:ext cx="227487" cy="236965"/>
           </a:xfrm>
           <a:prstGeom prst="rect">
@@ -16770,7 +18201,7 @@
         </p:nvSpPr>
         <p:spPr>
           <a:xfrm>
-            <a:off x="1214436" y="2450096"/>
+            <a:off x="1214437" y="2035545"/>
             <a:ext cx="227487" cy="236965"/>
           </a:xfrm>
           <a:prstGeom prst="rect">
@@ -16831,7 +18262,7 @@
         </p:nvSpPr>
         <p:spPr>
           <a:xfrm>
-            <a:off x="1214436" y="2700668"/>
+            <a:off x="1214437" y="2286117"/>
             <a:ext cx="227487" cy="236965"/>
           </a:xfrm>
           <a:prstGeom prst="rect">
@@ -16892,7 +18323,7 @@
         </p:nvSpPr>
         <p:spPr>
           <a:xfrm>
-            <a:off x="1214436" y="2962705"/>
+            <a:off x="1214437" y="2548154"/>
             <a:ext cx="227487" cy="236965"/>
           </a:xfrm>
           <a:prstGeom prst="rect">
@@ -16953,7 +18384,7 @@
         </p:nvSpPr>
         <p:spPr>
           <a:xfrm>
-            <a:off x="713508" y="1754295"/>
+            <a:off x="713509" y="1339744"/>
             <a:ext cx="947861" cy="236965"/>
           </a:xfrm>
           <a:prstGeom prst="rect">
@@ -17036,7 +18467,7 @@
         </p:nvSpPr>
         <p:spPr>
           <a:xfrm>
-            <a:off x="1689025" y="2450096"/>
+            <a:off x="1689026" y="2035545"/>
             <a:ext cx="227487" cy="236965"/>
           </a:xfrm>
           <a:prstGeom prst="rect">
@@ -17097,7 +18528,7 @@
         </p:nvSpPr>
         <p:spPr>
           <a:xfrm>
-            <a:off x="1689025" y="2700668"/>
+            <a:off x="1689026" y="2286117"/>
             <a:ext cx="227487" cy="236965"/>
           </a:xfrm>
           <a:prstGeom prst="rect">
@@ -17158,7 +18589,7 @@
         </p:nvSpPr>
         <p:spPr>
           <a:xfrm>
-            <a:off x="1689025" y="2962705"/>
+            <a:off x="1689026" y="2548154"/>
             <a:ext cx="227487" cy="236965"/>
           </a:xfrm>
           <a:prstGeom prst="rect">
@@ -17219,7 +18650,7 @@
         </p:nvSpPr>
         <p:spPr>
           <a:xfrm>
-            <a:off x="2453495" y="2087610"/>
+            <a:off x="2453495" y="1673059"/>
             <a:ext cx="189572" cy="236965"/>
           </a:xfrm>
           <a:prstGeom prst="rect">
@@ -17280,7 +18711,7 @@
         </p:nvSpPr>
         <p:spPr>
           <a:xfrm>
-            <a:off x="1942579" y="2450096"/>
+            <a:off x="1942580" y="2035545"/>
             <a:ext cx="227487" cy="236965"/>
           </a:xfrm>
           <a:prstGeom prst="rect">
@@ -17341,7 +18772,7 @@
         </p:nvSpPr>
         <p:spPr>
           <a:xfrm>
-            <a:off x="1942579" y="2700668"/>
+            <a:off x="1942580" y="2286117"/>
             <a:ext cx="227487" cy="236965"/>
           </a:xfrm>
           <a:prstGeom prst="rect">
@@ -17402,7 +18833,7 @@
         </p:nvSpPr>
         <p:spPr>
           <a:xfrm>
-            <a:off x="1942579" y="2962705"/>
+            <a:off x="1942580" y="2548154"/>
             <a:ext cx="227487" cy="236965"/>
           </a:xfrm>
           <a:prstGeom prst="rect">
@@ -17463,7 +18894,7 @@
         </p:nvSpPr>
         <p:spPr>
           <a:xfrm>
-            <a:off x="2196132" y="2450096"/>
+            <a:off x="2196133" y="2035545"/>
             <a:ext cx="227487" cy="236965"/>
           </a:xfrm>
           <a:prstGeom prst="rect">
@@ -17524,7 +18955,7 @@
         </p:nvSpPr>
         <p:spPr>
           <a:xfrm>
-            <a:off x="2196132" y="2700668"/>
+            <a:off x="2196133" y="2286117"/>
             <a:ext cx="227487" cy="236965"/>
           </a:xfrm>
           <a:prstGeom prst="rect">
@@ -17585,7 +19016,7 @@
         </p:nvSpPr>
         <p:spPr>
           <a:xfrm>
-            <a:off x="2196132" y="2962705"/>
+            <a:off x="2196133" y="2548154"/>
             <a:ext cx="227487" cy="236965"/>
           </a:xfrm>
           <a:prstGeom prst="rect">
@@ -17646,7 +19077,7 @@
         </p:nvSpPr>
         <p:spPr>
           <a:xfrm>
-            <a:off x="1695204" y="1754295"/>
+            <a:off x="1695205" y="1339744"/>
             <a:ext cx="947861" cy="236965"/>
           </a:xfrm>
           <a:prstGeom prst="rect">
@@ -17729,7 +19160,7 @@
         </p:nvSpPr>
         <p:spPr>
           <a:xfrm>
-            <a:off x="2663280" y="2450096"/>
+            <a:off x="2663281" y="2035545"/>
             <a:ext cx="227487" cy="236965"/>
           </a:xfrm>
           <a:prstGeom prst="rect">
@@ -17790,7 +19221,7 @@
         </p:nvSpPr>
         <p:spPr>
           <a:xfrm>
-            <a:off x="2663280" y="2700668"/>
+            <a:off x="2663281" y="2286117"/>
             <a:ext cx="227487" cy="236965"/>
           </a:xfrm>
           <a:prstGeom prst="rect">
@@ -17851,7 +19282,7 @@
         </p:nvSpPr>
         <p:spPr>
           <a:xfrm>
-            <a:off x="2663280" y="2962705"/>
+            <a:off x="2663281" y="2548154"/>
             <a:ext cx="227487" cy="236965"/>
           </a:xfrm>
           <a:prstGeom prst="rect">
@@ -17912,7 +19343,7 @@
         </p:nvSpPr>
         <p:spPr>
           <a:xfrm>
-            <a:off x="3427748" y="2087610"/>
+            <a:off x="3427748" y="1673059"/>
             <a:ext cx="189572" cy="236965"/>
           </a:xfrm>
           <a:prstGeom prst="rect">
@@ -17973,7 +19404,7 @@
         </p:nvSpPr>
         <p:spPr>
           <a:xfrm>
-            <a:off x="2916832" y="2450096"/>
+            <a:off x="2916833" y="2035545"/>
             <a:ext cx="227487" cy="236965"/>
           </a:xfrm>
           <a:prstGeom prst="rect">
@@ -18034,7 +19465,7 @@
         </p:nvSpPr>
         <p:spPr>
           <a:xfrm>
-            <a:off x="2916832" y="2700668"/>
+            <a:off x="2916833" y="2286117"/>
             <a:ext cx="227487" cy="236965"/>
           </a:xfrm>
           <a:prstGeom prst="rect">
@@ -18095,7 +19526,7 @@
         </p:nvSpPr>
         <p:spPr>
           <a:xfrm>
-            <a:off x="2916832" y="2962705"/>
+            <a:off x="2916833" y="2548154"/>
             <a:ext cx="227487" cy="236965"/>
           </a:xfrm>
           <a:prstGeom prst="rect">
@@ -18156,7 +19587,7 @@
         </p:nvSpPr>
         <p:spPr>
           <a:xfrm>
-            <a:off x="3170385" y="2450096"/>
+            <a:off x="3170386" y="2035545"/>
             <a:ext cx="227487" cy="236965"/>
           </a:xfrm>
           <a:prstGeom prst="rect">
@@ -18217,7 +19648,7 @@
         </p:nvSpPr>
         <p:spPr>
           <a:xfrm>
-            <a:off x="3170385" y="2700668"/>
+            <a:off x="3170386" y="2286117"/>
             <a:ext cx="227487" cy="236965"/>
           </a:xfrm>
           <a:prstGeom prst="rect">
@@ -18278,7 +19709,7 @@
         </p:nvSpPr>
         <p:spPr>
           <a:xfrm>
-            <a:off x="3170385" y="2962705"/>
+            <a:off x="3170386" y="2548154"/>
             <a:ext cx="227487" cy="236965"/>
           </a:xfrm>
           <a:prstGeom prst="rect">
@@ -18339,7 +19770,7 @@
         </p:nvSpPr>
         <p:spPr>
           <a:xfrm>
-            <a:off x="2669458" y="1754295"/>
+            <a:off x="2669459" y="1339744"/>
             <a:ext cx="947861" cy="236965"/>
           </a:xfrm>
           <a:prstGeom prst="rect">
@@ -18422,7 +19853,7 @@
         </p:nvSpPr>
         <p:spPr>
           <a:xfrm>
-            <a:off x="3644975" y="2450096"/>
+            <a:off x="3644976" y="2035545"/>
             <a:ext cx="227487" cy="236965"/>
           </a:xfrm>
           <a:prstGeom prst="rect">
@@ -18483,7 +19914,7 @@
         </p:nvSpPr>
         <p:spPr>
           <a:xfrm>
-            <a:off x="3644975" y="2700668"/>
+            <a:off x="3644976" y="2286117"/>
             <a:ext cx="227487" cy="236965"/>
           </a:xfrm>
           <a:prstGeom prst="rect">
@@ -18544,7 +19975,7 @@
         </p:nvSpPr>
         <p:spPr>
           <a:xfrm>
-            <a:off x="3644975" y="2962705"/>
+            <a:off x="3644976" y="2548154"/>
             <a:ext cx="227487" cy="236965"/>
           </a:xfrm>
           <a:prstGeom prst="rect">
@@ -18605,7 +20036,7 @@
         </p:nvSpPr>
         <p:spPr>
           <a:xfrm>
-            <a:off x="4366286" y="2087610"/>
+            <a:off x="4366286" y="1673059"/>
             <a:ext cx="189572" cy="236965"/>
           </a:xfrm>
           <a:prstGeom prst="rect">
@@ -18666,7 +20097,7 @@
         </p:nvSpPr>
         <p:spPr>
           <a:xfrm>
-            <a:off x="3898528" y="2450096"/>
+            <a:off x="3898529" y="2035545"/>
             <a:ext cx="227487" cy="236965"/>
           </a:xfrm>
           <a:prstGeom prst="rect">
@@ -18727,7 +20158,7 @@
         </p:nvSpPr>
         <p:spPr>
           <a:xfrm>
-            <a:off x="3898528" y="2700668"/>
+            <a:off x="3898529" y="2286117"/>
             <a:ext cx="227487" cy="236965"/>
           </a:xfrm>
           <a:prstGeom prst="rect">
@@ -18788,7 +20219,7 @@
         </p:nvSpPr>
         <p:spPr>
           <a:xfrm>
-            <a:off x="3898528" y="2962705"/>
+            <a:off x="3898529" y="2548154"/>
             <a:ext cx="227487" cy="236965"/>
           </a:xfrm>
           <a:prstGeom prst="rect">
@@ -18849,7 +20280,7 @@
         </p:nvSpPr>
         <p:spPr>
           <a:xfrm>
-            <a:off x="4152081" y="2450096"/>
+            <a:off x="4152081" y="2035545"/>
             <a:ext cx="227487" cy="236965"/>
           </a:xfrm>
           <a:prstGeom prst="rect">
@@ -18910,7 +20341,7 @@
         </p:nvSpPr>
         <p:spPr>
           <a:xfrm>
-            <a:off x="4152081" y="2700668"/>
+            <a:off x="4152081" y="2286117"/>
             <a:ext cx="227487" cy="236965"/>
           </a:xfrm>
           <a:prstGeom prst="rect">
@@ -18971,7 +20402,7 @@
         </p:nvSpPr>
         <p:spPr>
           <a:xfrm>
-            <a:off x="4152081" y="2962705"/>
+            <a:off x="4152081" y="2548154"/>
             <a:ext cx="227487" cy="236965"/>
           </a:xfrm>
           <a:prstGeom prst="rect">
@@ -19032,7 +20463,7 @@
         </p:nvSpPr>
         <p:spPr>
           <a:xfrm>
-            <a:off x="3651154" y="1754295"/>
+            <a:off x="3651155" y="1339744"/>
             <a:ext cx="947861" cy="236965"/>
           </a:xfrm>
           <a:prstGeom prst="rect">
@@ -19129,7 +20560,7 @@
         </p:blipFill>
         <p:spPr>
           <a:xfrm>
-            <a:off x="-1011230" y="1830088"/>
+            <a:off x="-1074601" y="1415536"/>
             <a:ext cx="142180" cy="142180"/>
           </a:xfrm>
           <a:prstGeom prst="rect">
@@ -19151,7 +20582,7 @@
         </p:nvSpPr>
         <p:spPr>
           <a:xfrm>
-            <a:off x="-1234545" y="1762392"/>
+            <a:off x="-1297916" y="1347841"/>
             <a:ext cx="1018951" cy="256659"/>
           </a:xfrm>
           <a:prstGeom prst="rect">
@@ -19226,7 +20657,7 @@
         </p:nvSpPr>
         <p:spPr>
           <a:xfrm>
-            <a:off x="-1414287" y="2678687"/>
+            <a:off x="-1441446" y="2273189"/>
             <a:ext cx="1018951" cy="256659"/>
           </a:xfrm>
           <a:prstGeom prst="rect">
@@ -19301,7 +20732,7 @@
         </p:nvSpPr>
         <p:spPr>
           <a:xfrm>
-            <a:off x="-481628" y="2450096"/>
+            <a:off x="-481628" y="2035544"/>
             <a:ext cx="175551" cy="724042"/>
           </a:xfrm>
           <a:prstGeom prst="leftBrace">
@@ -19373,7 +20804,7 @@
         </p:blipFill>
         <p:spPr>
           <a:xfrm>
-            <a:off x="-1192849" y="2747077"/>
+            <a:off x="-1220008" y="2341578"/>
             <a:ext cx="142180" cy="142180"/>
           </a:xfrm>
           <a:prstGeom prst="rect">
@@ -19395,7 +20826,7 @@
         </p:nvSpPr>
         <p:spPr>
           <a:xfrm>
-            <a:off x="-310824" y="1539218"/>
+            <a:off x="-310824" y="1124666"/>
             <a:ext cx="947641" cy="239114"/>
           </a:xfrm>
           <a:prstGeom prst="rect">
@@ -19440,7 +20871,7 @@
         </p:nvSpPr>
         <p:spPr>
           <a:xfrm>
-            <a:off x="713509" y="2087610"/>
+            <a:off x="713510" y="1673059"/>
             <a:ext cx="734593" cy="236965"/>
           </a:xfrm>
           <a:prstGeom prst="rect">
@@ -19509,7 +20940,7 @@
         </p:nvSpPr>
         <p:spPr>
           <a:xfrm>
-            <a:off x="1695206" y="2087610"/>
+            <a:off x="1695207" y="1673059"/>
             <a:ext cx="734593" cy="236965"/>
           </a:xfrm>
           <a:prstGeom prst="rect">
@@ -19578,7 +21009,7 @@
         </p:nvSpPr>
         <p:spPr>
           <a:xfrm>
-            <a:off x="2669459" y="2087610"/>
+            <a:off x="2669460" y="1673059"/>
             <a:ext cx="734593" cy="236965"/>
           </a:xfrm>
           <a:prstGeom prst="rect">
@@ -19647,7 +21078,7 @@
         </p:nvSpPr>
         <p:spPr>
           <a:xfrm>
-            <a:off x="3651156" y="2087610"/>
+            <a:off x="3651157" y="1673059"/>
             <a:ext cx="734593" cy="236965"/>
           </a:xfrm>
           <a:prstGeom prst="rect">
@@ -19716,7 +21147,7 @@
         </p:nvSpPr>
         <p:spPr>
           <a:xfrm>
-            <a:off x="717283" y="1539218"/>
+            <a:off x="717284" y="1124666"/>
             <a:ext cx="947641" cy="239114"/>
           </a:xfrm>
           <a:prstGeom prst="rect">
@@ -19761,7 +21192,7 @@
         </p:nvSpPr>
         <p:spPr>
           <a:xfrm>
-            <a:off x="1698577" y="1539218"/>
+            <a:off x="1698578" y="1124666"/>
             <a:ext cx="947641" cy="239114"/>
           </a:xfrm>
           <a:prstGeom prst="rect">
@@ -19806,7 +21237,7 @@
         </p:nvSpPr>
         <p:spPr>
           <a:xfrm>
-            <a:off x="2679869" y="1539218"/>
+            <a:off x="2679870" y="1124666"/>
             <a:ext cx="947641" cy="239114"/>
           </a:xfrm>
           <a:prstGeom prst="rect">
@@ -19851,7 +21282,7 @@
         </p:nvSpPr>
         <p:spPr>
           <a:xfrm>
-            <a:off x="3661159" y="1539218"/>
+            <a:off x="3661160" y="1124666"/>
             <a:ext cx="947641" cy="239114"/>
           </a:xfrm>
           <a:prstGeom prst="rect">
@@ -19910,7 +21341,7 @@
         </p:blipFill>
         <p:spPr>
           <a:xfrm>
-            <a:off x="360945" y="851315"/>
+            <a:off x="360946" y="482028"/>
             <a:ext cx="135127" cy="142180"/>
           </a:xfrm>
           <a:prstGeom prst="rect">
@@ -19932,7 +21363,7 @@
         </p:nvSpPr>
         <p:spPr>
           <a:xfrm>
-            <a:off x="262901" y="790261"/>
+            <a:off x="262902" y="420975"/>
             <a:ext cx="2825663" cy="256659"/>
           </a:xfrm>
           <a:prstGeom prst="rect">
@@ -19988,7 +21419,7 @@
                 <a:latin typeface="Calibri Light" panose="020F0302020204030204" pitchFamily="34" charset="0"/>
                 <a:cs typeface="Calibri Light" panose="020F0302020204030204" pitchFamily="34" charset="0"/>
               </a:rPr>
-              <a:t>= 1 (</a:t>
+              <a:t>= 1 ( </a:t>
             </a:r>
             <a:r>
               <a:rPr lang="en-GB" sz="919" b="1" dirty="0">
@@ -20033,8 +21464,8 @@
         </p:nvSpPr>
         <p:spPr>
           <a:xfrm>
-            <a:off x="-882370" y="1239615"/>
-            <a:ext cx="1350039" cy="256659"/>
+            <a:off x="-1139092" y="906541"/>
+            <a:ext cx="5797569" cy="256659"/>
           </a:xfrm>
           <a:prstGeom prst="rect">
             <a:avLst/>
@@ -20076,23 +21507,7 @@
                 <a:latin typeface="Calibri" panose="020F0502020204030204" pitchFamily="34" charset="0"/>
                 <a:cs typeface="Calibri" panose="020F0502020204030204" pitchFamily="34" charset="0"/>
               </a:rPr>
-              <a:t>Outer Cross-Validation</a:t>
-            </a:r>
-          </a:p>
-          <a:p>
-            <a:pPr algn="ctr"/>
-            <a:r>
-              <a:rPr lang="en-GB" sz="922" b="1" dirty="0">
-                <a:solidFill>
-                  <a:schemeClr val="tx1">
-                    <a:lumMod val="75000"/>
-                    <a:lumOff val="25000"/>
-                  </a:schemeClr>
-                </a:solidFill>
-                <a:latin typeface="Calibri" panose="020F0502020204030204" pitchFamily="34" charset="0"/>
-                <a:cs typeface="Calibri" panose="020F0502020204030204" pitchFamily="34" charset="0"/>
-              </a:rPr>
-              <a:t>(Model generalisation)</a:t>
+              <a:t>Outer Cross-Validation (Model generalisation)</a:t>
             </a:r>
             <a:endParaRPr lang="en-GB" sz="922" b="1" dirty="0">
               <a:solidFill>
@@ -20121,8 +21536,8 @@
         </p:nvSpPr>
         <p:spPr>
           <a:xfrm>
-            <a:off x="-1277702" y="3247625"/>
-            <a:ext cx="1745370" cy="256659"/>
+            <a:off x="-1308998" y="2847634"/>
+            <a:ext cx="1985033" cy="256659"/>
           </a:xfrm>
           <a:prstGeom prst="rect">
             <a:avLst/>
@@ -20180,7 +21595,7 @@
                 <a:latin typeface="Calibri" panose="020F0502020204030204" pitchFamily="34" charset="0"/>
                 <a:cs typeface="Calibri" panose="020F0502020204030204" pitchFamily="34" charset="0"/>
               </a:rPr>
-              <a:t>(Hyperparameter tuning)</a:t>
+              <a:t>(Optuna hyperparameter tuning)</a:t>
             </a:r>
             <a:endParaRPr lang="en-GB" sz="922" b="1" dirty="0">
               <a:solidFill>
@@ -20209,7 +21624,7 @@
         </p:nvSpPr>
         <p:spPr>
           <a:xfrm rot="16200000">
-            <a:off x="1505768" y="-1811202"/>
+            <a:off x="1505769" y="-2180489"/>
             <a:ext cx="277745" cy="6027680"/>
           </a:xfrm>
           <a:prstGeom prst="rightBrace">
@@ -20277,7 +21692,7 @@
         </p:blipFill>
         <p:spPr bwMode="auto">
           <a:xfrm>
-            <a:off x="2481755" y="821797"/>
+            <a:off x="2481756" y="452511"/>
             <a:ext cx="268351" cy="174919"/>
           </a:xfrm>
           <a:prstGeom prst="rect">
@@ -20339,7 +21754,7 @@
         </p:nvSpPr>
         <p:spPr>
           <a:xfrm>
-            <a:off x="118992" y="4239305"/>
+            <a:off x="118993" y="3942443"/>
             <a:ext cx="1065053" cy="226607"/>
           </a:xfrm>
           <a:prstGeom prst="rect">
@@ -20402,7 +21817,7 @@
         </p:nvSpPr>
         <p:spPr>
           <a:xfrm>
-            <a:off x="1218037" y="4239305"/>
+            <a:off x="1218038" y="3942443"/>
             <a:ext cx="1065053" cy="226607"/>
           </a:xfrm>
           <a:prstGeom prst="rect">
@@ -20465,7 +21880,7 @@
         </p:nvSpPr>
         <p:spPr>
           <a:xfrm>
-            <a:off x="2317083" y="4239305"/>
+            <a:off x="2317084" y="3942443"/>
             <a:ext cx="1065053" cy="226607"/>
           </a:xfrm>
           <a:prstGeom prst="rect">
@@ -20528,7 +21943,7 @@
         </p:nvSpPr>
         <p:spPr>
           <a:xfrm>
-            <a:off x="118992" y="4505274"/>
+            <a:off x="118993" y="4208412"/>
             <a:ext cx="1065053" cy="226607"/>
           </a:xfrm>
           <a:prstGeom prst="rect">
@@ -20591,7 +22006,7 @@
         </p:nvSpPr>
         <p:spPr>
           <a:xfrm>
-            <a:off x="1218037" y="4505274"/>
+            <a:off x="1218038" y="4208412"/>
             <a:ext cx="1065053" cy="226607"/>
           </a:xfrm>
           <a:prstGeom prst="rect">
@@ -20654,7 +22069,7 @@
         </p:nvSpPr>
         <p:spPr>
           <a:xfrm>
-            <a:off x="2317083" y="4505274"/>
+            <a:off x="2317084" y="4208412"/>
             <a:ext cx="1065053" cy="226607"/>
           </a:xfrm>
           <a:prstGeom prst="rect">
@@ -20717,7 +22132,7 @@
         </p:nvSpPr>
         <p:spPr>
           <a:xfrm>
-            <a:off x="118992" y="4761213"/>
+            <a:off x="118993" y="4464351"/>
             <a:ext cx="1065053" cy="226607"/>
           </a:xfrm>
           <a:prstGeom prst="rect">
@@ -20780,7 +22195,7 @@
         </p:nvSpPr>
         <p:spPr>
           <a:xfrm>
-            <a:off x="1218037" y="4761213"/>
+            <a:off x="1218038" y="4464351"/>
             <a:ext cx="1065053" cy="226607"/>
           </a:xfrm>
           <a:prstGeom prst="rect">
@@ -20843,7 +22258,7 @@
         </p:nvSpPr>
         <p:spPr>
           <a:xfrm>
-            <a:off x="2317083" y="4761213"/>
+            <a:off x="2317084" y="4464351"/>
             <a:ext cx="1065053" cy="226607"/>
           </a:xfrm>
           <a:prstGeom prst="rect">
@@ -20906,7 +22321,7 @@
         </p:nvSpPr>
         <p:spPr>
           <a:xfrm>
-            <a:off x="-300790" y="5294341"/>
+            <a:off x="-300790" y="4997479"/>
             <a:ext cx="3749686" cy="687573"/>
           </a:xfrm>
           <a:prstGeom prst="rect">
@@ -21016,7 +22431,7 @@
         </p:nvCxnSpPr>
         <p:spPr>
           <a:xfrm>
-            <a:off x="1555869" y="5055356"/>
+            <a:off x="1555869" y="4758493"/>
             <a:ext cx="0" cy="231258"/>
           </a:xfrm>
           <a:prstGeom prst="straightConnector1">
@@ -21061,7 +22476,7 @@
         </p:nvSpPr>
         <p:spPr>
           <a:xfrm>
-            <a:off x="-300790" y="3186137"/>
+            <a:off x="-300790" y="2889275"/>
             <a:ext cx="3740572" cy="399279"/>
           </a:xfrm>
           <a:prstGeom prst="rect">
@@ -21162,7 +22577,7 @@
         </p:nvSpPr>
         <p:spPr>
           <a:xfrm>
-            <a:off x="110138" y="4035458"/>
+            <a:off x="110139" y="3738596"/>
             <a:ext cx="1065053" cy="226607"/>
           </a:xfrm>
           <a:prstGeom prst="rect">
@@ -21237,7 +22652,7 @@
         </p:nvSpPr>
         <p:spPr>
           <a:xfrm>
-            <a:off x="1209182" y="4035458"/>
+            <a:off x="1209183" y="3738596"/>
             <a:ext cx="1065053" cy="226607"/>
           </a:xfrm>
           <a:prstGeom prst="rect">
@@ -21312,7 +22727,7 @@
         </p:nvSpPr>
         <p:spPr>
           <a:xfrm>
-            <a:off x="2308227" y="4035458"/>
+            <a:off x="2308228" y="3738596"/>
             <a:ext cx="1065053" cy="226607"/>
           </a:xfrm>
           <a:prstGeom prst="rect">
@@ -21387,7 +22802,7 @@
         </p:nvSpPr>
         <p:spPr>
           <a:xfrm>
-            <a:off x="-426882" y="4244605"/>
+            <a:off x="-426882" y="3947743"/>
             <a:ext cx="626914" cy="226607"/>
           </a:xfrm>
           <a:prstGeom prst="rect">
@@ -21449,7 +22864,7 @@
         </p:nvSpPr>
         <p:spPr>
           <a:xfrm>
-            <a:off x="-426882" y="4513210"/>
+            <a:off x="-426882" y="4216348"/>
             <a:ext cx="626914" cy="226607"/>
           </a:xfrm>
           <a:prstGeom prst="rect">
@@ -21511,7 +22926,7 @@
         </p:nvSpPr>
         <p:spPr>
           <a:xfrm>
-            <a:off x="-426882" y="4764227"/>
+            <a:off x="-426882" y="4467365"/>
             <a:ext cx="626914" cy="226607"/>
           </a:xfrm>
           <a:prstGeom prst="rect">
@@ -21573,7 +22988,7 @@
         </p:nvSpPr>
         <p:spPr>
           <a:xfrm>
-            <a:off x="-300788" y="3594724"/>
+            <a:off x="-300788" y="3297861"/>
             <a:ext cx="3740573" cy="3156470"/>
           </a:xfrm>
           <a:prstGeom prst="rect">
@@ -21636,7 +23051,7 @@
         </p:nvCxnSpPr>
         <p:spPr>
           <a:xfrm>
-            <a:off x="1572822" y="5987880"/>
+            <a:off x="1572822" y="5691018"/>
             <a:ext cx="0" cy="232185"/>
           </a:xfrm>
           <a:prstGeom prst="straightConnector1">
@@ -21681,7 +23096,7 @@
         </p:nvSpPr>
         <p:spPr>
           <a:xfrm>
-            <a:off x="-267485" y="6209826"/>
+            <a:off x="-267485" y="5912963"/>
             <a:ext cx="3707266" cy="541366"/>
           </a:xfrm>
           <a:prstGeom prst="rect">
@@ -21760,7 +23175,7 @@
         </p:nvSpPr>
         <p:spPr>
           <a:xfrm>
-            <a:off x="110135" y="3783108"/>
+            <a:off x="110135" y="3486245"/>
             <a:ext cx="3271998" cy="224404"/>
           </a:xfrm>
           <a:prstGeom prst="rect">
@@ -21832,7 +23247,7 @@
         </p:nvSpPr>
         <p:spPr>
           <a:xfrm>
-            <a:off x="142973" y="3573078"/>
+            <a:off x="142973" y="3276216"/>
             <a:ext cx="3263144" cy="252599"/>
           </a:xfrm>
           <a:prstGeom prst="rect">
@@ -21888,7 +23303,7 @@
         </p:blipFill>
         <p:spPr>
           <a:xfrm>
-            <a:off x="1094061" y="3395440"/>
+            <a:off x="1094062" y="3098578"/>
             <a:ext cx="135965" cy="135965"/>
           </a:xfrm>
           <a:prstGeom prst="rect">

</xml_diff>